<commit_message>
added abstract. pending refinement on slides.
</commit_message>
<xml_diff>
--- a/presentations/radical-modsim.pptx
+++ b/presentations/radical-modsim.pptx
@@ -5,7 +5,7 @@
     <p:sldMasterId id="2147483656" r:id="rId1"/>
   </p:sldMasterIdLst>
   <p:notesMasterIdLst>
-    <p:notesMasterId r:id="rId15"/>
+    <p:notesMasterId r:id="rId16"/>
   </p:notesMasterIdLst>
   <p:sldIdLst>
     <p:sldId id="256" r:id="rId2"/>
@@ -17,10 +17,11 @@
     <p:sldId id="285" r:id="rId8"/>
     <p:sldId id="286" r:id="rId9"/>
     <p:sldId id="287" r:id="rId10"/>
-    <p:sldId id="288" r:id="rId11"/>
-    <p:sldId id="289" r:id="rId12"/>
-    <p:sldId id="284" r:id="rId13"/>
-    <p:sldId id="282" r:id="rId14"/>
+    <p:sldId id="292" r:id="rId11"/>
+    <p:sldId id="288" r:id="rId12"/>
+    <p:sldId id="289" r:id="rId13"/>
+    <p:sldId id="284" r:id="rId14"/>
+    <p:sldId id="282" r:id="rId15"/>
   </p:sldIdLst>
   <p:sldSz cx="9144000" cy="6858000" type="screen4x3"/>
   <p:notesSz cx="6858000" cy="9144000"/>
@@ -2832,8 +2833,41 @@
           <a:p>
             <a:r>
               <a:rPr lang="en-US" dirty="0" smtClean="0"/>
-              <a:t>F*</a:t>
-            </a:r>
+              <a:t>I* </a:t>
+            </a:r>
+            <a:endParaRPr lang="en-US" dirty="0"/>
+          </a:p>
+        </p:txBody>
+      </p:sp>
+      <p:sp>
+        <p:nvSpPr>
+          <p:cNvPr id="3" name="Content Placeholder 2"/>
+          <p:cNvSpPr>
+            <a:spLocks noGrp="1"/>
+          </p:cNvSpPr>
+          <p:nvPr>
+            <p:ph idx="1"/>
+          </p:nvPr>
+        </p:nvSpPr>
+        <p:spPr/>
+        <p:txBody>
+          <a:bodyPr/>
+          <a:lstStyle/>
+          <a:p>
+            <a:r>
+              <a:rPr lang="en-US" dirty="0" smtClean="0"/>
+              <a:t>Analytical Model of Infrastructure</a:t>
+            </a:r>
+          </a:p>
+          <a:p>
+            <a:pPr lvl="1"/>
+            <a:r>
+              <a:rPr lang="en-US" dirty="0" smtClean="0"/>
+              <a:t>Based upon a set of capabilities exposed by that infrastructure, without regards to its internal properties</a:t>
+            </a:r>
+          </a:p>
+          <a:p>
+            <a:pPr lvl="1"/>
             <a:endParaRPr lang="en-US" dirty="0"/>
           </a:p>
         </p:txBody>
@@ -2841,7 +2875,7 @@
     </p:spTree>
     <p:extLst>
       <p:ext uri="{BB962C8B-B14F-4D97-AF65-F5344CB8AC3E}">
-        <p14:creationId xmlns:p14="http://schemas.microsoft.com/office/powerpoint/2010/main" val="4271741218"/>
+        <p14:creationId xmlns:p14="http://schemas.microsoft.com/office/powerpoint/2010/main" val="1832354515"/>
       </p:ext>
     </p:extLst>
   </p:cSld>
@@ -2885,6 +2919,59 @@
           <a:p>
             <a:r>
               <a:rPr lang="en-US" dirty="0" smtClean="0"/>
+              <a:t>F*</a:t>
+            </a:r>
+            <a:endParaRPr lang="en-US" dirty="0"/>
+          </a:p>
+        </p:txBody>
+      </p:sp>
+    </p:spTree>
+    <p:extLst>
+      <p:ext uri="{BB962C8B-B14F-4D97-AF65-F5344CB8AC3E}">
+        <p14:creationId xmlns:p14="http://schemas.microsoft.com/office/powerpoint/2010/main" val="4271741218"/>
+      </p:ext>
+    </p:extLst>
+  </p:cSld>
+  <p:clrMapOvr>
+    <a:masterClrMapping/>
+  </p:clrMapOvr>
+</p:sld>
+</file>
+
+<file path=ppt/slides/slide12.xml><?xml version="1.0" encoding="utf-8"?>
+<p:sld xmlns:a="http://schemas.openxmlformats.org/drawingml/2006/main" xmlns:r="http://schemas.openxmlformats.org/officeDocument/2006/relationships" xmlns:p="http://schemas.openxmlformats.org/presentationml/2006/main">
+  <p:cSld>
+    <p:spTree>
+      <p:nvGrpSpPr>
+        <p:cNvPr id="1" name=""/>
+        <p:cNvGrpSpPr/>
+        <p:nvPr/>
+      </p:nvGrpSpPr>
+      <p:grpSpPr>
+        <a:xfrm>
+          <a:off x="0" y="0"/>
+          <a:ext cx="0" cy="0"/>
+          <a:chOff x="0" y="0"/>
+          <a:chExt cx="0" cy="0"/>
+        </a:xfrm>
+      </p:grpSpPr>
+      <p:sp>
+        <p:nvSpPr>
+          <p:cNvPr id="2" name="Title 1"/>
+          <p:cNvSpPr>
+            <a:spLocks noGrp="1"/>
+          </p:cNvSpPr>
+          <p:nvPr>
+            <p:ph type="title"/>
+          </p:nvPr>
+        </p:nvSpPr>
+        <p:spPr/>
+        <p:txBody>
+          <a:bodyPr/>
+          <a:lstStyle/>
+          <a:p>
+            <a:r>
+              <a:rPr lang="en-US" dirty="0" smtClean="0"/>
               <a:t>*.* : Putting it together</a:t>
             </a:r>
             <a:endParaRPr lang="en-US" dirty="0"/>
@@ -2904,7 +2991,7 @@
 </p:sld>
 </file>
 
-<file path=ppt/slides/slide12.xml><?xml version="1.0" encoding="utf-8"?>
+<file path=ppt/slides/slide13.xml><?xml version="1.0" encoding="utf-8"?>
 <p:sld xmlns:a="http://schemas.openxmlformats.org/drawingml/2006/main" xmlns:r="http://schemas.openxmlformats.org/officeDocument/2006/relationships" xmlns:p="http://schemas.openxmlformats.org/presentationml/2006/main">
   <p:cSld>
     <p:spTree>
@@ -2947,15 +3034,7 @@
             </a:pPr>
             <a:r>
               <a:rPr lang="en-US" dirty="0" smtClean="0"/>
-              <a:t>Modelin</a:t>
-            </a:r>
-            <a:r>
-              <a:rPr lang="en-US" dirty="0" smtClean="0"/>
-              <a:t>g </a:t>
-            </a:r>
-            <a:r>
-              <a:rPr lang="en-US" dirty="0" smtClean="0"/>
-              <a:t>Challenges</a:t>
+              <a:t>Modeling Challenges</a:t>
             </a:r>
             <a:r>
               <a:rPr lang="en" dirty="0"/>
@@ -3000,6 +3079,29 @@
             </a:r>
           </a:p>
           <a:p>
+            <a:pPr lvl="1">
+              <a:lnSpc>
+                <a:spcPct val="90000"/>
+              </a:lnSpc>
+            </a:pPr>
+            <a:r>
+              <a:rPr lang="en-US" dirty="0" smtClean="0"/>
+              <a:t>Different model of varying specificity</a:t>
+            </a:r>
+          </a:p>
+          <a:p>
+            <a:pPr lvl="1">
+              <a:lnSpc>
+                <a:spcPct val="90000"/>
+              </a:lnSpc>
+            </a:pPr>
+            <a:r>
+              <a:rPr lang="en-US" dirty="0" smtClean="0"/>
+              <a:t>Some are analytical, some are conceptual </a:t>
+            </a:r>
+            <a:endParaRPr lang="en-US" dirty="0" smtClean="0"/>
+          </a:p>
+          <a:p>
             <a:pPr>
               <a:lnSpc>
                 <a:spcPct val="90000"/>
@@ -3020,6 +3122,7 @@
               <a:rPr lang="en-US" dirty="0" smtClean="0"/>
               <a:t>Heterogeneity</a:t>
             </a:r>
+            <a:endParaRPr lang="en-US" dirty="0" smtClean="0"/>
           </a:p>
           <a:p>
             <a:pPr lvl="1">
@@ -3029,11 +3132,7 @@
             </a:pPr>
             <a:r>
               <a:rPr lang="en-US" dirty="0" smtClean="0"/>
-              <a:t>Federating heterogeneous </a:t>
-            </a:r>
-            <a:r>
-              <a:rPr lang="en-US" dirty="0" smtClean="0"/>
-              <a:t>distributed infrastructure</a:t>
+              <a:t>Federating heterogeneous distributed infrastructure</a:t>
             </a:r>
           </a:p>
           <a:p>
@@ -3091,7 +3190,7 @@
 </p:sld>
 </file>
 
-<file path=ppt/slides/slide13.xml><?xml version="1.0" encoding="utf-8"?>
+<file path=ppt/slides/slide14.xml><?xml version="1.0" encoding="utf-8"?>
 <p:sld xmlns:a="http://schemas.openxmlformats.org/drawingml/2006/main" xmlns:r="http://schemas.openxmlformats.org/officeDocument/2006/relationships" xmlns:p="http://schemas.openxmlformats.org/presentationml/2006/main">
   <p:cSld>
     <p:spTree>
@@ -3284,15 +3383,7 @@
                   <a:srgbClr val="000000"/>
                 </a:solidFill>
               </a:rPr>
-              <a:t> for adaptiv</a:t>
-            </a:r>
-            <a:r>
-              <a:rPr lang="en-US" dirty="0" smtClean="0">
-                <a:solidFill>
-                  <a:srgbClr val="000000"/>
-                </a:solidFill>
-              </a:rPr>
-              <a:t>e applications</a:t>
+              <a:t> for adaptive applications</a:t>
             </a:r>
             <a:endParaRPr lang="en" dirty="0">
               <a:solidFill>
@@ -4055,18 +4146,7 @@
                   </a:schemeClr>
                 </a:solidFill>
               </a:rPr>
-              <a:t>tline </a:t>
-            </a:r>
-            <a:r>
-              <a:rPr lang="en-US" sz="2000" dirty="0" smtClean="0">
-                <a:solidFill>
-                  <a:schemeClr val="tx1">
-                    <a:lumMod val="65000"/>
-                    <a:lumOff val="35000"/>
-                  </a:schemeClr>
-                </a:solidFill>
-              </a:rPr>
-              <a:t>NGMW</a:t>
+              <a:t>tline NGMW</a:t>
             </a:r>
             <a:endParaRPr lang="en-US" sz="1800" dirty="0">
               <a:solidFill>
@@ -4116,18 +4196,7 @@
                   </a:schemeClr>
                 </a:solidFill>
               </a:rPr>
-              <a:t>Support </a:t>
-            </a:r>
-            <a:r>
-              <a:rPr lang="en-US" dirty="0" smtClean="0">
-                <a:solidFill>
-                  <a:schemeClr val="tx1">
-                    <a:lumMod val="65000"/>
-                    <a:lumOff val="35000"/>
-                  </a:schemeClr>
-                </a:solidFill>
-              </a:rPr>
-              <a:t>for Adaptive Applications and Dynamic Resources</a:t>
+              <a:t>Support for Adaptive Applications and Dynamic Resources</a:t>
             </a:r>
           </a:p>
           <a:p>
@@ -4654,19 +4723,7 @@
             <a:pPr marL="800100" lvl="1" indent="-342900"/>
             <a:r>
               <a:rPr lang="en-US" sz="1800" dirty="0" smtClean="0"/>
-              <a:t>[</a:t>
-            </a:r>
-            <a:r>
-              <a:rPr lang="en-US" sz="1800" dirty="0" smtClean="0"/>
-              <a:t>A</a:t>
-            </a:r>
-            <a:r>
-              <a:rPr lang="en-US" sz="1800" dirty="0" smtClean="0"/>
-              <a:t>*, </a:t>
-            </a:r>
-            <a:r>
-              <a:rPr lang="en-US" sz="1800" dirty="0" smtClean="0"/>
-              <a:t>W* ]</a:t>
+              <a:t>[A*, W* ]</a:t>
             </a:r>
             <a:r>
               <a:rPr lang="en-US" dirty="0"/>
@@ -4674,26 +4731,14 @@
             </a:r>
             <a:r>
               <a:rPr lang="en-US" dirty="0" smtClean="0"/>
-              <a:t>and [P*, F*</a:t>
-            </a:r>
+              <a:t>and [P*, F*]</a:t>
+            </a:r>
+          </a:p>
+          <a:p>
+            <a:pPr marL="1208088" lvl="2" indent="-342900"/>
             <a:r>
               <a:rPr lang="en-US" dirty="0" smtClean="0"/>
-              <a:t>]</a:t>
-            </a:r>
-          </a:p>
-          <a:p>
-            <a:pPr marL="1208088" lvl="2" indent="-342900"/>
-            <a:r>
-              <a:rPr lang="en-US" dirty="0" smtClean="0"/>
-              <a:t>A specific instance of A*, is subject to a transformation T which converts into executable units that have </a:t>
-            </a:r>
-            <a:r>
-              <a:rPr lang="en-US" dirty="0" smtClean="0"/>
-              <a:t>performance </a:t>
-            </a:r>
-            <a:r>
-              <a:rPr lang="en-US" dirty="0" smtClean="0"/>
-              <a:t>requirements</a:t>
+              <a:t>A specific instance of A*, is subject to a transformation T which converts into executable units that have performance requirements</a:t>
             </a:r>
           </a:p>
           <a:p>
@@ -4717,7 +4762,6 @@
               <a:rPr lang="en-US" dirty="0" smtClean="0"/>
               <a:t>) R</a:t>
             </a:r>
-            <a:endParaRPr lang="en-US" dirty="0" smtClean="0"/>
           </a:p>
         </p:txBody>
       </p:sp>
@@ -5016,11 +5060,7 @@
             <a:pPr marL="344488" indent="-342900"/>
             <a:r>
               <a:rPr lang="en-US" sz="2000" dirty="0" smtClean="0"/>
-              <a:t>Role </a:t>
-            </a:r>
-            <a:r>
-              <a:rPr lang="en-US" sz="2000" dirty="0" smtClean="0"/>
-              <a:t>of Simulation</a:t>
+              <a:t>Role of Simulation</a:t>
             </a:r>
           </a:p>
           <a:p>
@@ -5034,33 +5074,15 @@
             <a:pPr marL="800100" lvl="1" indent="-342900"/>
             <a:r>
               <a:rPr lang="en-US" dirty="0" smtClean="0"/>
-              <a:t>If we want a capability [C], what is the set of resources {R} we need to get this [C] with well-defined probability </a:t>
-            </a:r>
-            <a:r>
-              <a:rPr lang="en-US" dirty="0" smtClean="0"/>
-              <a:t>distribution?</a:t>
-            </a:r>
-            <a:endParaRPr lang="en-US" dirty="0" smtClean="0"/>
+              <a:t>If we want a capability [C], what is the set of resources {R} we need to get this [C] with well-defined probability distribution?</a:t>
+            </a:r>
           </a:p>
           <a:p>
             <a:pPr marL="800100" lvl="1" indent="-342900"/>
             <a:r>
               <a:rPr lang="en-US" sz="1800" dirty="0" smtClean="0"/>
-              <a:t>Given an application model, what is the workload </a:t>
-            </a:r>
-            <a:r>
-              <a:rPr lang="en-US" sz="1800" dirty="0" smtClean="0"/>
-              <a:t>independent </a:t>
-            </a:r>
-            <a:r>
-              <a:rPr lang="en-US" sz="1800" dirty="0" smtClean="0"/>
-              <a:t>of the underlying </a:t>
-            </a:r>
-            <a:r>
-              <a:rPr lang="en-US" sz="1800" dirty="0" smtClean="0"/>
-              <a:t>resources?</a:t>
-            </a:r>
-            <a:endParaRPr lang="en-US" sz="1800" dirty="0" smtClean="0"/>
+              <a:t>Given an application model, what is the workload independent of the underlying resources?</a:t>
+            </a:r>
           </a:p>
         </p:txBody>
       </p:sp>
@@ -5295,11 +5317,7 @@
             </a:r>
             <a:r>
               <a:rPr lang="en" sz="2000" dirty="0" smtClean="0"/>
-              <a:t> </a:t>
-            </a:r>
-            <a:r>
-              <a:rPr lang="en" sz="2000" dirty="0" smtClean="0"/>
-              <a:t>diversified </a:t>
+              <a:t> diversified </a:t>
             </a:r>
             <a:r>
               <a:rPr lang="en" sz="2000" dirty="0"/>
@@ -5338,11 +5356,7 @@
             </a:pPr>
             <a:r>
               <a:rPr lang="en-US" sz="2000" dirty="0" smtClean="0"/>
-              <a:t>How</a:t>
-            </a:r>
-            <a:r>
-              <a:rPr lang="en-US" sz="2000" dirty="0" smtClean="0"/>
-              <a:t>/when </a:t>
+              <a:t>How/when </a:t>
             </a:r>
             <a:r>
               <a:rPr lang="en-US" sz="2000" dirty="0"/>
@@ -5384,7 +5398,6 @@
               <a:rPr lang="en-US" sz="2000" dirty="0" smtClean="0"/>
               <a:t>?</a:t>
             </a:r>
-            <a:endParaRPr lang="en-US" sz="2000" dirty="0" smtClean="0"/>
           </a:p>
           <a:p>
             <a:pPr marL="457200" indent="-381000">
@@ -5397,11 +5410,7 @@
             </a:pPr>
             <a:r>
               <a:rPr lang="en-US" dirty="0" smtClean="0"/>
-              <a:t>Distributed </a:t>
-            </a:r>
-            <a:r>
-              <a:rPr lang="en-US" dirty="0" smtClean="0"/>
-              <a:t>Computing Applications</a:t>
+              <a:t>Distributed Computing Applications</a:t>
             </a:r>
             <a:r>
               <a:rPr lang="en-US" dirty="0"/>

</xml_diff>

<commit_message>
Refinements and fixes per F* call yesterday.   Sorry for earlier sloppiness.
</commit_message>
<xml_diff>
--- a/presentations/radical-modsim.pptx
+++ b/presentations/radical-modsim.pptx
@@ -4694,51 +4694,7 @@
                   </a:schemeClr>
                 </a:solidFill>
               </a:rPr>
-              <a:t>Abstracted </a:t>
-            </a:r>
-            <a:r>
-              <a:rPr lang="en-US" smtClean="0">
-                <a:solidFill>
-                  <a:schemeClr val="tx1">
-                    <a:lumMod val="65000"/>
-                    <a:lumOff val="35000"/>
-                  </a:schemeClr>
-                </a:solidFill>
-              </a:rPr>
-              <a:t>data logic (</a:t>
-            </a:r>
-            <a:r>
-              <a:rPr lang="en-US" dirty="0" smtClean="0">
-                <a:solidFill>
-                  <a:schemeClr val="tx1">
-                    <a:lumMod val="65000"/>
-                    <a:lumOff val="35000"/>
-                  </a:schemeClr>
-                </a:solidFill>
-              </a:rPr>
-              <a:t>representation, distribution, scheduling</a:t>
-            </a:r>
-            <a:r>
-              <a:rPr lang="en-US" smtClean="0">
-                <a:solidFill>
-                  <a:schemeClr val="tx1">
-                    <a:lumMod val="65000"/>
-                    <a:lumOff val="35000"/>
-                  </a:schemeClr>
-                </a:solidFill>
-              </a:rPr>
-              <a:t>, placement) </a:t>
-            </a:r>
-            <a:r>
-              <a:rPr lang="en-US" dirty="0" smtClean="0">
-                <a:solidFill>
-                  <a:schemeClr val="tx1">
-                    <a:lumMod val="65000"/>
-                    <a:lumOff val="35000"/>
-                  </a:schemeClr>
-                </a:solidFill>
-              </a:rPr>
-              <a:t>that captures application-semantics yet is not application-specific</a:t>
+              <a:t>Abstracted data logic (representation, distribution, scheduling, placement) that captures application-semantics yet is not application-specific</a:t>
             </a:r>
             <a:endParaRPr lang="en-US" dirty="0">
               <a:solidFill>
@@ -4824,7 +4780,29 @@
                   </a:schemeClr>
                 </a:solidFill>
               </a:rPr>
-              <a:t>Dynamic Resources: P*, I*</a:t>
+              <a:t>Dynamic </a:t>
+            </a:r>
+            <a:r>
+              <a:rPr lang="en-US" dirty="0" smtClean="0">
+                <a:solidFill>
+                  <a:schemeClr val="tx1">
+                    <a:lumMod val="65000"/>
+                    <a:lumOff val="35000"/>
+                  </a:schemeClr>
+                </a:solidFill>
+              </a:rPr>
+              <a:t>Resources/Infrastructure: </a:t>
+            </a:r>
+            <a:r>
+              <a:rPr lang="en-US" dirty="0" smtClean="0">
+                <a:solidFill>
+                  <a:schemeClr val="tx1">
+                    <a:lumMod val="65000"/>
+                    <a:lumOff val="35000"/>
+                  </a:schemeClr>
+                </a:solidFill>
+              </a:rPr>
+              <a:t>P*, I*</a:t>
             </a:r>
           </a:p>
           <a:p>
@@ -4843,7 +4821,18 @@
                   </a:schemeClr>
                 </a:solidFill>
               </a:rPr>
-              <a:t>Capability Based: F*</a:t>
+              <a:t>Federation of Infrastructure </a:t>
+            </a:r>
+            <a:r>
+              <a:rPr lang="en-US" dirty="0" smtClean="0">
+                <a:solidFill>
+                  <a:schemeClr val="tx1">
+                    <a:lumMod val="65000"/>
+                    <a:lumOff val="35000"/>
+                  </a:schemeClr>
+                </a:solidFill>
+              </a:rPr>
+              <a:t>F*</a:t>
             </a:r>
           </a:p>
           <a:p>
@@ -5111,6 +5100,22 @@
               <a:rPr lang="en-US" dirty="0" smtClean="0"/>
               <a:t>Need information about resources, networks </a:t>
             </a:r>
+            <a:endParaRPr lang="en-US" dirty="0" smtClean="0"/>
+          </a:p>
+          <a:p>
+            <a:pPr lvl="1"/>
+            <a:endParaRPr lang="en-US" dirty="0"/>
+          </a:p>
+          <a:p>
+            <a:r>
+              <a:rPr lang="en-US" dirty="0" smtClean="0"/>
+              <a:t>Wha</a:t>
+            </a:r>
+            <a:r>
+              <a:rPr lang="en-US" dirty="0" smtClean="0"/>
+              <a:t>t is a capability?</a:t>
+            </a:r>
+            <a:endParaRPr lang="en-US" dirty="0" smtClean="0"/>
           </a:p>
           <a:p>
             <a:pPr marL="457200" lvl="1" indent="0">
@@ -5852,10 +5857,10 @@
                   </a:schemeClr>
                 </a:solidFill>
               </a:rPr>
-              <a:t>Role </a:t>
-            </a:r>
-            <a:r>
-              <a:rPr lang="en-US" dirty="0">
+              <a:t>Understandin</a:t>
+            </a:r>
+            <a:r>
+              <a:rPr lang="en-US" dirty="0" smtClean="0">
                 <a:solidFill>
                   <a:schemeClr val="tx1">
                     <a:lumMod val="65000"/>
@@ -5863,8 +5868,16 @@
                   </a:schemeClr>
                 </a:solidFill>
               </a:rPr>
-              <a:t>of Modeling</a:t>
-            </a:r>
+              <a:t>g the Different Models:</a:t>
+            </a:r>
+            <a:endParaRPr lang="en-US" dirty="0">
+              <a:solidFill>
+                <a:schemeClr val="tx1">
+                  <a:lumMod val="65000"/>
+                  <a:lumOff val="35000"/>
+                </a:schemeClr>
+              </a:solidFill>
+            </a:endParaRPr>
           </a:p>
           <a:p>
             <a:pPr marL="800100" lvl="1" indent="-342900">
@@ -5946,7 +5959,18 @@
                   </a:schemeClr>
                 </a:solidFill>
               </a:rPr>
-              <a:t>P*: Conceptual Model for Resources</a:t>
+              <a:t>P*: Conceptual Model for </a:t>
+            </a:r>
+            <a:r>
+              <a:rPr lang="en-US" dirty="0" smtClean="0">
+                <a:solidFill>
+                  <a:schemeClr val="tx1">
+                    <a:lumMod val="65000"/>
+                    <a:lumOff val="35000"/>
+                  </a:schemeClr>
+                </a:solidFill>
+              </a:rPr>
+              <a:t>Dynamic Resources</a:t>
             </a:r>
           </a:p>
           <a:p>
@@ -5965,6 +5989,33 @@
                   </a:schemeClr>
                 </a:solidFill>
               </a:rPr>
+              <a:t>I* : Analytical Model for Infrastructure [Munich]</a:t>
+            </a:r>
+            <a:endParaRPr lang="en-US" dirty="0">
+              <a:solidFill>
+                <a:schemeClr val="tx1">
+                  <a:lumMod val="65000"/>
+                  <a:lumOff val="35000"/>
+                </a:schemeClr>
+              </a:solidFill>
+            </a:endParaRPr>
+          </a:p>
+          <a:p>
+            <a:pPr marL="800100" lvl="1" indent="-342900">
+              <a:buClr>
+                <a:srgbClr val="000000"/>
+              </a:buClr>
+              <a:buSzPct val="100000"/>
+            </a:pPr>
+            <a:r>
+              <a:rPr lang="en-US" dirty="0" smtClean="0">
+                <a:solidFill>
+                  <a:schemeClr val="tx1">
+                    <a:lumMod val="65000"/>
+                    <a:lumOff val="35000"/>
+                  </a:schemeClr>
+                </a:solidFill>
+              </a:rPr>
               <a:t>F</a:t>
             </a:r>
             <a:r>
@@ -6025,96 +6076,27 @@
                   </a:schemeClr>
                 </a:solidFill>
               </a:rPr>
-              <a:t>In turn builds upon a model/models of infrastructure</a:t>
-            </a:r>
-          </a:p>
-          <a:p>
-            <a:pPr marL="800100" lvl="1" indent="-342900"/>
-            <a:r>
-              <a:rPr lang="en-US" dirty="0"/>
-              <a:t>[A*, W* ] and [P*, F*]</a:t>
-            </a:r>
-          </a:p>
-          <a:p>
-            <a:pPr marL="1208088" lvl="2" indent="-342900"/>
-            <a:r>
-              <a:rPr lang="en-US" dirty="0"/>
-              <a:t>A specific instance of A*, is subject to a transformation </a:t>
-            </a:r>
-            <a:r>
-              <a:rPr lang="en-US" b="1" dirty="0">
-                <a:ln w="12700">
-                  <a:solidFill>
-                    <a:schemeClr val="tx2">
-                      <a:satMod val="155000"/>
-                    </a:schemeClr>
-                  </a:solidFill>
-                  <a:prstDash val="solid"/>
-                </a:ln>
-                <a:solidFill>
-                  <a:schemeClr val="bg2">
-                    <a:tint val="85000"/>
-                    <a:satMod val="155000"/>
+              <a:t>In turn builds upon a model/models of </a:t>
+            </a:r>
+            <a:r>
+              <a:rPr lang="en-US" dirty="0" smtClean="0">
+                <a:solidFill>
+                  <a:schemeClr val="tx1">
+                    <a:lumMod val="65000"/>
+                    <a:lumOff val="35000"/>
                   </a:schemeClr>
                 </a:solidFill>
-                <a:effectLst>
-                  <a:outerShdw blurRad="41275" dist="20320" dir="1800000" algn="tl" rotWithShape="0">
-                    <a:srgbClr val="000000">
-                      <a:alpha val="40000"/>
-                    </a:srgbClr>
-                  </a:outerShdw>
-                </a:effectLst>
-              </a:rPr>
-              <a:t>T</a:t>
-            </a:r>
-            <a:r>
-              <a:rPr lang="en-US" dirty="0"/>
-              <a:t> which converts into executable units that have performance requirements</a:t>
-            </a:r>
-          </a:p>
-          <a:p>
-            <a:pPr marL="1208088" lvl="2" indent="-342900"/>
-            <a:r>
-              <a:rPr lang="en-US" dirty="0"/>
-              <a:t>Here A* is an conceptual model, and W* is an analytical model</a:t>
-            </a:r>
-          </a:p>
-          <a:p>
-            <a:pPr marL="1208088" lvl="2" indent="-342900"/>
-            <a:r>
-              <a:rPr lang="en-US" dirty="0"/>
-              <a:t>P* is a model of Resources, which is subject to a transformation </a:t>
-            </a:r>
-            <a:r>
-              <a:rPr lang="en-US" b="1" dirty="0">
-                <a:ln w="12700">
-                  <a:solidFill>
-                    <a:schemeClr val="tx2">
-                      <a:satMod val="155000"/>
-                    </a:schemeClr>
-                  </a:solidFill>
-                  <a:prstDash val="solid"/>
-                </a:ln>
-                <a:solidFill>
-                  <a:schemeClr val="bg2">
-                    <a:tint val="85000"/>
-                    <a:satMod val="155000"/>
-                  </a:schemeClr>
-                </a:solidFill>
-                <a:effectLst>
-                  <a:outerShdw blurRad="41275" dist="20320" dir="1800000" algn="tl" rotWithShape="0">
-                    <a:srgbClr val="000000">
-                      <a:alpha val="40000"/>
-                    </a:srgbClr>
-                  </a:outerShdw>
-                </a:effectLst>
-              </a:rPr>
-              <a:t>R</a:t>
-            </a:r>
-            <a:r>
-              <a:rPr lang="en-US" dirty="0"/>
-              <a:t>(aggregation of resources per F*)</a:t>
-            </a:r>
+              </a:rPr>
+              <a:t>infrastructure (I*)</a:t>
+            </a:r>
+            <a:endParaRPr lang="en-US" dirty="0" smtClean="0">
+              <a:solidFill>
+                <a:schemeClr val="tx1">
+                  <a:lumMod val="65000"/>
+                  <a:lumOff val="35000"/>
+                </a:schemeClr>
+              </a:solidFill>
+            </a:endParaRPr>
           </a:p>
           <a:p>
             <a:pPr marL="344488" indent="-342900">
@@ -6445,22 +6427,173 @@
           <a:p>
             <a:pPr marL="344488" indent="-342900"/>
             <a:r>
+              <a:rPr lang="en-US" dirty="0" smtClean="0"/>
+              <a:t>Interaction between Models:</a:t>
+            </a:r>
+          </a:p>
+          <a:p>
+            <a:pPr marL="800100" lvl="1" indent="-342900"/>
+            <a:r>
+              <a:rPr lang="en-US" dirty="0" smtClean="0"/>
+              <a:t>[</a:t>
+            </a:r>
+            <a:r>
+              <a:rPr lang="en-US" dirty="0"/>
+              <a:t>A*, W* ] and [P*, F*]</a:t>
+            </a:r>
+          </a:p>
+          <a:p>
+            <a:pPr marL="1208088" lvl="2" indent="-342900"/>
+            <a:r>
+              <a:rPr lang="en-US" dirty="0"/>
+              <a:t>Here A* is a conceptual model, and W* is an analytical model</a:t>
+            </a:r>
+          </a:p>
+          <a:p>
+            <a:pPr marL="1208088" lvl="2" indent="-342900"/>
+            <a:r>
+              <a:rPr lang="en-US" dirty="0" smtClean="0"/>
+              <a:t>A </a:t>
+            </a:r>
+            <a:r>
+              <a:rPr lang="en-US" dirty="0"/>
+              <a:t>specific instance of A*, is subject to a transformation </a:t>
+            </a:r>
+            <a:r>
+              <a:rPr lang="en-US" b="1" dirty="0">
+                <a:ln w="12700">
+                  <a:solidFill>
+                    <a:schemeClr val="tx2">
+                      <a:satMod val="155000"/>
+                    </a:schemeClr>
+                  </a:solidFill>
+                  <a:prstDash val="solid"/>
+                </a:ln>
+                <a:solidFill>
+                  <a:schemeClr val="bg2">
+                    <a:tint val="85000"/>
+                    <a:satMod val="155000"/>
+                  </a:schemeClr>
+                </a:solidFill>
+                <a:effectLst>
+                  <a:outerShdw blurRad="41275" dist="20320" dir="1800000" algn="tl" rotWithShape="0">
+                    <a:srgbClr val="000000">
+                      <a:alpha val="40000"/>
+                    </a:srgbClr>
+                  </a:outerShdw>
+                </a:effectLst>
+              </a:rPr>
+              <a:t>W</a:t>
+            </a:r>
+            <a:r>
+              <a:rPr lang="en-US" dirty="0"/>
+              <a:t> which converts into executable units </a:t>
+            </a:r>
+            <a:r>
+              <a:rPr lang="en-US" dirty="0" smtClean="0"/>
+              <a:t>(per W*) that </a:t>
+            </a:r>
+            <a:r>
+              <a:rPr lang="en-US" dirty="0"/>
+              <a:t>have performance requirements</a:t>
+            </a:r>
+          </a:p>
+          <a:p>
+            <a:pPr marL="1208088" lvl="2" indent="-342900"/>
+            <a:r>
+              <a:rPr lang="en-US" dirty="0" smtClean="0"/>
+              <a:t>Infrastructure modeled as I*, capability is exposed and federated per F*</a:t>
+            </a:r>
+          </a:p>
+          <a:p>
+            <a:pPr marL="1208088" lvl="2" indent="-342900"/>
+            <a:r>
+              <a:rPr lang="en-US" dirty="0" smtClean="0"/>
+              <a:t>I</a:t>
+            </a:r>
+            <a:r>
+              <a:rPr lang="en-US" dirty="0"/>
+              <a:t>* </a:t>
+            </a:r>
+            <a:r>
+              <a:rPr lang="en-US" dirty="0" smtClean="0"/>
+              <a:t>subject </a:t>
+            </a:r>
+            <a:r>
+              <a:rPr lang="en-US" dirty="0"/>
+              <a:t>to a transformation </a:t>
+            </a:r>
+            <a:r>
+              <a:rPr lang="en-US" b="1" dirty="0" smtClean="0">
+                <a:ln w="12700">
+                  <a:solidFill>
+                    <a:schemeClr val="tx2">
+                      <a:satMod val="155000"/>
+                    </a:schemeClr>
+                  </a:solidFill>
+                  <a:prstDash val="solid"/>
+                </a:ln>
+                <a:solidFill>
+                  <a:schemeClr val="bg2">
+                    <a:tint val="85000"/>
+                    <a:satMod val="155000"/>
+                  </a:schemeClr>
+                </a:solidFill>
+                <a:effectLst>
+                  <a:outerShdw blurRad="41275" dist="20320" dir="1800000" algn="tl" rotWithShape="0">
+                    <a:srgbClr val="000000">
+                      <a:alpha val="40000"/>
+                    </a:srgbClr>
+                  </a:outerShdw>
+                </a:effectLst>
+              </a:rPr>
+              <a:t>F </a:t>
+            </a:r>
+            <a:r>
+              <a:rPr lang="en-US" dirty="0" smtClean="0"/>
+              <a:t>(</a:t>
+            </a:r>
+            <a:r>
+              <a:rPr lang="en-US" dirty="0"/>
+              <a:t>aggregation of resources per F*</a:t>
+            </a:r>
+            <a:r>
+              <a:rPr lang="en-US" dirty="0" smtClean="0"/>
+              <a:t>) to provide a federated capability</a:t>
+            </a:r>
+            <a:endParaRPr lang="en-US" dirty="0"/>
+          </a:p>
+          <a:p>
+            <a:pPr marL="344488" indent="-342900"/>
+            <a:r>
               <a:rPr lang="en-US" sz="2000" dirty="0" smtClean="0"/>
-              <a:t>Role of Simulation</a:t>
+              <a:t>Role </a:t>
+            </a:r>
+            <a:r>
+              <a:rPr lang="en-US" sz="2000" dirty="0" smtClean="0"/>
+              <a:t>of Simulation</a:t>
             </a:r>
           </a:p>
           <a:p>
             <a:pPr marL="800100" lvl="1" indent="-342900"/>
             <a:r>
               <a:rPr lang="en-US" sz="1800" dirty="0" smtClean="0"/>
-              <a:t>If we federate a given set of resources {R} what is the performance we expect?</a:t>
+              <a:t>If we federate a given set of resources {I} what is the performance we expect?</a:t>
             </a:r>
           </a:p>
           <a:p>
             <a:pPr marL="800100" lvl="1" indent="-342900"/>
             <a:r>
               <a:rPr lang="en-US" dirty="0" smtClean="0"/>
-              <a:t>If we want a capability [C], what is the set of resources {R} we need to get this [C] with well-defined probability distribution?</a:t>
+              <a:t>If we want a capability [C], what is the set of resources {I} we need to </a:t>
+            </a:r>
+            <a:r>
+              <a:rPr lang="en-US" dirty="0" smtClean="0"/>
+              <a:t>federate to get  </a:t>
+            </a:r>
+            <a:r>
+              <a:rPr lang="en-US" dirty="0" smtClean="0"/>
+              <a:t>this [C] with well-defined probability distribution?</a:t>
             </a:r>
           </a:p>
           <a:p>

</xml_diff>

<commit_message>
Added slide about I*
</commit_message>
<xml_diff>
--- a/presentations/radical-modsim.pptx
+++ b/presentations/radical-modsim.pptx
@@ -1329,7 +1329,7 @@
             <a:fld id="{8C1510E7-41E5-EC45-AEF0-4F5FBB17A54E}" type="slidenum">
               <a:rPr lang="en-US"/>
               <a:pPr/>
-              <a:t>‹#›</a:t>
+              <a:t>‹Nr.›</a:t>
             </a:fld>
             <a:endParaRPr lang="en-US"/>
           </a:p>
@@ -1514,7 +1514,7 @@
             <a:fld id="{E2EAB6CA-2AA1-0443-B8DC-DC15ED59C587}" type="slidenum">
               <a:rPr lang="en-US"/>
               <a:pPr/>
-              <a:t>‹#›</a:t>
+              <a:t>‹Nr.›</a:t>
             </a:fld>
             <a:endParaRPr lang="en-US"/>
           </a:p>
@@ -1660,7 +1660,7 @@
               <a:pPr>
                 <a:defRPr/>
               </a:pPr>
-              <a:t>‹#›</a:t>
+              <a:t>‹Nr.›</a:t>
             </a:fld>
             <a:endParaRPr lang="en-US"/>
           </a:p>
@@ -1924,7 +1924,7 @@
               <a:pPr>
                 <a:defRPr/>
               </a:pPr>
-              <a:t>‹#›</a:t>
+              <a:t>‹Nr.›</a:t>
             </a:fld>
             <a:endParaRPr lang="en-US"/>
           </a:p>
@@ -2129,7 +2129,7 @@
             <a:fld id="{F47EBDB2-0287-D14F-A8C8-B35968356903}" type="slidenum">
               <a:rPr lang="en-US" smtClean="0"/>
               <a:pPr/>
-              <a:t>‹#›</a:t>
+              <a:t>‹Nr.›</a:t>
             </a:fld>
             <a:endParaRPr lang="en-US" dirty="0"/>
           </a:p>
@@ -3042,7 +3042,12 @@
             <p:ph idx="1"/>
           </p:nvPr>
         </p:nvSpPr>
-        <p:spPr/>
+        <p:spPr>
+          <a:xfrm>
+            <a:off x="10357423" y="1168298"/>
+            <a:ext cx="8597178" cy="5146033"/>
+          </a:xfrm>
+        </p:spPr>
         <p:txBody>
           <a:bodyPr/>
           <a:lstStyle/>
@@ -3071,6 +3076,147 @@
           </a:p>
         </p:txBody>
       </p:sp>
+      <p:sp>
+        <p:nvSpPr>
+          <p:cNvPr id="4" name="Textfeld 3"/>
+          <p:cNvSpPr txBox="1"/>
+          <p:nvPr/>
+        </p:nvSpPr>
+        <p:spPr>
+          <a:xfrm>
+            <a:off x="282231" y="4977961"/>
+            <a:ext cx="2918753" cy="954107"/>
+          </a:xfrm>
+          <a:prstGeom prst="rect">
+            <a:avLst/>
+          </a:prstGeom>
+          <a:noFill/>
+        </p:spPr>
+        <p:txBody>
+          <a:bodyPr wrap="square" rtlCol="0">
+            <a:spAutoFit/>
+          </a:bodyPr>
+          <a:lstStyle/>
+          <a:p>
+            <a:pPr marL="285750" indent="-285750">
+              <a:buFont typeface="Wingdings" charset="2"/>
+              <a:buChar char="ü"/>
+            </a:pPr>
+            <a:r>
+              <a:rPr lang="de-DE" dirty="0" smtClean="0"/>
+              <a:t>Fast </a:t>
+            </a:r>
+            <a:r>
+              <a:rPr lang="de-DE" dirty="0" err="1"/>
+              <a:t>modeling</a:t>
+            </a:r>
+            <a:endParaRPr lang="de-DE" dirty="0"/>
+          </a:p>
+          <a:p>
+            <a:pPr marL="285750" indent="-285750">
+              <a:buFont typeface="Wingdings" charset="2"/>
+              <a:buChar char="ü"/>
+            </a:pPr>
+            <a:r>
+              <a:rPr lang="de-DE" dirty="0" smtClean="0"/>
+              <a:t>Easy </a:t>
+            </a:r>
+            <a:r>
+              <a:rPr lang="de-DE" dirty="0" err="1"/>
+              <a:t>data</a:t>
+            </a:r>
+            <a:r>
+              <a:rPr lang="de-DE" dirty="0"/>
+              <a:t> </a:t>
+            </a:r>
+            <a:r>
+              <a:rPr lang="de-DE" dirty="0" err="1"/>
+              <a:t>integration</a:t>
+            </a:r>
+            <a:endParaRPr lang="de-DE" dirty="0"/>
+          </a:p>
+          <a:p>
+            <a:pPr marL="285750" indent="-285750">
+              <a:buFont typeface="Wingdings" charset="2"/>
+              <a:buChar char="ü"/>
+            </a:pPr>
+            <a:r>
+              <a:rPr lang="de-DE" dirty="0" smtClean="0"/>
+              <a:t>Multiple </a:t>
+            </a:r>
+            <a:r>
+              <a:rPr lang="de-DE" dirty="0" err="1"/>
+              <a:t>levels</a:t>
+            </a:r>
+            <a:r>
+              <a:rPr lang="de-DE" dirty="0"/>
+              <a:t> </a:t>
+            </a:r>
+            <a:r>
+              <a:rPr lang="de-DE" dirty="0" err="1"/>
+              <a:t>of</a:t>
+            </a:r>
+            <a:r>
+              <a:rPr lang="de-DE" dirty="0"/>
+              <a:t> </a:t>
+            </a:r>
+            <a:r>
+              <a:rPr lang="de-DE" dirty="0" err="1" smtClean="0"/>
+              <a:t>granularity</a:t>
+            </a:r>
+            <a:endParaRPr lang="de-DE" dirty="0"/>
+          </a:p>
+          <a:p>
+            <a:pPr marL="285750" indent="-285750">
+              <a:buFont typeface="Wingdings" charset="2"/>
+              <a:buChar char="ü"/>
+            </a:pPr>
+            <a:r>
+              <a:rPr lang="de-DE" dirty="0" err="1" smtClean="0"/>
+              <a:t>Redundancy</a:t>
+            </a:r>
+            <a:r>
+              <a:rPr lang="de-DE" dirty="0" smtClean="0"/>
+              <a:t> </a:t>
+            </a:r>
+            <a:r>
+              <a:rPr lang="de-DE" dirty="0" err="1" smtClean="0"/>
+              <a:t>handling</a:t>
+            </a:r>
+            <a:endParaRPr lang="de-DE" dirty="0"/>
+          </a:p>
+        </p:txBody>
+      </p:sp>
+      <p:pic>
+        <p:nvPicPr>
+          <p:cNvPr id="5" name="Bild 4" descr="SlideDoE.png"/>
+          <p:cNvPicPr>
+            <a:picLocks noChangeAspect="1"/>
+          </p:cNvPicPr>
+          <p:nvPr/>
+        </p:nvPicPr>
+        <p:blipFill>
+          <a:blip r:embed="rId2">
+            <a:extLst>
+              <a:ext uri="{28A0092B-C50C-407E-A947-70E740481C1C}">
+                <a14:useLocalDpi xmlns:a14="http://schemas.microsoft.com/office/drawing/2010/main" val="0"/>
+              </a:ext>
+            </a:extLst>
+          </a:blip>
+          <a:stretch>
+            <a:fillRect/>
+          </a:stretch>
+        </p:blipFill>
+        <p:spPr>
+          <a:xfrm>
+            <a:off x="2309424" y="1168298"/>
+            <a:ext cx="6569984" cy="4025108"/>
+          </a:xfrm>
+          <a:prstGeom prst="rect">
+            <a:avLst/>
+          </a:prstGeom>
+        </p:spPr>
+      </p:pic>
     </p:spTree>
     <p:extLst>
       <p:ext uri="{BB962C8B-B14F-4D97-AF65-F5344CB8AC3E}">
@@ -4780,29 +4926,7 @@
                   </a:schemeClr>
                 </a:solidFill>
               </a:rPr>
-              <a:t>Dynamic </a:t>
-            </a:r>
-            <a:r>
-              <a:rPr lang="en-US" dirty="0" smtClean="0">
-                <a:solidFill>
-                  <a:schemeClr val="tx1">
-                    <a:lumMod val="65000"/>
-                    <a:lumOff val="35000"/>
-                  </a:schemeClr>
-                </a:solidFill>
-              </a:rPr>
-              <a:t>Resources/Infrastructure: </a:t>
-            </a:r>
-            <a:r>
-              <a:rPr lang="en-US" dirty="0" smtClean="0">
-                <a:solidFill>
-                  <a:schemeClr val="tx1">
-                    <a:lumMod val="65000"/>
-                    <a:lumOff val="35000"/>
-                  </a:schemeClr>
-                </a:solidFill>
-              </a:rPr>
-              <a:t>P*, I*</a:t>
+              <a:t>Dynamic Resources/Infrastructure: P*, I*</a:t>
             </a:r>
           </a:p>
           <a:p>
@@ -4821,18 +4945,7 @@
                   </a:schemeClr>
                 </a:solidFill>
               </a:rPr>
-              <a:t>Federation of Infrastructure </a:t>
-            </a:r>
-            <a:r>
-              <a:rPr lang="en-US" dirty="0" smtClean="0">
-                <a:solidFill>
-                  <a:schemeClr val="tx1">
-                    <a:lumMod val="65000"/>
-                    <a:lumOff val="35000"/>
-                  </a:schemeClr>
-                </a:solidFill>
-              </a:rPr>
-              <a:t>F*</a:t>
+              <a:t>Federation of Infrastructure F*</a:t>
             </a:r>
           </a:p>
           <a:p>
@@ -5100,7 +5213,6 @@
               <a:rPr lang="en-US" dirty="0" smtClean="0"/>
               <a:t>Need information about resources, networks </a:t>
             </a:r>
-            <a:endParaRPr lang="en-US" dirty="0" smtClean="0"/>
           </a:p>
           <a:p>
             <a:pPr lvl="1"/>
@@ -5109,13 +5221,8 @@
           <a:p>
             <a:r>
               <a:rPr lang="en-US" dirty="0" smtClean="0"/>
-              <a:t>Wha</a:t>
-            </a:r>
-            <a:r>
-              <a:rPr lang="en-US" dirty="0" smtClean="0"/>
-              <a:t>t is a capability?</a:t>
-            </a:r>
-            <a:endParaRPr lang="en-US" dirty="0" smtClean="0"/>
+              <a:t>What is a capability?</a:t>
+            </a:r>
           </a:p>
           <a:p>
             <a:pPr marL="457200" lvl="1" indent="0">
@@ -5857,18 +5964,7 @@
                   </a:schemeClr>
                 </a:solidFill>
               </a:rPr>
-              <a:t>Understandin</a:t>
-            </a:r>
-            <a:r>
-              <a:rPr lang="en-US" dirty="0" smtClean="0">
-                <a:solidFill>
-                  <a:schemeClr val="tx1">
-                    <a:lumMod val="65000"/>
-                    <a:lumOff val="35000"/>
-                  </a:schemeClr>
-                </a:solidFill>
-              </a:rPr>
-              <a:t>g the Different Models:</a:t>
+              <a:t>Understanding the Different Models:</a:t>
             </a:r>
             <a:endParaRPr lang="en-US" dirty="0">
               <a:solidFill>
@@ -6076,27 +6172,8 @@
                   </a:schemeClr>
                 </a:solidFill>
               </a:rPr>
-              <a:t>In turn builds upon a model/models of </a:t>
-            </a:r>
-            <a:r>
-              <a:rPr lang="en-US" dirty="0" smtClean="0">
-                <a:solidFill>
-                  <a:schemeClr val="tx1">
-                    <a:lumMod val="65000"/>
-                    <a:lumOff val="35000"/>
-                  </a:schemeClr>
-                </a:solidFill>
-              </a:rPr>
-              <a:t>infrastructure (I*)</a:t>
-            </a:r>
-            <a:endParaRPr lang="en-US" dirty="0" smtClean="0">
-              <a:solidFill>
-                <a:schemeClr val="tx1">
-                  <a:lumMod val="65000"/>
-                  <a:lumOff val="35000"/>
-                </a:schemeClr>
-              </a:solidFill>
-            </a:endParaRPr>
+              <a:t>In turn builds upon a model/models of infrastructure (I*)</a:t>
+            </a:r>
           </a:p>
           <a:p>
             <a:pPr marL="344488" indent="-342900">
@@ -6567,11 +6644,7 @@
             <a:pPr marL="344488" indent="-342900"/>
             <a:r>
               <a:rPr lang="en-US" sz="2000" dirty="0" smtClean="0"/>
-              <a:t>Role </a:t>
-            </a:r>
-            <a:r>
-              <a:rPr lang="en-US" sz="2000" dirty="0" smtClean="0"/>
-              <a:t>of Simulation</a:t>
+              <a:t>Role of Simulation</a:t>
             </a:r>
           </a:p>
           <a:p>
@@ -6585,15 +6658,7 @@
             <a:pPr marL="800100" lvl="1" indent="-342900"/>
             <a:r>
               <a:rPr lang="en-US" dirty="0" smtClean="0"/>
-              <a:t>If we want a capability [C], what is the set of resources {I} we need to </a:t>
-            </a:r>
-            <a:r>
-              <a:rPr lang="en-US" dirty="0" smtClean="0"/>
-              <a:t>federate to get  </a:t>
-            </a:r>
-            <a:r>
-              <a:rPr lang="en-US" dirty="0" smtClean="0"/>
-              <a:t>this [C] with well-defined probability distribution?</a:t>
+              <a:t>If we want a capability [C], what is the set of resources {I} we need to federate to get  this [C] with well-defined probability distribution?</a:t>
             </a:r>
           </a:p>
           <a:p>

</xml_diff>

<commit_message>
work on the NGMW schematic
</commit_message>
<xml_diff>
--- a/presentations/radical-modsim.pptx
+++ b/presentations/radical-modsim.pptx
@@ -5,7 +5,7 @@
     <p:sldMasterId id="2147483656" r:id="rId1"/>
   </p:sldMasterIdLst>
   <p:notesMasterIdLst>
-    <p:notesMasterId r:id="rId20"/>
+    <p:notesMasterId r:id="rId19"/>
   </p:notesMasterIdLst>
   <p:sldIdLst>
     <p:sldId id="256" r:id="rId2"/>
@@ -20,12 +20,11 @@
     <p:sldId id="286" r:id="rId11"/>
     <p:sldId id="287" r:id="rId12"/>
     <p:sldId id="298" r:id="rId13"/>
-    <p:sldId id="292" r:id="rId14"/>
-    <p:sldId id="297" r:id="rId15"/>
-    <p:sldId id="289" r:id="rId16"/>
-    <p:sldId id="284" r:id="rId17"/>
-    <p:sldId id="282" r:id="rId18"/>
-    <p:sldId id="295" r:id="rId19"/>
+    <p:sldId id="297" r:id="rId14"/>
+    <p:sldId id="289" r:id="rId15"/>
+    <p:sldId id="284" r:id="rId16"/>
+    <p:sldId id="282" r:id="rId17"/>
+    <p:sldId id="295" r:id="rId18"/>
   </p:sldIdLst>
   <p:sldSz cx="9144000" cy="6858000" type="screen4x3"/>
   <p:notesSz cx="6858000" cy="9144000"/>
@@ -3063,7 +3062,45 @@
           <a:p>
             <a:r>
               <a:rPr lang="en-US" dirty="0" smtClean="0"/>
-              <a:t>Currently Pilot-based compute resources, but plan is to have model for network and storage/data</a:t>
+              <a:t>Pilot-Jobs </a:t>
+            </a:r>
+            <a:r>
+              <a:rPr lang="en-US" dirty="0" smtClean="0"/>
+              <a:t>provide an abstraction for dynamic resource management. </a:t>
+            </a:r>
+            <a:r>
+              <a:rPr lang="en-US" dirty="0" smtClean="0"/>
+              <a:t>Currently abstraction is job based, but can be extended to include network </a:t>
+            </a:r>
+            <a:r>
+              <a:rPr lang="en-US" dirty="0" smtClean="0"/>
+              <a:t>and </a:t>
+            </a:r>
+            <a:r>
+              <a:rPr lang="en-US" dirty="0" smtClean="0"/>
+              <a:t>storage as </a:t>
+            </a:r>
+            <a:r>
+              <a:rPr lang="en-US" dirty="0" smtClean="0"/>
+              <a:t>other resource elements</a:t>
+            </a:r>
+          </a:p>
+          <a:p>
+            <a:r>
+              <a:rPr lang="en-US" dirty="0" smtClean="0"/>
+              <a:t>P</a:t>
+            </a:r>
+            <a:r>
+              <a:rPr lang="en-US" dirty="0"/>
+              <a:t>* is a conceptual model for </a:t>
+            </a:r>
+            <a:r>
+              <a:rPr lang="en-US" dirty="0" smtClean="0"/>
+              <a:t>Pilot-</a:t>
+            </a:r>
+            <a:r>
+              <a:rPr lang="en-US" smtClean="0"/>
+              <a:t>based resource</a:t>
             </a:r>
             <a:endParaRPr lang="en-US" dirty="0"/>
           </a:p>
@@ -3116,52 +3153,12 @@
           <a:p>
             <a:r>
               <a:rPr lang="en-US" dirty="0" smtClean="0"/>
-              <a:t>I*  [Christian]</a:t>
-            </a:r>
-            <a:endParaRPr lang="en-US" dirty="0"/>
-          </a:p>
-        </p:txBody>
-      </p:sp>
-      <p:sp>
-        <p:nvSpPr>
-          <p:cNvPr id="3" name="Content Placeholder 2"/>
-          <p:cNvSpPr>
-            <a:spLocks noGrp="1"/>
-          </p:cNvSpPr>
-          <p:nvPr>
-            <p:ph idx="1"/>
-          </p:nvPr>
-        </p:nvSpPr>
-        <p:spPr>
-          <a:xfrm>
-            <a:off x="10357423" y="1168298"/>
-            <a:ext cx="8597178" cy="5146033"/>
-          </a:xfrm>
-        </p:spPr>
-        <p:txBody>
-          <a:bodyPr/>
-          <a:lstStyle/>
-          <a:p>
+              <a:t>I*  </a:t>
+            </a:r>
             <a:r>
               <a:rPr lang="en-US" dirty="0" smtClean="0"/>
-              <a:t>Analytical Model of Infrastructure</a:t>
-            </a:r>
-          </a:p>
-          <a:p>
-            <a:pPr lvl="1"/>
-            <a:r>
-              <a:rPr lang="en-US" dirty="0" smtClean="0"/>
-              <a:t>Based upon a set of capabilities exposed by that infrastructure, without regards to its internal properties</a:t>
-            </a:r>
-          </a:p>
-          <a:p>
-            <a:pPr marL="457200" lvl="1" indent="0">
-              <a:buNone/>
-            </a:pPr>
-            <a:endParaRPr lang="en-US" dirty="0" smtClean="0"/>
-          </a:p>
-          <a:p>
-            <a:pPr lvl="1"/>
+              <a:t>]</a:t>
+            </a:r>
             <a:endParaRPr lang="en-US" dirty="0"/>
           </a:p>
         </p:txBody>
@@ -3307,6 +3304,25 @@
           </a:prstGeom>
         </p:spPr>
       </p:pic>
+      <p:sp>
+        <p:nvSpPr>
+          <p:cNvPr id="6" name="Content Placeholder 5"/>
+          <p:cNvSpPr>
+            <a:spLocks noGrp="1"/>
+          </p:cNvSpPr>
+          <p:nvPr>
+            <p:ph idx="1"/>
+          </p:nvPr>
+        </p:nvSpPr>
+        <p:spPr/>
+        <p:txBody>
+          <a:bodyPr/>
+          <a:lstStyle/>
+          <a:p>
+            <a:endParaRPr lang="en-US"/>
+          </a:p>
+        </p:txBody>
+      </p:sp>
     </p:spTree>
     <p:extLst>
       <p:ext uri="{BB962C8B-B14F-4D97-AF65-F5344CB8AC3E}">
@@ -3321,209 +3337,6 @@
 </file>
 
 <file path=ppt/slides/slide13.xml><?xml version="1.0" encoding="utf-8"?>
-<p:sld xmlns:a="http://schemas.openxmlformats.org/drawingml/2006/main" xmlns:r="http://schemas.openxmlformats.org/officeDocument/2006/relationships" xmlns:p="http://schemas.openxmlformats.org/presentationml/2006/main">
-  <p:cSld>
-    <p:spTree>
-      <p:nvGrpSpPr>
-        <p:cNvPr id="1" name=""/>
-        <p:cNvGrpSpPr/>
-        <p:nvPr/>
-      </p:nvGrpSpPr>
-      <p:grpSpPr>
-        <a:xfrm>
-          <a:off x="0" y="0"/>
-          <a:ext cx="0" cy="0"/>
-          <a:chOff x="0" y="0"/>
-          <a:chExt cx="0" cy="0"/>
-        </a:xfrm>
-      </p:grpSpPr>
-      <p:sp>
-        <p:nvSpPr>
-          <p:cNvPr id="2" name="Title 1"/>
-          <p:cNvSpPr>
-            <a:spLocks noGrp="1"/>
-          </p:cNvSpPr>
-          <p:nvPr>
-            <p:ph type="title" idx="4294967295"/>
-          </p:nvPr>
-        </p:nvSpPr>
-        <p:spPr>
-          <a:xfrm>
-            <a:off x="547688" y="76200"/>
-            <a:ext cx="8596312" cy="690563"/>
-          </a:xfrm>
-        </p:spPr>
-        <p:txBody>
-          <a:bodyPr/>
-          <a:lstStyle/>
-          <a:p>
-            <a:r>
-              <a:rPr lang="en-US" dirty="0" smtClean="0"/>
-              <a:t>I</a:t>
-            </a:r>
-            <a:r>
-              <a:rPr lang="en-US" dirty="0" smtClean="0"/>
-              <a:t>*</a:t>
-            </a:r>
-            <a:endParaRPr lang="en-US" dirty="0"/>
-          </a:p>
-        </p:txBody>
-      </p:sp>
-      <p:sp>
-        <p:nvSpPr>
-          <p:cNvPr id="4" name="Textfeld 3"/>
-          <p:cNvSpPr txBox="1"/>
-          <p:nvPr/>
-        </p:nvSpPr>
-        <p:spPr>
-          <a:xfrm>
-            <a:off x="282231" y="4977961"/>
-            <a:ext cx="2918753" cy="954107"/>
-          </a:xfrm>
-          <a:prstGeom prst="rect">
-            <a:avLst/>
-          </a:prstGeom>
-          <a:noFill/>
-        </p:spPr>
-        <p:txBody>
-          <a:bodyPr wrap="square" rtlCol="0">
-            <a:spAutoFit/>
-          </a:bodyPr>
-          <a:lstStyle/>
-          <a:p>
-            <a:pPr marL="285750" indent="-285750">
-              <a:buFont typeface="Wingdings" charset="2"/>
-              <a:buChar char="ü"/>
-            </a:pPr>
-            <a:r>
-              <a:rPr lang="de-DE" dirty="0" smtClean="0"/>
-              <a:t>Fast </a:t>
-            </a:r>
-            <a:r>
-              <a:rPr lang="de-DE" dirty="0" err="1"/>
-              <a:t>modeling</a:t>
-            </a:r>
-            <a:endParaRPr lang="de-DE" dirty="0"/>
-          </a:p>
-          <a:p>
-            <a:pPr marL="285750" indent="-285750">
-              <a:buFont typeface="Wingdings" charset="2"/>
-              <a:buChar char="ü"/>
-            </a:pPr>
-            <a:r>
-              <a:rPr lang="de-DE" dirty="0" smtClean="0"/>
-              <a:t>Easy </a:t>
-            </a:r>
-            <a:r>
-              <a:rPr lang="de-DE" dirty="0" err="1"/>
-              <a:t>data</a:t>
-            </a:r>
-            <a:r>
-              <a:rPr lang="de-DE" dirty="0"/>
-              <a:t> </a:t>
-            </a:r>
-            <a:r>
-              <a:rPr lang="de-DE" dirty="0" err="1"/>
-              <a:t>integration</a:t>
-            </a:r>
-            <a:endParaRPr lang="de-DE" dirty="0"/>
-          </a:p>
-          <a:p>
-            <a:pPr marL="285750" indent="-285750">
-              <a:buFont typeface="Wingdings" charset="2"/>
-              <a:buChar char="ü"/>
-            </a:pPr>
-            <a:r>
-              <a:rPr lang="de-DE" dirty="0" smtClean="0"/>
-              <a:t>Multiple </a:t>
-            </a:r>
-            <a:r>
-              <a:rPr lang="de-DE" dirty="0" err="1"/>
-              <a:t>levels</a:t>
-            </a:r>
-            <a:r>
-              <a:rPr lang="de-DE" dirty="0"/>
-              <a:t> </a:t>
-            </a:r>
-            <a:r>
-              <a:rPr lang="de-DE" dirty="0" err="1"/>
-              <a:t>of</a:t>
-            </a:r>
-            <a:r>
-              <a:rPr lang="de-DE" dirty="0"/>
-              <a:t> </a:t>
-            </a:r>
-            <a:r>
-              <a:rPr lang="de-DE" dirty="0" err="1" smtClean="0"/>
-              <a:t>granularity</a:t>
-            </a:r>
-            <a:endParaRPr lang="de-DE" dirty="0"/>
-          </a:p>
-          <a:p>
-            <a:pPr marL="285750" indent="-285750">
-              <a:buFont typeface="Wingdings" charset="2"/>
-              <a:buChar char="ü"/>
-            </a:pPr>
-            <a:r>
-              <a:rPr lang="de-DE" dirty="0" err="1" smtClean="0"/>
-              <a:t>Redundancy</a:t>
-            </a:r>
-            <a:r>
-              <a:rPr lang="de-DE" dirty="0" smtClean="0"/>
-              <a:t> </a:t>
-            </a:r>
-            <a:r>
-              <a:rPr lang="de-DE" dirty="0" err="1" smtClean="0"/>
-              <a:t>handling</a:t>
-            </a:r>
-            <a:endParaRPr lang="de-DE" dirty="0"/>
-          </a:p>
-        </p:txBody>
-      </p:sp>
-      <p:pic>
-        <p:nvPicPr>
-          <p:cNvPr id="5" name="Bild 4" descr="SlideDoE.png"/>
-          <p:cNvPicPr>
-            <a:picLocks noChangeAspect="1"/>
-          </p:cNvPicPr>
-          <p:nvPr/>
-        </p:nvPicPr>
-        <p:blipFill>
-          <a:blip r:embed="rId2">
-            <a:extLst>
-              <a:ext uri="{28A0092B-C50C-407E-A947-70E740481C1C}">
-                <a14:useLocalDpi xmlns:a14="http://schemas.microsoft.com/office/drawing/2010/main" val="0"/>
-              </a:ext>
-            </a:extLst>
-          </a:blip>
-          <a:stretch>
-            <a:fillRect/>
-          </a:stretch>
-        </p:blipFill>
-        <p:spPr>
-          <a:xfrm>
-            <a:off x="2309424" y="1168298"/>
-            <a:ext cx="6569984" cy="4025108"/>
-          </a:xfrm>
-          <a:prstGeom prst="rect">
-            <a:avLst/>
-          </a:prstGeom>
-        </p:spPr>
-      </p:pic>
-    </p:spTree>
-    <p:extLst>
-      <p:ext uri="{BB962C8B-B14F-4D97-AF65-F5344CB8AC3E}">
-        <p14:creationId xmlns:p14="http://schemas.microsoft.com/office/powerpoint/2010/main" val="1832354515"/>
-      </p:ext>
-    </p:extLst>
-  </p:cSld>
-  <p:clrMapOvr>
-    <a:masterClrMapping/>
-  </p:clrMapOvr>
-</p:sld>
-</file>
-
-<file path=ppt/slides/slide14.xml><?xml version="1.0" encoding="utf-8"?>
 <p:sld xmlns:a="http://schemas.openxmlformats.org/drawingml/2006/main" xmlns:r="http://schemas.openxmlformats.org/officeDocument/2006/relationships" xmlns:p="http://schemas.openxmlformats.org/presentationml/2006/main">
   <p:cSld>
     <p:spTree>
@@ -3861,7 +3674,7 @@
 </p:sld>
 </file>
 
-<file path=ppt/slides/slide15.xml><?xml version="1.0" encoding="utf-8"?>
+<file path=ppt/slides/slide14.xml><?xml version="1.0" encoding="utf-8"?>
 <p:sld xmlns:a="http://schemas.openxmlformats.org/drawingml/2006/main" xmlns:r="http://schemas.openxmlformats.org/officeDocument/2006/relationships" xmlns:p="http://schemas.openxmlformats.org/presentationml/2006/main">
   <p:cSld>
     <p:spTree>
@@ -3939,7 +3752,7 @@
 </p:sld>
 </file>
 
-<file path=ppt/slides/slide16.xml><?xml version="1.0" encoding="utf-8"?>
+<file path=ppt/slides/slide15.xml><?xml version="1.0" encoding="utf-8"?>
 <p:sld xmlns:a="http://schemas.openxmlformats.org/drawingml/2006/main" xmlns:r="http://schemas.openxmlformats.org/officeDocument/2006/relationships" xmlns:p="http://schemas.openxmlformats.org/presentationml/2006/main">
   <p:cSld>
     <p:spTree>
@@ -4199,7 +4012,7 @@
 </p:sld>
 </file>
 
-<file path=ppt/slides/slide17.xml><?xml version="1.0" encoding="utf-8"?>
+<file path=ppt/slides/slide16.xml><?xml version="1.0" encoding="utf-8"?>
 <p:sld xmlns:a="http://schemas.openxmlformats.org/drawingml/2006/main" xmlns:r="http://schemas.openxmlformats.org/officeDocument/2006/relationships" xmlns:p="http://schemas.openxmlformats.org/presentationml/2006/main">
   <p:cSld>
     <p:spTree>
@@ -4961,7 +4774,7 @@
 </p:sld>
 </file>
 
-<file path=ppt/slides/slide18.xml><?xml version="1.0" encoding="utf-8"?>
+<file path=ppt/slides/slide17.xml><?xml version="1.0" encoding="utf-8"?>
 <p:sld xmlns:a="http://schemas.openxmlformats.org/drawingml/2006/main" xmlns:r="http://schemas.openxmlformats.org/officeDocument/2006/relationships" xmlns:p="http://schemas.openxmlformats.org/presentationml/2006/main">
   <p:cSld>
     <p:spTree>

</xml_diff>

<commit_message>
ongoing work on ngmw schematic
</commit_message>
<xml_diff>
--- a/presentations/radical-modsim.pptx
+++ b/presentations/radical-modsim.pptx
@@ -3123,27 +3123,7 @@
           <a:p>
             <a:r>
               <a:rPr lang="en-US" dirty="0" smtClean="0"/>
-              <a:t>Pilot-Jobs </a:t>
-            </a:r>
-            <a:r>
-              <a:rPr lang="en-US" dirty="0" smtClean="0"/>
-              <a:t>provide an abstraction for dynamic resource management. </a:t>
-            </a:r>
-            <a:r>
-              <a:rPr lang="en-US" dirty="0" smtClean="0"/>
-              <a:t>Currently abstraction is job based, but can be extended to include network </a:t>
-            </a:r>
-            <a:r>
-              <a:rPr lang="en-US" dirty="0" smtClean="0"/>
-              <a:t>and </a:t>
-            </a:r>
-            <a:r>
-              <a:rPr lang="en-US" dirty="0" smtClean="0"/>
-              <a:t>storage as </a:t>
-            </a:r>
-            <a:r>
-              <a:rPr lang="en-US" dirty="0" smtClean="0"/>
-              <a:t>other resource elements</a:t>
+              <a:t>Pilot-Jobs provide an abstraction for dynamic resource management. Currently abstraction is job based, but can be extended to include network and storage as other resource elements</a:t>
             </a:r>
           </a:p>
           <a:p>
@@ -3210,11 +3190,7 @@
           <a:p>
             <a:r>
               <a:rPr lang="en-US" dirty="0" smtClean="0"/>
-              <a:t>I*  </a:t>
-            </a:r>
-            <a:r>
-              <a:rPr lang="en-US" dirty="0" smtClean="0"/>
-              <a:t>]</a:t>
+              <a:t>I*  ]</a:t>
             </a:r>
             <a:endParaRPr lang="en-US" dirty="0"/>
           </a:p>
@@ -5702,7 +5678,11 @@
           <a:p>
             <a:r>
               <a:rPr lang="en-US" dirty="0" smtClean="0"/>
-              <a:t>NGMW Schematic [Mark/SJ]</a:t>
+              <a:t>NGMW </a:t>
+            </a:r>
+            <a:r>
+              <a:rPr lang="en-US" dirty="0" smtClean="0"/>
+              <a:t>Schematic</a:t>
             </a:r>
             <a:endParaRPr lang="en-US" dirty="0"/>
           </a:p>
@@ -5710,7 +5690,7 @@
       </p:sp>
       <p:pic>
         <p:nvPicPr>
-          <p:cNvPr id="3" name="Content Placeholder 2" descr="ngmw-schematic.png"/>
+          <p:cNvPr id="7" name="Content Placeholder 6" descr="ngmw-schematic-2.png"/>
           <p:cNvPicPr>
             <a:picLocks noGrp="1" noChangeAspect="1"/>
           </p:cNvPicPr>
@@ -5726,7 +5706,7 @@
               </a:ext>
             </a:extLst>
           </a:blip>
-          <a:srcRect l="4366" r="4366"/>
+          <a:srcRect l="2528" r="2528"/>
           <a:stretch>
             <a:fillRect/>
           </a:stretch>

</xml_diff>

<commit_message>
putting it altogether slide    and minor changes
</commit_message>
<xml_diff>
--- a/presentations/radical-modsim.pptx
+++ b/presentations/radical-modsim.pptx
@@ -5,7 +5,7 @@
     <p:sldMasterId id="2147483656" r:id="rId1"/>
   </p:sldMasterIdLst>
   <p:notesMasterIdLst>
-    <p:notesMasterId r:id="rId19"/>
+    <p:notesMasterId r:id="rId20"/>
   </p:notesMasterIdLst>
   <p:sldIdLst>
     <p:sldId id="256" r:id="rId2"/>
@@ -22,9 +22,10 @@
     <p:sldId id="298" r:id="rId13"/>
     <p:sldId id="297" r:id="rId14"/>
     <p:sldId id="289" r:id="rId15"/>
-    <p:sldId id="284" r:id="rId16"/>
-    <p:sldId id="282" r:id="rId17"/>
-    <p:sldId id="295" r:id="rId18"/>
+    <p:sldId id="300" r:id="rId16"/>
+    <p:sldId id="284" r:id="rId17"/>
+    <p:sldId id="282" r:id="rId18"/>
+    <p:sldId id="295" r:id="rId19"/>
   </p:sldIdLst>
   <p:sldSz cx="9144000" cy="6858000" type="screen4x3"/>
   <p:notesSz cx="6858000" cy="9144000"/>
@@ -1016,6 +1017,95 @@
 </file>
 
 <file path=ppt/notesSlides/notesSlide7.xml><?xml version="1.0" encoding="utf-8"?>
+<p:notes xmlns:a="http://schemas.openxmlformats.org/drawingml/2006/main" xmlns:r="http://schemas.openxmlformats.org/officeDocument/2006/relationships" xmlns:p="http://schemas.openxmlformats.org/presentationml/2006/main">
+  <p:cSld>
+    <p:spTree>
+      <p:nvGrpSpPr>
+        <p:cNvPr id="1" name=""/>
+        <p:cNvGrpSpPr/>
+        <p:nvPr/>
+      </p:nvGrpSpPr>
+      <p:grpSpPr>
+        <a:xfrm>
+          <a:off x="0" y="0"/>
+          <a:ext cx="0" cy="0"/>
+          <a:chOff x="0" y="0"/>
+          <a:chExt cx="0" cy="0"/>
+        </a:xfrm>
+      </p:grpSpPr>
+      <p:sp>
+        <p:nvSpPr>
+          <p:cNvPr id="2" name="Slide Image Placeholder 1"/>
+          <p:cNvSpPr>
+            <a:spLocks noGrp="1" noRot="1" noChangeAspect="1"/>
+          </p:cNvSpPr>
+          <p:nvPr>
+            <p:ph type="sldImg"/>
+          </p:nvPr>
+        </p:nvSpPr>
+        <p:spPr>
+          <a:xfrm>
+            <a:off x="1143000" y="685800"/>
+            <a:ext cx="4572000" cy="3429000"/>
+          </a:xfrm>
+        </p:spPr>
+      </p:sp>
+      <p:sp>
+        <p:nvSpPr>
+          <p:cNvPr id="3" name="Notes Placeholder 2"/>
+          <p:cNvSpPr>
+            <a:spLocks noGrp="1"/>
+          </p:cNvSpPr>
+          <p:nvPr>
+            <p:ph type="body" idx="1"/>
+          </p:nvPr>
+        </p:nvSpPr>
+        <p:spPr/>
+        <p:txBody>
+          <a:bodyPr/>
+          <a:lstStyle/>
+          <a:p>
+            <a:pPr marL="0" marR="0" indent="0" algn="l" defTabSz="457200" rtl="0" eaLnBrk="1" fontAlgn="auto" latinLnBrk="0" hangingPunct="1">
+              <a:lnSpc>
+                <a:spcPct val="100000"/>
+              </a:lnSpc>
+              <a:spcBef>
+                <a:spcPts val="0"/>
+              </a:spcBef>
+              <a:spcAft>
+                <a:spcPts val="0"/>
+              </a:spcAft>
+              <a:buClrTx/>
+              <a:buSzTx/>
+              <a:buFontTx/>
+              <a:buNone/>
+              <a:tabLst/>
+              <a:defRPr/>
+            </a:pPr>
+            <a:r>
+              <a:rPr lang="en-US" dirty="0" smtClean="0"/>
+              <a:t>We take the schematic of NGMW and show how the different levels at which the Models work, (ii) how different models interact, especially (a) Andre and Christian’s work/interface, (ii) I* and F*.</a:t>
+            </a:r>
+          </a:p>
+          <a:p>
+            <a:endParaRPr lang="en-US" dirty="0"/>
+          </a:p>
+        </p:txBody>
+      </p:sp>
+    </p:spTree>
+    <p:extLst>
+      <p:ext uri="{BB962C8B-B14F-4D97-AF65-F5344CB8AC3E}">
+        <p14:creationId xmlns:p14="http://schemas.microsoft.com/office/powerpoint/2010/main" val="1073575463"/>
+      </p:ext>
+    </p:extLst>
+  </p:cSld>
+  <p:clrMapOvr>
+    <a:masterClrMapping/>
+  </p:clrMapOvr>
+</p:notes>
+</file>
+
+<file path=ppt/notesSlides/notesSlide8.xml><?xml version="1.0" encoding="utf-8"?>
 <p:notes xmlns:a="http://schemas.openxmlformats.org/drawingml/2006/main" xmlns:r="http://schemas.openxmlformats.org/officeDocument/2006/relationships" xmlns:p="http://schemas.openxmlformats.org/presentationml/2006/main" showMasterSp="0" showMasterPhAnim="0">
   <p:cSld>
     <p:spTree>
@@ -1150,7 +1240,7 @@
 </p:notes>
 </file>
 
-<file path=ppt/notesSlides/notesSlide8.xml><?xml version="1.0" encoding="utf-8"?>
+<file path=ppt/notesSlides/notesSlide9.xml><?xml version="1.0" encoding="utf-8"?>
 <p:notes xmlns:a="http://schemas.openxmlformats.org/drawingml/2006/main" xmlns:r="http://schemas.openxmlformats.org/officeDocument/2006/relationships" xmlns:p="http://schemas.openxmlformats.org/presentationml/2006/main" showMasterSp="0" showMasterPhAnim="0">
   <p:cSld>
     <p:spTree>
@@ -3790,6 +3880,84 @@
   <p:cSld>
     <p:spTree>
       <p:nvGrpSpPr>
+        <p:cNvPr id="1" name=""/>
+        <p:cNvGrpSpPr/>
+        <p:nvPr/>
+      </p:nvGrpSpPr>
+      <p:grpSpPr>
+        <a:xfrm>
+          <a:off x="0" y="0"/>
+          <a:ext cx="0" cy="0"/>
+          <a:chOff x="0" y="0"/>
+          <a:chExt cx="0" cy="0"/>
+        </a:xfrm>
+      </p:grpSpPr>
+      <p:sp>
+        <p:nvSpPr>
+          <p:cNvPr id="2" name="Title 1"/>
+          <p:cNvSpPr>
+            <a:spLocks noGrp="1"/>
+          </p:cNvSpPr>
+          <p:nvPr>
+            <p:ph type="title"/>
+          </p:nvPr>
+        </p:nvSpPr>
+        <p:spPr/>
+        <p:txBody>
+          <a:bodyPr/>
+          <a:lstStyle/>
+          <a:p>
+            <a:r>
+              <a:rPr lang="en-US" dirty="0" smtClean="0"/>
+              <a:t>*.* : Putting it together</a:t>
+            </a:r>
+            <a:endParaRPr lang="en-US" dirty="0"/>
+          </a:p>
+        </p:txBody>
+      </p:sp>
+      <p:pic>
+        <p:nvPicPr>
+          <p:cNvPr id="4" name="Content Placeholder 3" descr="ngmw-schematic-3.png"/>
+          <p:cNvPicPr>
+            <a:picLocks noGrp="1" noChangeAspect="1"/>
+          </p:cNvPicPr>
+          <p:nvPr>
+            <p:ph idx="1"/>
+          </p:nvPr>
+        </p:nvPicPr>
+        <p:blipFill>
+          <a:blip r:embed="rId3">
+            <a:extLst>
+              <a:ext uri="{28A0092B-C50C-407E-A947-70E740481C1C}">
+                <a14:useLocalDpi xmlns:a14="http://schemas.microsoft.com/office/drawing/2010/main" val="0"/>
+              </a:ext>
+            </a:extLst>
+          </a:blip>
+          <a:srcRect l="-43785" r="-43785"/>
+          <a:stretch>
+            <a:fillRect/>
+          </a:stretch>
+        </p:blipFill>
+        <p:spPr/>
+      </p:pic>
+    </p:spTree>
+    <p:extLst>
+      <p:ext uri="{BB962C8B-B14F-4D97-AF65-F5344CB8AC3E}">
+        <p14:creationId xmlns:p14="http://schemas.microsoft.com/office/powerpoint/2010/main" val="449869100"/>
+      </p:ext>
+    </p:extLst>
+  </p:cSld>
+  <p:clrMapOvr>
+    <a:masterClrMapping/>
+  </p:clrMapOvr>
+</p:sld>
+</file>
+
+<file path=ppt/slides/slide16.xml><?xml version="1.0" encoding="utf-8"?>
+<p:sld xmlns:a="http://schemas.openxmlformats.org/drawingml/2006/main" xmlns:r="http://schemas.openxmlformats.org/officeDocument/2006/relationships" xmlns:p="http://schemas.openxmlformats.org/presentationml/2006/main">
+  <p:cSld>
+    <p:spTree>
+      <p:nvGrpSpPr>
         <p:cNvPr id="1" name="Shape 46"/>
         <p:cNvGrpSpPr/>
         <p:nvPr/>
@@ -4045,7 +4213,7 @@
 </p:sld>
 </file>
 
-<file path=ppt/slides/slide16.xml><?xml version="1.0" encoding="utf-8"?>
+<file path=ppt/slides/slide17.xml><?xml version="1.0" encoding="utf-8"?>
 <p:sld xmlns:a="http://schemas.openxmlformats.org/drawingml/2006/main" xmlns:r="http://schemas.openxmlformats.org/officeDocument/2006/relationships" xmlns:p="http://schemas.openxmlformats.org/presentationml/2006/main">
   <p:cSld>
     <p:spTree>
@@ -4807,7 +4975,7 @@
 </p:sld>
 </file>
 
-<file path=ppt/slides/slide17.xml><?xml version="1.0" encoding="utf-8"?>
+<file path=ppt/slides/slide18.xml><?xml version="1.0" encoding="utf-8"?>
 <p:sld xmlns:a="http://schemas.openxmlformats.org/drawingml/2006/main" xmlns:r="http://schemas.openxmlformats.org/officeDocument/2006/relationships" xmlns:p="http://schemas.openxmlformats.org/presentationml/2006/main">
   <p:cSld>
     <p:spTree>
@@ -5678,11 +5846,7 @@
           <a:p>
             <a:r>
               <a:rPr lang="en-US" dirty="0" smtClean="0"/>
-              <a:t>NGMW </a:t>
-            </a:r>
-            <a:r>
-              <a:rPr lang="en-US" dirty="0" smtClean="0"/>
-              <a:t>Schematic</a:t>
+              <a:t>NGMW Schematic</a:t>
             </a:r>
             <a:endParaRPr lang="en-US" dirty="0"/>
           </a:p>

</xml_diff>

<commit_message>
ongoing work -- refined A*/W* slide. hid a couple of others.
</commit_message>
<xml_diff>
--- a/presentations/radical-modsim.pptx
+++ b/presentations/radical-modsim.pptx
@@ -5,7 +5,7 @@
     <p:sldMasterId id="2147483656" r:id="rId1"/>
   </p:sldMasterIdLst>
   <p:notesMasterIdLst>
-    <p:notesMasterId r:id="rId28"/>
+    <p:notesMasterId r:id="rId29"/>
   </p:notesMasterIdLst>
   <p:sldIdLst>
     <p:sldId id="256" r:id="rId2"/>
@@ -26,14 +26,15 @@
     <p:sldId id="297" r:id="rId17"/>
     <p:sldId id="289" r:id="rId18"/>
     <p:sldId id="300" r:id="rId19"/>
-    <p:sldId id="327" r:id="rId20"/>
-    <p:sldId id="328" r:id="rId21"/>
-    <p:sldId id="326" r:id="rId22"/>
-    <p:sldId id="295" r:id="rId23"/>
-    <p:sldId id="284" r:id="rId24"/>
-    <p:sldId id="320" r:id="rId25"/>
-    <p:sldId id="321" r:id="rId26"/>
-    <p:sldId id="329" r:id="rId27"/>
+    <p:sldId id="331" r:id="rId20"/>
+    <p:sldId id="327" r:id="rId21"/>
+    <p:sldId id="328" r:id="rId22"/>
+    <p:sldId id="326" r:id="rId23"/>
+    <p:sldId id="295" r:id="rId24"/>
+    <p:sldId id="284" r:id="rId25"/>
+    <p:sldId id="320" r:id="rId26"/>
+    <p:sldId id="321" r:id="rId27"/>
+    <p:sldId id="329" r:id="rId28"/>
   </p:sldIdLst>
   <p:sldSz cx="9144000" cy="6858000" type="screen4x3"/>
   <p:notesSz cx="6858000" cy="9144000"/>
@@ -601,7 +602,12 @@
             <p:ph type="sldImg"/>
           </p:nvPr>
         </p:nvSpPr>
-        <p:spPr/>
+        <p:spPr>
+          <a:xfrm>
+            <a:off x="1143000" y="685800"/>
+            <a:ext cx="4572000" cy="3429000"/>
+          </a:xfrm>
+        </p:spPr>
       </p:sp>
       <p:sp>
         <p:nvSpPr>
@@ -618,6 +624,29 @@
           <a:bodyPr/>
           <a:lstStyle/>
           <a:p>
+            <a:pPr marL="0" marR="0" lvl="1" indent="0" algn="l" defTabSz="457200" rtl="0" eaLnBrk="1" fontAlgn="auto" latinLnBrk="0" hangingPunct="1">
+              <a:lnSpc>
+                <a:spcPct val="100000"/>
+              </a:lnSpc>
+              <a:spcBef>
+                <a:spcPts val="0"/>
+              </a:spcBef>
+              <a:spcAft>
+                <a:spcPts val="0"/>
+              </a:spcAft>
+              <a:buClrTx/>
+              <a:buSzTx/>
+              <a:buFontTx/>
+              <a:buNone/>
+              <a:tabLst/>
+              <a:defRPr/>
+            </a:pPr>
+            <a:r>
+              <a:rPr lang="en-US" dirty="0" smtClean="0"/>
+              <a:t>Decomposition of application's problem and data space </a:t>
+            </a:r>
+          </a:p>
+          <a:p>
             <a:endParaRPr lang="en-US" dirty="0"/>
           </a:p>
         </p:txBody>
@@ -625,7 +654,7 @@
     </p:spTree>
     <p:extLst>
       <p:ext uri="{BB962C8B-B14F-4D97-AF65-F5344CB8AC3E}">
-        <p14:creationId xmlns:p14="http://schemas.microsoft.com/office/powerpoint/2010/main" val="3821591872"/>
+        <p14:creationId xmlns:p14="http://schemas.microsoft.com/office/powerpoint/2010/main" val="536234631"/>
       </p:ext>
     </p:extLst>
   </p:cSld>
@@ -662,12 +691,7 @@
             <p:ph type="sldImg"/>
           </p:nvPr>
         </p:nvSpPr>
-        <p:spPr>
-          <a:xfrm>
-            <a:off x="1143000" y="685800"/>
-            <a:ext cx="4572000" cy="3429000"/>
-          </a:xfrm>
-        </p:spPr>
+        <p:spPr/>
       </p:sp>
       <p:sp>
         <p:nvSpPr>
@@ -684,29 +708,6 @@
           <a:bodyPr/>
           <a:lstStyle/>
           <a:p>
-            <a:pPr marL="0" marR="0" indent="0" algn="l" defTabSz="457200" rtl="0" eaLnBrk="1" fontAlgn="auto" latinLnBrk="0" hangingPunct="1">
-              <a:lnSpc>
-                <a:spcPct val="100000"/>
-              </a:lnSpc>
-              <a:spcBef>
-                <a:spcPts val="0"/>
-              </a:spcBef>
-              <a:spcAft>
-                <a:spcPts val="0"/>
-              </a:spcAft>
-              <a:buClrTx/>
-              <a:buSzTx/>
-              <a:buFontTx/>
-              <a:buNone/>
-              <a:tabLst/>
-              <a:defRPr/>
-            </a:pPr>
-            <a:r>
-              <a:rPr lang="en-US" dirty="0" smtClean="0"/>
-              <a:t>We take the schematic of NGMW and show how the different levels at which the Models work, (ii) how different models interact, especially (a) Andre and Christian’s work/interface, (ii) I* and F*.</a:t>
-            </a:r>
-          </a:p>
-          <a:p>
             <a:endParaRPr lang="en-US" dirty="0"/>
           </a:p>
         </p:txBody>
@@ -714,7 +715,7 @@
     </p:spTree>
     <p:extLst>
       <p:ext uri="{BB962C8B-B14F-4D97-AF65-F5344CB8AC3E}">
-        <p14:creationId xmlns:p14="http://schemas.microsoft.com/office/powerpoint/2010/main" val="1073575463"/>
+        <p14:creationId xmlns:p14="http://schemas.microsoft.com/office/powerpoint/2010/main" val="3821591872"/>
       </p:ext>
     </p:extLst>
   </p:cSld>
@@ -862,6 +863,184 @@
           <a:bodyPr/>
           <a:lstStyle/>
           <a:p>
+            <a:pPr marL="0" marR="0" indent="0" algn="l" defTabSz="457200" rtl="0" eaLnBrk="1" fontAlgn="auto" latinLnBrk="0" hangingPunct="1">
+              <a:lnSpc>
+                <a:spcPct val="100000"/>
+              </a:lnSpc>
+              <a:spcBef>
+                <a:spcPts val="0"/>
+              </a:spcBef>
+              <a:spcAft>
+                <a:spcPts val="0"/>
+              </a:spcAft>
+              <a:buClrTx/>
+              <a:buSzTx/>
+              <a:buFontTx/>
+              <a:buNone/>
+              <a:tabLst/>
+              <a:defRPr/>
+            </a:pPr>
+            <a:r>
+              <a:rPr lang="en-US" dirty="0" smtClean="0"/>
+              <a:t>We take the schematic of NGMW and show how the different levels at which the Models work, (ii) how different models interact, especially (a) Andre and Christian’s work/interface, (ii) I* and F*.</a:t>
+            </a:r>
+          </a:p>
+          <a:p>
+            <a:endParaRPr lang="en-US" dirty="0"/>
+          </a:p>
+        </p:txBody>
+      </p:sp>
+    </p:spTree>
+    <p:extLst>
+      <p:ext uri="{BB962C8B-B14F-4D97-AF65-F5344CB8AC3E}">
+        <p14:creationId xmlns:p14="http://schemas.microsoft.com/office/powerpoint/2010/main" val="1073575463"/>
+      </p:ext>
+    </p:extLst>
+  </p:cSld>
+  <p:clrMapOvr>
+    <a:masterClrMapping/>
+  </p:clrMapOvr>
+</p:notes>
+</file>
+
+<file path=ppt/notesSlides/notesSlide14.xml><?xml version="1.0" encoding="utf-8"?>
+<p:notes xmlns:a="http://schemas.openxmlformats.org/drawingml/2006/main" xmlns:r="http://schemas.openxmlformats.org/officeDocument/2006/relationships" xmlns:p="http://schemas.openxmlformats.org/presentationml/2006/main">
+  <p:cSld>
+    <p:spTree>
+      <p:nvGrpSpPr>
+        <p:cNvPr id="1" name=""/>
+        <p:cNvGrpSpPr/>
+        <p:nvPr/>
+      </p:nvGrpSpPr>
+      <p:grpSpPr>
+        <a:xfrm>
+          <a:off x="0" y="0"/>
+          <a:ext cx="0" cy="0"/>
+          <a:chOff x="0" y="0"/>
+          <a:chExt cx="0" cy="0"/>
+        </a:xfrm>
+      </p:grpSpPr>
+      <p:sp>
+        <p:nvSpPr>
+          <p:cNvPr id="2" name="Slide Image Placeholder 1"/>
+          <p:cNvSpPr>
+            <a:spLocks noGrp="1" noRot="1" noChangeAspect="1"/>
+          </p:cNvSpPr>
+          <p:nvPr>
+            <p:ph type="sldImg"/>
+          </p:nvPr>
+        </p:nvSpPr>
+        <p:spPr>
+          <a:xfrm>
+            <a:off x="1143000" y="685800"/>
+            <a:ext cx="4572000" cy="3429000"/>
+          </a:xfrm>
+        </p:spPr>
+      </p:sp>
+      <p:sp>
+        <p:nvSpPr>
+          <p:cNvPr id="3" name="Notes Placeholder 2"/>
+          <p:cNvSpPr>
+            <a:spLocks noGrp="1"/>
+          </p:cNvSpPr>
+          <p:nvPr>
+            <p:ph type="body" idx="1"/>
+          </p:nvPr>
+        </p:nvSpPr>
+        <p:spPr/>
+        <p:txBody>
+          <a:bodyPr/>
+          <a:lstStyle/>
+          <a:p>
+            <a:pPr marL="0" marR="0" indent="0" algn="l" defTabSz="457200" rtl="0" eaLnBrk="1" fontAlgn="auto" latinLnBrk="0" hangingPunct="1">
+              <a:lnSpc>
+                <a:spcPct val="100000"/>
+              </a:lnSpc>
+              <a:spcBef>
+                <a:spcPts val="0"/>
+              </a:spcBef>
+              <a:spcAft>
+                <a:spcPts val="0"/>
+              </a:spcAft>
+              <a:buClrTx/>
+              <a:buSzTx/>
+              <a:buFontTx/>
+              <a:buNone/>
+              <a:tabLst/>
+              <a:defRPr/>
+            </a:pPr>
+            <a:r>
+              <a:rPr lang="en-US" dirty="0" smtClean="0"/>
+              <a:t>We take the schematic of NGMW and show how the different levels at which the Models work, (ii) how different models interact, especially (a) Andre and Christian’s work/interface, (ii) I* and F*.</a:t>
+            </a:r>
+          </a:p>
+          <a:p>
+            <a:endParaRPr lang="en-US" dirty="0"/>
+          </a:p>
+        </p:txBody>
+      </p:sp>
+    </p:spTree>
+    <p:extLst>
+      <p:ext uri="{BB962C8B-B14F-4D97-AF65-F5344CB8AC3E}">
+        <p14:creationId xmlns:p14="http://schemas.microsoft.com/office/powerpoint/2010/main" val="1073575463"/>
+      </p:ext>
+    </p:extLst>
+  </p:cSld>
+  <p:clrMapOvr>
+    <a:masterClrMapping/>
+  </p:clrMapOvr>
+</p:notes>
+</file>
+
+<file path=ppt/notesSlides/notesSlide15.xml><?xml version="1.0" encoding="utf-8"?>
+<p:notes xmlns:a="http://schemas.openxmlformats.org/drawingml/2006/main" xmlns:r="http://schemas.openxmlformats.org/officeDocument/2006/relationships" xmlns:p="http://schemas.openxmlformats.org/presentationml/2006/main">
+  <p:cSld>
+    <p:spTree>
+      <p:nvGrpSpPr>
+        <p:cNvPr id="1" name=""/>
+        <p:cNvGrpSpPr/>
+        <p:nvPr/>
+      </p:nvGrpSpPr>
+      <p:grpSpPr>
+        <a:xfrm>
+          <a:off x="0" y="0"/>
+          <a:ext cx="0" cy="0"/>
+          <a:chOff x="0" y="0"/>
+          <a:chExt cx="0" cy="0"/>
+        </a:xfrm>
+      </p:grpSpPr>
+      <p:sp>
+        <p:nvSpPr>
+          <p:cNvPr id="2" name="Slide Image Placeholder 1"/>
+          <p:cNvSpPr>
+            <a:spLocks noGrp="1" noRot="1" noChangeAspect="1"/>
+          </p:cNvSpPr>
+          <p:nvPr>
+            <p:ph type="sldImg"/>
+          </p:nvPr>
+        </p:nvSpPr>
+        <p:spPr>
+          <a:xfrm>
+            <a:off x="1143000" y="685800"/>
+            <a:ext cx="4572000" cy="3429000"/>
+          </a:xfrm>
+        </p:spPr>
+      </p:sp>
+      <p:sp>
+        <p:nvSpPr>
+          <p:cNvPr id="3" name="Notes Placeholder 2"/>
+          <p:cNvSpPr>
+            <a:spLocks noGrp="1"/>
+          </p:cNvSpPr>
+          <p:nvPr>
+            <p:ph type="body" idx="1"/>
+          </p:nvPr>
+        </p:nvSpPr>
+        <p:spPr/>
+        <p:txBody>
+          <a:bodyPr/>
+          <a:lstStyle/>
+          <a:p>
             <a:r>
               <a:rPr lang="en-US" dirty="0" smtClean="0"/>
               <a:t>A* and W* need fixing</a:t>
@@ -883,7 +1062,7 @@
 </p:notes>
 </file>
 
-<file path=ppt/notesSlides/notesSlide14.xml><?xml version="1.0" encoding="utf-8"?>
+<file path=ppt/notesSlides/notesSlide16.xml><?xml version="1.0" encoding="utf-8"?>
 <p:notes xmlns:a="http://schemas.openxmlformats.org/drawingml/2006/main" xmlns:r="http://schemas.openxmlformats.org/officeDocument/2006/relationships" xmlns:p="http://schemas.openxmlformats.org/presentationml/2006/main" showMasterSp="0" showMasterPhAnim="0">
   <p:cSld>
     <p:spTree>
@@ -1018,7 +1197,7 @@
 </p:notes>
 </file>
 
-<file path=ppt/notesSlides/notesSlide15.xml><?xml version="1.0" encoding="utf-8"?>
+<file path=ppt/notesSlides/notesSlide17.xml><?xml version="1.0" encoding="utf-8"?>
 <p:notes xmlns:a="http://schemas.openxmlformats.org/drawingml/2006/main" xmlns:r="http://schemas.openxmlformats.org/officeDocument/2006/relationships" xmlns:p="http://schemas.openxmlformats.org/presentationml/2006/main" showMasterSp="0" showMasterPhAnim="0">
   <p:cSld>
     <p:spTree>
@@ -1137,7 +1316,7 @@
 </p:notes>
 </file>
 
-<file path=ppt/notesSlides/notesSlide16.xml><?xml version="1.0" encoding="utf-8"?>
+<file path=ppt/notesSlides/notesSlide18.xml><?xml version="1.0" encoding="utf-8"?>
 <p:notes xmlns:a="http://schemas.openxmlformats.org/drawingml/2006/main" xmlns:r="http://schemas.openxmlformats.org/officeDocument/2006/relationships" xmlns:p="http://schemas.openxmlformats.org/presentationml/2006/main" showMasterSp="0" showMasterPhAnim="0">
   <p:cSld>
     <p:spTree>
@@ -1232,7 +1411,7 @@
 </p:notes>
 </file>
 
-<file path=ppt/notesSlides/notesSlide17.xml><?xml version="1.0" encoding="utf-8"?>
+<file path=ppt/notesSlides/notesSlide19.xml><?xml version="1.0" encoding="utf-8"?>
 <p:notes xmlns:a="http://schemas.openxmlformats.org/drawingml/2006/main" xmlns:r="http://schemas.openxmlformats.org/officeDocument/2006/relationships" xmlns:p="http://schemas.openxmlformats.org/presentationml/2006/main" showMasterSp="0" showMasterPhAnim="0">
   <p:cSld>
     <p:spTree>
@@ -4668,7 +4847,7 @@
         </p:nvSpPr>
         <p:spPr>
           <a:xfrm>
-            <a:off x="685800" y="2130425"/>
+            <a:off x="685800" y="1622425"/>
             <a:ext cx="8025072" cy="1470025"/>
           </a:xfrm>
           <a:prstGeom prst="rect">
@@ -4698,10 +4877,10 @@
               <a:rPr lang="en-US" dirty="0" smtClean="0"/>
             </a:br>
             <a:r>
-              <a:rPr lang="en-US" sz="2800" i="1" dirty="0" smtClean="0"/>
+              <a:rPr lang="en-US" sz="2800" dirty="0" smtClean="0"/>
               <a:t>The Role of Modeling and Simulation</a:t>
             </a:r>
-            <a:endParaRPr lang="en" sz="2800" i="1" dirty="0"/>
+            <a:endParaRPr lang="en" sz="2800" dirty="0"/>
           </a:p>
         </p:txBody>
       </p:sp>
@@ -4716,6 +4895,10 @@
           </p:nvPr>
         </p:nvSpPr>
         <p:spPr>
+          <a:xfrm>
+            <a:off x="1465179" y="3204411"/>
+            <a:ext cx="6400800" cy="1752600"/>
+          </a:xfrm>
           <a:prstGeom prst="rect">
             <a:avLst/>
           </a:prstGeom>
@@ -4799,6 +4982,134 @@
             <a:r>
               <a:rPr lang="en" dirty="0"/>
               <a:t>://radical.rutgers.edu</a:t>
+            </a:r>
+          </a:p>
+        </p:txBody>
+      </p:sp>
+      <p:sp>
+        <p:nvSpPr>
+          <p:cNvPr id="2" name="Rectangle 1"/>
+          <p:cNvSpPr/>
+          <p:nvPr/>
+        </p:nvSpPr>
+        <p:spPr>
+          <a:xfrm>
+            <a:off x="1331495" y="5157537"/>
+            <a:ext cx="6956926" cy="830997"/>
+          </a:xfrm>
+          <a:prstGeom prst="rect">
+            <a:avLst/>
+          </a:prstGeom>
+        </p:spPr>
+        <p:txBody>
+          <a:bodyPr wrap="square">
+            <a:spAutoFit/>
+          </a:bodyPr>
+          <a:lstStyle/>
+          <a:p>
+            <a:r>
+              <a:rPr lang="en-US" sz="1600" b="1" dirty="0">
+                <a:solidFill>
+                  <a:srgbClr val="800000"/>
+                </a:solidFill>
+              </a:rPr>
+              <a:t>This talk is primarily the effort of  </a:t>
+            </a:r>
+            <a:r>
+              <a:rPr lang="en-US" sz="1600" b="1" dirty="0" smtClean="0">
+                <a:solidFill>
+                  <a:srgbClr val="800000"/>
+                </a:solidFill>
+              </a:rPr>
+              <a:t>the RADICAL group, </a:t>
+            </a:r>
+            <a:r>
+              <a:rPr lang="en-US" sz="1600" b="1" dirty="0">
+                <a:solidFill>
+                  <a:srgbClr val="800000"/>
+                </a:solidFill>
+              </a:rPr>
+              <a:t>but different parts of this work have benefitted from collaborations with </a:t>
+            </a:r>
+            <a:r>
+              <a:rPr lang="en-US" sz="1600" b="1" dirty="0" smtClean="0">
+                <a:solidFill>
+                  <a:srgbClr val="800000"/>
+                </a:solidFill>
+              </a:rPr>
+              <a:t>the AIMES Project (Katz, </a:t>
+            </a:r>
+            <a:r>
+              <a:rPr lang="en-US" sz="1600" b="1" dirty="0" err="1" smtClean="0">
+                <a:solidFill>
+                  <a:srgbClr val="800000"/>
+                </a:solidFill>
+              </a:rPr>
+              <a:t>Weissman</a:t>
+            </a:r>
+            <a:r>
+              <a:rPr lang="en-US" sz="1600" b="1" dirty="0" smtClean="0">
+                <a:solidFill>
+                  <a:srgbClr val="800000"/>
+                </a:solidFill>
+              </a:rPr>
+              <a:t>) </a:t>
+            </a:r>
+            <a:r>
+              <a:rPr lang="en-US" sz="1600" b="1" dirty="0">
+                <a:solidFill>
+                  <a:srgbClr val="800000"/>
+                </a:solidFill>
+              </a:rPr>
+              <a:t>and </a:t>
+            </a:r>
+            <a:r>
+              <a:rPr lang="en-US" sz="1600" b="1" dirty="0" smtClean="0">
+                <a:solidFill>
+                  <a:srgbClr val="800000"/>
+                </a:solidFill>
+              </a:rPr>
+              <a:t>LMU-Munich </a:t>
+            </a:r>
+            <a:r>
+              <a:rPr lang="en-US" sz="1600" b="1" dirty="0">
+                <a:solidFill>
+                  <a:srgbClr val="800000"/>
+                </a:solidFill>
+              </a:rPr>
+              <a:t>(</a:t>
+            </a:r>
+            <a:r>
+              <a:rPr lang="en-US" sz="1600" b="1" dirty="0" err="1">
+                <a:solidFill>
+                  <a:srgbClr val="800000"/>
+                </a:solidFill>
+              </a:rPr>
+              <a:t>Straube</a:t>
+            </a:r>
+            <a:r>
+              <a:rPr lang="en-US" sz="1600" b="1" dirty="0">
+                <a:solidFill>
+                  <a:srgbClr val="800000"/>
+                </a:solidFill>
+              </a:rPr>
+              <a:t>, </a:t>
+            </a:r>
+            <a:r>
+              <a:rPr lang="en-US" sz="1600" b="1" dirty="0" err="1">
+                <a:solidFill>
+                  <a:srgbClr val="800000"/>
+                </a:solidFill>
+              </a:rPr>
+              <a:t>Kranzmuller</a:t>
+            </a:r>
+            <a:r>
+              <a:rPr lang="en-US" sz="1600" b="1" dirty="0">
+                <a:solidFill>
+                  <a:srgbClr val="800000"/>
+                </a:solidFill>
+              </a:rPr>
+              <a:t>)</a:t>
             </a:r>
           </a:p>
         </p:txBody>
@@ -5856,7 +6167,11 @@
           <a:p>
             <a:r>
               <a:rPr lang="en-US" dirty="0" smtClean="0"/>
-              <a:t>A*/W* [Andre]</a:t>
+              <a:t>A*/</a:t>
+            </a:r>
+            <a:r>
+              <a:rPr lang="en-US" dirty="0" smtClean="0"/>
+              <a:t>W*</a:t>
             </a:r>
             <a:endParaRPr lang="en-US" dirty="0"/>
           </a:p>
@@ -5879,7 +6194,157 @@
           <a:p>
             <a:r>
               <a:rPr lang="en-US" dirty="0"/>
-              <a:t>Andre: is this really a model of your emulator?</a:t>
+              <a:t>A* models the structure of some distributed application </a:t>
+            </a:r>
+            <a:r>
+              <a:rPr lang="en-US" dirty="0" smtClean="0"/>
+              <a:t>classes</a:t>
+            </a:r>
+          </a:p>
+          <a:p>
+            <a:pPr lvl="1"/>
+            <a:r>
+              <a:rPr lang="en-US" dirty="0" smtClean="0"/>
+              <a:t>Accompanying </a:t>
+            </a:r>
+            <a:r>
+              <a:rPr lang="en-US" dirty="0"/>
+              <a:t>communication and coordination properties</a:t>
+            </a:r>
+          </a:p>
+          <a:p>
+            <a:pPr lvl="1"/>
+            <a:r>
+              <a:rPr lang="en-US" dirty="0" smtClean="0"/>
+              <a:t>Decomposition </a:t>
+            </a:r>
+            <a:r>
+              <a:rPr lang="en-US" dirty="0"/>
+              <a:t>of application's problem and data space </a:t>
+            </a:r>
+            <a:endParaRPr lang="en-US" dirty="0" smtClean="0"/>
+          </a:p>
+          <a:p>
+            <a:pPr lvl="1"/>
+            <a:r>
+              <a:rPr lang="en-US" dirty="0" smtClean="0"/>
+              <a:t>Implications </a:t>
+            </a:r>
+            <a:r>
+              <a:rPr lang="en-US" dirty="0"/>
+              <a:t>for application components and their distribution </a:t>
+            </a:r>
+            <a:endParaRPr lang="en-US" dirty="0" smtClean="0"/>
+          </a:p>
+          <a:p>
+            <a:r>
+              <a:rPr lang="en-US" dirty="0" smtClean="0"/>
+              <a:t>Supports the derivation </a:t>
+            </a:r>
+            <a:r>
+              <a:rPr lang="en-US" dirty="0"/>
+              <a:t>of a workload </a:t>
+            </a:r>
+            <a:r>
+              <a:rPr lang="en-US" dirty="0" smtClean="0"/>
+              <a:t>representation</a:t>
+            </a:r>
+          </a:p>
+          <a:p>
+            <a:r>
+              <a:rPr lang="en-US" dirty="0" smtClean="0"/>
+              <a:t>W* analytical </a:t>
+            </a:r>
+            <a:r>
+              <a:rPr lang="en-US" dirty="0"/>
+              <a:t>model of application </a:t>
+            </a:r>
+            <a:r>
+              <a:rPr lang="en-US" dirty="0" smtClean="0"/>
+              <a:t>workload</a:t>
+            </a:r>
+          </a:p>
+          <a:p>
+            <a:pPr lvl="1"/>
+            <a:r>
+              <a:rPr lang="en-US" dirty="0" smtClean="0"/>
+              <a:t>Constituents </a:t>
+            </a:r>
+            <a:r>
+              <a:rPr lang="en-US" dirty="0"/>
+              <a:t>are small units of workload </a:t>
+            </a:r>
+            <a:r>
+              <a:rPr lang="en-US" dirty="0" smtClean="0"/>
+              <a:t>which can have causal and temporal relationships </a:t>
+            </a:r>
+            <a:r>
+              <a:rPr lang="en-US" dirty="0"/>
+              <a:t>(Concurrent, Sequential, Starts-After, ...</a:t>
+            </a:r>
+            <a:r>
+              <a:rPr lang="en-US" dirty="0" smtClean="0"/>
+              <a:t>)</a:t>
+            </a:r>
+          </a:p>
+          <a:p>
+            <a:pPr lvl="1"/>
+            <a:r>
+              <a:rPr lang="en-US" dirty="0" smtClean="0"/>
+              <a:t>Constituents can be transformed directly either as system workload</a:t>
+            </a:r>
+          </a:p>
+          <a:p>
+            <a:r>
+              <a:rPr lang="en-US" dirty="0" smtClean="0"/>
+              <a:t>Workloads </a:t>
+            </a:r>
+            <a:r>
+              <a:rPr lang="en-US" dirty="0"/>
+              <a:t>are considered </a:t>
+            </a:r>
+            <a:r>
+              <a:rPr lang="en-US" dirty="0" smtClean="0"/>
+              <a:t>static; no </a:t>
+            </a:r>
+            <a:r>
+              <a:rPr lang="en-US" dirty="0"/>
+              <a:t>changes based on (non-predictable) application </a:t>
+            </a:r>
+            <a:endParaRPr lang="en-US" dirty="0" smtClean="0"/>
+          </a:p>
+          <a:p>
+            <a:pPr lvl="1"/>
+            <a:r>
+              <a:rPr lang="en-US" dirty="0" smtClean="0"/>
+              <a:t>representations </a:t>
+            </a:r>
+            <a:r>
+              <a:rPr lang="en-US" dirty="0"/>
+              <a:t>of W* will be used for simulations (WL description) and experiments (WL implementation) </a:t>
+            </a:r>
+            <a:endParaRPr lang="en-US" dirty="0" smtClean="0"/>
+          </a:p>
+          <a:p>
+            <a:r>
+              <a:rPr lang="en-US" dirty="0"/>
+              <a:t>Dynamic applications result in </a:t>
+            </a:r>
+            <a:r>
+              <a:rPr lang="en-US" dirty="0" smtClean="0"/>
+              <a:t>workloads </a:t>
+            </a:r>
+            <a:r>
+              <a:rPr lang="en-US" dirty="0"/>
+              <a:t>with </a:t>
+            </a:r>
+            <a:r>
+              <a:rPr lang="en-US" dirty="0" smtClean="0"/>
+              <a:t>a range </a:t>
+            </a:r>
+            <a:r>
+              <a:rPr lang="en-US" dirty="0"/>
+              <a:t>of properties </a:t>
             </a:r>
           </a:p>
           <a:p>
@@ -6542,7 +7007,7 @@
 </file>
 
 <file path=ppt/slides/slide17.xml><?xml version="1.0" encoding="utf-8"?>
-<p:sld xmlns:a="http://schemas.openxmlformats.org/drawingml/2006/main" xmlns:r="http://schemas.openxmlformats.org/officeDocument/2006/relationships" xmlns:p="http://schemas.openxmlformats.org/presentationml/2006/main">
+<p:sld xmlns:a="http://schemas.openxmlformats.org/drawingml/2006/main" xmlns:r="http://schemas.openxmlformats.org/officeDocument/2006/relationships" xmlns:p="http://schemas.openxmlformats.org/presentationml/2006/main" show="0">
   <p:cSld>
     <p:spTree>
       <p:nvGrpSpPr>
@@ -6616,11 +7081,11 @@
   <p:clrMapOvr>
     <a:masterClrMapping/>
   </p:clrMapOvr>
-  <mc:AlternateContent xmlns:mc="http://schemas.openxmlformats.org/markup-compatibility/2006" xmlns:p14="http://schemas.microsoft.com/office/powerpoint/2010/main">
-    <mc:Choice Requires="p14">
+  <mc:AlternateContent xmlns:mc="http://schemas.openxmlformats.org/markup-compatibility/2006">
+    <mc:Choice xmlns:p14="http://schemas.microsoft.com/office/powerpoint/2010/main" Requires="p14">
       <p:transition spd="slow" p14:dur="2000"/>
     </mc:Choice>
-    <mc:Fallback xmlns="">
+    <mc:Fallback>
       <p:transition xmlns:p14="http://schemas.microsoft.com/office/powerpoint/2010/main" spd="slow"/>
     </mc:Fallback>
   </mc:AlternateContent>
@@ -6739,522 +7204,47 @@
           <a:p>
             <a:r>
               <a:rPr lang="en-US" dirty="0" smtClean="0"/>
-              <a:t>This will be eliminated..</a:t>
+              <a:t>*.* : Putting it together</a:t>
             </a:r>
             <a:endParaRPr lang="en-US" dirty="0"/>
           </a:p>
         </p:txBody>
       </p:sp>
-      <p:sp>
-        <p:nvSpPr>
-          <p:cNvPr id="3" name="Shape 72"/>
-          <p:cNvSpPr txBox="1">
-            <a:spLocks/>
-          </p:cNvSpPr>
-          <p:nvPr/>
-        </p:nvSpPr>
-        <p:spPr bwMode="auto">
-          <a:xfrm>
-            <a:off x="282231" y="786259"/>
-            <a:ext cx="8596312" cy="5281613"/>
-          </a:xfrm>
-          <a:prstGeom prst="rect">
-            <a:avLst/>
-          </a:prstGeom>
-          <a:noFill/>
-          <a:ln>
-            <a:noFill/>
-          </a:ln>
-          <a:extLst>
-            <a:ext uri="{909E8E84-426E-40dd-AFC4-6F175D3DCCD1}">
-              <a14:hiddenFill xmlns:a14="http://schemas.microsoft.com/office/drawing/2010/main">
-                <a:solidFill>
-                  <a:srgbClr val="FFFFFF"/>
-                </a:solidFill>
-              </a14:hiddenFill>
-            </a:ext>
-            <a:ext uri="{91240B29-F687-4f45-9708-019B960494DF}">
-              <a14:hiddenLine xmlns:a14="http://schemas.microsoft.com/office/drawing/2010/main" w="9525">
-                <a:solidFill>
-                  <a:srgbClr val="000000"/>
-                </a:solidFill>
-                <a:miter lim="800000"/>
-                <a:headEnd/>
-                <a:tailEnd/>
-              </a14:hiddenLine>
-            </a:ext>
-            <a:ext uri="{FAA26D3D-D897-4be2-8F04-BA451C77F1D7}">
-              <ma14:placeholderFlag xmlns:ma14="http://schemas.microsoft.com/office/mac/drawingml/2011/main" val="1"/>
-            </a:ext>
-          </a:extLst>
-        </p:spPr>
-        <p:txBody>
-          <a:bodyPr vert="horz" wrap="square" lIns="91425" tIns="91425" rIns="91425" bIns="91425" numCol="1" anchor="t" anchorCtr="0" compatLnSpc="1">
-            <a:prstTxWarp prst="textNoShape">
-              <a:avLst/>
-            </a:prstTxWarp>
-            <a:noAutofit/>
-          </a:bodyPr>
-          <a:lstStyle>
-            <a:lvl1pPr marL="227013" indent="-227013" algn="l" rtl="0" eaLnBrk="0" fontAlgn="base" hangingPunct="0">
-              <a:spcBef>
-                <a:spcPts val="1200"/>
-              </a:spcBef>
-              <a:spcAft>
-                <a:spcPct val="0"/>
-              </a:spcAft>
-              <a:buClr>
-                <a:schemeClr val="tx1">
-                  <a:lumMod val="95000"/>
-                  <a:lumOff val="5000"/>
-                </a:schemeClr>
-              </a:buClr>
-              <a:buChar char="•"/>
-              <a:tabLst/>
-              <a:defRPr sz="2000">
-                <a:solidFill>
-                  <a:schemeClr val="tx1">
-                    <a:lumMod val="95000"/>
-                    <a:lumOff val="5000"/>
-                  </a:schemeClr>
-                </a:solidFill>
-                <a:latin typeface="+mn-lt"/>
-                <a:ea typeface="ＭＳ Ｐゴシック" charset="-128"/>
-                <a:cs typeface="ＭＳ Ｐゴシック" charset="-128"/>
-              </a:defRPr>
-            </a:lvl1pPr>
-            <a:lvl2pPr marL="682625" indent="-225425" algn="l" rtl="0" eaLnBrk="0" fontAlgn="base" hangingPunct="0">
-              <a:spcBef>
-                <a:spcPct val="20000"/>
-              </a:spcBef>
-              <a:spcAft>
-                <a:spcPct val="0"/>
-              </a:spcAft>
-              <a:buClr>
-                <a:schemeClr val="tx1">
-                  <a:lumMod val="95000"/>
-                  <a:lumOff val="5000"/>
-                </a:schemeClr>
-              </a:buClr>
-              <a:buChar char="–"/>
-              <a:defRPr sz="1800">
-                <a:solidFill>
-                  <a:srgbClr val="5F5F5F"/>
-                </a:solidFill>
-                <a:latin typeface="+mn-lt"/>
-                <a:ea typeface="ＭＳ Ｐゴシック" charset="-128"/>
-              </a:defRPr>
-            </a:lvl2pPr>
-            <a:lvl3pPr marL="1090613" indent="-176213" algn="l" rtl="0" eaLnBrk="0" fontAlgn="base" hangingPunct="0">
-              <a:spcBef>
-                <a:spcPct val="20000"/>
-              </a:spcBef>
-              <a:spcAft>
-                <a:spcPct val="0"/>
-              </a:spcAft>
-              <a:buClr>
-                <a:schemeClr val="tx1">
-                  <a:lumMod val="95000"/>
-                  <a:lumOff val="5000"/>
-                </a:schemeClr>
-              </a:buClr>
-              <a:buChar char="•"/>
-              <a:defRPr sz="1800">
-                <a:solidFill>
-                  <a:srgbClr val="5F5F5F"/>
-                </a:solidFill>
-                <a:latin typeface="+mn-lt"/>
-                <a:ea typeface="ＭＳ Ｐゴシック" charset="-128"/>
-              </a:defRPr>
-            </a:lvl3pPr>
-            <a:lvl4pPr marL="1600200" indent="-228600" algn="l" rtl="0" eaLnBrk="0" fontAlgn="base" hangingPunct="0">
-              <a:spcBef>
-                <a:spcPct val="20000"/>
-              </a:spcBef>
-              <a:spcAft>
-                <a:spcPct val="0"/>
-              </a:spcAft>
-              <a:buClr>
-                <a:schemeClr val="tx1">
-                  <a:lumMod val="95000"/>
-                  <a:lumOff val="5000"/>
-                </a:schemeClr>
-              </a:buClr>
-              <a:buChar char="–"/>
-              <a:defRPr sz="1800">
-                <a:solidFill>
-                  <a:srgbClr val="5F5F5F"/>
-                </a:solidFill>
-                <a:latin typeface="+mn-lt"/>
-                <a:ea typeface="ＭＳ Ｐゴシック" charset="-128"/>
-              </a:defRPr>
-            </a:lvl4pPr>
-            <a:lvl5pPr marL="2000250" indent="-171450" algn="l" rtl="0" eaLnBrk="0" fontAlgn="base" hangingPunct="0">
-              <a:spcBef>
-                <a:spcPct val="20000"/>
-              </a:spcBef>
-              <a:spcAft>
-                <a:spcPct val="0"/>
-              </a:spcAft>
-              <a:buClr>
-                <a:schemeClr val="tx1">
-                  <a:lumMod val="95000"/>
-                  <a:lumOff val="5000"/>
-                </a:schemeClr>
-              </a:buClr>
-              <a:buChar char="»"/>
-              <a:defRPr sz="1800">
-                <a:solidFill>
-                  <a:srgbClr val="5F5F5F"/>
-                </a:solidFill>
-                <a:latin typeface="+mn-lt"/>
-                <a:ea typeface="ＭＳ Ｐゴシック" charset="-128"/>
-              </a:defRPr>
-            </a:lvl5pPr>
-            <a:lvl6pPr marL="2514600" indent="-228600" algn="l" rtl="0" fontAlgn="base">
-              <a:spcBef>
-                <a:spcPct val="20000"/>
-              </a:spcBef>
-              <a:spcAft>
-                <a:spcPct val="0"/>
-              </a:spcAft>
-              <a:buChar char="»"/>
-              <a:defRPr sz="1400">
-                <a:solidFill>
-                  <a:srgbClr val="5F5F5F"/>
-                </a:solidFill>
-                <a:latin typeface="+mn-lt"/>
-                <a:ea typeface="ＭＳ Ｐゴシック" charset="-128"/>
-              </a:defRPr>
-            </a:lvl6pPr>
-            <a:lvl7pPr marL="2971800" indent="-228600" algn="l" rtl="0" fontAlgn="base">
-              <a:spcBef>
-                <a:spcPct val="20000"/>
-              </a:spcBef>
-              <a:spcAft>
-                <a:spcPct val="0"/>
-              </a:spcAft>
-              <a:buChar char="»"/>
-              <a:defRPr sz="1400">
-                <a:solidFill>
-                  <a:srgbClr val="5F5F5F"/>
-                </a:solidFill>
-                <a:latin typeface="+mn-lt"/>
-                <a:ea typeface="ＭＳ Ｐゴシック" charset="-128"/>
-              </a:defRPr>
-            </a:lvl7pPr>
-            <a:lvl8pPr marL="3429000" indent="-228600" algn="l" rtl="0" fontAlgn="base">
-              <a:spcBef>
-                <a:spcPct val="20000"/>
-              </a:spcBef>
-              <a:spcAft>
-                <a:spcPct val="0"/>
-              </a:spcAft>
-              <a:buChar char="»"/>
-              <a:defRPr sz="1400">
-                <a:solidFill>
-                  <a:srgbClr val="5F5F5F"/>
-                </a:solidFill>
-                <a:latin typeface="+mn-lt"/>
-                <a:ea typeface="ＭＳ Ｐゴシック" charset="-128"/>
-              </a:defRPr>
-            </a:lvl8pPr>
-            <a:lvl9pPr marL="3886200" indent="-228600" algn="l" rtl="0" fontAlgn="base">
-              <a:spcBef>
-                <a:spcPct val="20000"/>
-              </a:spcBef>
-              <a:spcAft>
-                <a:spcPct val="0"/>
-              </a:spcAft>
-              <a:buChar char="»"/>
-              <a:defRPr sz="1400">
-                <a:solidFill>
-                  <a:srgbClr val="5F5F5F"/>
-                </a:solidFill>
-                <a:latin typeface="+mn-lt"/>
-                <a:ea typeface="ＭＳ Ｐゴシック" charset="-128"/>
-              </a:defRPr>
-            </a:lvl9pPr>
-          </a:lstStyle>
-          <a:p>
-            <a:pPr marL="344488" indent="-342900">
-              <a:buClr>
-                <a:srgbClr val="000000"/>
-              </a:buClr>
-              <a:buSzPct val="100000"/>
-            </a:pPr>
-            <a:r>
-              <a:rPr lang="en-US" dirty="0" smtClean="0">
-                <a:solidFill>
-                  <a:schemeClr val="tx1">
-                    <a:lumMod val="65000"/>
-                    <a:lumOff val="35000"/>
-                  </a:schemeClr>
-                </a:solidFill>
-              </a:rPr>
-              <a:t>Understanding the Different Models:</a:t>
-            </a:r>
-            <a:endParaRPr lang="en-US" dirty="0">
-              <a:solidFill>
-                <a:schemeClr val="tx1">
-                  <a:lumMod val="65000"/>
-                  <a:lumOff val="35000"/>
-                </a:schemeClr>
-              </a:solidFill>
-            </a:endParaRPr>
-          </a:p>
-          <a:p>
-            <a:pPr marL="800100" lvl="1" indent="-342900">
-              <a:buClr>
-                <a:srgbClr val="000000"/>
-              </a:buClr>
-              <a:buSzPct val="100000"/>
-            </a:pPr>
-            <a:r>
-              <a:rPr lang="en-US" dirty="0">
-                <a:solidFill>
-                  <a:srgbClr val="800000"/>
-                </a:solidFill>
-              </a:rPr>
-              <a:t>A* : Conceptual Model for Distributed Application</a:t>
-            </a:r>
-          </a:p>
-          <a:p>
-            <a:pPr marL="1208088" lvl="2" indent="-342900">
-              <a:buClr>
-                <a:srgbClr val="000000"/>
-              </a:buClr>
-              <a:buSzPct val="100000"/>
-            </a:pPr>
-            <a:r>
-              <a:rPr lang="en-US" dirty="0">
-                <a:solidFill>
-                  <a:srgbClr val="800000"/>
-                </a:solidFill>
-              </a:rPr>
-              <a:t>One of many different analytical models of an application</a:t>
-            </a:r>
-          </a:p>
-          <a:p>
-            <a:pPr marL="800100" lvl="1" indent="-342900">
-              <a:buClr>
-                <a:srgbClr val="000000"/>
-              </a:buClr>
-              <a:buSzPct val="100000"/>
-            </a:pPr>
-            <a:r>
-              <a:rPr lang="en-US" dirty="0">
-                <a:solidFill>
-                  <a:srgbClr val="800000"/>
-                </a:solidFill>
-              </a:rPr>
-              <a:t>W*: Analytical model of workload </a:t>
-            </a:r>
-          </a:p>
-          <a:p>
-            <a:pPr marL="1208088" lvl="2" indent="-342900">
-              <a:buClr>
-                <a:srgbClr val="000000"/>
-              </a:buClr>
-              <a:buSzPct val="100000"/>
-            </a:pPr>
-            <a:r>
-              <a:rPr lang="en-US" dirty="0">
-                <a:solidFill>
-                  <a:srgbClr val="800000"/>
-                </a:solidFill>
-              </a:rPr>
-              <a:t>Outputs concrete executable units, thus provides a measure of performance and prediction but independent of resources</a:t>
-            </a:r>
-          </a:p>
-          <a:p>
-            <a:pPr marL="800100" lvl="1" indent="-342900">
-              <a:buClr>
-                <a:srgbClr val="000000"/>
-              </a:buClr>
-              <a:buSzPct val="100000"/>
-            </a:pPr>
-            <a:r>
-              <a:rPr lang="en-US" dirty="0">
-                <a:solidFill>
-                  <a:schemeClr val="tx1">
-                    <a:lumMod val="65000"/>
-                    <a:lumOff val="35000"/>
-                  </a:schemeClr>
-                </a:solidFill>
-              </a:rPr>
-              <a:t>P*: Conceptual Model for </a:t>
-            </a:r>
-            <a:r>
-              <a:rPr lang="en-US" dirty="0" smtClean="0">
-                <a:solidFill>
-                  <a:schemeClr val="tx1">
-                    <a:lumMod val="65000"/>
-                    <a:lumOff val="35000"/>
-                  </a:schemeClr>
-                </a:solidFill>
-              </a:rPr>
-              <a:t>Dynamic Resources</a:t>
-            </a:r>
-          </a:p>
-          <a:p>
-            <a:pPr marL="800100" lvl="1" indent="-342900">
-              <a:buClr>
-                <a:srgbClr val="000000"/>
-              </a:buClr>
-              <a:buSzPct val="100000"/>
-            </a:pPr>
-            <a:r>
-              <a:rPr lang="en-US" dirty="0" smtClean="0">
-                <a:solidFill>
-                  <a:schemeClr val="tx1">
-                    <a:lumMod val="65000"/>
-                    <a:lumOff val="35000"/>
-                  </a:schemeClr>
-                </a:solidFill>
-              </a:rPr>
-              <a:t>I* : Analytical Model for Infrastructure [Munich]</a:t>
-            </a:r>
-            <a:endParaRPr lang="en-US" dirty="0">
-              <a:solidFill>
-                <a:schemeClr val="tx1">
-                  <a:lumMod val="65000"/>
-                  <a:lumOff val="35000"/>
-                </a:schemeClr>
-              </a:solidFill>
-            </a:endParaRPr>
-          </a:p>
-          <a:p>
-            <a:pPr marL="800100" lvl="1" indent="-342900">
-              <a:buClr>
-                <a:srgbClr val="000000"/>
-              </a:buClr>
-              <a:buSzPct val="100000"/>
-            </a:pPr>
-            <a:r>
-              <a:rPr lang="en-US" dirty="0" smtClean="0">
-                <a:solidFill>
-                  <a:schemeClr val="tx1">
-                    <a:lumMod val="65000"/>
-                    <a:lumOff val="35000"/>
-                  </a:schemeClr>
-                </a:solidFill>
-              </a:rPr>
-              <a:t>F</a:t>
-            </a:r>
-            <a:r>
-              <a:rPr lang="en-US" dirty="0">
-                <a:solidFill>
-                  <a:schemeClr val="tx1">
-                    <a:lumMod val="65000"/>
-                    <a:lumOff val="35000"/>
-                  </a:schemeClr>
-                </a:solidFill>
-              </a:rPr>
-              <a:t>*: Analytical Model of resource federation/overlay</a:t>
-            </a:r>
-          </a:p>
-          <a:p>
-            <a:pPr marL="1208088" lvl="2" indent="-342900">
-              <a:buClr>
-                <a:srgbClr val="000000"/>
-              </a:buClr>
-              <a:buSzPct val="100000"/>
-            </a:pPr>
-            <a:r>
-              <a:rPr lang="en-US" dirty="0">
-                <a:solidFill>
-                  <a:schemeClr val="tx1">
-                    <a:lumMod val="65000"/>
-                    <a:lumOff val="35000"/>
-                  </a:schemeClr>
-                </a:solidFill>
-              </a:rPr>
-              <a:t>Determines how different resources might be </a:t>
-            </a:r>
-            <a:r>
-              <a:rPr lang="en-US" dirty="0" smtClean="0">
-                <a:solidFill>
-                  <a:schemeClr val="tx1">
-                    <a:lumMod val="65000"/>
-                    <a:lumOff val="35000"/>
-                  </a:schemeClr>
-                </a:solidFill>
-              </a:rPr>
-              <a:t>federated</a:t>
-            </a:r>
-          </a:p>
-          <a:p>
-            <a:pPr marL="1208088" lvl="2" indent="-342900">
-              <a:buClr>
-                <a:srgbClr val="000000"/>
-              </a:buClr>
-              <a:buSzPct val="100000"/>
-            </a:pPr>
-            <a:r>
-              <a:rPr lang="en-US" dirty="0" smtClean="0">
-                <a:solidFill>
-                  <a:schemeClr val="tx1">
-                    <a:lumMod val="65000"/>
-                    <a:lumOff val="35000"/>
-                  </a:schemeClr>
-                </a:solidFill>
-              </a:rPr>
-              <a:t>In turn builds upon a model/models of infrastructure (I*)</a:t>
-            </a:r>
-          </a:p>
-          <a:p>
-            <a:pPr marL="344488" indent="-342900">
-              <a:buClr>
-                <a:srgbClr val="000000"/>
-              </a:buClr>
-              <a:buSzPct val="100000"/>
-            </a:pPr>
-            <a:endParaRPr lang="en-US" dirty="0" smtClean="0">
-              <a:solidFill>
-                <a:schemeClr val="tx1">
-                  <a:lumMod val="65000"/>
-                  <a:lumOff val="35000"/>
-                </a:schemeClr>
-              </a:solidFill>
-            </a:endParaRPr>
-          </a:p>
-          <a:p>
-            <a:pPr marL="865188" lvl="2" indent="0">
-              <a:buClr>
-                <a:srgbClr val="000000"/>
-              </a:buClr>
-              <a:buSzPct val="100000"/>
-              <a:buNone/>
-            </a:pPr>
-            <a:endParaRPr lang="en-US" dirty="0">
-              <a:solidFill>
-                <a:schemeClr val="tx1">
-                  <a:lumMod val="65000"/>
-                  <a:lumOff val="35000"/>
-                </a:schemeClr>
-              </a:solidFill>
-            </a:endParaRPr>
-          </a:p>
-        </p:txBody>
-      </p:sp>
+      <p:pic>
+        <p:nvPicPr>
+          <p:cNvPr id="5" name="Content Placeholder 4" descr="logic_components.png"/>
+          <p:cNvPicPr>
+            <a:picLocks noGrp="1" noChangeAspect="1"/>
+          </p:cNvPicPr>
+          <p:nvPr>
+            <p:ph idx="1"/>
+          </p:nvPr>
+        </p:nvPicPr>
+        <p:blipFill>
+          <a:blip r:embed="rId3">
+            <a:extLst>
+              <a:ext uri="{28A0092B-C50C-407E-A947-70E740481C1C}">
+                <a14:useLocalDpi xmlns:a14="http://schemas.microsoft.com/office/drawing/2010/main" val="0"/>
+              </a:ext>
+            </a:extLst>
+          </a:blip>
+          <a:srcRect l="-15141" r="-15141"/>
+          <a:stretch>
+            <a:fillRect/>
+          </a:stretch>
+        </p:blipFill>
+        <p:spPr/>
+      </p:pic>
     </p:spTree>
     <p:extLst>
       <p:ext uri="{BB962C8B-B14F-4D97-AF65-F5344CB8AC3E}">
-        <p14:creationId xmlns:p14="http://schemas.microsoft.com/office/powerpoint/2010/main" val="4188818823"/>
+        <p14:creationId xmlns:p14="http://schemas.microsoft.com/office/powerpoint/2010/main" val="3441613021"/>
       </p:ext>
     </p:extLst>
   </p:cSld>
   <p:clrMapOvr>
     <a:masterClrMapping/>
   </p:clrMapOvr>
-  <p:timing>
-    <p:tnLst>
-      <p:par>
-        <p:cTn xmlns:p14="http://schemas.microsoft.com/office/powerpoint/2010/main" id="1" dur="indefinite" restart="never" nodeType="tmRoot"/>
-      </p:par>
-    </p:tnLst>
-  </p:timing>
 </p:sld>
 </file>
 
@@ -7409,6 +7399,25 @@
               </a:rPr>
               <a:t>The State of Extreme Scale Distributed Computing </a:t>
             </a:r>
+          </a:p>
+          <a:p>
+            <a:pPr>
+              <a:buClr>
+                <a:srgbClr val="000000"/>
+              </a:buClr>
+              <a:buSzPct val="100000"/>
+            </a:pPr>
+            <a:r>
+              <a:rPr lang="en-US" dirty="0" smtClean="0">
+                <a:solidFill>
+                  <a:schemeClr val="tx1">
+                    <a:lumMod val="65000"/>
+                    <a:lumOff val="35000"/>
+                  </a:schemeClr>
+                </a:solidFill>
+              </a:rPr>
+              <a:t>NGMW as a way to address DEC requirements</a:t>
+            </a:r>
             <a:endParaRPr lang="en-US" dirty="0">
               <a:solidFill>
                 <a:schemeClr val="tx1">
@@ -7419,44 +7428,6 @@
             </a:endParaRPr>
           </a:p>
           <a:p>
-            <a:pPr>
-              <a:buClr>
-                <a:srgbClr val="000000"/>
-              </a:buClr>
-              <a:buSzPct val="100000"/>
-            </a:pPr>
-            <a:r>
-              <a:rPr lang="en-US" dirty="0" smtClean="0">
-                <a:solidFill>
-                  <a:schemeClr val="tx1">
-                    <a:lumMod val="65000"/>
-                    <a:lumOff val="35000"/>
-                  </a:schemeClr>
-                </a:solidFill>
-              </a:rPr>
-              <a:t>NGMW </a:t>
-            </a:r>
-            <a:r>
-              <a:rPr lang="en-US" dirty="0" smtClean="0">
-                <a:solidFill>
-                  <a:schemeClr val="tx1">
-                    <a:lumMod val="65000"/>
-                    <a:lumOff val="35000"/>
-                  </a:schemeClr>
-                </a:solidFill>
-              </a:rPr>
-              <a:t>as a way to address DEC requirements</a:t>
-            </a:r>
-            <a:endParaRPr lang="en-US" dirty="0">
-              <a:solidFill>
-                <a:schemeClr val="tx1">
-                  <a:lumMod val="65000"/>
-                  <a:lumOff val="35000"/>
-                </a:schemeClr>
-              </a:solidFill>
-            </a:endParaRPr>
-          </a:p>
-          <a:p>
             <a:pPr lvl="1">
               <a:buClr>
                 <a:srgbClr val="000000"/>
@@ -7472,18 +7443,7 @@
                   </a:schemeClr>
                 </a:solidFill>
               </a:rPr>
-              <a:t>Design considerations for </a:t>
-            </a:r>
-            <a:r>
-              <a:rPr lang="en-US" sz="2000" dirty="0" smtClean="0">
-                <a:solidFill>
-                  <a:schemeClr val="tx1">
-                    <a:lumMod val="65000"/>
-                    <a:lumOff val="35000"/>
-                  </a:schemeClr>
-                </a:solidFill>
-              </a:rPr>
-              <a:t>NGMW</a:t>
+              <a:t>Design considerations for NGMW</a:t>
             </a:r>
             <a:endParaRPr lang="en-US" sz="2000" dirty="0">
               <a:solidFill>
@@ -7567,18 +7527,7 @@
                   </a:schemeClr>
                 </a:solidFill>
               </a:rPr>
-              <a:t>Federation of Infrastructure F</a:t>
-            </a:r>
-            <a:r>
-              <a:rPr lang="en-US" sz="2000" dirty="0" smtClean="0">
-                <a:solidFill>
-                  <a:schemeClr val="tx1">
-                    <a:lumMod val="65000"/>
-                    <a:lumOff val="35000"/>
-                  </a:schemeClr>
-                </a:solidFill>
-              </a:rPr>
-              <a:t>*</a:t>
+              <a:t>Federation of Infrastructure F*</a:t>
             </a:r>
           </a:p>
           <a:p>
@@ -7599,14 +7548,6 @@
               </a:rPr>
               <a:t>Putting it altogether: conceptual and implementation</a:t>
             </a:r>
-            <a:endParaRPr lang="en-US" sz="2000" dirty="0" smtClean="0">
-              <a:solidFill>
-                <a:schemeClr val="tx1">
-                  <a:lumMod val="65000"/>
-                  <a:lumOff val="35000"/>
-                </a:schemeClr>
-              </a:solidFill>
-            </a:endParaRPr>
           </a:p>
           <a:p>
             <a:pPr marL="344488" indent="-342900">
@@ -7686,7 +7627,7 @@
 </file>
 
 <file path=ppt/slides/slide20.xml><?xml version="1.0" encoding="utf-8"?>
-<p:sld xmlns:a="http://schemas.openxmlformats.org/drawingml/2006/main" xmlns:r="http://schemas.openxmlformats.org/officeDocument/2006/relationships" xmlns:p="http://schemas.openxmlformats.org/presentationml/2006/main">
+<p:sld xmlns:a="http://schemas.openxmlformats.org/drawingml/2006/main" xmlns:r="http://schemas.openxmlformats.org/officeDocument/2006/relationships" xmlns:p="http://schemas.openxmlformats.org/presentationml/2006/main" show="0">
   <p:cSld>
     <p:spTree>
       <p:nvGrpSpPr>
@@ -7719,11 +7660,7 @@
           <a:p>
             <a:r>
               <a:rPr lang="en-US" dirty="0" smtClean="0"/>
-              <a:t>NGMW: </a:t>
-            </a:r>
-            <a:r>
-              <a:rPr lang="en-US" dirty="0" smtClean="0"/>
-              <a:t>Interaction of Models and Simulation</a:t>
+              <a:t>This will be eliminated..</a:t>
             </a:r>
             <a:endParaRPr lang="en-US" dirty="0"/>
           </a:p>
@@ -7961,6 +7898,567 @@
             </a:lvl9pPr>
           </a:lstStyle>
           <a:p>
+            <a:pPr marL="344488" indent="-342900">
+              <a:buClr>
+                <a:srgbClr val="000000"/>
+              </a:buClr>
+              <a:buSzPct val="100000"/>
+            </a:pPr>
+            <a:r>
+              <a:rPr lang="en-US" dirty="0" smtClean="0">
+                <a:solidFill>
+                  <a:schemeClr val="tx1">
+                    <a:lumMod val="65000"/>
+                    <a:lumOff val="35000"/>
+                  </a:schemeClr>
+                </a:solidFill>
+              </a:rPr>
+              <a:t>Understanding the Different Models:</a:t>
+            </a:r>
+            <a:endParaRPr lang="en-US" dirty="0">
+              <a:solidFill>
+                <a:schemeClr val="tx1">
+                  <a:lumMod val="65000"/>
+                  <a:lumOff val="35000"/>
+                </a:schemeClr>
+              </a:solidFill>
+            </a:endParaRPr>
+          </a:p>
+          <a:p>
+            <a:pPr marL="800100" lvl="1" indent="-342900">
+              <a:buClr>
+                <a:srgbClr val="000000"/>
+              </a:buClr>
+              <a:buSzPct val="100000"/>
+            </a:pPr>
+            <a:r>
+              <a:rPr lang="en-US" dirty="0">
+                <a:solidFill>
+                  <a:srgbClr val="800000"/>
+                </a:solidFill>
+              </a:rPr>
+              <a:t>A* : Conceptual Model for Distributed Application</a:t>
+            </a:r>
+          </a:p>
+          <a:p>
+            <a:pPr marL="1208088" lvl="2" indent="-342900">
+              <a:buClr>
+                <a:srgbClr val="000000"/>
+              </a:buClr>
+              <a:buSzPct val="100000"/>
+            </a:pPr>
+            <a:r>
+              <a:rPr lang="en-US" dirty="0">
+                <a:solidFill>
+                  <a:srgbClr val="800000"/>
+                </a:solidFill>
+              </a:rPr>
+              <a:t>One of many different analytical models of an application</a:t>
+            </a:r>
+          </a:p>
+          <a:p>
+            <a:pPr marL="800100" lvl="1" indent="-342900">
+              <a:buClr>
+                <a:srgbClr val="000000"/>
+              </a:buClr>
+              <a:buSzPct val="100000"/>
+            </a:pPr>
+            <a:r>
+              <a:rPr lang="en-US" dirty="0">
+                <a:solidFill>
+                  <a:srgbClr val="800000"/>
+                </a:solidFill>
+              </a:rPr>
+              <a:t>W*: Analytical model of workload </a:t>
+            </a:r>
+          </a:p>
+          <a:p>
+            <a:pPr marL="1208088" lvl="2" indent="-342900">
+              <a:buClr>
+                <a:srgbClr val="000000"/>
+              </a:buClr>
+              <a:buSzPct val="100000"/>
+            </a:pPr>
+            <a:r>
+              <a:rPr lang="en-US" dirty="0">
+                <a:solidFill>
+                  <a:srgbClr val="800000"/>
+                </a:solidFill>
+              </a:rPr>
+              <a:t>Outputs concrete executable units, thus provides a measure of performance and prediction but independent of resources</a:t>
+            </a:r>
+          </a:p>
+          <a:p>
+            <a:pPr marL="800100" lvl="1" indent="-342900">
+              <a:buClr>
+                <a:srgbClr val="000000"/>
+              </a:buClr>
+              <a:buSzPct val="100000"/>
+            </a:pPr>
+            <a:r>
+              <a:rPr lang="en-US" dirty="0">
+                <a:solidFill>
+                  <a:schemeClr val="tx1">
+                    <a:lumMod val="65000"/>
+                    <a:lumOff val="35000"/>
+                  </a:schemeClr>
+                </a:solidFill>
+              </a:rPr>
+              <a:t>P*: Conceptual Model for </a:t>
+            </a:r>
+            <a:r>
+              <a:rPr lang="en-US" dirty="0" smtClean="0">
+                <a:solidFill>
+                  <a:schemeClr val="tx1">
+                    <a:lumMod val="65000"/>
+                    <a:lumOff val="35000"/>
+                  </a:schemeClr>
+                </a:solidFill>
+              </a:rPr>
+              <a:t>Dynamic Resources</a:t>
+            </a:r>
+          </a:p>
+          <a:p>
+            <a:pPr marL="800100" lvl="1" indent="-342900">
+              <a:buClr>
+                <a:srgbClr val="000000"/>
+              </a:buClr>
+              <a:buSzPct val="100000"/>
+            </a:pPr>
+            <a:r>
+              <a:rPr lang="en-US" dirty="0" smtClean="0">
+                <a:solidFill>
+                  <a:schemeClr val="tx1">
+                    <a:lumMod val="65000"/>
+                    <a:lumOff val="35000"/>
+                  </a:schemeClr>
+                </a:solidFill>
+              </a:rPr>
+              <a:t>I* : Analytical Model for Infrastructure [Munich]</a:t>
+            </a:r>
+            <a:endParaRPr lang="en-US" dirty="0">
+              <a:solidFill>
+                <a:schemeClr val="tx1">
+                  <a:lumMod val="65000"/>
+                  <a:lumOff val="35000"/>
+                </a:schemeClr>
+              </a:solidFill>
+            </a:endParaRPr>
+          </a:p>
+          <a:p>
+            <a:pPr marL="800100" lvl="1" indent="-342900">
+              <a:buClr>
+                <a:srgbClr val="000000"/>
+              </a:buClr>
+              <a:buSzPct val="100000"/>
+            </a:pPr>
+            <a:r>
+              <a:rPr lang="en-US" dirty="0" smtClean="0">
+                <a:solidFill>
+                  <a:schemeClr val="tx1">
+                    <a:lumMod val="65000"/>
+                    <a:lumOff val="35000"/>
+                  </a:schemeClr>
+                </a:solidFill>
+              </a:rPr>
+              <a:t>F</a:t>
+            </a:r>
+            <a:r>
+              <a:rPr lang="en-US" dirty="0">
+                <a:solidFill>
+                  <a:schemeClr val="tx1">
+                    <a:lumMod val="65000"/>
+                    <a:lumOff val="35000"/>
+                  </a:schemeClr>
+                </a:solidFill>
+              </a:rPr>
+              <a:t>*: Analytical Model of resource federation/overlay</a:t>
+            </a:r>
+          </a:p>
+          <a:p>
+            <a:pPr marL="1208088" lvl="2" indent="-342900">
+              <a:buClr>
+                <a:srgbClr val="000000"/>
+              </a:buClr>
+              <a:buSzPct val="100000"/>
+            </a:pPr>
+            <a:r>
+              <a:rPr lang="en-US" dirty="0">
+                <a:solidFill>
+                  <a:schemeClr val="tx1">
+                    <a:lumMod val="65000"/>
+                    <a:lumOff val="35000"/>
+                  </a:schemeClr>
+                </a:solidFill>
+              </a:rPr>
+              <a:t>Determines how different resources might be </a:t>
+            </a:r>
+            <a:r>
+              <a:rPr lang="en-US" dirty="0" smtClean="0">
+                <a:solidFill>
+                  <a:schemeClr val="tx1">
+                    <a:lumMod val="65000"/>
+                    <a:lumOff val="35000"/>
+                  </a:schemeClr>
+                </a:solidFill>
+              </a:rPr>
+              <a:t>federated</a:t>
+            </a:r>
+          </a:p>
+          <a:p>
+            <a:pPr marL="1208088" lvl="2" indent="-342900">
+              <a:buClr>
+                <a:srgbClr val="000000"/>
+              </a:buClr>
+              <a:buSzPct val="100000"/>
+            </a:pPr>
+            <a:r>
+              <a:rPr lang="en-US" dirty="0" smtClean="0">
+                <a:solidFill>
+                  <a:schemeClr val="tx1">
+                    <a:lumMod val="65000"/>
+                    <a:lumOff val="35000"/>
+                  </a:schemeClr>
+                </a:solidFill>
+              </a:rPr>
+              <a:t>In turn builds upon a model/models of infrastructure (I*)</a:t>
+            </a:r>
+          </a:p>
+          <a:p>
+            <a:pPr marL="344488" indent="-342900">
+              <a:buClr>
+                <a:srgbClr val="000000"/>
+              </a:buClr>
+              <a:buSzPct val="100000"/>
+            </a:pPr>
+            <a:endParaRPr lang="en-US" dirty="0" smtClean="0">
+              <a:solidFill>
+                <a:schemeClr val="tx1">
+                  <a:lumMod val="65000"/>
+                  <a:lumOff val="35000"/>
+                </a:schemeClr>
+              </a:solidFill>
+            </a:endParaRPr>
+          </a:p>
+          <a:p>
+            <a:pPr marL="865188" lvl="2" indent="0">
+              <a:buClr>
+                <a:srgbClr val="000000"/>
+              </a:buClr>
+              <a:buSzPct val="100000"/>
+              <a:buNone/>
+            </a:pPr>
+            <a:endParaRPr lang="en-US" dirty="0">
+              <a:solidFill>
+                <a:schemeClr val="tx1">
+                  <a:lumMod val="65000"/>
+                  <a:lumOff val="35000"/>
+                </a:schemeClr>
+              </a:solidFill>
+            </a:endParaRPr>
+          </a:p>
+        </p:txBody>
+      </p:sp>
+    </p:spTree>
+    <p:extLst>
+      <p:ext uri="{BB962C8B-B14F-4D97-AF65-F5344CB8AC3E}">
+        <p14:creationId xmlns:p14="http://schemas.microsoft.com/office/powerpoint/2010/main" val="4188818823"/>
+      </p:ext>
+    </p:extLst>
+  </p:cSld>
+  <p:clrMapOvr>
+    <a:masterClrMapping/>
+  </p:clrMapOvr>
+  <mc:AlternateContent xmlns:mc="http://schemas.openxmlformats.org/markup-compatibility/2006">
+    <mc:Choice xmlns:p14="http://schemas.microsoft.com/office/powerpoint/2010/main" Requires="p14">
+      <p:transition spd="slow" p14:dur="2000"/>
+    </mc:Choice>
+    <mc:Fallback>
+      <p:transition xmlns:p14="http://schemas.microsoft.com/office/powerpoint/2010/main" spd="slow"/>
+    </mc:Fallback>
+  </mc:AlternateContent>
+  <p:timing>
+    <p:tnLst>
+      <p:par>
+        <p:cTn xmlns:p14="http://schemas.microsoft.com/office/powerpoint/2010/main" id="1" dur="indefinite" restart="never" nodeType="tmRoot"/>
+      </p:par>
+    </p:tnLst>
+  </p:timing>
+</p:sld>
+</file>
+
+<file path=ppt/slides/slide21.xml><?xml version="1.0" encoding="utf-8"?>
+<p:sld xmlns:a="http://schemas.openxmlformats.org/drawingml/2006/main" xmlns:r="http://schemas.openxmlformats.org/officeDocument/2006/relationships" xmlns:p="http://schemas.openxmlformats.org/presentationml/2006/main">
+  <p:cSld>
+    <p:spTree>
+      <p:nvGrpSpPr>
+        <p:cNvPr id="1" name=""/>
+        <p:cNvGrpSpPr/>
+        <p:nvPr/>
+      </p:nvGrpSpPr>
+      <p:grpSpPr>
+        <a:xfrm>
+          <a:off x="0" y="0"/>
+          <a:ext cx="0" cy="0"/>
+          <a:chOff x="0" y="0"/>
+          <a:chExt cx="0" cy="0"/>
+        </a:xfrm>
+      </p:grpSpPr>
+      <p:sp>
+        <p:nvSpPr>
+          <p:cNvPr id="2" name="Title 1"/>
+          <p:cNvSpPr>
+            <a:spLocks noGrp="1"/>
+          </p:cNvSpPr>
+          <p:nvPr>
+            <p:ph type="title"/>
+          </p:nvPr>
+        </p:nvSpPr>
+        <p:spPr/>
+        <p:txBody>
+          <a:bodyPr/>
+          <a:lstStyle/>
+          <a:p>
+            <a:r>
+              <a:rPr lang="en-US" dirty="0" smtClean="0"/>
+              <a:t>NGMW: Interaction of Models and Simulation</a:t>
+            </a:r>
+            <a:endParaRPr lang="en-US" dirty="0"/>
+          </a:p>
+        </p:txBody>
+      </p:sp>
+      <p:sp>
+        <p:nvSpPr>
+          <p:cNvPr id="3" name="Shape 72"/>
+          <p:cNvSpPr txBox="1">
+            <a:spLocks/>
+          </p:cNvSpPr>
+          <p:nvPr/>
+        </p:nvSpPr>
+        <p:spPr bwMode="auto">
+          <a:xfrm>
+            <a:off x="282231" y="786259"/>
+            <a:ext cx="8596312" cy="5281613"/>
+          </a:xfrm>
+          <a:prstGeom prst="rect">
+            <a:avLst/>
+          </a:prstGeom>
+          <a:noFill/>
+          <a:ln>
+            <a:noFill/>
+          </a:ln>
+          <a:extLst>
+            <a:ext uri="{909E8E84-426E-40dd-AFC4-6F175D3DCCD1}">
+              <a14:hiddenFill xmlns:a14="http://schemas.microsoft.com/office/drawing/2010/main">
+                <a:solidFill>
+                  <a:srgbClr val="FFFFFF"/>
+                </a:solidFill>
+              </a14:hiddenFill>
+            </a:ext>
+            <a:ext uri="{91240B29-F687-4f45-9708-019B960494DF}">
+              <a14:hiddenLine xmlns:a14="http://schemas.microsoft.com/office/drawing/2010/main" w="9525">
+                <a:solidFill>
+                  <a:srgbClr val="000000"/>
+                </a:solidFill>
+                <a:miter lim="800000"/>
+                <a:headEnd/>
+                <a:tailEnd/>
+              </a14:hiddenLine>
+            </a:ext>
+            <a:ext uri="{FAA26D3D-D897-4be2-8F04-BA451C77F1D7}">
+              <ma14:placeholderFlag xmlns:ma14="http://schemas.microsoft.com/office/mac/drawingml/2011/main" val="1"/>
+            </a:ext>
+          </a:extLst>
+        </p:spPr>
+        <p:txBody>
+          <a:bodyPr vert="horz" wrap="square" lIns="91425" tIns="91425" rIns="91425" bIns="91425" numCol="1" anchor="t" anchorCtr="0" compatLnSpc="1">
+            <a:prstTxWarp prst="textNoShape">
+              <a:avLst/>
+            </a:prstTxWarp>
+            <a:noAutofit/>
+          </a:bodyPr>
+          <a:lstStyle>
+            <a:lvl1pPr marL="227013" indent="-227013" algn="l" rtl="0" eaLnBrk="0" fontAlgn="base" hangingPunct="0">
+              <a:spcBef>
+                <a:spcPts val="1200"/>
+              </a:spcBef>
+              <a:spcAft>
+                <a:spcPct val="0"/>
+              </a:spcAft>
+              <a:buClr>
+                <a:schemeClr val="tx1">
+                  <a:lumMod val="95000"/>
+                  <a:lumOff val="5000"/>
+                </a:schemeClr>
+              </a:buClr>
+              <a:buChar char="•"/>
+              <a:tabLst/>
+              <a:defRPr sz="2000">
+                <a:solidFill>
+                  <a:schemeClr val="tx1">
+                    <a:lumMod val="95000"/>
+                    <a:lumOff val="5000"/>
+                  </a:schemeClr>
+                </a:solidFill>
+                <a:latin typeface="+mn-lt"/>
+                <a:ea typeface="ＭＳ Ｐゴシック" charset="-128"/>
+                <a:cs typeface="ＭＳ Ｐゴシック" charset="-128"/>
+              </a:defRPr>
+            </a:lvl1pPr>
+            <a:lvl2pPr marL="682625" indent="-225425" algn="l" rtl="0" eaLnBrk="0" fontAlgn="base" hangingPunct="0">
+              <a:spcBef>
+                <a:spcPct val="20000"/>
+              </a:spcBef>
+              <a:spcAft>
+                <a:spcPct val="0"/>
+              </a:spcAft>
+              <a:buClr>
+                <a:schemeClr val="tx1">
+                  <a:lumMod val="95000"/>
+                  <a:lumOff val="5000"/>
+                </a:schemeClr>
+              </a:buClr>
+              <a:buChar char="–"/>
+              <a:defRPr sz="1800">
+                <a:solidFill>
+                  <a:srgbClr val="5F5F5F"/>
+                </a:solidFill>
+                <a:latin typeface="+mn-lt"/>
+                <a:ea typeface="ＭＳ Ｐゴシック" charset="-128"/>
+              </a:defRPr>
+            </a:lvl2pPr>
+            <a:lvl3pPr marL="1090613" indent="-176213" algn="l" rtl="0" eaLnBrk="0" fontAlgn="base" hangingPunct="0">
+              <a:spcBef>
+                <a:spcPct val="20000"/>
+              </a:spcBef>
+              <a:spcAft>
+                <a:spcPct val="0"/>
+              </a:spcAft>
+              <a:buClr>
+                <a:schemeClr val="tx1">
+                  <a:lumMod val="95000"/>
+                  <a:lumOff val="5000"/>
+                </a:schemeClr>
+              </a:buClr>
+              <a:buChar char="•"/>
+              <a:defRPr sz="1800">
+                <a:solidFill>
+                  <a:srgbClr val="5F5F5F"/>
+                </a:solidFill>
+                <a:latin typeface="+mn-lt"/>
+                <a:ea typeface="ＭＳ Ｐゴシック" charset="-128"/>
+              </a:defRPr>
+            </a:lvl3pPr>
+            <a:lvl4pPr marL="1600200" indent="-228600" algn="l" rtl="0" eaLnBrk="0" fontAlgn="base" hangingPunct="0">
+              <a:spcBef>
+                <a:spcPct val="20000"/>
+              </a:spcBef>
+              <a:spcAft>
+                <a:spcPct val="0"/>
+              </a:spcAft>
+              <a:buClr>
+                <a:schemeClr val="tx1">
+                  <a:lumMod val="95000"/>
+                  <a:lumOff val="5000"/>
+                </a:schemeClr>
+              </a:buClr>
+              <a:buChar char="–"/>
+              <a:defRPr sz="1800">
+                <a:solidFill>
+                  <a:srgbClr val="5F5F5F"/>
+                </a:solidFill>
+                <a:latin typeface="+mn-lt"/>
+                <a:ea typeface="ＭＳ Ｐゴシック" charset="-128"/>
+              </a:defRPr>
+            </a:lvl4pPr>
+            <a:lvl5pPr marL="2000250" indent="-171450" algn="l" rtl="0" eaLnBrk="0" fontAlgn="base" hangingPunct="0">
+              <a:spcBef>
+                <a:spcPct val="20000"/>
+              </a:spcBef>
+              <a:spcAft>
+                <a:spcPct val="0"/>
+              </a:spcAft>
+              <a:buClr>
+                <a:schemeClr val="tx1">
+                  <a:lumMod val="95000"/>
+                  <a:lumOff val="5000"/>
+                </a:schemeClr>
+              </a:buClr>
+              <a:buChar char="»"/>
+              <a:defRPr sz="1800">
+                <a:solidFill>
+                  <a:srgbClr val="5F5F5F"/>
+                </a:solidFill>
+                <a:latin typeface="+mn-lt"/>
+                <a:ea typeface="ＭＳ Ｐゴシック" charset="-128"/>
+              </a:defRPr>
+            </a:lvl5pPr>
+            <a:lvl6pPr marL="2514600" indent="-228600" algn="l" rtl="0" fontAlgn="base">
+              <a:spcBef>
+                <a:spcPct val="20000"/>
+              </a:spcBef>
+              <a:spcAft>
+                <a:spcPct val="0"/>
+              </a:spcAft>
+              <a:buChar char="»"/>
+              <a:defRPr sz="1400">
+                <a:solidFill>
+                  <a:srgbClr val="5F5F5F"/>
+                </a:solidFill>
+                <a:latin typeface="+mn-lt"/>
+                <a:ea typeface="ＭＳ Ｐゴシック" charset="-128"/>
+              </a:defRPr>
+            </a:lvl6pPr>
+            <a:lvl7pPr marL="2971800" indent="-228600" algn="l" rtl="0" fontAlgn="base">
+              <a:spcBef>
+                <a:spcPct val="20000"/>
+              </a:spcBef>
+              <a:spcAft>
+                <a:spcPct val="0"/>
+              </a:spcAft>
+              <a:buChar char="»"/>
+              <a:defRPr sz="1400">
+                <a:solidFill>
+                  <a:srgbClr val="5F5F5F"/>
+                </a:solidFill>
+                <a:latin typeface="+mn-lt"/>
+                <a:ea typeface="ＭＳ Ｐゴシック" charset="-128"/>
+              </a:defRPr>
+            </a:lvl7pPr>
+            <a:lvl8pPr marL="3429000" indent="-228600" algn="l" rtl="0" fontAlgn="base">
+              <a:spcBef>
+                <a:spcPct val="20000"/>
+              </a:spcBef>
+              <a:spcAft>
+                <a:spcPct val="0"/>
+              </a:spcAft>
+              <a:buChar char="»"/>
+              <a:defRPr sz="1400">
+                <a:solidFill>
+                  <a:srgbClr val="5F5F5F"/>
+                </a:solidFill>
+                <a:latin typeface="+mn-lt"/>
+                <a:ea typeface="ＭＳ Ｐゴシック" charset="-128"/>
+              </a:defRPr>
+            </a:lvl8pPr>
+            <a:lvl9pPr marL="3886200" indent="-228600" algn="l" rtl="0" fontAlgn="base">
+              <a:spcBef>
+                <a:spcPct val="20000"/>
+              </a:spcBef>
+              <a:spcAft>
+                <a:spcPct val="0"/>
+              </a:spcAft>
+              <a:buChar char="»"/>
+              <a:defRPr sz="1400">
+                <a:solidFill>
+                  <a:srgbClr val="5F5F5F"/>
+                </a:solidFill>
+                <a:latin typeface="+mn-lt"/>
+                <a:ea typeface="ＭＳ Ｐゴシック" charset="-128"/>
+              </a:defRPr>
+            </a:lvl9pPr>
+          </a:lstStyle>
+          <a:p>
             <a:pPr marL="344488" indent="-342900"/>
             <a:r>
               <a:rPr lang="en-US" dirty="0" smtClean="0"/>
@@ -8149,7 +8647,7 @@
 </p:sld>
 </file>
 
-<file path=ppt/slides/slide21.xml><?xml version="1.0" encoding="utf-8"?>
+<file path=ppt/slides/slide22.xml><?xml version="1.0" encoding="utf-8"?>
 <p:sld xmlns:a="http://schemas.openxmlformats.org/drawingml/2006/main" xmlns:r="http://schemas.openxmlformats.org/officeDocument/2006/relationships" xmlns:p="http://schemas.openxmlformats.org/presentationml/2006/main">
   <p:cSld>
     <p:spTree>
@@ -8340,7 +8838,7 @@
 </p:sld>
 </file>
 
-<file path=ppt/slides/slide22.xml><?xml version="1.0" encoding="utf-8"?>
+<file path=ppt/slides/slide23.xml><?xml version="1.0" encoding="utf-8"?>
 <p:sld xmlns:a="http://schemas.openxmlformats.org/drawingml/2006/main" xmlns:r="http://schemas.openxmlformats.org/officeDocument/2006/relationships" xmlns:p="http://schemas.openxmlformats.org/presentationml/2006/main">
   <p:cSld>
     <p:spTree>
@@ -8537,7 +9035,7 @@
 </p:sld>
 </file>
 
-<file path=ppt/slides/slide23.xml><?xml version="1.0" encoding="utf-8"?>
+<file path=ppt/slides/slide24.xml><?xml version="1.0" encoding="utf-8"?>
 <p:sld xmlns:a="http://schemas.openxmlformats.org/drawingml/2006/main" xmlns:r="http://schemas.openxmlformats.org/officeDocument/2006/relationships" xmlns:p="http://schemas.openxmlformats.org/presentationml/2006/main">
   <p:cSld>
     <p:spTree>
@@ -8797,7 +9295,7 @@
 </p:sld>
 </file>
 
-<file path=ppt/slides/slide24.xml><?xml version="1.0" encoding="utf-8"?>
+<file path=ppt/slides/slide25.xml><?xml version="1.0" encoding="utf-8"?>
 <p:sld xmlns:a="http://schemas.openxmlformats.org/drawingml/2006/main" xmlns:r="http://schemas.openxmlformats.org/officeDocument/2006/relationships" xmlns:p="http://schemas.openxmlformats.org/presentationml/2006/main" show="0">
   <p:cSld>
     <p:spTree>
@@ -9220,7 +9718,7 @@
 </p:sld>
 </file>
 
-<file path=ppt/slides/slide25.xml><?xml version="1.0" encoding="utf-8"?>
+<file path=ppt/slides/slide26.xml><?xml version="1.0" encoding="utf-8"?>
 <p:sld xmlns:a="http://schemas.openxmlformats.org/drawingml/2006/main" xmlns:r="http://schemas.openxmlformats.org/officeDocument/2006/relationships" xmlns:p="http://schemas.openxmlformats.org/presentationml/2006/main" show="0">
   <p:cSld>
     <p:spTree>
@@ -9580,7 +10078,7 @@
 </p:sld>
 </file>
 
-<file path=ppt/slides/slide26.xml><?xml version="1.0" encoding="utf-8"?>
+<file path=ppt/slides/slide27.xml><?xml version="1.0" encoding="utf-8"?>
 <p:sld xmlns:a="http://schemas.openxmlformats.org/drawingml/2006/main" xmlns:r="http://schemas.openxmlformats.org/officeDocument/2006/relationships" xmlns:p="http://schemas.openxmlformats.org/presentationml/2006/main" show="0">
   <p:cSld>
     <p:spTree>
@@ -9974,11 +10472,7 @@
             </a:r>
             <a:r>
               <a:rPr lang="en-US" dirty="0" smtClean="0"/>
-              <a:t> </a:t>
-            </a:r>
-            <a:r>
-              <a:rPr lang="en-US" dirty="0" smtClean="0"/>
-              <a:t>resources</a:t>
+              <a:t> resources</a:t>
             </a:r>
           </a:p>
           <a:p>
@@ -10029,7 +10523,6 @@
               <a:rPr lang="en-US" dirty="0" smtClean="0"/>
               <a:t>?</a:t>
             </a:r>
-            <a:endParaRPr lang="en-US" dirty="0" smtClean="0"/>
           </a:p>
           <a:p>
             <a:r>
@@ -10246,7 +10739,6 @@
               <a:rPr lang="en-US" dirty="0" smtClean="0"/>
               <a:t>Therefore a distinct role for middleware </a:t>
             </a:r>
-            <a:endParaRPr lang="en-US" dirty="0" smtClean="0"/>
           </a:p>
           <a:p>
             <a:pPr lvl="1"/>
@@ -10373,11 +10865,7 @@
             </a:pPr>
             <a:r>
               <a:rPr lang="en" sz="2000" dirty="0" smtClean="0"/>
-              <a:t>Support </a:t>
-            </a:r>
-            <a:r>
-              <a:rPr lang="en" sz="2000" dirty="0" smtClean="0"/>
-              <a:t>a broad range of </a:t>
+              <a:t>Support a broad range of </a:t>
             </a:r>
             <a:r>
               <a:rPr lang="en-US" sz="2000" dirty="0" smtClean="0"/>
@@ -10426,11 +10914,7 @@
             </a:pPr>
             <a:r>
               <a:rPr lang="en-US" sz="2000" dirty="0" smtClean="0"/>
-              <a:t>Novel application classes: Adaptive </a:t>
-            </a:r>
-            <a:r>
-              <a:rPr lang="en-US" sz="2000" dirty="0" smtClean="0"/>
-              <a:t>Applications</a:t>
+              <a:t>Novel application classes: Adaptive Applications</a:t>
             </a:r>
           </a:p>
           <a:p>

</xml_diff>

<commit_message>
Work on slide 7.
</commit_message>
<xml_diff>
--- a/presentations/radical-modsim.pptx
+++ b/presentations/radical-modsim.pptx
@@ -7729,13 +7729,8 @@
             <a:pPr lvl="1"/>
             <a:r>
               <a:rPr lang="en-US" sz="2000" dirty="0" smtClean="0"/>
-              <a:t>Many concurrent applications can </a:t>
-            </a:r>
-            <a:r>
-              <a:rPr lang="en-US" sz="2000" dirty="0" smtClean="0"/>
-              <a:t>scale</a:t>
-            </a:r>
-            <a:endParaRPr lang="en-US" sz="2000" dirty="0" smtClean="0"/>
+              <a:t>Many concurrent applications can scale</a:t>
+            </a:r>
           </a:p>
         </p:txBody>
       </p:sp>
@@ -8734,119 +8729,95 @@
                 <a:ea typeface="ＭＳ Ｐゴシック" charset="0"/>
                 <a:cs typeface="ＭＳ Ｐゴシック" charset="0"/>
               </a:rPr>
-              <a:t>Community (HEP) applications, essentially </a:t>
-            </a:r>
+              <a:t>Community (HEP) applications, essentially similar</a:t>
+            </a:r>
+          </a:p>
+          <a:p>
+            <a:pPr>
+              <a:lnSpc>
+                <a:spcPct val="90000"/>
+              </a:lnSpc>
+            </a:pPr>
+            <a:r>
+              <a:rPr lang="en-US" dirty="0" smtClean="0"/>
+              <a:t>Important </a:t>
+            </a:r>
+            <a:r>
+              <a:rPr lang="en-US" dirty="0"/>
+              <a:t>role for </a:t>
+            </a:r>
+            <a:r>
+              <a:rPr lang="en-US" dirty="0" smtClean="0"/>
+              <a:t>middleware</a:t>
+            </a:r>
+          </a:p>
+          <a:p>
+            <a:pPr lvl="1">
+              <a:lnSpc>
+                <a:spcPct val="90000"/>
+              </a:lnSpc>
+            </a:pPr>
+            <a:r>
+              <a:rPr lang="en-US" sz="2000" dirty="0" smtClean="0">
+                <a:latin typeface="Arial" charset="0"/>
+                <a:ea typeface="ＭＳ Ｐゴシック" charset="0"/>
+              </a:rPr>
+              <a:t>Integrate </a:t>
+            </a:r>
+            <a:r>
+              <a:rPr lang="en-US" sz="2000" dirty="0">
+                <a:latin typeface="Arial" charset="0"/>
+                <a:ea typeface="ＭＳ Ｐゴシック" charset="0"/>
+              </a:rPr>
+              <a:t>services and extend </a:t>
+            </a:r>
+            <a:r>
+              <a:rPr lang="en-US" sz="2000" dirty="0" smtClean="0">
+                <a:latin typeface="Arial" charset="0"/>
+                <a:ea typeface="ＭＳ Ｐゴシック" charset="0"/>
+              </a:rPr>
+              <a:t>tools</a:t>
+            </a:r>
+            <a:r>
+              <a:rPr lang="en-US" sz="2000" dirty="0" smtClean="0"/>
+              <a:t> amidst </a:t>
+            </a:r>
+            <a:r>
+              <a:rPr lang="en-US" sz="2000" dirty="0" smtClean="0">
+                <a:latin typeface="Arial" charset="0"/>
+                <a:ea typeface="ＭＳ Ｐゴシック" charset="0"/>
+              </a:rPr>
+              <a:t>heterogeneous </a:t>
+            </a:r>
+            <a:r>
+              <a:rPr lang="en-US" sz="2000" dirty="0">
+                <a:latin typeface="Arial" charset="0"/>
+                <a:ea typeface="ＭＳ Ｐゴシック" charset="0"/>
+              </a:rPr>
+              <a:t>software and system access </a:t>
+            </a:r>
+            <a:r>
+              <a:rPr lang="en-US" sz="2000" dirty="0" smtClean="0">
+                <a:latin typeface="Arial" charset="0"/>
+                <a:ea typeface="ＭＳ Ｐゴシック" charset="0"/>
+              </a:rPr>
+              <a:t>layers</a:t>
+            </a:r>
+            <a:endParaRPr lang="en-US" sz="2000" dirty="0"/>
+          </a:p>
+          <a:p>
+            <a:pPr lvl="1">
+              <a:lnSpc>
+                <a:spcPct val="90000"/>
+              </a:lnSpc>
+            </a:pPr>
             <a:r>
               <a:rPr lang="en-US" sz="2000" dirty="0" smtClean="0">
                 <a:latin typeface="Arial" charset="0"/>
                 <a:ea typeface="ＭＳ Ｐゴシック" charset="0"/>
                 <a:cs typeface="ＭＳ Ｐゴシック" charset="0"/>
               </a:rPr>
-              <a:t>similar</a:t>
-            </a:r>
-          </a:p>
-          <a:p>
-            <a:pPr>
-              <a:lnSpc>
-                <a:spcPct val="90000"/>
-              </a:lnSpc>
-            </a:pPr>
-            <a:r>
-              <a:rPr lang="en-US" dirty="0" smtClean="0"/>
-              <a:t>Important </a:t>
-            </a:r>
-            <a:r>
-              <a:rPr lang="en-US" dirty="0"/>
-              <a:t>role for </a:t>
-            </a:r>
-            <a:r>
-              <a:rPr lang="en-US" dirty="0" smtClean="0"/>
-              <a:t>middleware</a:t>
-            </a:r>
-          </a:p>
-          <a:p>
-            <a:pPr lvl="1">
-              <a:lnSpc>
-                <a:spcPct val="90000"/>
-              </a:lnSpc>
-            </a:pPr>
-            <a:r>
-              <a:rPr lang="en-US" sz="2000" dirty="0" smtClean="0">
-                <a:latin typeface="Arial" charset="0"/>
-                <a:ea typeface="ＭＳ Ｐゴシック" charset="0"/>
-              </a:rPr>
-              <a:t>Integrate </a:t>
-            </a:r>
-            <a:r>
-              <a:rPr lang="en-US" sz="2000" dirty="0">
-                <a:latin typeface="Arial" charset="0"/>
-                <a:ea typeface="ＭＳ Ｐゴシック" charset="0"/>
-              </a:rPr>
-              <a:t>services and extend </a:t>
-            </a:r>
-            <a:r>
-              <a:rPr lang="en-US" sz="2000" dirty="0" smtClean="0">
-                <a:latin typeface="Arial" charset="0"/>
-                <a:ea typeface="ＭＳ Ｐゴシック" charset="0"/>
-              </a:rPr>
-              <a:t>tools</a:t>
-            </a:r>
-            <a:r>
-              <a:rPr lang="en-US" sz="2000" dirty="0" smtClean="0"/>
-              <a:t> amidst </a:t>
-            </a:r>
-            <a:r>
-              <a:rPr lang="en-US" sz="2000" dirty="0" smtClean="0">
-                <a:latin typeface="Arial" charset="0"/>
-                <a:ea typeface="ＭＳ Ｐゴシック" charset="0"/>
-              </a:rPr>
-              <a:t>heterogeneous </a:t>
-            </a:r>
-            <a:r>
-              <a:rPr lang="en-US" sz="2000" dirty="0">
-                <a:latin typeface="Arial" charset="0"/>
-                <a:ea typeface="ＭＳ Ｐゴシック" charset="0"/>
-              </a:rPr>
-              <a:t>software and system access </a:t>
-            </a:r>
-            <a:r>
-              <a:rPr lang="en-US" sz="2000" dirty="0" smtClean="0">
-                <a:latin typeface="Arial" charset="0"/>
-                <a:ea typeface="ＭＳ Ｐゴシック" charset="0"/>
-              </a:rPr>
-              <a:t>layers</a:t>
-            </a:r>
-            <a:endParaRPr lang="en-US" sz="2000" dirty="0"/>
-          </a:p>
-          <a:p>
-            <a:pPr lvl="1">
-              <a:lnSpc>
-                <a:spcPct val="90000"/>
-              </a:lnSpc>
-            </a:pPr>
-            <a:r>
-              <a:rPr lang="en-US" sz="2000" dirty="0" smtClean="0">
-                <a:latin typeface="Arial" charset="0"/>
-                <a:ea typeface="ＭＳ Ｐゴシック" charset="0"/>
-                <a:cs typeface="ＭＳ Ｐゴシック" charset="0"/>
-              </a:rPr>
-              <a:t>Explains </a:t>
-            </a:r>
-            <a:r>
-              <a:rPr lang="en-US" sz="2000" dirty="0" smtClean="0">
-                <a:latin typeface="Arial" charset="0"/>
-                <a:ea typeface="ＭＳ Ｐゴシック" charset="0"/>
-                <a:cs typeface="ＭＳ Ｐゴシック" charset="0"/>
-              </a:rPr>
-              <a:t>why </a:t>
-            </a:r>
-            <a:r>
-              <a:rPr lang="en-US" sz="2000" dirty="0" smtClean="0">
-                <a:latin typeface="Arial" charset="0"/>
-                <a:ea typeface="ＭＳ Ｐゴシック" charset="0"/>
-                <a:cs typeface="ＭＳ Ｐゴシック" charset="0"/>
-              </a:rPr>
-              <a:t>DC software environment is complex</a:t>
+              <a:t>Explains why DC software environment is complex</a:t>
             </a:r>
             <a:endParaRPr lang="en-US" sz="2000" dirty="0">
               <a:latin typeface="Arial" charset="0"/>
@@ -8919,7 +8890,12 @@
             <p:ph idx="1"/>
           </p:nvPr>
         </p:nvSpPr>
-        <p:spPr/>
+        <p:spPr>
+          <a:xfrm>
+            <a:off x="282231" y="911867"/>
+            <a:ext cx="8727298" cy="5146033"/>
+          </a:xfrm>
+        </p:spPr>
         <p:txBody>
           <a:bodyPr/>
           <a:lstStyle/>
@@ -8936,15 +8912,7 @@
                   <a:srgbClr val="000000"/>
                 </a:solidFill>
               </a:rPr>
-              <a:t>Functional </a:t>
-            </a:r>
-            <a:r>
-              <a:rPr lang="en-US" dirty="0" smtClean="0">
-                <a:solidFill>
-                  <a:srgbClr val="000000"/>
-                </a:solidFill>
-              </a:rPr>
-              <a:t>Aims</a:t>
+              <a:t>Functional Aims</a:t>
             </a:r>
           </a:p>
           <a:p>
@@ -8956,7 +8924,7 @@
             </a:pPr>
             <a:r>
               <a:rPr lang="en-US" sz="2000" dirty="0" smtClean="0"/>
-              <a:t>When </a:t>
+              <a:t>What </a:t>
             </a:r>
             <a:r>
               <a:rPr lang="en-US" sz="2000" dirty="0"/>
@@ -8968,9 +8936,16 @@
             </a:r>
             <a:r>
               <a:rPr lang="en-US" sz="2000" dirty="0"/>
-              <a:t>/how to distribute? What to distribute? </a:t>
-            </a:r>
-            <a:endParaRPr lang="en-US" sz="2000" dirty="0"/>
+              <a:t>/how to distribute? </a:t>
+            </a:r>
+            <a:r>
+              <a:rPr lang="en-US" sz="2000" dirty="0" smtClean="0"/>
+              <a:t>When </a:t>
+            </a:r>
+            <a:r>
+              <a:rPr lang="en-US" sz="2000" dirty="0"/>
+              <a:t>to distribute? </a:t>
+            </a:r>
           </a:p>
           <a:p>
             <a:pPr marL="800100" lvl="1" indent="-342900">
@@ -8981,11 +8956,7 @@
             </a:pPr>
             <a:r>
               <a:rPr lang="en-US" sz="2000" dirty="0" smtClean="0"/>
-              <a:t>Need </a:t>
-            </a:r>
-            <a:r>
-              <a:rPr lang="en-US" sz="2000" dirty="0" smtClean="0"/>
-              <a:t>to integrate information </a:t>
+              <a:t>Need to integrate information </a:t>
             </a:r>
             <a:r>
               <a:rPr lang="en-US" sz="2000" dirty="0"/>
@@ -8995,7 +8966,6 @@
               <a:rPr lang="en-US" sz="2000" dirty="0" smtClean="0"/>
               <a:t>applications and resources (compute, data and networks) </a:t>
             </a:r>
-            <a:endParaRPr lang="en-US" sz="2000" dirty="0" smtClean="0"/>
           </a:p>
           <a:p>
             <a:pPr marL="800100" lvl="1" indent="-342900">
@@ -9048,45 +9018,15 @@
               <a:rPr lang="en-US" sz="2000" dirty="0" smtClean="0">
                 <a:solidFill>
                   <a:schemeClr val="tx1">
-                    <a:lumMod val="65000"/>
-                    <a:lumOff val="35000"/>
+                    <a:lumMod val="75000"/>
+                    <a:lumOff val="25000"/>
                   </a:schemeClr>
                 </a:solidFill>
               </a:rPr>
-              <a:t>Integrated </a:t>
+              <a:t>Support </a:t>
             </a:r>
             <a:r>
               <a:rPr lang="en-US" sz="2000" dirty="0">
-                <a:solidFill>
-                  <a:schemeClr val="tx1">
-                    <a:lumMod val="65000"/>
-                    <a:lumOff val="35000"/>
-                  </a:schemeClr>
-                </a:solidFill>
-              </a:rPr>
-              <a:t>for Adaptive Applications and Dynamic Resource </a:t>
-            </a:r>
-            <a:r>
-              <a:rPr lang="en-US" sz="2000" dirty="0" smtClean="0">
-                <a:solidFill>
-                  <a:schemeClr val="tx1">
-                    <a:lumMod val="65000"/>
-                    <a:lumOff val="35000"/>
-                  </a:schemeClr>
-                </a:solidFill>
-              </a:rPr>
-              <a:t>Management</a:t>
-            </a:r>
-          </a:p>
-          <a:p>
-            <a:pPr marL="1208088" lvl="2" indent="-342900">
-              <a:buClr>
-                <a:srgbClr val="000000"/>
-              </a:buClr>
-              <a:buSzPct val="100000"/>
-            </a:pPr>
-            <a:r>
-              <a:rPr lang="en-US" sz="2000" dirty="0" smtClean="0">
                 <a:solidFill>
                   <a:schemeClr val="tx1">
                     <a:lumMod val="75000"/>
@@ -9094,10 +9034,10 @@
                   </a:schemeClr>
                 </a:solidFill>
               </a:rPr>
-              <a:t>Support </a:t>
-            </a:r>
-            <a:r>
-              <a:rPr lang="en-US" sz="2000" dirty="0">
+              <a:t>adaptive </a:t>
+            </a:r>
+            <a:r>
+              <a:rPr lang="en-US" sz="2000" dirty="0" smtClean="0">
                 <a:solidFill>
                   <a:schemeClr val="tx1">
                     <a:lumMod val="75000"/>
@@ -9105,7 +9045,7 @@
                   </a:schemeClr>
                 </a:solidFill>
               </a:rPr>
-              <a:t>adaptive </a:t>
+              <a:t>applications in conjunction with dynamic </a:t>
             </a:r>
             <a:r>
               <a:rPr lang="en-US" sz="2000" dirty="0" smtClean="0">
@@ -9116,18 +9056,7 @@
                   </a:schemeClr>
                 </a:solidFill>
               </a:rPr>
-              <a:t>applications </a:t>
-            </a:r>
-            <a:r>
-              <a:rPr lang="en-US" sz="2000" dirty="0" smtClean="0">
-                <a:solidFill>
-                  <a:schemeClr val="tx1">
-                    <a:lumMod val="75000"/>
-                    <a:lumOff val="25000"/>
-                  </a:schemeClr>
-                </a:solidFill>
-              </a:rPr>
-              <a:t>in conjunction with dynamic resources</a:t>
+              <a:t>resources</a:t>
             </a:r>
             <a:endParaRPr lang="en" sz="2000" dirty="0">
               <a:solidFill>
@@ -9236,45 +9165,62 @@
                   </a:schemeClr>
                 </a:solidFill>
               </a:rPr>
-              <a:t>Abstracted</a:t>
+              <a:t>Abstracted application communication and dataflow </a:t>
+            </a:r>
+            <a:r>
+              <a:rPr lang="en-US" sz="2000" dirty="0" smtClean="0">
+                <a:solidFill>
+                  <a:schemeClr val="tx1">
+                    <a:lumMod val="75000"/>
+                    <a:lumOff val="25000"/>
+                  </a:schemeClr>
+                </a:solidFill>
+              </a:rPr>
+              <a:t>representation that </a:t>
             </a:r>
             <a:r>
               <a:rPr lang="en-US" sz="2000" dirty="0">
                 <a:solidFill>
                   <a:schemeClr val="tx1">
-                    <a:lumMod val="65000"/>
-                    <a:lumOff val="35000"/>
+                    <a:lumMod val="75000"/>
+                    <a:lumOff val="25000"/>
                   </a:schemeClr>
                 </a:solidFill>
               </a:rPr>
-              <a:t> data logic (representation, distribution, scheduling, placement) that captures application-semantics yet is not application-</a:t>
+              <a:t>captures application logic yet is </a:t>
             </a:r>
             <a:r>
               <a:rPr lang="en-US" sz="2000" dirty="0" smtClean="0">
                 <a:solidFill>
                   <a:schemeClr val="tx1">
-                    <a:lumMod val="65000"/>
-                    <a:lumOff val="35000"/>
+                    <a:lumMod val="75000"/>
+                    <a:lumOff val="25000"/>
                   </a:schemeClr>
                 </a:solidFill>
               </a:rPr>
-              <a:t>specific</a:t>
-            </a:r>
-          </a:p>
-          <a:p>
-            <a:pPr marL="1208088" lvl="2" indent="-342900">
-              <a:buClr>
-                <a:srgbClr val="000000"/>
-              </a:buClr>
-              <a:buSzPct val="100000"/>
-            </a:pPr>
+              <a:t>not application-specific and allows for reasoning on distribution</a:t>
+            </a:r>
+            <a:r>
+              <a:rPr lang="en-US" sz="2000" dirty="0">
+                <a:solidFill>
+                  <a:schemeClr val="tx1">
+                    <a:lumMod val="75000"/>
+                    <a:lumOff val="25000"/>
+                  </a:schemeClr>
+                </a:solidFill>
+              </a:rPr>
+              <a:t>, scheduling, </a:t>
+            </a:r>
             <a:r>
               <a:rPr lang="en-US" sz="2000" dirty="0" smtClean="0">
                 <a:solidFill>
-                  <a:srgbClr val="800000"/>
-                </a:solidFill>
-              </a:rPr>
-              <a:t>Mark do you have improvement to the above?</a:t>
+                  <a:schemeClr val="tx1">
+                    <a:lumMod val="75000"/>
+                    <a:lumOff val="25000"/>
+                  </a:schemeClr>
+                </a:solidFill>
+              </a:rPr>
+              <a:t>placement</a:t>
             </a:r>
             <a:endParaRPr lang="en-US" sz="2000" dirty="0">
               <a:solidFill>
@@ -9469,18 +9415,7 @@
                   </a:schemeClr>
                 </a:solidFill>
               </a:rPr>
-              <a:t>together </a:t>
-            </a:r>
-            <a:r>
-              <a:rPr lang="en-US" dirty="0" smtClean="0">
-                <a:solidFill>
-                  <a:schemeClr val="tx1">
-                    <a:lumMod val="65000"/>
-                    <a:lumOff val="35000"/>
-                  </a:schemeClr>
-                </a:solidFill>
-              </a:rPr>
-              <a:t>but:</a:t>
+              <a:t>together but:</a:t>
             </a:r>
           </a:p>
           <a:p>
@@ -9639,10 +9574,10 @@
                   </a:schemeClr>
                 </a:solidFill>
               </a:rPr>
-              <a:t>Exposes </a:t>
-            </a:r>
-            <a:r>
-              <a:rPr lang="en-US" sz="2000" dirty="0" smtClean="0">
+              <a:t>Exposes well-</a:t>
+            </a:r>
+            <a:r>
+              <a:rPr lang="en" sz="2000" dirty="0" smtClean="0">
                 <a:solidFill>
                   <a:schemeClr val="tx1">
                     <a:lumMod val="65000"/>
@@ -9650,10 +9585,18 @@
                   </a:schemeClr>
                 </a:solidFill>
               </a:rPr>
-              <a:t>well-</a:t>
-            </a:r>
-            <a:r>
-              <a:rPr lang="en" sz="2000" dirty="0" smtClean="0">
+              <a:t>defined </a:t>
+            </a:r>
+            <a:r>
+              <a:rPr lang="en-US" sz="2000" dirty="0" smtClean="0">
+                <a:solidFill>
+                  <a:srgbClr val="800000"/>
+                </a:solidFill>
+              </a:rPr>
+              <a:t>capabilities</a:t>
+            </a:r>
+            <a:r>
+              <a:rPr lang="en-US" sz="2000" dirty="0" smtClean="0">
                 <a:solidFill>
                   <a:schemeClr val="tx1">
                     <a:lumMod val="65000"/>
@@ -9661,37 +9604,7 @@
                   </a:schemeClr>
                 </a:solidFill>
               </a:rPr>
-              <a:t>defined </a:t>
-            </a:r>
-            <a:r>
-              <a:rPr lang="en-US" sz="2000" dirty="0" smtClean="0">
-                <a:solidFill>
-                  <a:srgbClr val="800000"/>
-                </a:solidFill>
-              </a:rPr>
-              <a:t>capabilities</a:t>
-            </a:r>
-            <a:r>
-              <a:rPr lang="en-US" sz="2000" dirty="0" smtClean="0">
-                <a:solidFill>
-                  <a:schemeClr val="tx1">
-                    <a:lumMod val="65000"/>
-                    <a:lumOff val="35000"/>
-                  </a:schemeClr>
-                </a:solidFill>
-              </a:rPr>
-              <a:t> rather than </a:t>
-            </a:r>
-            <a:r>
-              <a:rPr lang="en-US" sz="2000" dirty="0" smtClean="0">
-                <a:solidFill>
-                  <a:schemeClr val="tx1">
-                    <a:lumMod val="65000"/>
-                    <a:lumOff val="35000"/>
-                  </a:schemeClr>
-                </a:solidFill>
-              </a:rPr>
-              <a:t>technology</a:t>
+              <a:t> rather than technology</a:t>
             </a:r>
           </a:p>
           <a:p>
@@ -10052,15 +9965,7 @@
             </a:pPr>
             <a:r>
               <a:rPr lang="en-US" dirty="0" smtClean="0"/>
-              <a:t>NGMW: </a:t>
-            </a:r>
-            <a:r>
-              <a:rPr lang="en-US" dirty="0" smtClean="0"/>
-              <a:t>Capability </a:t>
-            </a:r>
-            <a:r>
-              <a:rPr lang="en-US" dirty="0" smtClean="0"/>
-              <a:t>Challenges</a:t>
+              <a:t>NGMW: Capability Challenges</a:t>
             </a:r>
             <a:endParaRPr lang="en" dirty="0"/>
           </a:p>
@@ -10413,11 +10318,7 @@
             </a:pPr>
             <a:r>
               <a:rPr lang="en-US" dirty="0" smtClean="0"/>
-              <a:t>In </a:t>
-            </a:r>
-            <a:r>
-              <a:rPr lang="en-US" dirty="0" smtClean="0"/>
-              <a:t>turn need models of semantics – static and dynamic, and performance</a:t>
+              <a:t>In turn need models of semantics – static and dynamic, and performance</a:t>
             </a:r>
           </a:p>
           <a:p>

</xml_diff>

<commit_message>
introduced some explanatory scenarios for NGMW
</commit_message>
<xml_diff>
--- a/presentations/radical-modsim.pptx
+++ b/presentations/radical-modsim.pptx
@@ -5,7 +5,7 @@
     <p:sldMasterId id="2147483656" r:id="rId1"/>
   </p:sldMasterIdLst>
   <p:notesMasterIdLst>
-    <p:notesMasterId r:id="rId26"/>
+    <p:notesMasterId r:id="rId30"/>
   </p:notesMasterIdLst>
   <p:sldIdLst>
     <p:sldId id="256" r:id="rId2"/>
@@ -22,16 +22,20 @@
     <p:sldId id="340" r:id="rId13"/>
     <p:sldId id="285" r:id="rId14"/>
     <p:sldId id="298" r:id="rId15"/>
-    <p:sldId id="287" r:id="rId16"/>
+    <p:sldId id="343" r:id="rId16"/>
     <p:sldId id="297" r:id="rId17"/>
-    <p:sldId id="300" r:id="rId18"/>
-    <p:sldId id="331" r:id="rId19"/>
-    <p:sldId id="328" r:id="rId20"/>
-    <p:sldId id="326" r:id="rId21"/>
-    <p:sldId id="295" r:id="rId22"/>
-    <p:sldId id="284" r:id="rId23"/>
-    <p:sldId id="336" r:id="rId24"/>
-    <p:sldId id="341" r:id="rId25"/>
+    <p:sldId id="344" r:id="rId18"/>
+    <p:sldId id="345" r:id="rId19"/>
+    <p:sldId id="331" r:id="rId20"/>
+    <p:sldId id="346" r:id="rId21"/>
+    <p:sldId id="328" r:id="rId22"/>
+    <p:sldId id="326" r:id="rId23"/>
+    <p:sldId id="295" r:id="rId24"/>
+    <p:sldId id="284" r:id="rId25"/>
+    <p:sldId id="336" r:id="rId26"/>
+    <p:sldId id="341" r:id="rId27"/>
+    <p:sldId id="342" r:id="rId28"/>
+    <p:sldId id="347" r:id="rId29"/>
   </p:sldIdLst>
   <p:sldSz cx="9144000" cy="6858000" type="screen4x3"/>
   <p:notesSz cx="6858000" cy="9144000"/>
@@ -809,6 +813,94 @@
           <a:bodyPr/>
           <a:lstStyle/>
           <a:p>
+            <a:pPr marL="285750" indent="-285750">
+              <a:buFont typeface="Wingdings" charset="2"/>
+              <a:buChar char="ü"/>
+            </a:pPr>
+            <a:r>
+              <a:rPr lang="de-DE" dirty="0" smtClean="0"/>
+              <a:t>Fast </a:t>
+            </a:r>
+            <a:r>
+              <a:rPr lang="de-DE" dirty="0" err="1" smtClean="0"/>
+              <a:t>modeling</a:t>
+            </a:r>
+            <a:endParaRPr lang="de-DE" dirty="0" smtClean="0"/>
+          </a:p>
+          <a:p>
+            <a:pPr marL="285750" indent="-285750">
+              <a:buFont typeface="Wingdings" charset="2"/>
+              <a:buChar char="ü"/>
+            </a:pPr>
+            <a:r>
+              <a:rPr lang="de-DE" dirty="0" smtClean="0"/>
+              <a:t>Easy </a:t>
+            </a:r>
+            <a:r>
+              <a:rPr lang="de-DE" dirty="0" err="1" smtClean="0"/>
+              <a:t>data</a:t>
+            </a:r>
+            <a:r>
+              <a:rPr lang="de-DE" dirty="0" smtClean="0"/>
+              <a:t> </a:t>
+            </a:r>
+            <a:r>
+              <a:rPr lang="de-DE" dirty="0" err="1" smtClean="0"/>
+              <a:t>integration</a:t>
+            </a:r>
+            <a:endParaRPr lang="de-DE" dirty="0" smtClean="0"/>
+          </a:p>
+          <a:p>
+            <a:pPr marL="285750" indent="-285750">
+              <a:buFont typeface="Wingdings" charset="2"/>
+              <a:buChar char="ü"/>
+            </a:pPr>
+            <a:r>
+              <a:rPr lang="de-DE" dirty="0" smtClean="0"/>
+              <a:t>Multiple </a:t>
+            </a:r>
+            <a:r>
+              <a:rPr lang="de-DE" dirty="0" err="1" smtClean="0"/>
+              <a:t>levels</a:t>
+            </a:r>
+            <a:r>
+              <a:rPr lang="de-DE" dirty="0" smtClean="0"/>
+              <a:t> </a:t>
+            </a:r>
+            <a:r>
+              <a:rPr lang="de-DE" dirty="0" err="1" smtClean="0"/>
+              <a:t>of</a:t>
+            </a:r>
+            <a:r>
+              <a:rPr lang="de-DE" dirty="0" smtClean="0"/>
+              <a:t> </a:t>
+            </a:r>
+            <a:r>
+              <a:rPr lang="de-DE" dirty="0" err="1" smtClean="0"/>
+              <a:t>granularity</a:t>
+            </a:r>
+            <a:endParaRPr lang="de-DE" dirty="0" smtClean="0"/>
+          </a:p>
+          <a:p>
+            <a:pPr marL="285750" indent="-285750">
+              <a:buFont typeface="Wingdings" charset="2"/>
+              <a:buChar char="ü"/>
+            </a:pPr>
+            <a:r>
+              <a:rPr lang="de-DE" dirty="0" err="1" smtClean="0"/>
+              <a:t>Redundancy</a:t>
+            </a:r>
+            <a:r>
+              <a:rPr lang="de-DE" dirty="0" smtClean="0"/>
+              <a:t> </a:t>
+            </a:r>
+            <a:r>
+              <a:rPr lang="de-DE" dirty="0" err="1" smtClean="0"/>
+              <a:t>handling</a:t>
+            </a:r>
+            <a:endParaRPr lang="de-DE" dirty="0" smtClean="0"/>
+          </a:p>
+          <a:p>
             <a:endParaRPr lang="en-US" dirty="0"/>
           </a:p>
         </p:txBody>
@@ -816,7 +908,7 @@
     </p:spTree>
     <p:extLst>
       <p:ext uri="{BB962C8B-B14F-4D97-AF65-F5344CB8AC3E}">
-        <p14:creationId xmlns:p14="http://schemas.microsoft.com/office/powerpoint/2010/main" val="3821591872"/>
+        <p14:creationId xmlns:p14="http://schemas.microsoft.com/office/powerpoint/2010/main" val="3242815811"/>
       </p:ext>
     </p:extLst>
   </p:cSld>
@@ -875,29 +967,6 @@
           <a:bodyPr/>
           <a:lstStyle/>
           <a:p>
-            <a:pPr marL="0" marR="0" indent="0" algn="l" defTabSz="457200" rtl="0" eaLnBrk="1" fontAlgn="auto" latinLnBrk="0" hangingPunct="1">
-              <a:lnSpc>
-                <a:spcPct val="100000"/>
-              </a:lnSpc>
-              <a:spcBef>
-                <a:spcPts val="0"/>
-              </a:spcBef>
-              <a:spcAft>
-                <a:spcPts val="0"/>
-              </a:spcAft>
-              <a:buClrTx/>
-              <a:buSzTx/>
-              <a:buFontTx/>
-              <a:buNone/>
-              <a:tabLst/>
-              <a:defRPr/>
-            </a:pPr>
-            <a:r>
-              <a:rPr lang="en-US" dirty="0" smtClean="0"/>
-              <a:t>We take the schematic of NGMW and show how the different levels at which the Models work, (ii) how different models interact, especially (a) Andre and Christian’s work/interface, (ii) I* and F*.</a:t>
-            </a:r>
-          </a:p>
-          <a:p>
             <a:endParaRPr lang="en-US" dirty="0"/>
           </a:p>
         </p:txBody>
@@ -905,7 +974,7 @@
     </p:spTree>
     <p:extLst>
       <p:ext uri="{BB962C8B-B14F-4D97-AF65-F5344CB8AC3E}">
-        <p14:creationId xmlns:p14="http://schemas.microsoft.com/office/powerpoint/2010/main" val="1073575463"/>
+        <p14:creationId xmlns:p14="http://schemas.microsoft.com/office/powerpoint/2010/main" val="3821591872"/>
       </p:ext>
     </p:extLst>
   </p:cSld>
@@ -1005,6 +1074,275 @@
 </file>
 
 <file path=ppt/notesSlides/notesSlide15.xml><?xml version="1.0" encoding="utf-8"?>
+<p:notes xmlns:a="http://schemas.openxmlformats.org/drawingml/2006/main" xmlns:r="http://schemas.openxmlformats.org/officeDocument/2006/relationships" xmlns:p="http://schemas.openxmlformats.org/presentationml/2006/main">
+  <p:cSld>
+    <p:spTree>
+      <p:nvGrpSpPr>
+        <p:cNvPr id="1" name=""/>
+        <p:cNvGrpSpPr/>
+        <p:nvPr/>
+      </p:nvGrpSpPr>
+      <p:grpSpPr>
+        <a:xfrm>
+          <a:off x="0" y="0"/>
+          <a:ext cx="0" cy="0"/>
+          <a:chOff x="0" y="0"/>
+          <a:chExt cx="0" cy="0"/>
+        </a:xfrm>
+      </p:grpSpPr>
+      <p:sp>
+        <p:nvSpPr>
+          <p:cNvPr id="2" name="Slide Image Placeholder 1"/>
+          <p:cNvSpPr>
+            <a:spLocks noGrp="1" noRot="1" noChangeAspect="1"/>
+          </p:cNvSpPr>
+          <p:nvPr>
+            <p:ph type="sldImg"/>
+          </p:nvPr>
+        </p:nvSpPr>
+        <p:spPr>
+          <a:xfrm>
+            <a:off x="1143000" y="685800"/>
+            <a:ext cx="4572000" cy="3429000"/>
+          </a:xfrm>
+        </p:spPr>
+      </p:sp>
+      <p:sp>
+        <p:nvSpPr>
+          <p:cNvPr id="3" name="Notes Placeholder 2"/>
+          <p:cNvSpPr>
+            <a:spLocks noGrp="1"/>
+          </p:cNvSpPr>
+          <p:nvPr>
+            <p:ph type="body" idx="1"/>
+          </p:nvPr>
+        </p:nvSpPr>
+        <p:spPr/>
+        <p:txBody>
+          <a:bodyPr/>
+          <a:lstStyle/>
+          <a:p>
+            <a:pPr marL="0" marR="0" indent="0" algn="l" defTabSz="457200" rtl="0" eaLnBrk="1" fontAlgn="auto" latinLnBrk="0" hangingPunct="1">
+              <a:lnSpc>
+                <a:spcPct val="100000"/>
+              </a:lnSpc>
+              <a:spcBef>
+                <a:spcPts val="0"/>
+              </a:spcBef>
+              <a:spcAft>
+                <a:spcPts val="0"/>
+              </a:spcAft>
+              <a:buClrTx/>
+              <a:buSzTx/>
+              <a:buFontTx/>
+              <a:buNone/>
+              <a:tabLst/>
+              <a:defRPr/>
+            </a:pPr>
+            <a:r>
+              <a:rPr lang="en-US" dirty="0" smtClean="0"/>
+              <a:t>We show</a:t>
+            </a:r>
+            <a:r>
+              <a:rPr lang="en-US" baseline="0" dirty="0" smtClean="0"/>
+              <a:t> how *.* meets the first of the design objectives of NGMW</a:t>
+            </a:r>
+            <a:endParaRPr lang="en-US" dirty="0"/>
+          </a:p>
+        </p:txBody>
+      </p:sp>
+    </p:spTree>
+    <p:extLst>
+      <p:ext uri="{BB962C8B-B14F-4D97-AF65-F5344CB8AC3E}">
+        <p14:creationId xmlns:p14="http://schemas.microsoft.com/office/powerpoint/2010/main" val="1073575463"/>
+      </p:ext>
+    </p:extLst>
+  </p:cSld>
+  <p:clrMapOvr>
+    <a:masterClrMapping/>
+  </p:clrMapOvr>
+</p:notes>
+</file>
+
+<file path=ppt/notesSlides/notesSlide16.xml><?xml version="1.0" encoding="utf-8"?>
+<p:notes xmlns:a="http://schemas.openxmlformats.org/drawingml/2006/main" xmlns:r="http://schemas.openxmlformats.org/officeDocument/2006/relationships" xmlns:p="http://schemas.openxmlformats.org/presentationml/2006/main">
+  <p:cSld>
+    <p:spTree>
+      <p:nvGrpSpPr>
+        <p:cNvPr id="1" name=""/>
+        <p:cNvGrpSpPr/>
+        <p:nvPr/>
+      </p:nvGrpSpPr>
+      <p:grpSpPr>
+        <a:xfrm>
+          <a:off x="0" y="0"/>
+          <a:ext cx="0" cy="0"/>
+          <a:chOff x="0" y="0"/>
+          <a:chExt cx="0" cy="0"/>
+        </a:xfrm>
+      </p:grpSpPr>
+      <p:sp>
+        <p:nvSpPr>
+          <p:cNvPr id="2" name="Slide Image Placeholder 1"/>
+          <p:cNvSpPr>
+            <a:spLocks noGrp="1" noRot="1" noChangeAspect="1"/>
+          </p:cNvSpPr>
+          <p:nvPr>
+            <p:ph type="sldImg"/>
+          </p:nvPr>
+        </p:nvSpPr>
+        <p:spPr>
+          <a:xfrm>
+            <a:off x="1143000" y="685800"/>
+            <a:ext cx="4572000" cy="3429000"/>
+          </a:xfrm>
+        </p:spPr>
+      </p:sp>
+      <p:sp>
+        <p:nvSpPr>
+          <p:cNvPr id="3" name="Notes Placeholder 2"/>
+          <p:cNvSpPr>
+            <a:spLocks noGrp="1"/>
+          </p:cNvSpPr>
+          <p:nvPr>
+            <p:ph type="body" idx="1"/>
+          </p:nvPr>
+        </p:nvSpPr>
+        <p:spPr/>
+        <p:txBody>
+          <a:bodyPr/>
+          <a:lstStyle/>
+          <a:p>
+            <a:pPr marL="0" marR="0" indent="0" algn="l" defTabSz="457200" rtl="0" eaLnBrk="1" fontAlgn="auto" latinLnBrk="0" hangingPunct="1">
+              <a:lnSpc>
+                <a:spcPct val="100000"/>
+              </a:lnSpc>
+              <a:spcBef>
+                <a:spcPts val="0"/>
+              </a:spcBef>
+              <a:spcAft>
+                <a:spcPts val="0"/>
+              </a:spcAft>
+              <a:buClrTx/>
+              <a:buSzTx/>
+              <a:buFontTx/>
+              <a:buNone/>
+              <a:tabLst/>
+              <a:defRPr/>
+            </a:pPr>
+            <a:r>
+              <a:rPr lang="en-US" dirty="0" smtClean="0"/>
+              <a:t>We take the schematic of NGMW and show how the different levels at which the Models work, (ii) how different models interact, especially (a) Andre and Christian’s work/interface, (ii) I* and F*.</a:t>
+            </a:r>
+          </a:p>
+          <a:p>
+            <a:endParaRPr lang="en-US" dirty="0"/>
+          </a:p>
+        </p:txBody>
+      </p:sp>
+    </p:spTree>
+    <p:extLst>
+      <p:ext uri="{BB962C8B-B14F-4D97-AF65-F5344CB8AC3E}">
+        <p14:creationId xmlns:p14="http://schemas.microsoft.com/office/powerpoint/2010/main" val="1073575463"/>
+      </p:ext>
+    </p:extLst>
+  </p:cSld>
+  <p:clrMapOvr>
+    <a:masterClrMapping/>
+  </p:clrMapOvr>
+</p:notes>
+</file>
+
+<file path=ppt/notesSlides/notesSlide17.xml><?xml version="1.0" encoding="utf-8"?>
+<p:notes xmlns:a="http://schemas.openxmlformats.org/drawingml/2006/main" xmlns:r="http://schemas.openxmlformats.org/officeDocument/2006/relationships" xmlns:p="http://schemas.openxmlformats.org/presentationml/2006/main">
+  <p:cSld>
+    <p:spTree>
+      <p:nvGrpSpPr>
+        <p:cNvPr id="1" name=""/>
+        <p:cNvGrpSpPr/>
+        <p:nvPr/>
+      </p:nvGrpSpPr>
+      <p:grpSpPr>
+        <a:xfrm>
+          <a:off x="0" y="0"/>
+          <a:ext cx="0" cy="0"/>
+          <a:chOff x="0" y="0"/>
+          <a:chExt cx="0" cy="0"/>
+        </a:xfrm>
+      </p:grpSpPr>
+      <p:sp>
+        <p:nvSpPr>
+          <p:cNvPr id="2" name="Slide Image Placeholder 1"/>
+          <p:cNvSpPr>
+            <a:spLocks noGrp="1" noRot="1" noChangeAspect="1"/>
+          </p:cNvSpPr>
+          <p:nvPr>
+            <p:ph type="sldImg"/>
+          </p:nvPr>
+        </p:nvSpPr>
+        <p:spPr>
+          <a:xfrm>
+            <a:off x="1143000" y="685800"/>
+            <a:ext cx="4572000" cy="3429000"/>
+          </a:xfrm>
+        </p:spPr>
+      </p:sp>
+      <p:sp>
+        <p:nvSpPr>
+          <p:cNvPr id="3" name="Notes Placeholder 2"/>
+          <p:cNvSpPr>
+            <a:spLocks noGrp="1"/>
+          </p:cNvSpPr>
+          <p:nvPr>
+            <p:ph type="body" idx="1"/>
+          </p:nvPr>
+        </p:nvSpPr>
+        <p:spPr/>
+        <p:txBody>
+          <a:bodyPr/>
+          <a:lstStyle/>
+          <a:p>
+            <a:pPr marL="0" marR="0" indent="0" algn="l" defTabSz="457200" rtl="0" eaLnBrk="1" fontAlgn="auto" latinLnBrk="0" hangingPunct="1">
+              <a:lnSpc>
+                <a:spcPct val="100000"/>
+              </a:lnSpc>
+              <a:spcBef>
+                <a:spcPts val="0"/>
+              </a:spcBef>
+              <a:spcAft>
+                <a:spcPts val="0"/>
+              </a:spcAft>
+              <a:buClrTx/>
+              <a:buSzTx/>
+              <a:buFontTx/>
+              <a:buNone/>
+              <a:tabLst/>
+              <a:defRPr/>
+            </a:pPr>
+            <a:r>
+              <a:rPr lang="en-US" dirty="0" smtClean="0"/>
+              <a:t>We take the schematic of NGMW and show how the different levels at which the Models work, (ii) how different models interact, especially (a) Andre and Christian’s work/interface, (ii) I* and F*.</a:t>
+            </a:r>
+          </a:p>
+          <a:p>
+            <a:endParaRPr lang="en-US" dirty="0"/>
+          </a:p>
+        </p:txBody>
+      </p:sp>
+    </p:spTree>
+    <p:extLst>
+      <p:ext uri="{BB962C8B-B14F-4D97-AF65-F5344CB8AC3E}">
+        <p14:creationId xmlns:p14="http://schemas.microsoft.com/office/powerpoint/2010/main" val="1073575463"/>
+      </p:ext>
+    </p:extLst>
+  </p:cSld>
+  <p:clrMapOvr>
+    <a:masterClrMapping/>
+  </p:clrMapOvr>
+</p:notes>
+</file>
+
+<file path=ppt/notesSlides/notesSlide18.xml><?xml version="1.0" encoding="utf-8"?>
 <p:notes xmlns:a="http://schemas.openxmlformats.org/drawingml/2006/main" xmlns:r="http://schemas.openxmlformats.org/officeDocument/2006/relationships" xmlns:p="http://schemas.openxmlformats.org/presentationml/2006/main" showMasterSp="0" showMasterPhAnim="0">
   <p:cSld>
     <p:spTree>
@@ -1139,7 +1477,7 @@
 </p:notes>
 </file>
 
-<file path=ppt/notesSlides/notesSlide16.xml><?xml version="1.0" encoding="utf-8"?>
+<file path=ppt/notesSlides/notesSlide19.xml><?xml version="1.0" encoding="utf-8"?>
 <p:notes xmlns:a="http://schemas.openxmlformats.org/drawingml/2006/main" xmlns:r="http://schemas.openxmlformats.org/officeDocument/2006/relationships" xmlns:p="http://schemas.openxmlformats.org/presentationml/2006/main">
   <p:cSld>
     <p:spTree>
@@ -1328,6 +1666,95 @@
 </p:notes>
 </file>
 
+<file path=ppt/notesSlides/notesSlide20.xml><?xml version="1.0" encoding="utf-8"?>
+<p:notes xmlns:a="http://schemas.openxmlformats.org/drawingml/2006/main" xmlns:r="http://schemas.openxmlformats.org/officeDocument/2006/relationships" xmlns:p="http://schemas.openxmlformats.org/presentationml/2006/main">
+  <p:cSld>
+    <p:spTree>
+      <p:nvGrpSpPr>
+        <p:cNvPr id="1" name=""/>
+        <p:cNvGrpSpPr/>
+        <p:nvPr/>
+      </p:nvGrpSpPr>
+      <p:grpSpPr>
+        <a:xfrm>
+          <a:off x="0" y="0"/>
+          <a:ext cx="0" cy="0"/>
+          <a:chOff x="0" y="0"/>
+          <a:chExt cx="0" cy="0"/>
+        </a:xfrm>
+      </p:grpSpPr>
+      <p:sp>
+        <p:nvSpPr>
+          <p:cNvPr id="2" name="Slide Image Placeholder 1"/>
+          <p:cNvSpPr>
+            <a:spLocks noGrp="1" noRot="1" noChangeAspect="1"/>
+          </p:cNvSpPr>
+          <p:nvPr>
+            <p:ph type="sldImg"/>
+          </p:nvPr>
+        </p:nvSpPr>
+        <p:spPr>
+          <a:xfrm>
+            <a:off x="1143000" y="685800"/>
+            <a:ext cx="4572000" cy="3429000"/>
+          </a:xfrm>
+        </p:spPr>
+      </p:sp>
+      <p:sp>
+        <p:nvSpPr>
+          <p:cNvPr id="3" name="Notes Placeholder 2"/>
+          <p:cNvSpPr>
+            <a:spLocks noGrp="1"/>
+          </p:cNvSpPr>
+          <p:nvPr>
+            <p:ph type="body" idx="1"/>
+          </p:nvPr>
+        </p:nvSpPr>
+        <p:spPr/>
+        <p:txBody>
+          <a:bodyPr/>
+          <a:lstStyle/>
+          <a:p>
+            <a:pPr marL="0" marR="0" indent="0" algn="l" defTabSz="457200" rtl="0" eaLnBrk="1" fontAlgn="auto" latinLnBrk="0" hangingPunct="1">
+              <a:lnSpc>
+                <a:spcPct val="100000"/>
+              </a:lnSpc>
+              <a:spcBef>
+                <a:spcPts val="0"/>
+              </a:spcBef>
+              <a:spcAft>
+                <a:spcPts val="0"/>
+              </a:spcAft>
+              <a:buClrTx/>
+              <a:buSzTx/>
+              <a:buFontTx/>
+              <a:buNone/>
+              <a:tabLst/>
+              <a:defRPr/>
+            </a:pPr>
+            <a:r>
+              <a:rPr lang="en-US" dirty="0" smtClean="0"/>
+              <a:t>We take the schematic of NGMW and show how the different levels at which the Models work, (ii) how different models interact, especially (a) Andre and Christian’s work/interface, (ii) I* and F*.</a:t>
+            </a:r>
+          </a:p>
+          <a:p>
+            <a:endParaRPr lang="en-US" dirty="0"/>
+          </a:p>
+        </p:txBody>
+      </p:sp>
+    </p:spTree>
+    <p:extLst>
+      <p:ext uri="{BB962C8B-B14F-4D97-AF65-F5344CB8AC3E}">
+        <p14:creationId xmlns:p14="http://schemas.microsoft.com/office/powerpoint/2010/main" val="1073575463"/>
+      </p:ext>
+    </p:extLst>
+  </p:cSld>
+  <p:clrMapOvr>
+    <a:masterClrMapping/>
+  </p:clrMapOvr>
+</p:notes>
+</file>
+
 <file path=ppt/notesSlides/notesSlide3.xml><?xml version="1.0" encoding="utf-8"?>
 <p:notes xmlns:a="http://schemas.openxmlformats.org/drawingml/2006/main" xmlns:r="http://schemas.openxmlformats.org/officeDocument/2006/relationships" xmlns:p="http://schemas.openxmlformats.org/presentationml/2006/main" showMasterSp="0" showMasterPhAnim="0">
   <p:cSld>
@@ -2218,6 +2645,162 @@
 </p:sldLayout>
 </file>
 
+<file path=ppt/slideLayouts/slideLayout10.xml><?xml version="1.0" encoding="utf-8"?>
+<p:sldLayout xmlns:a="http://schemas.openxmlformats.org/drawingml/2006/main" xmlns:r="http://schemas.openxmlformats.org/officeDocument/2006/relationships" xmlns:p="http://schemas.openxmlformats.org/presentationml/2006/main" userDrawn="1">
+  <p:cSld name="Title Only">
+    <p:spTree>
+      <p:nvGrpSpPr>
+        <p:cNvPr id="1" name=""/>
+        <p:cNvGrpSpPr/>
+        <p:nvPr/>
+      </p:nvGrpSpPr>
+      <p:grpSpPr>
+        <a:xfrm>
+          <a:off x="0" y="0"/>
+          <a:ext cx="0" cy="0"/>
+          <a:chOff x="0" y="0"/>
+          <a:chExt cx="0" cy="0"/>
+        </a:xfrm>
+      </p:grpSpPr>
+      <p:cxnSp>
+        <p:nvCxnSpPr>
+          <p:cNvPr id="3" name="Straight Connector 2"/>
+          <p:cNvCxnSpPr/>
+          <p:nvPr userDrawn="1"/>
+        </p:nvCxnSpPr>
+        <p:spPr>
+          <a:xfrm>
+            <a:off x="187325" y="1008063"/>
+            <a:ext cx="8728075" cy="0"/>
+          </a:xfrm>
+          <a:prstGeom prst="line">
+            <a:avLst/>
+          </a:prstGeom>
+          <a:ln>
+            <a:solidFill>
+              <a:srgbClr val="5F5F5F"/>
+            </a:solidFill>
+          </a:ln>
+          <a:effectLst/>
+        </p:spPr>
+        <p:style>
+          <a:lnRef idx="2">
+            <a:schemeClr val="accent1"/>
+          </a:lnRef>
+          <a:fillRef idx="0">
+            <a:schemeClr val="accent1"/>
+          </a:fillRef>
+          <a:effectRef idx="1">
+            <a:schemeClr val="accent1"/>
+          </a:effectRef>
+          <a:fontRef idx="minor">
+            <a:schemeClr val="tx1"/>
+          </a:fontRef>
+        </p:style>
+      </p:cxnSp>
+      <p:sp>
+        <p:nvSpPr>
+          <p:cNvPr id="6" name="Rectangle 2"/>
+          <p:cNvSpPr>
+            <a:spLocks noGrp="1" noChangeArrowheads="1"/>
+          </p:cNvSpPr>
+          <p:nvPr>
+            <p:ph type="title"/>
+          </p:nvPr>
+        </p:nvSpPr>
+        <p:spPr bwMode="auto">
+          <a:xfrm>
+            <a:off x="195729" y="186232"/>
+            <a:ext cx="8694574" cy="808038"/>
+          </a:xfrm>
+          <a:prstGeom prst="rect">
+            <a:avLst/>
+          </a:prstGeom>
+          <a:noFill/>
+          <a:ln>
+            <a:noFill/>
+          </a:ln>
+          <a:extLst>
+            <a:ext uri="{909E8E84-426E-40dd-AFC4-6F175D3DCCD1}">
+              <a14:hiddenFill xmlns:a14="http://schemas.microsoft.com/office/drawing/2010/main">
+                <a:solidFill>
+                  <a:srgbClr val="FFFFFF"/>
+                </a:solidFill>
+              </a14:hiddenFill>
+            </a:ext>
+            <a:ext uri="{91240B29-F687-4f45-9708-019B960494DF}">
+              <a14:hiddenLine xmlns:a14="http://schemas.microsoft.com/office/drawing/2010/main" w="9525">
+                <a:solidFill>
+                  <a:srgbClr val="000000"/>
+                </a:solidFill>
+                <a:miter lim="800000"/>
+                <a:headEnd/>
+                <a:tailEnd/>
+              </a14:hiddenLine>
+            </a:ext>
+            <a:ext uri="{FAA26D3D-D897-4be2-8F04-BA451C77F1D7}">
+              <ma14:placeholderFlag xmlns:ma14="http://schemas.microsoft.com/office/mac/drawingml/2011/main" val="1"/>
+            </a:ext>
+          </a:extLst>
+        </p:spPr>
+        <p:txBody>
+          <a:bodyPr/>
+          <a:lstStyle/>
+          <a:p>
+            <a:pPr lvl="0"/>
+            <a:r>
+              <a:rPr lang="en-US" dirty="0"/>
+              <a:t>Click to edit Master title style</a:t>
+            </a:r>
+          </a:p>
+        </p:txBody>
+      </p:sp>
+      <p:sp>
+        <p:nvSpPr>
+          <p:cNvPr id="4" name="Rectangle 3"/>
+          <p:cNvSpPr>
+            <a:spLocks noGrp="1" noChangeArrowheads="1"/>
+          </p:cNvSpPr>
+          <p:nvPr>
+            <p:ph type="sldNum" sz="quarter" idx="10"/>
+          </p:nvPr>
+        </p:nvSpPr>
+        <p:spPr/>
+        <p:txBody>
+          <a:bodyPr/>
+          <a:lstStyle>
+            <a:lvl1pPr>
+              <a:defRPr/>
+            </a:lvl1pPr>
+          </a:lstStyle>
+          <a:p>
+            <a:pPr>
+              <a:defRPr/>
+            </a:pPr>
+            <a:fld id="{55CA80F3-A1BC-BC41-A1D7-7ADFCFE8360E}" type="slidenum">
+              <a:rPr lang="en-US"/>
+              <a:pPr>
+                <a:defRPr/>
+              </a:pPr>
+              <a:t>‹#›</a:t>
+            </a:fld>
+            <a:endParaRPr lang="en-US"/>
+          </a:p>
+        </p:txBody>
+      </p:sp>
+    </p:spTree>
+    <p:extLst>
+      <p:ext uri="{BB962C8B-B14F-4D97-AF65-F5344CB8AC3E}">
+        <p14:creationId xmlns:p14="http://schemas.microsoft.com/office/powerpoint/2010/main" val="2726348540"/>
+      </p:ext>
+    </p:extLst>
+  </p:cSld>
+  <p:clrMapOvr>
+    <a:masterClrMapping/>
+  </p:clrMapOvr>
+</p:sldLayout>
+</file>
+
 <file path=ppt/slideLayouts/slideLayout2.xml><?xml version="1.0" encoding="utf-8"?>
 <p:sldLayout xmlns:a="http://schemas.openxmlformats.org/drawingml/2006/main" xmlns:r="http://schemas.openxmlformats.org/officeDocument/2006/relationships" xmlns:p="http://schemas.openxmlformats.org/presentationml/2006/main" preserve="1" userDrawn="1">
   <p:cSld name="Title and Content">
@@ -3406,7 +3989,7 @@
           <p:nvPr userDrawn="1"/>
         </p:nvPicPr>
         <p:blipFill>
-          <a:blip r:embed="rId11">
+          <a:blip r:embed="rId12">
             <a:extLst>
               <a:ext uri="{28A0092B-C50C-407E-A947-70E740481C1C}">
                 <a14:useLocalDpi xmlns:a14="http://schemas.microsoft.com/office/drawing/2010/main" val="0"/>
@@ -3671,6 +4254,7 @@
     <p:sldLayoutId id="2147483677" r:id="rId7"/>
     <p:sldLayoutId id="2147483678" r:id="rId8"/>
     <p:sldLayoutId id="2147483682" r:id="rId9"/>
+    <p:sldLayoutId id="2147483683" r:id="rId10"/>
   </p:sldLayoutIdLst>
   <p:txStyles>
     <p:titleStyle>
@@ -4955,120 +5539,13 @@
           <a:p>
             <a:r>
               <a:rPr lang="en-US" dirty="0" smtClean="0"/>
-              <a:t>I*  </a:t>
+              <a:t>I* </a:t>
+            </a:r>
+            <a:r>
+              <a:rPr lang="en-US" dirty="0"/>
+              <a:t>- Analytical HPDC Infrastructure Model </a:t>
             </a:r>
             <a:endParaRPr lang="en-US" dirty="0"/>
-          </a:p>
-        </p:txBody>
-      </p:sp>
-      <p:sp>
-        <p:nvSpPr>
-          <p:cNvPr id="4" name="Textfeld 3"/>
-          <p:cNvSpPr txBox="1"/>
-          <p:nvPr/>
-        </p:nvSpPr>
-        <p:spPr>
-          <a:xfrm>
-            <a:off x="282231" y="4977961"/>
-            <a:ext cx="2918753" cy="954107"/>
-          </a:xfrm>
-          <a:prstGeom prst="rect">
-            <a:avLst/>
-          </a:prstGeom>
-          <a:noFill/>
-        </p:spPr>
-        <p:txBody>
-          <a:bodyPr wrap="square" rtlCol="0">
-            <a:spAutoFit/>
-          </a:bodyPr>
-          <a:lstStyle/>
-          <a:p>
-            <a:pPr marL="285750" indent="-285750">
-              <a:buFont typeface="Wingdings" charset="2"/>
-              <a:buChar char="ü"/>
-            </a:pPr>
-            <a:r>
-              <a:rPr lang="de-DE" dirty="0" smtClean="0"/>
-              <a:t>Fast </a:t>
-            </a:r>
-            <a:r>
-              <a:rPr lang="de-DE" dirty="0" err="1"/>
-              <a:t>modeling</a:t>
-            </a:r>
-            <a:endParaRPr lang="de-DE" dirty="0"/>
-          </a:p>
-          <a:p>
-            <a:pPr marL="285750" indent="-285750">
-              <a:buFont typeface="Wingdings" charset="2"/>
-              <a:buChar char="ü"/>
-            </a:pPr>
-            <a:r>
-              <a:rPr lang="de-DE" dirty="0" smtClean="0"/>
-              <a:t>Easy </a:t>
-            </a:r>
-            <a:r>
-              <a:rPr lang="de-DE" dirty="0" err="1"/>
-              <a:t>data</a:t>
-            </a:r>
-            <a:r>
-              <a:rPr lang="de-DE" dirty="0"/>
-              <a:t> </a:t>
-            </a:r>
-            <a:r>
-              <a:rPr lang="de-DE" dirty="0" err="1"/>
-              <a:t>integration</a:t>
-            </a:r>
-            <a:endParaRPr lang="de-DE" dirty="0"/>
-          </a:p>
-          <a:p>
-            <a:pPr marL="285750" indent="-285750">
-              <a:buFont typeface="Wingdings" charset="2"/>
-              <a:buChar char="ü"/>
-            </a:pPr>
-            <a:r>
-              <a:rPr lang="de-DE" dirty="0" smtClean="0"/>
-              <a:t>Multiple </a:t>
-            </a:r>
-            <a:r>
-              <a:rPr lang="de-DE" dirty="0" err="1"/>
-              <a:t>levels</a:t>
-            </a:r>
-            <a:r>
-              <a:rPr lang="de-DE" dirty="0"/>
-              <a:t> </a:t>
-            </a:r>
-            <a:r>
-              <a:rPr lang="de-DE" dirty="0" err="1"/>
-              <a:t>of</a:t>
-            </a:r>
-            <a:r>
-              <a:rPr lang="de-DE" dirty="0"/>
-              <a:t> </a:t>
-            </a:r>
-            <a:r>
-              <a:rPr lang="de-DE" dirty="0" err="1" smtClean="0"/>
-              <a:t>granularity</a:t>
-            </a:r>
-            <a:endParaRPr lang="de-DE" dirty="0"/>
-          </a:p>
-          <a:p>
-            <a:pPr marL="285750" indent="-285750">
-              <a:buFont typeface="Wingdings" charset="2"/>
-              <a:buChar char="ü"/>
-            </a:pPr>
-            <a:r>
-              <a:rPr lang="de-DE" dirty="0" err="1" smtClean="0"/>
-              <a:t>Redundancy</a:t>
-            </a:r>
-            <a:r>
-              <a:rPr lang="de-DE" dirty="0" smtClean="0"/>
-              <a:t> </a:t>
-            </a:r>
-            <a:r>
-              <a:rPr lang="de-DE" dirty="0" err="1" smtClean="0"/>
-              <a:t>handling</a:t>
-            </a:r>
-            <a:endParaRPr lang="de-DE" dirty="0"/>
           </a:p>
         </p:txBody>
       </p:sp>
@@ -5081,7 +5558,7 @@
           <p:nvPr/>
         </p:nvPicPr>
         <p:blipFill>
-          <a:blip r:embed="rId2">
+          <a:blip r:embed="rId3">
             <a:extLst>
               <a:ext uri="{28A0092B-C50C-407E-A947-70E740481C1C}">
                 <a14:useLocalDpi xmlns:a14="http://schemas.microsoft.com/office/drawing/2010/main" val="0"/>
@@ -5094,8 +5571,8 @@
         </p:blipFill>
         <p:spPr>
           <a:xfrm>
-            <a:off x="2309424" y="1168298"/>
-            <a:ext cx="6569984" cy="4025108"/>
+            <a:off x="508000" y="1168298"/>
+            <a:ext cx="8371408" cy="5128752"/>
           </a:xfrm>
           <a:prstGeom prst="rect">
             <a:avLst/>
@@ -5110,7 +5587,7 @@
         </p:nvSpPr>
         <p:spPr>
           <a:xfrm>
-            <a:off x="3876841" y="5454316"/>
+            <a:off x="282231" y="806382"/>
             <a:ext cx="4852737" cy="307777"/>
           </a:xfrm>
           <a:prstGeom prst="rect">
@@ -5180,7 +5657,7 @@
       </p:grpSpPr>
       <p:sp>
         <p:nvSpPr>
-          <p:cNvPr id="2" name="Title 1"/>
+          <p:cNvPr id="22529" name="Title 1"/>
           <p:cNvSpPr>
             <a:spLocks noGrp="1"/>
           </p:cNvSpPr>
@@ -5188,66 +5665,638 @@
             <p:ph type="title"/>
           </p:nvPr>
         </p:nvSpPr>
-        <p:spPr/>
+        <p:spPr>
+          <a:xfrm>
+            <a:off x="195263" y="185738"/>
+            <a:ext cx="8694737" cy="808037"/>
+          </a:xfrm>
+        </p:spPr>
         <p:txBody>
           <a:bodyPr/>
           <a:lstStyle/>
           <a:p>
             <a:r>
-              <a:rPr lang="en-US" dirty="0" smtClean="0"/>
-              <a:t>P* </a:t>
-            </a:r>
-            <a:endParaRPr lang="en-US" dirty="0"/>
+              <a:rPr lang="en-US" dirty="0">
+                <a:latin typeface="Arial" charset="0"/>
+                <a:ea typeface="ＭＳ Ｐゴシック" charset="0"/>
+                <a:cs typeface="ＭＳ Ｐゴシック" charset="0"/>
+              </a:rPr>
+              <a:t>P</a:t>
+            </a:r>
+            <a:r>
+              <a:rPr lang="en-US" dirty="0" smtClean="0">
+                <a:latin typeface="Arial" charset="0"/>
+                <a:ea typeface="ＭＳ Ｐゴシック" charset="0"/>
+                <a:cs typeface="ＭＳ Ｐゴシック" charset="0"/>
+              </a:rPr>
+              <a:t>*: Model for Dynamic Resources</a:t>
+            </a:r>
+            <a:endParaRPr lang="en-US" dirty="0">
+              <a:latin typeface="Arial" charset="0"/>
+              <a:ea typeface="ＭＳ Ｐゴシック" charset="0"/>
+              <a:cs typeface="ＭＳ Ｐゴシック" charset="0"/>
+            </a:endParaRPr>
           </a:p>
         </p:txBody>
       </p:sp>
       <p:sp>
         <p:nvSpPr>
-          <p:cNvPr id="4" name="Content Placeholder 3"/>
-          <p:cNvSpPr>
-            <a:spLocks noGrp="1"/>
+          <p:cNvPr id="22530" name="Content Placeholder 2"/>
+          <p:cNvSpPr txBox="1">
+            <a:spLocks/>
           </p:cNvSpPr>
-          <p:nvPr>
-            <p:ph idx="1"/>
-          </p:nvPr>
+          <p:nvPr/>
         </p:nvSpPr>
-        <p:spPr/>
+        <p:spPr bwMode="auto">
+          <a:xfrm>
+            <a:off x="209967" y="1059452"/>
+            <a:ext cx="8229600" cy="4533900"/>
+          </a:xfrm>
+          <a:prstGeom prst="rect">
+            <a:avLst/>
+          </a:prstGeom>
+          <a:noFill/>
+          <a:ln>
+            <a:noFill/>
+          </a:ln>
+          <a:extLst>
+            <a:ext uri="{909E8E84-426E-40dd-AFC4-6F175D3DCCD1}">
+              <a14:hiddenFill xmlns:a14="http://schemas.microsoft.com/office/drawing/2010/main">
+                <a:solidFill>
+                  <a:srgbClr val="FFFFFF"/>
+                </a:solidFill>
+              </a14:hiddenFill>
+            </a:ext>
+            <a:ext uri="{91240B29-F687-4f45-9708-019B960494DF}">
+              <a14:hiddenLine xmlns:a14="http://schemas.microsoft.com/office/drawing/2010/main" w="9525">
+                <a:solidFill>
+                  <a:srgbClr val="000000"/>
+                </a:solidFill>
+                <a:miter lim="800000"/>
+                <a:headEnd/>
+                <a:tailEnd/>
+              </a14:hiddenLine>
+            </a:ext>
+          </a:extLst>
+        </p:spPr>
         <p:txBody>
           <a:bodyPr/>
+          <a:lstStyle>
+            <a:lvl1pPr marL="342900" indent="-342900" eaLnBrk="0" hangingPunct="0">
+              <a:defRPr sz="2400">
+                <a:solidFill>
+                  <a:schemeClr val="tx1"/>
+                </a:solidFill>
+                <a:latin typeface="Arial" charset="0"/>
+                <a:ea typeface="ＭＳ Ｐゴシック" charset="0"/>
+                <a:cs typeface="ＭＳ Ｐゴシック" charset="0"/>
+              </a:defRPr>
+            </a:lvl1pPr>
+            <a:lvl2pPr marL="742950" indent="-285750" eaLnBrk="0" hangingPunct="0">
+              <a:defRPr sz="2400">
+                <a:solidFill>
+                  <a:schemeClr val="tx1"/>
+                </a:solidFill>
+                <a:latin typeface="Arial" charset="0"/>
+                <a:ea typeface="ＭＳ Ｐゴシック" charset="0"/>
+              </a:defRPr>
+            </a:lvl2pPr>
+            <a:lvl3pPr marL="1143000" indent="-228600" eaLnBrk="0" hangingPunct="0">
+              <a:defRPr sz="2400">
+                <a:solidFill>
+                  <a:schemeClr val="tx1"/>
+                </a:solidFill>
+                <a:latin typeface="Arial" charset="0"/>
+                <a:ea typeface="ＭＳ Ｐゴシック" charset="0"/>
+              </a:defRPr>
+            </a:lvl3pPr>
+            <a:lvl4pPr marL="1600200" indent="-228600" eaLnBrk="0" hangingPunct="0">
+              <a:defRPr sz="2400">
+                <a:solidFill>
+                  <a:schemeClr val="tx1"/>
+                </a:solidFill>
+                <a:latin typeface="Arial" charset="0"/>
+                <a:ea typeface="ＭＳ Ｐゴシック" charset="0"/>
+              </a:defRPr>
+            </a:lvl4pPr>
+            <a:lvl5pPr marL="2057400" indent="-228600" eaLnBrk="0" hangingPunct="0">
+              <a:defRPr sz="2400">
+                <a:solidFill>
+                  <a:schemeClr val="tx1"/>
+                </a:solidFill>
+                <a:latin typeface="Arial" charset="0"/>
+                <a:ea typeface="ＭＳ Ｐゴシック" charset="0"/>
+              </a:defRPr>
+            </a:lvl5pPr>
+            <a:lvl6pPr marL="2514600" indent="-228600" eaLnBrk="0" fontAlgn="base" hangingPunct="0">
+              <a:spcBef>
+                <a:spcPct val="0"/>
+              </a:spcBef>
+              <a:spcAft>
+                <a:spcPct val="0"/>
+              </a:spcAft>
+              <a:defRPr sz="2400">
+                <a:solidFill>
+                  <a:schemeClr val="tx1"/>
+                </a:solidFill>
+                <a:latin typeface="Arial" charset="0"/>
+                <a:ea typeface="ＭＳ Ｐゴシック" charset="0"/>
+              </a:defRPr>
+            </a:lvl6pPr>
+            <a:lvl7pPr marL="2971800" indent="-228600" eaLnBrk="0" fontAlgn="base" hangingPunct="0">
+              <a:spcBef>
+                <a:spcPct val="0"/>
+              </a:spcBef>
+              <a:spcAft>
+                <a:spcPct val="0"/>
+              </a:spcAft>
+              <a:defRPr sz="2400">
+                <a:solidFill>
+                  <a:schemeClr val="tx1"/>
+                </a:solidFill>
+                <a:latin typeface="Arial" charset="0"/>
+                <a:ea typeface="ＭＳ Ｐゴシック" charset="0"/>
+              </a:defRPr>
+            </a:lvl7pPr>
+            <a:lvl8pPr marL="3429000" indent="-228600" eaLnBrk="0" fontAlgn="base" hangingPunct="0">
+              <a:spcBef>
+                <a:spcPct val="0"/>
+              </a:spcBef>
+              <a:spcAft>
+                <a:spcPct val="0"/>
+              </a:spcAft>
+              <a:defRPr sz="2400">
+                <a:solidFill>
+                  <a:schemeClr val="tx1"/>
+                </a:solidFill>
+                <a:latin typeface="Arial" charset="0"/>
+                <a:ea typeface="ＭＳ Ｐゴシック" charset="0"/>
+              </a:defRPr>
+            </a:lvl8pPr>
+            <a:lvl9pPr marL="3886200" indent="-228600" eaLnBrk="0" fontAlgn="base" hangingPunct="0">
+              <a:spcBef>
+                <a:spcPct val="0"/>
+              </a:spcBef>
+              <a:spcAft>
+                <a:spcPct val="0"/>
+              </a:spcAft>
+              <a:defRPr sz="2400">
+                <a:solidFill>
+                  <a:schemeClr val="tx1"/>
+                </a:solidFill>
+                <a:latin typeface="Arial" charset="0"/>
+                <a:ea typeface="ＭＳ Ｐゴシック" charset="0"/>
+              </a:defRPr>
+            </a:lvl9pPr>
+          </a:lstStyle>
+          <a:p>
+            <a:pPr eaLnBrk="1" hangingPunct="1">
+              <a:spcBef>
+                <a:spcPct val="20000"/>
+              </a:spcBef>
+              <a:buFontTx/>
+              <a:buChar char="•"/>
+            </a:pPr>
+            <a:r>
+              <a:rPr lang="en-US" sz="2000" dirty="0" smtClean="0"/>
+              <a:t>Elements:</a:t>
+            </a:r>
+            <a:endParaRPr lang="en-US" sz="2000" b="1" dirty="0"/>
+          </a:p>
+          <a:p>
+            <a:pPr lvl="1" eaLnBrk="1" hangingPunct="1">
+              <a:spcBef>
+                <a:spcPct val="20000"/>
+              </a:spcBef>
+              <a:buFontTx/>
+              <a:buChar char="–"/>
+            </a:pPr>
+            <a:r>
+              <a:rPr lang="en-US" sz="1800" dirty="0">
+                <a:solidFill>
+                  <a:srgbClr val="5F5F5F"/>
+                </a:solidFill>
+              </a:rPr>
+              <a:t>Pilot-Compute (PC</a:t>
+            </a:r>
+            <a:r>
+              <a:rPr lang="en-US" sz="1800" dirty="0" smtClean="0">
+                <a:solidFill>
+                  <a:srgbClr val="5F5F5F"/>
+                </a:solidFill>
+              </a:rPr>
+              <a:t>).</a:t>
+            </a:r>
+            <a:endParaRPr lang="en-US" sz="1800" dirty="0">
+              <a:solidFill>
+                <a:srgbClr val="5F5F5F"/>
+              </a:solidFill>
+            </a:endParaRPr>
+          </a:p>
+          <a:p>
+            <a:pPr lvl="1" eaLnBrk="1" hangingPunct="1">
+              <a:spcBef>
+                <a:spcPct val="20000"/>
+              </a:spcBef>
+              <a:buFontTx/>
+              <a:buChar char="–"/>
+            </a:pPr>
+            <a:r>
+              <a:rPr lang="en-US" sz="1800" dirty="0">
+                <a:solidFill>
+                  <a:srgbClr val="5F5F5F"/>
+                </a:solidFill>
+              </a:rPr>
+              <a:t>Pilot-Data (PD</a:t>
+            </a:r>
+            <a:r>
+              <a:rPr lang="en-US" sz="1800" dirty="0" smtClean="0">
+                <a:solidFill>
+                  <a:srgbClr val="5F5F5F"/>
+                </a:solidFill>
+              </a:rPr>
+              <a:t>).</a:t>
+            </a:r>
+            <a:endParaRPr lang="en-US" sz="1800" dirty="0">
+              <a:solidFill>
+                <a:srgbClr val="5F5F5F"/>
+              </a:solidFill>
+            </a:endParaRPr>
+          </a:p>
+          <a:p>
+            <a:pPr lvl="1" eaLnBrk="1" hangingPunct="1">
+              <a:spcBef>
+                <a:spcPct val="20000"/>
+              </a:spcBef>
+              <a:buFontTx/>
+              <a:buChar char="–"/>
+            </a:pPr>
+            <a:r>
+              <a:rPr lang="en-US" sz="1800" dirty="0">
+                <a:solidFill>
+                  <a:srgbClr val="5F5F5F"/>
+                </a:solidFill>
+              </a:rPr>
+              <a:t>Compute Unit (CU</a:t>
+            </a:r>
+            <a:r>
+              <a:rPr lang="en-US" sz="1800" dirty="0" smtClean="0">
+                <a:solidFill>
+                  <a:srgbClr val="5F5F5F"/>
+                </a:solidFill>
+              </a:rPr>
+              <a:t>).</a:t>
+            </a:r>
+            <a:endParaRPr lang="en-US" sz="1800" dirty="0">
+              <a:solidFill>
+                <a:srgbClr val="5F5F5F"/>
+              </a:solidFill>
+            </a:endParaRPr>
+          </a:p>
+          <a:p>
+            <a:pPr lvl="1" eaLnBrk="1" hangingPunct="1">
+              <a:spcBef>
+                <a:spcPct val="20000"/>
+              </a:spcBef>
+              <a:buFontTx/>
+              <a:buChar char="–"/>
+            </a:pPr>
+            <a:r>
+              <a:rPr lang="en-US" sz="1800" dirty="0">
+                <a:solidFill>
+                  <a:srgbClr val="5F5F5F"/>
+                </a:solidFill>
+              </a:rPr>
+              <a:t>Data Unit (DU</a:t>
+            </a:r>
+            <a:r>
+              <a:rPr lang="en-US" sz="1800" dirty="0" smtClean="0">
+                <a:solidFill>
+                  <a:srgbClr val="5F5F5F"/>
+                </a:solidFill>
+              </a:rPr>
+              <a:t>).</a:t>
+            </a:r>
+            <a:endParaRPr lang="en-US" sz="1800" dirty="0">
+              <a:solidFill>
+                <a:srgbClr val="5F5F5F"/>
+              </a:solidFill>
+            </a:endParaRPr>
+          </a:p>
+          <a:p>
+            <a:pPr lvl="1" eaLnBrk="1" hangingPunct="1">
+              <a:spcBef>
+                <a:spcPct val="20000"/>
+              </a:spcBef>
+              <a:buFontTx/>
+              <a:buChar char="–"/>
+            </a:pPr>
+            <a:r>
+              <a:rPr lang="en-US" sz="1800" dirty="0">
+                <a:solidFill>
+                  <a:srgbClr val="5F5F5F"/>
+                </a:solidFill>
+              </a:rPr>
+              <a:t>Scheduling Unit (SU</a:t>
+            </a:r>
+            <a:r>
+              <a:rPr lang="en-US" sz="1800" dirty="0" smtClean="0">
+                <a:solidFill>
+                  <a:srgbClr val="5F5F5F"/>
+                </a:solidFill>
+              </a:rPr>
+              <a:t>).</a:t>
+            </a:r>
+            <a:endParaRPr lang="en-US" sz="1800" dirty="0">
+              <a:solidFill>
+                <a:srgbClr val="5F5F5F"/>
+              </a:solidFill>
+            </a:endParaRPr>
+          </a:p>
+          <a:p>
+            <a:pPr lvl="1" eaLnBrk="1" hangingPunct="1">
+              <a:spcBef>
+                <a:spcPct val="20000"/>
+              </a:spcBef>
+              <a:buFontTx/>
+              <a:buChar char="–"/>
+            </a:pPr>
+            <a:r>
+              <a:rPr lang="en-US" sz="1800" dirty="0">
+                <a:solidFill>
+                  <a:srgbClr val="5F5F5F"/>
+                </a:solidFill>
+              </a:rPr>
+              <a:t>Pilot-Manager (PM</a:t>
+            </a:r>
+            <a:r>
+              <a:rPr lang="en-US" sz="1800" dirty="0" smtClean="0">
+                <a:solidFill>
+                  <a:srgbClr val="5F5F5F"/>
+                </a:solidFill>
+              </a:rPr>
+              <a:t>).</a:t>
+            </a:r>
+            <a:endParaRPr lang="en-US" sz="1800" dirty="0">
+              <a:solidFill>
+                <a:srgbClr val="5F5F5F"/>
+              </a:solidFill>
+            </a:endParaRPr>
+          </a:p>
+          <a:p>
+            <a:pPr eaLnBrk="1" hangingPunct="1">
+              <a:spcBef>
+                <a:spcPts val="1200"/>
+              </a:spcBef>
+              <a:buFontTx/>
+              <a:buChar char="•"/>
+            </a:pPr>
+            <a:r>
+              <a:rPr lang="en-US" sz="2000" dirty="0" smtClean="0"/>
+              <a:t>Characteristics:</a:t>
+            </a:r>
+            <a:endParaRPr lang="en-US" sz="2000" b="1" dirty="0"/>
+          </a:p>
+          <a:p>
+            <a:pPr lvl="1" eaLnBrk="1" hangingPunct="1">
+              <a:spcBef>
+                <a:spcPct val="20000"/>
+              </a:spcBef>
+              <a:buFontTx/>
+              <a:buChar char="–"/>
+            </a:pPr>
+            <a:r>
+              <a:rPr lang="en-US" sz="1800" dirty="0" smtClean="0">
+                <a:solidFill>
+                  <a:srgbClr val="5F5F5F"/>
+                </a:solidFill>
+              </a:rPr>
+              <a:t>Coordination.</a:t>
+            </a:r>
+            <a:endParaRPr lang="en-US" sz="1800" dirty="0">
+              <a:solidFill>
+                <a:srgbClr val="5F5F5F"/>
+              </a:solidFill>
+            </a:endParaRPr>
+          </a:p>
+          <a:p>
+            <a:pPr lvl="1" eaLnBrk="1" hangingPunct="1">
+              <a:spcBef>
+                <a:spcPct val="20000"/>
+              </a:spcBef>
+              <a:buFontTx/>
+              <a:buChar char="–"/>
+            </a:pPr>
+            <a:r>
+              <a:rPr lang="en-US" sz="1800" dirty="0" smtClean="0">
+                <a:solidFill>
+                  <a:srgbClr val="5F5F5F"/>
+                </a:solidFill>
+              </a:rPr>
+              <a:t>Communication.</a:t>
+            </a:r>
+            <a:endParaRPr lang="en-US" sz="1800" dirty="0">
+              <a:solidFill>
+                <a:srgbClr val="5F5F5F"/>
+              </a:solidFill>
+            </a:endParaRPr>
+          </a:p>
+          <a:p>
+            <a:pPr lvl="1" eaLnBrk="1" hangingPunct="1">
+              <a:spcBef>
+                <a:spcPct val="20000"/>
+              </a:spcBef>
+              <a:buFontTx/>
+              <a:buChar char="–"/>
+            </a:pPr>
+            <a:r>
+              <a:rPr lang="en-US" sz="1800" dirty="0" smtClean="0">
+                <a:solidFill>
+                  <a:srgbClr val="5F5F5F"/>
+                </a:solidFill>
+              </a:rPr>
+              <a:t>Scheduling.</a:t>
+            </a:r>
+            <a:endParaRPr lang="en-US" sz="1800" dirty="0">
+              <a:solidFill>
+                <a:srgbClr val="5F5F5F"/>
+              </a:solidFill>
+            </a:endParaRPr>
+          </a:p>
+          <a:p>
+            <a:pPr eaLnBrk="1" hangingPunct="1">
+              <a:spcBef>
+                <a:spcPts val="1200"/>
+              </a:spcBef>
+              <a:buFontTx/>
+              <a:buChar char="•"/>
+            </a:pPr>
+            <a:r>
+              <a:rPr lang="en-US" sz="2000" dirty="0"/>
+              <a:t>Pilot-</a:t>
+            </a:r>
+            <a:r>
+              <a:rPr lang="en-US" sz="2000" dirty="0" smtClean="0"/>
+              <a:t>API</a:t>
+            </a:r>
+          </a:p>
+          <a:p>
+            <a:pPr eaLnBrk="1" hangingPunct="1">
+              <a:spcBef>
+                <a:spcPts val="1200"/>
+              </a:spcBef>
+              <a:buFontTx/>
+              <a:buChar char="•"/>
+            </a:pPr>
+            <a:r>
+              <a:rPr lang="en-US" sz="2000" dirty="0" smtClean="0"/>
+              <a:t>Will extend to Compute, Data and Network</a:t>
+            </a:r>
+          </a:p>
+          <a:p>
+            <a:pPr eaLnBrk="1" hangingPunct="1">
+              <a:spcBef>
+                <a:spcPts val="1200"/>
+              </a:spcBef>
+              <a:buFontTx/>
+              <a:buChar char="•"/>
+            </a:pPr>
+            <a:endParaRPr lang="en-US" sz="2000" dirty="0"/>
+          </a:p>
+        </p:txBody>
+      </p:sp>
+      <p:pic>
+        <p:nvPicPr>
+          <p:cNvPr id="22531" name="Picture 3" descr="pstar_model copy.png"/>
+          <p:cNvPicPr>
+            <a:picLocks noChangeAspect="1"/>
+          </p:cNvPicPr>
+          <p:nvPr/>
+        </p:nvPicPr>
+        <p:blipFill>
+          <a:blip r:embed="rId2">
+            <a:extLst>
+              <a:ext uri="{28A0092B-C50C-407E-A947-70E740481C1C}">
+                <a14:useLocalDpi xmlns:a14="http://schemas.microsoft.com/office/drawing/2010/main" val="0"/>
+              </a:ext>
+            </a:extLst>
+          </a:blip>
+          <a:srcRect/>
+          <a:stretch>
+            <a:fillRect/>
+          </a:stretch>
+        </p:blipFill>
+        <p:spPr bwMode="auto">
+          <a:xfrm>
+            <a:off x="4002088" y="1079500"/>
+            <a:ext cx="4319587" cy="4678363"/>
+          </a:xfrm>
+          <a:prstGeom prst="rect">
+            <a:avLst/>
+          </a:prstGeom>
+          <a:noFill/>
+          <a:ln>
+            <a:noFill/>
+          </a:ln>
+          <a:extLst>
+            <a:ext uri="{909E8E84-426E-40dd-AFC4-6F175D3DCCD1}">
+              <a14:hiddenFill xmlns:a14="http://schemas.microsoft.com/office/drawing/2010/main">
+                <a:solidFill>
+                  <a:srgbClr val="FFFFFF"/>
+                </a:solidFill>
+              </a14:hiddenFill>
+            </a:ext>
+            <a:ext uri="{91240B29-F687-4f45-9708-019B960494DF}">
+              <a14:hiddenLine xmlns:a14="http://schemas.microsoft.com/office/drawing/2010/main" w="9525">
+                <a:solidFill>
+                  <a:srgbClr val="000000"/>
+                </a:solidFill>
+                <a:miter lim="800000"/>
+                <a:headEnd/>
+                <a:tailEnd/>
+              </a14:hiddenLine>
+            </a:ext>
+          </a:extLst>
+        </p:spPr>
+      </p:pic>
+      <p:sp>
+        <p:nvSpPr>
+          <p:cNvPr id="22532" name="Rectangle 4"/>
+          <p:cNvSpPr>
+            <a:spLocks noChangeArrowheads="1"/>
+          </p:cNvSpPr>
+          <p:nvPr/>
+        </p:nvSpPr>
+        <p:spPr bwMode="auto">
+          <a:xfrm>
+            <a:off x="706438" y="5794792"/>
+            <a:ext cx="8089983" cy="307777"/>
+          </a:xfrm>
+          <a:prstGeom prst="rect">
+            <a:avLst/>
+          </a:prstGeom>
+          <a:noFill/>
+          <a:ln>
+            <a:noFill/>
+          </a:ln>
+          <a:extLst>
+            <a:ext uri="{909E8E84-426E-40dd-AFC4-6F175D3DCCD1}">
+              <a14:hiddenFill xmlns:a14="http://schemas.microsoft.com/office/drawing/2010/main">
+                <a:solidFill>
+                  <a:srgbClr val="FFFFFF"/>
+                </a:solidFill>
+              </a14:hiddenFill>
+            </a:ext>
+            <a:ext uri="{91240B29-F687-4f45-9708-019B960494DF}">
+              <a14:hiddenLine xmlns:a14="http://schemas.microsoft.com/office/drawing/2010/main" w="9525">
+                <a:solidFill>
+                  <a:srgbClr val="000000"/>
+                </a:solidFill>
+                <a:miter lim="800000"/>
+                <a:headEnd/>
+                <a:tailEnd/>
+              </a14:hiddenLine>
+            </a:ext>
+          </a:extLst>
+        </p:spPr>
+        <p:txBody>
+          <a:bodyPr wrap="square">
+            <a:spAutoFit/>
+          </a:bodyPr>
           <a:lstStyle/>
           <a:p>
             <a:r>
-              <a:rPr lang="en-US" dirty="0" smtClean="0"/>
-              <a:t>Pilot-Jobs provide an abstraction for dynamic resource management. Currently abstraction is job based, but can be extended to include network and storage as other resource elements</a:t>
-            </a:r>
-          </a:p>
-          <a:p>
-            <a:r>
-              <a:rPr lang="en-US" dirty="0" smtClean="0"/>
-              <a:t>P</a:t>
-            </a:r>
-            <a:r>
-              <a:rPr lang="en-US" dirty="0"/>
-              <a:t>* is a conceptual model for </a:t>
-            </a:r>
-            <a:r>
-              <a:rPr lang="en-US" dirty="0" smtClean="0"/>
-              <a:t>Pilot-based resource</a:t>
-            </a:r>
-            <a:endParaRPr lang="en-US" dirty="0"/>
+              <a:rPr lang="en-US" sz="1400" dirty="0"/>
+              <a:t>“P*: A Model of Pilot-Abstractions”, </a:t>
+            </a:r>
+            <a:r>
+              <a:rPr lang="en-US" sz="1400" i="1" dirty="0"/>
+              <a:t>8th IEEE International Conference on e-Science 2012</a:t>
+            </a:r>
+            <a:r>
+              <a:rPr lang="en-US" sz="1400" dirty="0"/>
+              <a:t>, 2012</a:t>
+            </a:r>
           </a:p>
         </p:txBody>
       </p:sp>
     </p:spTree>
     <p:extLst>
       <p:ext uri="{BB962C8B-B14F-4D97-AF65-F5344CB8AC3E}">
-        <p14:creationId xmlns:p14="http://schemas.microsoft.com/office/powerpoint/2010/main" val="2772051994"/>
+        <p14:creationId xmlns:p14="http://schemas.microsoft.com/office/powerpoint/2010/main" val="2326881319"/>
       </p:ext>
     </p:extLst>
   </p:cSld>
   <p:clrMapOvr>
     <a:masterClrMapping/>
   </p:clrMapOvr>
+  <p:timing>
+    <p:tnLst>
+      <p:par>
+        <p:cTn xmlns:p14="http://schemas.microsoft.com/office/powerpoint/2010/main" id="1" dur="indefinite" restart="never" nodeType="tmRoot"/>
+      </p:par>
+    </p:tnLst>
+  </p:timing>
 </p:sld>
 </file>
 
@@ -5629,14 +6678,333 @@
           </a:p>
         </p:txBody>
       </p:sp>
+      <p:sp>
+        <p:nvSpPr>
+          <p:cNvPr id="3" name="Content Placeholder 2"/>
+          <p:cNvSpPr>
+            <a:spLocks noGrp="1"/>
+          </p:cNvSpPr>
+          <p:nvPr>
+            <p:ph sz="half" idx="2"/>
+          </p:nvPr>
+        </p:nvSpPr>
+        <p:spPr>
+          <a:xfrm>
+            <a:off x="282231" y="1176421"/>
+            <a:ext cx="4279074" cy="4533900"/>
+          </a:xfrm>
+        </p:spPr>
+        <p:txBody>
+          <a:bodyPr/>
+          <a:lstStyle/>
+          <a:p>
+            <a:r>
+              <a:rPr lang="en-US" sz="2000" dirty="0" smtClean="0"/>
+              <a:t>P*: Decouples dynamic resource management from job and task management</a:t>
+            </a:r>
+          </a:p>
+          <a:p>
+            <a:r>
+              <a:rPr lang="en-US" sz="2000" dirty="0" smtClean="0"/>
+              <a:t>F*: Resource aggregation and provisioning decoupled from job and resource management</a:t>
+            </a:r>
+          </a:p>
+          <a:p>
+            <a:pPr lvl="1"/>
+            <a:r>
+              <a:rPr lang="en-US" sz="1800" dirty="0" smtClean="0"/>
+              <a:t>Furthers the separation of concerns</a:t>
+            </a:r>
+          </a:p>
+          <a:p>
+            <a:r>
+              <a:rPr lang="en-US" sz="2000" dirty="0" smtClean="0"/>
+              <a:t>C* provides, F</a:t>
+            </a:r>
+            <a:r>
+              <a:rPr lang="en-US" sz="2000" dirty="0"/>
+              <a:t>* </a:t>
+            </a:r>
+            <a:r>
+              <a:rPr lang="en-US" sz="2000" dirty="0" smtClean="0"/>
+              <a:t>decides</a:t>
+            </a:r>
+            <a:r>
+              <a:rPr lang="en-US" sz="2000" dirty="0"/>
+              <a:t>, P* </a:t>
+            </a:r>
+            <a:r>
+              <a:rPr lang="en-US" sz="2000" dirty="0" smtClean="0"/>
+              <a:t>executes</a:t>
+            </a:r>
+          </a:p>
+          <a:p>
+            <a:r>
+              <a:rPr lang="en-US" sz="2000" dirty="0" smtClean="0"/>
+              <a:t>Federate at the capability level</a:t>
+            </a:r>
+          </a:p>
+          <a:p>
+            <a:r>
+              <a:rPr lang="en-US" sz="2000" dirty="0" smtClean="0"/>
+              <a:t>P* creates the overlay at the resource level</a:t>
+            </a:r>
+            <a:endParaRPr lang="en-US" sz="2000" dirty="0"/>
+          </a:p>
+          <a:p>
+            <a:endParaRPr lang="en-US" sz="2000" dirty="0"/>
+          </a:p>
+        </p:txBody>
+      </p:sp>
       <p:pic>
         <p:nvPicPr>
-          <p:cNvPr id="4" name="Content Placeholder 3" descr="ngmw-schematic-3.png"/>
+          <p:cNvPr id="6" name="ngmw-schematic-A1.png">
+            <a:hlinkClick r:id="" action="ppaction://media"/>
+          </p:cNvPr>
           <p:cNvPicPr>
             <a:picLocks noGrp="1" noChangeAspect="1"/>
           </p:cNvPicPr>
           <p:nvPr>
-            <p:ph idx="1"/>
+            <p:ph sz="half" idx="1"/>
+            <a:videoFile r:link="rId2"/>
+            <p:extLst>
+              <p:ext uri="{DAA4B4D4-6D71-4841-9C94-3DE7FCFB9230}">
+                <p14:media xmlns:p14="http://schemas.microsoft.com/office/powerpoint/2010/main" r:embed="rId1"/>
+              </p:ext>
+            </p:extLst>
+          </p:nvPr>
+        </p:nvPicPr>
+        <p:blipFill>
+          <a:blip r:embed="rId5"/>
+          <a:stretch>
+            <a:fillRect/>
+          </a:stretch>
+        </p:blipFill>
+        <p:spPr>
+          <a:xfrm>
+            <a:off x="4691063" y="712805"/>
+            <a:ext cx="4188345" cy="5028127"/>
+          </a:xfrm>
+        </p:spPr>
+      </p:pic>
+    </p:spTree>
+    <p:extLst>
+      <p:ext uri="{BB962C8B-B14F-4D97-AF65-F5344CB8AC3E}">
+        <p14:creationId xmlns:p14="http://schemas.microsoft.com/office/powerpoint/2010/main" val="3505105283"/>
+      </p:ext>
+    </p:extLst>
+  </p:cSld>
+  <p:clrMapOvr>
+    <a:masterClrMapping/>
+  </p:clrMapOvr>
+  <p:timing>
+    <p:tnLst>
+      <p:par>
+        <p:cTn xmlns:p14="http://schemas.microsoft.com/office/powerpoint/2010/main" id="1" dur="indefinite" restart="never" nodeType="tmRoot">
+          <p:childTnLst>
+            <p:seq concurrent="1" nextAc="seek">
+              <p:cTn id="2" restart="whenNotActive" fill="hold" evtFilter="cancelBubble" nodeType="interactiveSeq">
+                <p:stCondLst>
+                  <p:cond evt="onClick" delay="0">
+                    <p:tgtEl>
+                      <p:spTgt spid="6"/>
+                    </p:tgtEl>
+                  </p:cond>
+                </p:stCondLst>
+                <p:endSync evt="end" delay="0">
+                  <p:rtn val="all"/>
+                </p:endSync>
+                <p:childTnLst>
+                  <p:par>
+                    <p:cTn id="3" fill="hold">
+                      <p:stCondLst>
+                        <p:cond delay="0"/>
+                      </p:stCondLst>
+                      <p:childTnLst>
+                        <p:par>
+                          <p:cTn id="4" fill="hold">
+                            <p:stCondLst>
+                              <p:cond delay="0"/>
+                            </p:stCondLst>
+                            <p:childTnLst>
+                              <p:par>
+                                <p:cTn id="5" presetID="2" presetClass="mediacall" presetSubtype="0" fill="hold" nodeType="clickEffect">
+                                  <p:stCondLst>
+                                    <p:cond delay="0"/>
+                                  </p:stCondLst>
+                                  <p:childTnLst>
+                                    <p:cmd type="call" cmd="togglePause">
+                                      <p:cBhvr>
+                                        <p:cTn id="6" dur="1" fill="hold"/>
+                                        <p:tgtEl>
+                                          <p:spTgt spid="6"/>
+                                        </p:tgtEl>
+                                      </p:cBhvr>
+                                    </p:cmd>
+                                  </p:childTnLst>
+                                </p:cTn>
+                              </p:par>
+                            </p:childTnLst>
+                          </p:cTn>
+                        </p:par>
+                      </p:childTnLst>
+                    </p:cTn>
+                  </p:par>
+                </p:childTnLst>
+              </p:cTn>
+              <p:nextCondLst>
+                <p:cond evt="onClick" delay="0">
+                  <p:tgtEl>
+                    <p:spTgt spid="6"/>
+                  </p:tgtEl>
+                </p:cond>
+              </p:nextCondLst>
+            </p:seq>
+            <p:video>
+              <p:cMediaNode vol="80000">
+                <p:cTn id="7" fill="hold" display="0">
+                  <p:stCondLst>
+                    <p:cond delay="indefinite"/>
+                  </p:stCondLst>
+                </p:cTn>
+                <p:tgtEl>
+                  <p:spTgt spid="6"/>
+                </p:tgtEl>
+              </p:cMediaNode>
+            </p:video>
+          </p:childTnLst>
+        </p:cTn>
+      </p:par>
+    </p:tnLst>
+  </p:timing>
+</p:sld>
+</file>
+
+<file path=ppt/slides/slide18.xml><?xml version="1.0" encoding="utf-8"?>
+<p:sld xmlns:a="http://schemas.openxmlformats.org/drawingml/2006/main" xmlns:r="http://schemas.openxmlformats.org/officeDocument/2006/relationships" xmlns:p="http://schemas.openxmlformats.org/presentationml/2006/main">
+  <p:cSld>
+    <p:spTree>
+      <p:nvGrpSpPr>
+        <p:cNvPr id="1" name=""/>
+        <p:cNvGrpSpPr/>
+        <p:nvPr/>
+      </p:nvGrpSpPr>
+      <p:grpSpPr>
+        <a:xfrm>
+          <a:off x="0" y="0"/>
+          <a:ext cx="0" cy="0"/>
+          <a:chOff x="0" y="0"/>
+          <a:chExt cx="0" cy="0"/>
+        </a:xfrm>
+      </p:grpSpPr>
+      <p:sp>
+        <p:nvSpPr>
+          <p:cNvPr id="2" name="Title 1"/>
+          <p:cNvSpPr>
+            <a:spLocks noGrp="1"/>
+          </p:cNvSpPr>
+          <p:nvPr>
+            <p:ph type="title"/>
+          </p:nvPr>
+        </p:nvSpPr>
+        <p:spPr/>
+        <p:txBody>
+          <a:bodyPr/>
+          <a:lstStyle/>
+          <a:p>
+            <a:r>
+              <a:rPr lang="en-US" dirty="0" smtClean="0"/>
+              <a:t>Design </a:t>
+            </a:r>
+            <a:r>
+              <a:rPr lang="en-US" dirty="0" err="1" smtClean="0"/>
+              <a:t>Obj</a:t>
+            </a:r>
+            <a:r>
+              <a:rPr lang="en-US" dirty="0" smtClean="0"/>
+              <a:t>: Multi-level and Integrated Reasoning</a:t>
+            </a:r>
+            <a:endParaRPr lang="en-US" dirty="0"/>
+          </a:p>
+        </p:txBody>
+      </p:sp>
+      <p:sp>
+        <p:nvSpPr>
+          <p:cNvPr id="3" name="Content Placeholder 2"/>
+          <p:cNvSpPr>
+            <a:spLocks noGrp="1"/>
+          </p:cNvSpPr>
+          <p:nvPr>
+            <p:ph sz="half" idx="2"/>
+          </p:nvPr>
+        </p:nvSpPr>
+        <p:spPr>
+          <a:xfrm>
+            <a:off x="282231" y="1176421"/>
+            <a:ext cx="4279074" cy="4533900"/>
+          </a:xfrm>
+        </p:spPr>
+        <p:txBody>
+          <a:bodyPr/>
+          <a:lstStyle/>
+          <a:p>
+            <a:r>
+              <a:rPr lang="en-US" sz="2000" dirty="0"/>
+              <a:t>Transformation of Application workload via system workload to Infrastructure capability</a:t>
+            </a:r>
+          </a:p>
+          <a:p>
+            <a:r>
+              <a:rPr lang="en-US" sz="2000" dirty="0" smtClean="0"/>
+              <a:t>Application requests R(100, T,10), say 100 tasks, of type T, complete within 10 units of time</a:t>
+            </a:r>
+          </a:p>
+          <a:p>
+            <a:r>
+              <a:rPr lang="en-US" sz="2000" dirty="0" smtClean="0"/>
+              <a:t>Federation Layer/Manager responds with collective capability of C(50, T, 10) or C(100, T, 20)</a:t>
+            </a:r>
+          </a:p>
+          <a:p>
+            <a:r>
+              <a:rPr lang="en-US" sz="2000" dirty="0" smtClean="0"/>
+              <a:t>Adaptive Application</a:t>
+            </a:r>
+          </a:p>
+          <a:p>
+            <a:pPr lvl="1"/>
+            <a:r>
+              <a:rPr lang="en-US" sz="1600" dirty="0" smtClean="0"/>
+              <a:t>Response can be either at A, W level</a:t>
+            </a:r>
+          </a:p>
+          <a:p>
+            <a:pPr lvl="1"/>
+            <a:r>
+              <a:rPr lang="en-US" sz="1600" dirty="0" smtClean="0"/>
+              <a:t>Application may self-throttle number of tasks generated</a:t>
+            </a:r>
+          </a:p>
+          <a:p>
+            <a:pPr lvl="1"/>
+            <a:r>
+              <a:rPr lang="en-US" sz="1600" dirty="0" smtClean="0"/>
+              <a:t>Or workload description can be changed to meet the capability</a:t>
+            </a:r>
+          </a:p>
+          <a:p>
+            <a:endParaRPr lang="en-US" sz="2000" dirty="0" smtClean="0"/>
+          </a:p>
+        </p:txBody>
+      </p:sp>
+      <p:pic>
+        <p:nvPicPr>
+          <p:cNvPr id="5" name="Content Placeholder 4" descr="ngmw-schematic-A2.png"/>
+          <p:cNvPicPr>
+            <a:picLocks noGrp="1" noChangeAspect="1"/>
+          </p:cNvPicPr>
+          <p:nvPr>
+            <p:ph sz="half" idx="1"/>
           </p:nvPr>
         </p:nvPicPr>
         <p:blipFill>
@@ -5647,27 +7015,39 @@
               </a:ext>
             </a:extLst>
           </a:blip>
-          <a:srcRect l="-43785" r="-43785"/>
+          <a:srcRect t="3245" b="3245"/>
           <a:stretch>
             <a:fillRect/>
           </a:stretch>
         </p:blipFill>
-        <p:spPr/>
+        <p:spPr>
+          <a:xfrm>
+            <a:off x="4721225" y="1336675"/>
+            <a:ext cx="4038600" cy="4533900"/>
+          </a:xfrm>
+        </p:spPr>
       </p:pic>
     </p:spTree>
     <p:extLst>
       <p:ext uri="{BB962C8B-B14F-4D97-AF65-F5344CB8AC3E}">
-        <p14:creationId xmlns:p14="http://schemas.microsoft.com/office/powerpoint/2010/main" val="449869100"/>
+        <p14:creationId xmlns:p14="http://schemas.microsoft.com/office/powerpoint/2010/main" val="1258356087"/>
       </p:ext>
     </p:extLst>
   </p:cSld>
   <p:clrMapOvr>
     <a:masterClrMapping/>
   </p:clrMapOvr>
+  <p:timing>
+    <p:tnLst>
+      <p:par>
+        <p:cTn xmlns:p14="http://schemas.microsoft.com/office/powerpoint/2010/main" id="1" dur="indefinite" restart="never" nodeType="tmRoot"/>
+      </p:par>
+    </p:tnLst>
+  </p:timing>
 </p:sld>
 </file>
 
-<file path=ppt/slides/slide18.xml><?xml version="1.0" encoding="utf-8"?>
+<file path=ppt/slides/slide19.xml><?xml version="1.0" encoding="utf-8"?>
 <p:sld xmlns:a="http://schemas.openxmlformats.org/drawingml/2006/main" xmlns:r="http://schemas.openxmlformats.org/officeDocument/2006/relationships" xmlns:p="http://schemas.openxmlformats.org/presentationml/2006/main">
   <p:cSld>
     <p:spTree>
@@ -5745,466 +7125,6 @@
 </p:sld>
 </file>
 
-<file path=ppt/slides/slide19.xml><?xml version="1.0" encoding="utf-8"?>
-<p:sld xmlns:a="http://schemas.openxmlformats.org/drawingml/2006/main" xmlns:r="http://schemas.openxmlformats.org/officeDocument/2006/relationships" xmlns:p="http://schemas.openxmlformats.org/presentationml/2006/main">
-  <p:cSld>
-    <p:spTree>
-      <p:nvGrpSpPr>
-        <p:cNvPr id="1" name=""/>
-        <p:cNvGrpSpPr/>
-        <p:nvPr/>
-      </p:nvGrpSpPr>
-      <p:grpSpPr>
-        <a:xfrm>
-          <a:off x="0" y="0"/>
-          <a:ext cx="0" cy="0"/>
-          <a:chOff x="0" y="0"/>
-          <a:chExt cx="0" cy="0"/>
-        </a:xfrm>
-      </p:grpSpPr>
-      <p:sp>
-        <p:nvSpPr>
-          <p:cNvPr id="2" name="Title 1"/>
-          <p:cNvSpPr>
-            <a:spLocks noGrp="1"/>
-          </p:cNvSpPr>
-          <p:nvPr>
-            <p:ph type="title"/>
-          </p:nvPr>
-        </p:nvSpPr>
-        <p:spPr/>
-        <p:txBody>
-          <a:bodyPr/>
-          <a:lstStyle/>
-          <a:p>
-            <a:r>
-              <a:rPr lang="en-US" dirty="0" smtClean="0"/>
-              <a:t>NGMW: Interaction of Models and Simulation</a:t>
-            </a:r>
-            <a:endParaRPr lang="en-US" dirty="0"/>
-          </a:p>
-        </p:txBody>
-      </p:sp>
-      <p:sp>
-        <p:nvSpPr>
-          <p:cNvPr id="3" name="Shape 72"/>
-          <p:cNvSpPr txBox="1">
-            <a:spLocks/>
-          </p:cNvSpPr>
-          <p:nvPr/>
-        </p:nvSpPr>
-        <p:spPr bwMode="auto">
-          <a:xfrm>
-            <a:off x="282231" y="786259"/>
-            <a:ext cx="8596312" cy="5281613"/>
-          </a:xfrm>
-          <a:prstGeom prst="rect">
-            <a:avLst/>
-          </a:prstGeom>
-          <a:noFill/>
-          <a:ln>
-            <a:noFill/>
-          </a:ln>
-          <a:extLst>
-            <a:ext uri="{909E8E84-426E-40dd-AFC4-6F175D3DCCD1}">
-              <a14:hiddenFill xmlns:a14="http://schemas.microsoft.com/office/drawing/2010/main">
-                <a:solidFill>
-                  <a:srgbClr val="FFFFFF"/>
-                </a:solidFill>
-              </a14:hiddenFill>
-            </a:ext>
-            <a:ext uri="{91240B29-F687-4f45-9708-019B960494DF}">
-              <a14:hiddenLine xmlns:a14="http://schemas.microsoft.com/office/drawing/2010/main" w="9525">
-                <a:solidFill>
-                  <a:srgbClr val="000000"/>
-                </a:solidFill>
-                <a:miter lim="800000"/>
-                <a:headEnd/>
-                <a:tailEnd/>
-              </a14:hiddenLine>
-            </a:ext>
-            <a:ext uri="{FAA26D3D-D897-4be2-8F04-BA451C77F1D7}">
-              <ma14:placeholderFlag xmlns:ma14="http://schemas.microsoft.com/office/mac/drawingml/2011/main" val="1"/>
-            </a:ext>
-          </a:extLst>
-        </p:spPr>
-        <p:txBody>
-          <a:bodyPr vert="horz" wrap="square" lIns="91425" tIns="91425" rIns="91425" bIns="91425" numCol="1" anchor="t" anchorCtr="0" compatLnSpc="1">
-            <a:prstTxWarp prst="textNoShape">
-              <a:avLst/>
-            </a:prstTxWarp>
-            <a:noAutofit/>
-          </a:bodyPr>
-          <a:lstStyle>
-            <a:lvl1pPr marL="227013" indent="-227013" algn="l" rtl="0" eaLnBrk="0" fontAlgn="base" hangingPunct="0">
-              <a:spcBef>
-                <a:spcPts val="1200"/>
-              </a:spcBef>
-              <a:spcAft>
-                <a:spcPct val="0"/>
-              </a:spcAft>
-              <a:buClr>
-                <a:schemeClr val="tx1">
-                  <a:lumMod val="95000"/>
-                  <a:lumOff val="5000"/>
-                </a:schemeClr>
-              </a:buClr>
-              <a:buChar char="•"/>
-              <a:tabLst/>
-              <a:defRPr sz="2000">
-                <a:solidFill>
-                  <a:schemeClr val="tx1">
-                    <a:lumMod val="95000"/>
-                    <a:lumOff val="5000"/>
-                  </a:schemeClr>
-                </a:solidFill>
-                <a:latin typeface="+mn-lt"/>
-                <a:ea typeface="ＭＳ Ｐゴシック" charset="-128"/>
-                <a:cs typeface="ＭＳ Ｐゴシック" charset="-128"/>
-              </a:defRPr>
-            </a:lvl1pPr>
-            <a:lvl2pPr marL="682625" indent="-225425" algn="l" rtl="0" eaLnBrk="0" fontAlgn="base" hangingPunct="0">
-              <a:spcBef>
-                <a:spcPct val="20000"/>
-              </a:spcBef>
-              <a:spcAft>
-                <a:spcPct val="0"/>
-              </a:spcAft>
-              <a:buClr>
-                <a:schemeClr val="tx1">
-                  <a:lumMod val="95000"/>
-                  <a:lumOff val="5000"/>
-                </a:schemeClr>
-              </a:buClr>
-              <a:buChar char="–"/>
-              <a:defRPr sz="1800">
-                <a:solidFill>
-                  <a:srgbClr val="5F5F5F"/>
-                </a:solidFill>
-                <a:latin typeface="+mn-lt"/>
-                <a:ea typeface="ＭＳ Ｐゴシック" charset="-128"/>
-              </a:defRPr>
-            </a:lvl2pPr>
-            <a:lvl3pPr marL="1090613" indent="-176213" algn="l" rtl="0" eaLnBrk="0" fontAlgn="base" hangingPunct="0">
-              <a:spcBef>
-                <a:spcPct val="20000"/>
-              </a:spcBef>
-              <a:spcAft>
-                <a:spcPct val="0"/>
-              </a:spcAft>
-              <a:buClr>
-                <a:schemeClr val="tx1">
-                  <a:lumMod val="95000"/>
-                  <a:lumOff val="5000"/>
-                </a:schemeClr>
-              </a:buClr>
-              <a:buChar char="•"/>
-              <a:defRPr sz="1800">
-                <a:solidFill>
-                  <a:srgbClr val="5F5F5F"/>
-                </a:solidFill>
-                <a:latin typeface="+mn-lt"/>
-                <a:ea typeface="ＭＳ Ｐゴシック" charset="-128"/>
-              </a:defRPr>
-            </a:lvl3pPr>
-            <a:lvl4pPr marL="1600200" indent="-228600" algn="l" rtl="0" eaLnBrk="0" fontAlgn="base" hangingPunct="0">
-              <a:spcBef>
-                <a:spcPct val="20000"/>
-              </a:spcBef>
-              <a:spcAft>
-                <a:spcPct val="0"/>
-              </a:spcAft>
-              <a:buClr>
-                <a:schemeClr val="tx1">
-                  <a:lumMod val="95000"/>
-                  <a:lumOff val="5000"/>
-                </a:schemeClr>
-              </a:buClr>
-              <a:buChar char="–"/>
-              <a:defRPr sz="1800">
-                <a:solidFill>
-                  <a:srgbClr val="5F5F5F"/>
-                </a:solidFill>
-                <a:latin typeface="+mn-lt"/>
-                <a:ea typeface="ＭＳ Ｐゴシック" charset="-128"/>
-              </a:defRPr>
-            </a:lvl4pPr>
-            <a:lvl5pPr marL="2000250" indent="-171450" algn="l" rtl="0" eaLnBrk="0" fontAlgn="base" hangingPunct="0">
-              <a:spcBef>
-                <a:spcPct val="20000"/>
-              </a:spcBef>
-              <a:spcAft>
-                <a:spcPct val="0"/>
-              </a:spcAft>
-              <a:buClr>
-                <a:schemeClr val="tx1">
-                  <a:lumMod val="95000"/>
-                  <a:lumOff val="5000"/>
-                </a:schemeClr>
-              </a:buClr>
-              <a:buChar char="»"/>
-              <a:defRPr sz="1800">
-                <a:solidFill>
-                  <a:srgbClr val="5F5F5F"/>
-                </a:solidFill>
-                <a:latin typeface="+mn-lt"/>
-                <a:ea typeface="ＭＳ Ｐゴシック" charset="-128"/>
-              </a:defRPr>
-            </a:lvl5pPr>
-            <a:lvl6pPr marL="2514600" indent="-228600" algn="l" rtl="0" fontAlgn="base">
-              <a:spcBef>
-                <a:spcPct val="20000"/>
-              </a:spcBef>
-              <a:spcAft>
-                <a:spcPct val="0"/>
-              </a:spcAft>
-              <a:buChar char="»"/>
-              <a:defRPr sz="1400">
-                <a:solidFill>
-                  <a:srgbClr val="5F5F5F"/>
-                </a:solidFill>
-                <a:latin typeface="+mn-lt"/>
-                <a:ea typeface="ＭＳ Ｐゴシック" charset="-128"/>
-              </a:defRPr>
-            </a:lvl6pPr>
-            <a:lvl7pPr marL="2971800" indent="-228600" algn="l" rtl="0" fontAlgn="base">
-              <a:spcBef>
-                <a:spcPct val="20000"/>
-              </a:spcBef>
-              <a:spcAft>
-                <a:spcPct val="0"/>
-              </a:spcAft>
-              <a:buChar char="»"/>
-              <a:defRPr sz="1400">
-                <a:solidFill>
-                  <a:srgbClr val="5F5F5F"/>
-                </a:solidFill>
-                <a:latin typeface="+mn-lt"/>
-                <a:ea typeface="ＭＳ Ｐゴシック" charset="-128"/>
-              </a:defRPr>
-            </a:lvl7pPr>
-            <a:lvl8pPr marL="3429000" indent="-228600" algn="l" rtl="0" fontAlgn="base">
-              <a:spcBef>
-                <a:spcPct val="20000"/>
-              </a:spcBef>
-              <a:spcAft>
-                <a:spcPct val="0"/>
-              </a:spcAft>
-              <a:buChar char="»"/>
-              <a:defRPr sz="1400">
-                <a:solidFill>
-                  <a:srgbClr val="5F5F5F"/>
-                </a:solidFill>
-                <a:latin typeface="+mn-lt"/>
-                <a:ea typeface="ＭＳ Ｐゴシック" charset="-128"/>
-              </a:defRPr>
-            </a:lvl8pPr>
-            <a:lvl9pPr marL="3886200" indent="-228600" algn="l" rtl="0" fontAlgn="base">
-              <a:spcBef>
-                <a:spcPct val="20000"/>
-              </a:spcBef>
-              <a:spcAft>
-                <a:spcPct val="0"/>
-              </a:spcAft>
-              <a:buChar char="»"/>
-              <a:defRPr sz="1400">
-                <a:solidFill>
-                  <a:srgbClr val="5F5F5F"/>
-                </a:solidFill>
-                <a:latin typeface="+mn-lt"/>
-                <a:ea typeface="ＭＳ Ｐゴシック" charset="-128"/>
-              </a:defRPr>
-            </a:lvl9pPr>
-          </a:lstStyle>
-          <a:p>
-            <a:pPr marL="344488" indent="-342900"/>
-            <a:r>
-              <a:rPr lang="en-US" dirty="0" smtClean="0"/>
-              <a:t>Interaction between Models:</a:t>
-            </a:r>
-          </a:p>
-          <a:p>
-            <a:pPr marL="800100" lvl="1" indent="-342900"/>
-            <a:r>
-              <a:rPr lang="en-US" dirty="0" smtClean="0"/>
-              <a:t>[</a:t>
-            </a:r>
-            <a:r>
-              <a:rPr lang="en-US" dirty="0"/>
-              <a:t>A*, W* ] and [P*, F*]</a:t>
-            </a:r>
-          </a:p>
-          <a:p>
-            <a:pPr marL="1208088" lvl="2" indent="-342900"/>
-            <a:r>
-              <a:rPr lang="en-US" dirty="0"/>
-              <a:t>Here A* is a conceptual model, and W* is an analytical model</a:t>
-            </a:r>
-          </a:p>
-          <a:p>
-            <a:pPr marL="1208088" lvl="2" indent="-342900"/>
-            <a:r>
-              <a:rPr lang="en-US" dirty="0" smtClean="0"/>
-              <a:t>A </a:t>
-            </a:r>
-            <a:r>
-              <a:rPr lang="en-US" dirty="0"/>
-              <a:t>specific instance of A*, is subject to a transformation </a:t>
-            </a:r>
-            <a:r>
-              <a:rPr lang="en-US" b="1" dirty="0">
-                <a:ln w="12700">
-                  <a:solidFill>
-                    <a:schemeClr val="tx2">
-                      <a:satMod val="155000"/>
-                    </a:schemeClr>
-                  </a:solidFill>
-                  <a:prstDash val="solid"/>
-                </a:ln>
-                <a:solidFill>
-                  <a:schemeClr val="bg2">
-                    <a:tint val="85000"/>
-                    <a:satMod val="155000"/>
-                  </a:schemeClr>
-                </a:solidFill>
-                <a:effectLst>
-                  <a:outerShdw blurRad="41275" dist="20320" dir="1800000" algn="tl" rotWithShape="0">
-                    <a:srgbClr val="000000">
-                      <a:alpha val="40000"/>
-                    </a:srgbClr>
-                  </a:outerShdw>
-                </a:effectLst>
-              </a:rPr>
-              <a:t>W</a:t>
-            </a:r>
-            <a:r>
-              <a:rPr lang="en-US" dirty="0"/>
-              <a:t> which converts into executable units </a:t>
-            </a:r>
-            <a:r>
-              <a:rPr lang="en-US" dirty="0" smtClean="0"/>
-              <a:t>(per W*) that </a:t>
-            </a:r>
-            <a:r>
-              <a:rPr lang="en-US" dirty="0"/>
-              <a:t>have performance requirements</a:t>
-            </a:r>
-          </a:p>
-          <a:p>
-            <a:pPr marL="1208088" lvl="2" indent="-342900"/>
-            <a:r>
-              <a:rPr lang="en-US" dirty="0" smtClean="0"/>
-              <a:t>Infrastructure modeled as I*, capability is exposed and federated per F*</a:t>
-            </a:r>
-          </a:p>
-          <a:p>
-            <a:pPr marL="1208088" lvl="2" indent="-342900"/>
-            <a:r>
-              <a:rPr lang="en-US" dirty="0" smtClean="0"/>
-              <a:t>I</a:t>
-            </a:r>
-            <a:r>
-              <a:rPr lang="en-US" dirty="0"/>
-              <a:t>* </a:t>
-            </a:r>
-            <a:r>
-              <a:rPr lang="en-US" dirty="0" smtClean="0"/>
-              <a:t>subject </a:t>
-            </a:r>
-            <a:r>
-              <a:rPr lang="en-US" dirty="0"/>
-              <a:t>to a transformation </a:t>
-            </a:r>
-            <a:r>
-              <a:rPr lang="en-US" b="1" dirty="0" smtClean="0">
-                <a:ln w="12700">
-                  <a:solidFill>
-                    <a:schemeClr val="tx2">
-                      <a:satMod val="155000"/>
-                    </a:schemeClr>
-                  </a:solidFill>
-                  <a:prstDash val="solid"/>
-                </a:ln>
-                <a:solidFill>
-                  <a:schemeClr val="bg2">
-                    <a:tint val="85000"/>
-                    <a:satMod val="155000"/>
-                  </a:schemeClr>
-                </a:solidFill>
-                <a:effectLst>
-                  <a:outerShdw blurRad="41275" dist="20320" dir="1800000" algn="tl" rotWithShape="0">
-                    <a:srgbClr val="000000">
-                      <a:alpha val="40000"/>
-                    </a:srgbClr>
-                  </a:outerShdw>
-                </a:effectLst>
-              </a:rPr>
-              <a:t>F </a:t>
-            </a:r>
-            <a:r>
-              <a:rPr lang="en-US" dirty="0" smtClean="0"/>
-              <a:t>(</a:t>
-            </a:r>
-            <a:r>
-              <a:rPr lang="en-US" dirty="0"/>
-              <a:t>aggregation of resources per F*</a:t>
-            </a:r>
-            <a:r>
-              <a:rPr lang="en-US" dirty="0" smtClean="0"/>
-              <a:t>) to provide a federated capability</a:t>
-            </a:r>
-            <a:endParaRPr lang="en-US" dirty="0"/>
-          </a:p>
-          <a:p>
-            <a:pPr marL="344488" indent="-342900"/>
-            <a:r>
-              <a:rPr lang="en-US" sz="2000" dirty="0" smtClean="0"/>
-              <a:t>Role of Simulation</a:t>
-            </a:r>
-          </a:p>
-          <a:p>
-            <a:pPr marL="800100" lvl="1" indent="-342900"/>
-            <a:r>
-              <a:rPr lang="en-US" sz="1800" dirty="0" smtClean="0"/>
-              <a:t>If we federate a given set of resources {I} what is the performance we expect?</a:t>
-            </a:r>
-          </a:p>
-          <a:p>
-            <a:pPr marL="800100" lvl="1" indent="-342900"/>
-            <a:r>
-              <a:rPr lang="en-US" dirty="0" smtClean="0"/>
-              <a:t>If we want a capability [C], what is the set of resources {I} we need to federate to get  this [C] with well-defined probability distribution?</a:t>
-            </a:r>
-          </a:p>
-          <a:p>
-            <a:pPr marL="800100" lvl="1" indent="-342900"/>
-            <a:r>
-              <a:rPr lang="en-US" sz="1800" dirty="0" smtClean="0"/>
-              <a:t>Given an instance of an application (model), what is the workload  independent of the underlying resources?</a:t>
-            </a:r>
-          </a:p>
-        </p:txBody>
-      </p:sp>
-    </p:spTree>
-    <p:extLst>
-      <p:ext uri="{BB962C8B-B14F-4D97-AF65-F5344CB8AC3E}">
-        <p14:creationId xmlns:p14="http://schemas.microsoft.com/office/powerpoint/2010/main" val="1704466999"/>
-      </p:ext>
-    </p:extLst>
-  </p:cSld>
-  <p:clrMapOvr>
-    <a:masterClrMapping/>
-  </p:clrMapOvr>
-  <p:timing>
-    <p:tnLst>
-      <p:par>
-        <p:cTn xmlns:p14="http://schemas.microsoft.com/office/powerpoint/2010/main" id="1" dur="indefinite" restart="never" nodeType="tmRoot"/>
-      </p:par>
-    </p:tnLst>
-  </p:timing>
-</p:sld>
-</file>
-
 <file path=ppt/slides/slide2.xml><?xml version="1.0" encoding="utf-8"?>
 <p:sld xmlns:a="http://schemas.openxmlformats.org/drawingml/2006/main" xmlns:r="http://schemas.openxmlformats.org/officeDocument/2006/relationships" xmlns:p="http://schemas.openxmlformats.org/presentationml/2006/main">
   <p:cSld>
@@ -6651,7 +7571,7 @@
       </p:grpSpPr>
       <p:sp>
         <p:nvSpPr>
-          <p:cNvPr id="58369" name="Title 1"/>
+          <p:cNvPr id="2" name="Title 1"/>
           <p:cNvSpPr>
             <a:spLocks noGrp="1"/>
           </p:cNvSpPr>
@@ -6659,231 +7579,158 @@
             <p:ph type="title"/>
           </p:nvPr>
         </p:nvSpPr>
-        <p:spPr/>
+        <p:spPr>
+          <a:xfrm>
+            <a:off x="282231" y="75986"/>
+            <a:ext cx="8741453" cy="690291"/>
+          </a:xfrm>
+        </p:spPr>
         <p:txBody>
           <a:bodyPr/>
           <a:lstStyle/>
           <a:p>
             <a:r>
-              <a:rPr lang="en-US" dirty="0" smtClean="0">
-                <a:latin typeface="Arial" charset="0"/>
-                <a:ea typeface="ＭＳ Ｐゴシック" charset="0"/>
-                <a:cs typeface="ＭＳ Ｐゴシック" charset="0"/>
-              </a:rPr>
-              <a:t>Mapping Tasks to Resources</a:t>
-            </a:r>
-            <a:endParaRPr lang="en-US" dirty="0">
-              <a:latin typeface="Arial" charset="0"/>
-              <a:ea typeface="ＭＳ Ｐゴシック" charset="0"/>
-              <a:cs typeface="ＭＳ Ｐゴシック" charset="0"/>
-            </a:endParaRPr>
+              <a:rPr lang="en-US" sz="2800" dirty="0" smtClean="0"/>
+              <a:t>AIMES: Demonstration of Flexible Federation (SC’13)</a:t>
+            </a:r>
+            <a:endParaRPr lang="en-US" sz="2800" dirty="0"/>
           </a:p>
         </p:txBody>
       </p:sp>
       <p:sp>
         <p:nvSpPr>
-          <p:cNvPr id="58370" name="Content Placeholder 2"/>
+          <p:cNvPr id="3" name="Content Placeholder 2"/>
           <p:cNvSpPr>
             <a:spLocks noGrp="1"/>
           </p:cNvSpPr>
           <p:nvPr>
-            <p:ph idx="1"/>
+            <p:ph sz="half" idx="2"/>
           </p:nvPr>
         </p:nvSpPr>
-        <p:spPr/>
+        <p:spPr>
+          <a:xfrm>
+            <a:off x="160421" y="1176421"/>
+            <a:ext cx="4400884" cy="4533900"/>
+          </a:xfrm>
+        </p:spPr>
         <p:txBody>
           <a:bodyPr/>
           <a:lstStyle/>
           <a:p>
             <a:r>
-              <a:rPr lang="en-US" dirty="0">
-                <a:latin typeface="Arial" charset="0"/>
-                <a:ea typeface="ＭＳ Ｐゴシック" charset="0"/>
-                <a:cs typeface="ＭＳ Ｐゴシック" charset="0"/>
-              </a:rPr>
-              <a:t>Different aspects of mapping tasks to resources</a:t>
+              <a:rPr lang="en-US" sz="2000" dirty="0" smtClean="0"/>
+              <a:t>Application say Bag-of-Tasks </a:t>
             </a:r>
           </a:p>
           <a:p>
             <a:pPr lvl="1"/>
             <a:r>
-              <a:rPr lang="en-US" dirty="0" smtClean="0">
-                <a:latin typeface="Arial" charset="0"/>
-                <a:ea typeface="ＭＳ Ｐゴシック" charset="0"/>
-              </a:rPr>
-              <a:t>Optimal </a:t>
-            </a:r>
-            <a:r>
-              <a:rPr lang="en-US" dirty="0">
-                <a:latin typeface="Arial" charset="0"/>
-                <a:ea typeface="ＭＳ Ｐゴシック" charset="0"/>
-              </a:rPr>
-              <a:t>Characterization: Finding the optimal workload </a:t>
-            </a:r>
-            <a:r>
-              <a:rPr lang="en-US" dirty="0" smtClean="0">
-                <a:latin typeface="Arial" charset="0"/>
-                <a:ea typeface="ＭＳ Ｐゴシック" charset="0"/>
-              </a:rPr>
-              <a:t>characterization </a:t>
-            </a:r>
-            <a:r>
-              <a:rPr lang="en-US" dirty="0">
-                <a:latin typeface="Arial" charset="0"/>
-                <a:ea typeface="ＭＳ Ｐゴシック" charset="0"/>
-              </a:rPr>
-              <a:t>(of an application)</a:t>
-            </a:r>
-          </a:p>
-          <a:p>
-            <a:pPr lvl="2"/>
-            <a:r>
-              <a:rPr lang="en-US" dirty="0">
-                <a:latin typeface="Arial" charset="0"/>
-                <a:ea typeface="ＭＳ Ｐゴシック" charset="0"/>
-              </a:rPr>
-              <a:t>Generality versus specificity. Class of Applications versus Many application classes/types</a:t>
-            </a:r>
-          </a:p>
-          <a:p>
-            <a:pPr lvl="2"/>
-            <a:r>
-              <a:rPr lang="en-US" dirty="0">
-                <a:latin typeface="Arial" charset="0"/>
-                <a:ea typeface="ＭＳ Ｐゴシック" charset="0"/>
-              </a:rPr>
-              <a:t>Different applications have different </a:t>
-            </a:r>
-            <a:r>
-              <a:rPr lang="en-US" dirty="0" smtClean="0">
-                <a:latin typeface="Arial" charset="0"/>
-                <a:ea typeface="ＭＳ Ｐゴシック" charset="0"/>
-              </a:rPr>
-              <a:t>metrics</a:t>
-            </a:r>
-          </a:p>
-          <a:p>
-            <a:pPr lvl="2"/>
-            <a:endParaRPr lang="en-US" dirty="0">
-              <a:latin typeface="Arial" charset="0"/>
-              <a:ea typeface="ＭＳ Ｐゴシック" charset="0"/>
-            </a:endParaRPr>
+              <a:rPr lang="en-US" sz="2000" dirty="0" smtClean="0"/>
+              <a:t>Say </a:t>
+            </a:r>
+            <a:r>
+              <a:rPr lang="en-US" sz="2000" dirty="0" err="1" smtClean="0"/>
+              <a:t>BoT</a:t>
+            </a:r>
+            <a:r>
+              <a:rPr lang="en-US" sz="2000" dirty="0" smtClean="0"/>
+              <a:t>(100, H, 10)</a:t>
+            </a:r>
+          </a:p>
+          <a:p>
+            <a:r>
+              <a:rPr lang="en-US" sz="2000" dirty="0" smtClean="0"/>
+              <a:t>Generate similar workload description from different application representations</a:t>
+            </a:r>
+          </a:p>
+          <a:p>
+            <a:r>
+              <a:rPr lang="en-US" sz="2000" dirty="0" smtClean="0"/>
+              <a:t>Bundles currently provide</a:t>
+            </a:r>
           </a:p>
           <a:p>
             <a:pPr lvl="1"/>
             <a:r>
-              <a:rPr lang="en-US" dirty="0" smtClean="0">
-                <a:latin typeface="Arial" charset="0"/>
-                <a:ea typeface="ＭＳ Ｐゴシック" charset="0"/>
-              </a:rPr>
-              <a:t>Optimal </a:t>
-            </a:r>
-            <a:r>
-              <a:rPr lang="en-US" dirty="0">
-                <a:latin typeface="Arial" charset="0"/>
-                <a:ea typeface="ＭＳ Ｐゴシック" charset="0"/>
-              </a:rPr>
-              <a:t>Federation: Finding the optimal </a:t>
-            </a:r>
-            <a:r>
-              <a:rPr lang="en-US" dirty="0" smtClean="0">
-                <a:latin typeface="Arial" charset="0"/>
-                <a:ea typeface="ＭＳ Ｐゴシック" charset="0"/>
-              </a:rPr>
-              <a:t>infrastructure </a:t>
-            </a:r>
-            <a:r>
-              <a:rPr lang="en-US" dirty="0">
-                <a:latin typeface="Arial" charset="0"/>
-                <a:ea typeface="ＭＳ Ｐゴシック" charset="0"/>
-              </a:rPr>
-              <a:t>configurations for a given workload </a:t>
-            </a:r>
-          </a:p>
-          <a:p>
-            <a:pPr lvl="2"/>
-            <a:r>
-              <a:rPr lang="en-US" dirty="0">
-                <a:latin typeface="Arial" charset="0"/>
-                <a:ea typeface="ＭＳ Ｐゴシック" charset="0"/>
-              </a:rPr>
-              <a:t>Irrespective of whether it is best representation of an application</a:t>
-            </a:r>
-          </a:p>
-          <a:p>
-            <a:pPr lvl="2"/>
-            <a:r>
-              <a:rPr lang="en-US" dirty="0">
-                <a:latin typeface="Arial" charset="0"/>
-                <a:ea typeface="ＭＳ Ｐゴシック" charset="0"/>
-              </a:rPr>
-              <a:t>Resources availability at extreme scale is </a:t>
-            </a:r>
-            <a:r>
-              <a:rPr lang="en-US" dirty="0" smtClean="0">
-                <a:latin typeface="Arial" charset="0"/>
-                <a:ea typeface="ＭＳ Ｐゴシック" charset="0"/>
-              </a:rPr>
-              <a:t>variable</a:t>
-            </a:r>
-          </a:p>
-          <a:p>
-            <a:pPr lvl="2"/>
-            <a:endParaRPr lang="en-US" dirty="0">
-              <a:latin typeface="Arial" charset="0"/>
-              <a:ea typeface="ＭＳ Ｐゴシック" charset="0"/>
-            </a:endParaRPr>
+              <a:rPr lang="en-US" sz="2000" dirty="0" smtClean="0"/>
+              <a:t>Info on resource availability</a:t>
+            </a:r>
           </a:p>
           <a:p>
             <a:pPr lvl="1"/>
             <a:r>
-              <a:rPr lang="en-US" dirty="0" smtClean="0">
-                <a:latin typeface="Arial" charset="0"/>
-                <a:ea typeface="ＭＳ Ｐゴシック" charset="0"/>
-              </a:rPr>
-              <a:t>Optimal </a:t>
-            </a:r>
-            <a:r>
-              <a:rPr lang="en-US" dirty="0">
-                <a:latin typeface="Arial" charset="0"/>
-                <a:ea typeface="ＭＳ Ｐゴシック" charset="0"/>
-              </a:rPr>
-              <a:t>Mapping: Workload to Resource Mapping</a:t>
-            </a:r>
-          </a:p>
-          <a:p>
-            <a:pPr lvl="2"/>
-            <a:r>
-              <a:rPr lang="en-US" dirty="0">
-                <a:latin typeface="Arial" charset="0"/>
-                <a:ea typeface="ＭＳ Ｐゴシック" charset="0"/>
-              </a:rPr>
-              <a:t>Static versus Dynamic </a:t>
-            </a:r>
-            <a:r>
-              <a:rPr lang="en-US" dirty="0" smtClean="0">
-                <a:latin typeface="Arial" charset="0"/>
-                <a:ea typeface="ＭＳ Ｐゴシック" charset="0"/>
-              </a:rPr>
-              <a:t>Mapping</a:t>
-            </a:r>
-            <a:endParaRPr lang="en-US" dirty="0">
-              <a:latin typeface="Arial" charset="0"/>
-              <a:ea typeface="ＭＳ Ｐゴシック" charset="0"/>
-            </a:endParaRPr>
+              <a:rPr lang="en-US" sz="2000" dirty="0" smtClean="0"/>
+              <a:t>Eventually resource properties</a:t>
+            </a:r>
+          </a:p>
+          <a:p>
+            <a:r>
+              <a:rPr lang="en-US" sz="2000" dirty="0" smtClean="0"/>
+              <a:t>Ultimately bundles (and I*) should be consistent with C* </a:t>
+            </a:r>
+          </a:p>
+          <a:p>
+            <a:r>
+              <a:rPr lang="en-US" sz="2000" dirty="0" smtClean="0"/>
+              <a:t>Formalize the advantages of dynamic and flexible federation</a:t>
+            </a:r>
+          </a:p>
+          <a:p>
+            <a:pPr lvl="1"/>
+            <a:r>
+              <a:rPr lang="en-US" sz="2000" dirty="0" smtClean="0"/>
+              <a:t>Performance improvements</a:t>
+            </a:r>
           </a:p>
         </p:txBody>
       </p:sp>
+      <p:pic>
+        <p:nvPicPr>
+          <p:cNvPr id="8" name="Content Placeholder 7" descr="aimes-scenario-no-adaptivity.png"/>
+          <p:cNvPicPr>
+            <a:picLocks noGrp="1" noChangeAspect="1"/>
+          </p:cNvPicPr>
+          <p:nvPr>
+            <p:ph sz="half" idx="1"/>
+          </p:nvPr>
+        </p:nvPicPr>
+        <p:blipFill>
+          <a:blip r:embed="rId3">
+            <a:extLst>
+              <a:ext uri="{28A0092B-C50C-407E-A947-70E740481C1C}">
+                <a14:useLocalDpi xmlns:a14="http://schemas.microsoft.com/office/drawing/2010/main" val="0"/>
+              </a:ext>
+            </a:extLst>
+          </a:blip>
+          <a:srcRect t="3245" b="3245"/>
+          <a:stretch>
+            <a:fillRect/>
+          </a:stretch>
+        </p:blipFill>
+        <p:spPr>
+          <a:xfrm>
+            <a:off x="4744118" y="1176421"/>
+            <a:ext cx="4038600" cy="4533900"/>
+          </a:xfrm>
+        </p:spPr>
+      </p:pic>
     </p:spTree>
     <p:extLst>
       <p:ext uri="{BB962C8B-B14F-4D97-AF65-F5344CB8AC3E}">
-        <p14:creationId xmlns:p14="http://schemas.microsoft.com/office/powerpoint/2010/main" val="1666342825"/>
+        <p14:creationId xmlns:p14="http://schemas.microsoft.com/office/powerpoint/2010/main" val="3612151942"/>
       </p:ext>
     </p:extLst>
   </p:cSld>
   <p:clrMapOvr>
     <a:masterClrMapping/>
   </p:clrMapOvr>
+  <p:timing>
+    <p:tnLst>
+      <p:par>
+        <p:cTn xmlns:p14="http://schemas.microsoft.com/office/powerpoint/2010/main" id="1" dur="indefinite" restart="never" nodeType="tmRoot"/>
+      </p:par>
+    </p:tnLst>
+  </p:timing>
 </p:sld>
 </file>
 
@@ -6921,6 +7768,737 @@
           <a:p>
             <a:r>
               <a:rPr lang="en-US" dirty="0" smtClean="0"/>
+              <a:t>NGMW: Interaction of Models and Simulation</a:t>
+            </a:r>
+            <a:endParaRPr lang="en-US" dirty="0"/>
+          </a:p>
+        </p:txBody>
+      </p:sp>
+      <p:sp>
+        <p:nvSpPr>
+          <p:cNvPr id="3" name="Shape 72"/>
+          <p:cNvSpPr txBox="1">
+            <a:spLocks/>
+          </p:cNvSpPr>
+          <p:nvPr/>
+        </p:nvSpPr>
+        <p:spPr bwMode="auto">
+          <a:xfrm>
+            <a:off x="282231" y="786259"/>
+            <a:ext cx="8596312" cy="5281613"/>
+          </a:xfrm>
+          <a:prstGeom prst="rect">
+            <a:avLst/>
+          </a:prstGeom>
+          <a:noFill/>
+          <a:ln>
+            <a:noFill/>
+          </a:ln>
+          <a:extLst>
+            <a:ext uri="{909E8E84-426E-40dd-AFC4-6F175D3DCCD1}">
+              <a14:hiddenFill xmlns:a14="http://schemas.microsoft.com/office/drawing/2010/main">
+                <a:solidFill>
+                  <a:srgbClr val="FFFFFF"/>
+                </a:solidFill>
+              </a14:hiddenFill>
+            </a:ext>
+            <a:ext uri="{91240B29-F687-4f45-9708-019B960494DF}">
+              <a14:hiddenLine xmlns:a14="http://schemas.microsoft.com/office/drawing/2010/main" w="9525">
+                <a:solidFill>
+                  <a:srgbClr val="000000"/>
+                </a:solidFill>
+                <a:miter lim="800000"/>
+                <a:headEnd/>
+                <a:tailEnd/>
+              </a14:hiddenLine>
+            </a:ext>
+            <a:ext uri="{FAA26D3D-D897-4be2-8F04-BA451C77F1D7}">
+              <ma14:placeholderFlag xmlns:ma14="http://schemas.microsoft.com/office/mac/drawingml/2011/main" val="1"/>
+            </a:ext>
+          </a:extLst>
+        </p:spPr>
+        <p:txBody>
+          <a:bodyPr vert="horz" wrap="square" lIns="91425" tIns="91425" rIns="91425" bIns="91425" numCol="1" anchor="t" anchorCtr="0" compatLnSpc="1">
+            <a:prstTxWarp prst="textNoShape">
+              <a:avLst/>
+            </a:prstTxWarp>
+            <a:noAutofit/>
+          </a:bodyPr>
+          <a:lstStyle>
+            <a:lvl1pPr marL="227013" indent="-227013" algn="l" rtl="0" eaLnBrk="0" fontAlgn="base" hangingPunct="0">
+              <a:spcBef>
+                <a:spcPts val="1200"/>
+              </a:spcBef>
+              <a:spcAft>
+                <a:spcPct val="0"/>
+              </a:spcAft>
+              <a:buClr>
+                <a:schemeClr val="tx1">
+                  <a:lumMod val="95000"/>
+                  <a:lumOff val="5000"/>
+                </a:schemeClr>
+              </a:buClr>
+              <a:buChar char="•"/>
+              <a:tabLst/>
+              <a:defRPr sz="2000">
+                <a:solidFill>
+                  <a:schemeClr val="tx1">
+                    <a:lumMod val="95000"/>
+                    <a:lumOff val="5000"/>
+                  </a:schemeClr>
+                </a:solidFill>
+                <a:latin typeface="+mn-lt"/>
+                <a:ea typeface="ＭＳ Ｐゴシック" charset="-128"/>
+                <a:cs typeface="ＭＳ Ｐゴシック" charset="-128"/>
+              </a:defRPr>
+            </a:lvl1pPr>
+            <a:lvl2pPr marL="682625" indent="-225425" algn="l" rtl="0" eaLnBrk="0" fontAlgn="base" hangingPunct="0">
+              <a:spcBef>
+                <a:spcPct val="20000"/>
+              </a:spcBef>
+              <a:spcAft>
+                <a:spcPct val="0"/>
+              </a:spcAft>
+              <a:buClr>
+                <a:schemeClr val="tx1">
+                  <a:lumMod val="95000"/>
+                  <a:lumOff val="5000"/>
+                </a:schemeClr>
+              </a:buClr>
+              <a:buChar char="–"/>
+              <a:defRPr sz="1800">
+                <a:solidFill>
+                  <a:srgbClr val="5F5F5F"/>
+                </a:solidFill>
+                <a:latin typeface="+mn-lt"/>
+                <a:ea typeface="ＭＳ Ｐゴシック" charset="-128"/>
+              </a:defRPr>
+            </a:lvl2pPr>
+            <a:lvl3pPr marL="1090613" indent="-176213" algn="l" rtl="0" eaLnBrk="0" fontAlgn="base" hangingPunct="0">
+              <a:spcBef>
+                <a:spcPct val="20000"/>
+              </a:spcBef>
+              <a:spcAft>
+                <a:spcPct val="0"/>
+              </a:spcAft>
+              <a:buClr>
+                <a:schemeClr val="tx1">
+                  <a:lumMod val="95000"/>
+                  <a:lumOff val="5000"/>
+                </a:schemeClr>
+              </a:buClr>
+              <a:buChar char="•"/>
+              <a:defRPr sz="1800">
+                <a:solidFill>
+                  <a:srgbClr val="5F5F5F"/>
+                </a:solidFill>
+                <a:latin typeface="+mn-lt"/>
+                <a:ea typeface="ＭＳ Ｐゴシック" charset="-128"/>
+              </a:defRPr>
+            </a:lvl3pPr>
+            <a:lvl4pPr marL="1600200" indent="-228600" algn="l" rtl="0" eaLnBrk="0" fontAlgn="base" hangingPunct="0">
+              <a:spcBef>
+                <a:spcPct val="20000"/>
+              </a:spcBef>
+              <a:spcAft>
+                <a:spcPct val="0"/>
+              </a:spcAft>
+              <a:buClr>
+                <a:schemeClr val="tx1">
+                  <a:lumMod val="95000"/>
+                  <a:lumOff val="5000"/>
+                </a:schemeClr>
+              </a:buClr>
+              <a:buChar char="–"/>
+              <a:defRPr sz="1800">
+                <a:solidFill>
+                  <a:srgbClr val="5F5F5F"/>
+                </a:solidFill>
+                <a:latin typeface="+mn-lt"/>
+                <a:ea typeface="ＭＳ Ｐゴシック" charset="-128"/>
+              </a:defRPr>
+            </a:lvl4pPr>
+            <a:lvl5pPr marL="2000250" indent="-171450" algn="l" rtl="0" eaLnBrk="0" fontAlgn="base" hangingPunct="0">
+              <a:spcBef>
+                <a:spcPct val="20000"/>
+              </a:spcBef>
+              <a:spcAft>
+                <a:spcPct val="0"/>
+              </a:spcAft>
+              <a:buClr>
+                <a:schemeClr val="tx1">
+                  <a:lumMod val="95000"/>
+                  <a:lumOff val="5000"/>
+                </a:schemeClr>
+              </a:buClr>
+              <a:buChar char="»"/>
+              <a:defRPr sz="1800">
+                <a:solidFill>
+                  <a:srgbClr val="5F5F5F"/>
+                </a:solidFill>
+                <a:latin typeface="+mn-lt"/>
+                <a:ea typeface="ＭＳ Ｐゴシック" charset="-128"/>
+              </a:defRPr>
+            </a:lvl5pPr>
+            <a:lvl6pPr marL="2514600" indent="-228600" algn="l" rtl="0" fontAlgn="base">
+              <a:spcBef>
+                <a:spcPct val="20000"/>
+              </a:spcBef>
+              <a:spcAft>
+                <a:spcPct val="0"/>
+              </a:spcAft>
+              <a:buChar char="»"/>
+              <a:defRPr sz="1400">
+                <a:solidFill>
+                  <a:srgbClr val="5F5F5F"/>
+                </a:solidFill>
+                <a:latin typeface="+mn-lt"/>
+                <a:ea typeface="ＭＳ Ｐゴシック" charset="-128"/>
+              </a:defRPr>
+            </a:lvl6pPr>
+            <a:lvl7pPr marL="2971800" indent="-228600" algn="l" rtl="0" fontAlgn="base">
+              <a:spcBef>
+                <a:spcPct val="20000"/>
+              </a:spcBef>
+              <a:spcAft>
+                <a:spcPct val="0"/>
+              </a:spcAft>
+              <a:buChar char="»"/>
+              <a:defRPr sz="1400">
+                <a:solidFill>
+                  <a:srgbClr val="5F5F5F"/>
+                </a:solidFill>
+                <a:latin typeface="+mn-lt"/>
+                <a:ea typeface="ＭＳ Ｐゴシック" charset="-128"/>
+              </a:defRPr>
+            </a:lvl7pPr>
+            <a:lvl8pPr marL="3429000" indent="-228600" algn="l" rtl="0" fontAlgn="base">
+              <a:spcBef>
+                <a:spcPct val="20000"/>
+              </a:spcBef>
+              <a:spcAft>
+                <a:spcPct val="0"/>
+              </a:spcAft>
+              <a:buChar char="»"/>
+              <a:defRPr sz="1400">
+                <a:solidFill>
+                  <a:srgbClr val="5F5F5F"/>
+                </a:solidFill>
+                <a:latin typeface="+mn-lt"/>
+                <a:ea typeface="ＭＳ Ｐゴシック" charset="-128"/>
+              </a:defRPr>
+            </a:lvl8pPr>
+            <a:lvl9pPr marL="3886200" indent="-228600" algn="l" rtl="0" fontAlgn="base">
+              <a:spcBef>
+                <a:spcPct val="20000"/>
+              </a:spcBef>
+              <a:spcAft>
+                <a:spcPct val="0"/>
+              </a:spcAft>
+              <a:buChar char="»"/>
+              <a:defRPr sz="1400">
+                <a:solidFill>
+                  <a:srgbClr val="5F5F5F"/>
+                </a:solidFill>
+                <a:latin typeface="+mn-lt"/>
+                <a:ea typeface="ＭＳ Ｐゴシック" charset="-128"/>
+              </a:defRPr>
+            </a:lvl9pPr>
+          </a:lstStyle>
+          <a:p>
+            <a:pPr marL="344488" indent="-342900"/>
+            <a:r>
+              <a:rPr lang="en-US" dirty="0" smtClean="0"/>
+              <a:t>Interaction between Models:</a:t>
+            </a:r>
+          </a:p>
+          <a:p>
+            <a:pPr marL="800100" lvl="1" indent="-342900"/>
+            <a:r>
+              <a:rPr lang="en-US" dirty="0" smtClean="0"/>
+              <a:t>[</a:t>
+            </a:r>
+            <a:r>
+              <a:rPr lang="en-US" dirty="0"/>
+              <a:t>A*, W* ] and [P*, F*]</a:t>
+            </a:r>
+          </a:p>
+          <a:p>
+            <a:pPr marL="1208088" lvl="2" indent="-342900"/>
+            <a:r>
+              <a:rPr lang="en-US" dirty="0"/>
+              <a:t>Here A* is a conceptual model, and W* is an analytical model</a:t>
+            </a:r>
+          </a:p>
+          <a:p>
+            <a:pPr marL="1208088" lvl="2" indent="-342900"/>
+            <a:r>
+              <a:rPr lang="en-US" dirty="0" smtClean="0"/>
+              <a:t>A </a:t>
+            </a:r>
+            <a:r>
+              <a:rPr lang="en-US" dirty="0"/>
+              <a:t>specific instance of A*, is subject to a transformation </a:t>
+            </a:r>
+            <a:r>
+              <a:rPr lang="en-US" b="1" dirty="0">
+                <a:ln w="12700">
+                  <a:solidFill>
+                    <a:schemeClr val="tx2">
+                      <a:satMod val="155000"/>
+                    </a:schemeClr>
+                  </a:solidFill>
+                  <a:prstDash val="solid"/>
+                </a:ln>
+                <a:solidFill>
+                  <a:schemeClr val="bg2">
+                    <a:tint val="85000"/>
+                    <a:satMod val="155000"/>
+                  </a:schemeClr>
+                </a:solidFill>
+                <a:effectLst>
+                  <a:outerShdw blurRad="41275" dist="20320" dir="1800000" algn="tl" rotWithShape="0">
+                    <a:srgbClr val="000000">
+                      <a:alpha val="40000"/>
+                    </a:srgbClr>
+                  </a:outerShdw>
+                </a:effectLst>
+              </a:rPr>
+              <a:t>W</a:t>
+            </a:r>
+            <a:r>
+              <a:rPr lang="en-US" dirty="0"/>
+              <a:t> which converts into executable units </a:t>
+            </a:r>
+            <a:r>
+              <a:rPr lang="en-US" dirty="0" smtClean="0"/>
+              <a:t>(per W*) that </a:t>
+            </a:r>
+            <a:r>
+              <a:rPr lang="en-US" dirty="0"/>
+              <a:t>have performance requirements</a:t>
+            </a:r>
+          </a:p>
+          <a:p>
+            <a:pPr marL="1208088" lvl="2" indent="-342900"/>
+            <a:r>
+              <a:rPr lang="en-US" dirty="0" smtClean="0"/>
+              <a:t>Infrastructure modeled as I*, capability is exposed and federated per F*</a:t>
+            </a:r>
+          </a:p>
+          <a:p>
+            <a:pPr marL="1208088" lvl="2" indent="-342900"/>
+            <a:r>
+              <a:rPr lang="en-US" dirty="0" smtClean="0"/>
+              <a:t>I</a:t>
+            </a:r>
+            <a:r>
+              <a:rPr lang="en-US" dirty="0"/>
+              <a:t>* </a:t>
+            </a:r>
+            <a:r>
+              <a:rPr lang="en-US" dirty="0" smtClean="0"/>
+              <a:t>subject </a:t>
+            </a:r>
+            <a:r>
+              <a:rPr lang="en-US" dirty="0"/>
+              <a:t>to a transformation </a:t>
+            </a:r>
+            <a:r>
+              <a:rPr lang="en-US" b="1" dirty="0" smtClean="0">
+                <a:ln w="12700">
+                  <a:solidFill>
+                    <a:schemeClr val="tx2">
+                      <a:satMod val="155000"/>
+                    </a:schemeClr>
+                  </a:solidFill>
+                  <a:prstDash val="solid"/>
+                </a:ln>
+                <a:solidFill>
+                  <a:schemeClr val="bg2">
+                    <a:tint val="85000"/>
+                    <a:satMod val="155000"/>
+                  </a:schemeClr>
+                </a:solidFill>
+                <a:effectLst>
+                  <a:outerShdw blurRad="41275" dist="20320" dir="1800000" algn="tl" rotWithShape="0">
+                    <a:srgbClr val="000000">
+                      <a:alpha val="40000"/>
+                    </a:srgbClr>
+                  </a:outerShdw>
+                </a:effectLst>
+              </a:rPr>
+              <a:t>F </a:t>
+            </a:r>
+            <a:r>
+              <a:rPr lang="en-US" dirty="0" smtClean="0"/>
+              <a:t>(</a:t>
+            </a:r>
+            <a:r>
+              <a:rPr lang="en-US" dirty="0"/>
+              <a:t>aggregation of resources per F*</a:t>
+            </a:r>
+            <a:r>
+              <a:rPr lang="en-US" dirty="0" smtClean="0"/>
+              <a:t>) to provide a federated capability</a:t>
+            </a:r>
+            <a:endParaRPr lang="en-US" dirty="0"/>
+          </a:p>
+          <a:p>
+            <a:pPr marL="344488" indent="-342900"/>
+            <a:r>
+              <a:rPr lang="en-US" sz="2000" dirty="0" smtClean="0"/>
+              <a:t>Role of Simulation</a:t>
+            </a:r>
+          </a:p>
+          <a:p>
+            <a:pPr marL="800100" lvl="1" indent="-342900"/>
+            <a:r>
+              <a:rPr lang="en-US" sz="1800" dirty="0" smtClean="0"/>
+              <a:t>If we federate a given set of </a:t>
+            </a:r>
+            <a:r>
+              <a:rPr lang="en-US" sz="1800" dirty="0" smtClean="0"/>
+              <a:t>infrastructure {</a:t>
+            </a:r>
+            <a:r>
+              <a:rPr lang="en-US" sz="1800" dirty="0" smtClean="0"/>
+              <a:t>I} what is the performance we expect?</a:t>
+            </a:r>
+          </a:p>
+          <a:p>
+            <a:pPr marL="800100" lvl="1" indent="-342900"/>
+            <a:r>
+              <a:rPr lang="en-US" dirty="0" smtClean="0"/>
+              <a:t>If we want a capability [C], what is the set </a:t>
+            </a:r>
+            <a:r>
+              <a:rPr lang="en-US" dirty="0" smtClean="0"/>
+              <a:t>of infrastructure {</a:t>
+            </a:r>
+            <a:r>
+              <a:rPr lang="en-US" dirty="0" smtClean="0"/>
+              <a:t>I} we need to federate to get  this [C] with well-defined probability distribution?</a:t>
+            </a:r>
+          </a:p>
+          <a:p>
+            <a:pPr marL="800100" lvl="1" indent="-342900"/>
+            <a:r>
+              <a:rPr lang="en-US" sz="1800" dirty="0" smtClean="0"/>
+              <a:t>Given an instance of an application (model), what is the workload  independent of the underlying resources?</a:t>
+            </a:r>
+          </a:p>
+        </p:txBody>
+      </p:sp>
+    </p:spTree>
+    <p:extLst>
+      <p:ext uri="{BB962C8B-B14F-4D97-AF65-F5344CB8AC3E}">
+        <p14:creationId xmlns:p14="http://schemas.microsoft.com/office/powerpoint/2010/main" val="1704466999"/>
+      </p:ext>
+    </p:extLst>
+  </p:cSld>
+  <p:clrMapOvr>
+    <a:masterClrMapping/>
+  </p:clrMapOvr>
+  <p:timing>
+    <p:tnLst>
+      <p:par>
+        <p:cTn xmlns:p14="http://schemas.microsoft.com/office/powerpoint/2010/main" id="1" dur="indefinite" restart="never" nodeType="tmRoot"/>
+      </p:par>
+    </p:tnLst>
+  </p:timing>
+</p:sld>
+</file>
+
+<file path=ppt/slides/slide22.xml><?xml version="1.0" encoding="utf-8"?>
+<p:sld xmlns:a="http://schemas.openxmlformats.org/drawingml/2006/main" xmlns:r="http://schemas.openxmlformats.org/officeDocument/2006/relationships" xmlns:p="http://schemas.openxmlformats.org/presentationml/2006/main">
+  <p:cSld>
+    <p:spTree>
+      <p:nvGrpSpPr>
+        <p:cNvPr id="1" name=""/>
+        <p:cNvGrpSpPr/>
+        <p:nvPr/>
+      </p:nvGrpSpPr>
+      <p:grpSpPr>
+        <a:xfrm>
+          <a:off x="0" y="0"/>
+          <a:ext cx="0" cy="0"/>
+          <a:chOff x="0" y="0"/>
+          <a:chExt cx="0" cy="0"/>
+        </a:xfrm>
+      </p:grpSpPr>
+      <p:sp>
+        <p:nvSpPr>
+          <p:cNvPr id="58369" name="Title 1"/>
+          <p:cNvSpPr>
+            <a:spLocks noGrp="1"/>
+          </p:cNvSpPr>
+          <p:nvPr>
+            <p:ph type="title"/>
+          </p:nvPr>
+        </p:nvSpPr>
+        <p:spPr/>
+        <p:txBody>
+          <a:bodyPr/>
+          <a:lstStyle/>
+          <a:p>
+            <a:r>
+              <a:rPr lang="en-US" dirty="0" smtClean="0">
+                <a:latin typeface="Arial" charset="0"/>
+                <a:ea typeface="ＭＳ Ｐゴシック" charset="0"/>
+                <a:cs typeface="ＭＳ Ｐゴシック" charset="0"/>
+              </a:rPr>
+              <a:t>Mapping Tasks to Resources</a:t>
+            </a:r>
+            <a:endParaRPr lang="en-US" dirty="0">
+              <a:latin typeface="Arial" charset="0"/>
+              <a:ea typeface="ＭＳ Ｐゴシック" charset="0"/>
+              <a:cs typeface="ＭＳ Ｐゴシック" charset="0"/>
+            </a:endParaRPr>
+          </a:p>
+        </p:txBody>
+      </p:sp>
+      <p:sp>
+        <p:nvSpPr>
+          <p:cNvPr id="58370" name="Content Placeholder 2"/>
+          <p:cNvSpPr>
+            <a:spLocks noGrp="1"/>
+          </p:cNvSpPr>
+          <p:nvPr>
+            <p:ph idx="1"/>
+          </p:nvPr>
+        </p:nvSpPr>
+        <p:spPr/>
+        <p:txBody>
+          <a:bodyPr/>
+          <a:lstStyle/>
+          <a:p>
+            <a:r>
+              <a:rPr lang="en-US" dirty="0">
+                <a:latin typeface="Arial" charset="0"/>
+                <a:ea typeface="ＭＳ Ｐゴシック" charset="0"/>
+                <a:cs typeface="ＭＳ Ｐゴシック" charset="0"/>
+              </a:rPr>
+              <a:t>Different aspects of mapping tasks to resources</a:t>
+            </a:r>
+          </a:p>
+          <a:p>
+            <a:pPr lvl="1"/>
+            <a:r>
+              <a:rPr lang="en-US" dirty="0" smtClean="0">
+                <a:latin typeface="Arial" charset="0"/>
+                <a:ea typeface="ＭＳ Ｐゴシック" charset="0"/>
+              </a:rPr>
+              <a:t>Optimal </a:t>
+            </a:r>
+            <a:r>
+              <a:rPr lang="en-US" dirty="0">
+                <a:latin typeface="Arial" charset="0"/>
+                <a:ea typeface="ＭＳ Ｐゴシック" charset="0"/>
+              </a:rPr>
+              <a:t>Characterization: Finding the optimal workload </a:t>
+            </a:r>
+            <a:r>
+              <a:rPr lang="en-US" dirty="0" smtClean="0">
+                <a:latin typeface="Arial" charset="0"/>
+                <a:ea typeface="ＭＳ Ｐゴシック" charset="0"/>
+              </a:rPr>
+              <a:t>characterization </a:t>
+            </a:r>
+            <a:r>
+              <a:rPr lang="en-US" dirty="0">
+                <a:latin typeface="Arial" charset="0"/>
+                <a:ea typeface="ＭＳ Ｐゴシック" charset="0"/>
+              </a:rPr>
+              <a:t>(of an application)</a:t>
+            </a:r>
+          </a:p>
+          <a:p>
+            <a:pPr lvl="2"/>
+            <a:r>
+              <a:rPr lang="en-US" dirty="0">
+                <a:latin typeface="Arial" charset="0"/>
+                <a:ea typeface="ＭＳ Ｐゴシック" charset="0"/>
+              </a:rPr>
+              <a:t>Generality versus specificity. Class of Applications versus Many application classes/types</a:t>
+            </a:r>
+          </a:p>
+          <a:p>
+            <a:pPr lvl="2"/>
+            <a:r>
+              <a:rPr lang="en-US" dirty="0">
+                <a:latin typeface="Arial" charset="0"/>
+                <a:ea typeface="ＭＳ Ｐゴシック" charset="0"/>
+              </a:rPr>
+              <a:t>Different applications have different </a:t>
+            </a:r>
+            <a:r>
+              <a:rPr lang="en-US" dirty="0" smtClean="0">
+                <a:latin typeface="Arial" charset="0"/>
+                <a:ea typeface="ＭＳ Ｐゴシック" charset="0"/>
+              </a:rPr>
+              <a:t>metrics</a:t>
+            </a:r>
+          </a:p>
+          <a:p>
+            <a:pPr lvl="2"/>
+            <a:endParaRPr lang="en-US" dirty="0">
+              <a:latin typeface="Arial" charset="0"/>
+              <a:ea typeface="ＭＳ Ｐゴシック" charset="0"/>
+            </a:endParaRPr>
+          </a:p>
+          <a:p>
+            <a:pPr lvl="1"/>
+            <a:r>
+              <a:rPr lang="en-US" dirty="0" smtClean="0">
+                <a:latin typeface="Arial" charset="0"/>
+                <a:ea typeface="ＭＳ Ｐゴシック" charset="0"/>
+              </a:rPr>
+              <a:t>Optimal </a:t>
+            </a:r>
+            <a:r>
+              <a:rPr lang="en-US" dirty="0">
+                <a:latin typeface="Arial" charset="0"/>
+                <a:ea typeface="ＭＳ Ｐゴシック" charset="0"/>
+              </a:rPr>
+              <a:t>Federation: Finding the optimal </a:t>
+            </a:r>
+            <a:r>
+              <a:rPr lang="en-US" dirty="0" smtClean="0">
+                <a:latin typeface="Arial" charset="0"/>
+                <a:ea typeface="ＭＳ Ｐゴシック" charset="0"/>
+              </a:rPr>
+              <a:t>infrastructure </a:t>
+            </a:r>
+            <a:r>
+              <a:rPr lang="en-US" dirty="0">
+                <a:latin typeface="Arial" charset="0"/>
+                <a:ea typeface="ＭＳ Ｐゴシック" charset="0"/>
+              </a:rPr>
+              <a:t>configurations for a given workload </a:t>
+            </a:r>
+          </a:p>
+          <a:p>
+            <a:pPr lvl="2"/>
+            <a:r>
+              <a:rPr lang="en-US" dirty="0">
+                <a:latin typeface="Arial" charset="0"/>
+                <a:ea typeface="ＭＳ Ｐゴシック" charset="0"/>
+              </a:rPr>
+              <a:t>Irrespective of whether it is best representation of an application</a:t>
+            </a:r>
+          </a:p>
+          <a:p>
+            <a:pPr lvl="2"/>
+            <a:r>
+              <a:rPr lang="en-US" dirty="0">
+                <a:latin typeface="Arial" charset="0"/>
+                <a:ea typeface="ＭＳ Ｐゴシック" charset="0"/>
+              </a:rPr>
+              <a:t>Resources availability at extreme scale is </a:t>
+            </a:r>
+            <a:r>
+              <a:rPr lang="en-US" dirty="0" smtClean="0">
+                <a:latin typeface="Arial" charset="0"/>
+                <a:ea typeface="ＭＳ Ｐゴシック" charset="0"/>
+              </a:rPr>
+              <a:t>variable</a:t>
+            </a:r>
+          </a:p>
+          <a:p>
+            <a:pPr lvl="2"/>
+            <a:endParaRPr lang="en-US" dirty="0">
+              <a:latin typeface="Arial" charset="0"/>
+              <a:ea typeface="ＭＳ Ｐゴシック" charset="0"/>
+            </a:endParaRPr>
+          </a:p>
+          <a:p>
+            <a:pPr lvl="1"/>
+            <a:r>
+              <a:rPr lang="en-US" dirty="0" smtClean="0">
+                <a:latin typeface="Arial" charset="0"/>
+                <a:ea typeface="ＭＳ Ｐゴシック" charset="0"/>
+              </a:rPr>
+              <a:t>Optimal </a:t>
+            </a:r>
+            <a:r>
+              <a:rPr lang="en-US" dirty="0">
+                <a:latin typeface="Arial" charset="0"/>
+                <a:ea typeface="ＭＳ Ｐゴシック" charset="0"/>
+              </a:rPr>
+              <a:t>Mapping: Workload to Resource Mapping</a:t>
+            </a:r>
+          </a:p>
+          <a:p>
+            <a:pPr lvl="2"/>
+            <a:r>
+              <a:rPr lang="en-US" dirty="0">
+                <a:latin typeface="Arial" charset="0"/>
+                <a:ea typeface="ＭＳ Ｐゴシック" charset="0"/>
+              </a:rPr>
+              <a:t>Static versus Dynamic </a:t>
+            </a:r>
+            <a:r>
+              <a:rPr lang="en-US" dirty="0" smtClean="0">
+                <a:latin typeface="Arial" charset="0"/>
+                <a:ea typeface="ＭＳ Ｐゴシック" charset="0"/>
+              </a:rPr>
+              <a:t>Mapping</a:t>
+            </a:r>
+            <a:endParaRPr lang="en-US" dirty="0">
+              <a:latin typeface="Arial" charset="0"/>
+              <a:ea typeface="ＭＳ Ｐゴシック" charset="0"/>
+            </a:endParaRPr>
+          </a:p>
+        </p:txBody>
+      </p:sp>
+    </p:spTree>
+    <p:extLst>
+      <p:ext uri="{BB962C8B-B14F-4D97-AF65-F5344CB8AC3E}">
+        <p14:creationId xmlns:p14="http://schemas.microsoft.com/office/powerpoint/2010/main" val="1666342825"/>
+      </p:ext>
+    </p:extLst>
+  </p:cSld>
+  <p:clrMapOvr>
+    <a:masterClrMapping/>
+  </p:clrMapOvr>
+</p:sld>
+</file>
+
+<file path=ppt/slides/slide23.xml><?xml version="1.0" encoding="utf-8"?>
+<p:sld xmlns:a="http://schemas.openxmlformats.org/drawingml/2006/main" xmlns:r="http://schemas.openxmlformats.org/officeDocument/2006/relationships" xmlns:p="http://schemas.openxmlformats.org/presentationml/2006/main">
+  <p:cSld>
+    <p:spTree>
+      <p:nvGrpSpPr>
+        <p:cNvPr id="1" name=""/>
+        <p:cNvGrpSpPr/>
+        <p:nvPr/>
+      </p:nvGrpSpPr>
+      <p:grpSpPr>
+        <a:xfrm>
+          <a:off x="0" y="0"/>
+          <a:ext cx="0" cy="0"/>
+          <a:chOff x="0" y="0"/>
+          <a:chExt cx="0" cy="0"/>
+        </a:xfrm>
+      </p:grpSpPr>
+      <p:sp>
+        <p:nvSpPr>
+          <p:cNvPr id="2" name="Title 1"/>
+          <p:cNvSpPr>
+            <a:spLocks noGrp="1"/>
+          </p:cNvSpPr>
+          <p:nvPr>
+            <p:ph type="title"/>
+          </p:nvPr>
+        </p:nvSpPr>
+        <p:spPr/>
+        <p:txBody>
+          <a:bodyPr/>
+          <a:lstStyle/>
+          <a:p>
+            <a:r>
+              <a:rPr lang="en-US" dirty="0" smtClean="0"/>
               <a:t>Organizer’s Questions</a:t>
             </a:r>
             <a:endParaRPr lang="en-US" dirty="0"/>
@@ -7084,7 +8662,7 @@
 </p:sld>
 </file>
 
-<file path=ppt/slides/slide22.xml><?xml version="1.0" encoding="utf-8"?>
+<file path=ppt/slides/slide24.xml><?xml version="1.0" encoding="utf-8"?>
 <p:sld xmlns:a="http://schemas.openxmlformats.org/drawingml/2006/main" xmlns:r="http://schemas.openxmlformats.org/officeDocument/2006/relationships" xmlns:p="http://schemas.openxmlformats.org/presentationml/2006/main">
   <p:cSld>
     <p:spTree>
@@ -7348,7 +8926,7 @@
 </p:sld>
 </file>
 
-<file path=ppt/slides/slide23.xml><?xml version="1.0" encoding="utf-8"?>
+<file path=ppt/slides/slide25.xml><?xml version="1.0" encoding="utf-8"?>
 <p:sld xmlns:a="http://schemas.openxmlformats.org/drawingml/2006/main" xmlns:r="http://schemas.openxmlformats.org/officeDocument/2006/relationships" xmlns:p="http://schemas.openxmlformats.org/presentationml/2006/main">
   <p:cSld>
     <p:spTree>
@@ -7433,8 +9011,21 @@
             </a:r>
             <a:r>
               <a:rPr lang="en-US" dirty="0" smtClean="0"/>
-              <a:t> (ATLAS/PANDA)</a:t>
-            </a:r>
+              <a:t> (ATLAS/PANDA</a:t>
+            </a:r>
+            <a:r>
+              <a:rPr lang="en-US" dirty="0" smtClean="0"/>
+              <a:t>)</a:t>
+            </a:r>
+          </a:p>
+          <a:p>
+            <a:r>
+              <a:rPr lang="en-US" dirty="0"/>
+              <a:t>AIMES: Integrated Middleware Framework for Extreme Collaborative Science, Office of Advanced Scientific Computing and Research, Department of Energy ER26115/DE- SC0008591</a:t>
+            </a:r>
+          </a:p>
+          <a:p>
+            <a:endParaRPr lang="en-US" dirty="0" smtClean="0"/>
           </a:p>
         </p:txBody>
       </p:sp>
@@ -7451,8 +9042,8 @@
 </p:sld>
 </file>
 
-<file path=ppt/slides/slide24.xml><?xml version="1.0" encoding="utf-8"?>
-<p:sld xmlns:a="http://schemas.openxmlformats.org/drawingml/2006/main" xmlns:r="http://schemas.openxmlformats.org/officeDocument/2006/relationships" xmlns:p="http://schemas.openxmlformats.org/presentationml/2006/main">
+<file path=ppt/slides/slide26.xml><?xml version="1.0" encoding="utf-8"?>
+<p:sld xmlns:a="http://schemas.openxmlformats.org/drawingml/2006/main" xmlns:r="http://schemas.openxmlformats.org/officeDocument/2006/relationships" xmlns:p="http://schemas.openxmlformats.org/presentationml/2006/main" show="0">
   <p:cSld>
     <p:spTree>
       <p:nvGrpSpPr>
@@ -7520,6 +9111,273 @@
     <p:extLst>
       <p:ext uri="{BB962C8B-B14F-4D97-AF65-F5344CB8AC3E}">
         <p14:creationId xmlns:p14="http://schemas.microsoft.com/office/powerpoint/2010/main" val="957286402"/>
+      </p:ext>
+    </p:extLst>
+  </p:cSld>
+  <p:clrMapOvr>
+    <a:masterClrMapping/>
+  </p:clrMapOvr>
+  <mc:AlternateContent xmlns:mc="http://schemas.openxmlformats.org/markup-compatibility/2006">
+    <mc:Choice xmlns:p14="http://schemas.microsoft.com/office/powerpoint/2010/main" Requires="p14">
+      <p:transition spd="slow" p14:dur="2000"/>
+    </mc:Choice>
+    <mc:Fallback>
+      <p:transition xmlns:p14="http://schemas.microsoft.com/office/powerpoint/2010/main" spd="slow"/>
+    </mc:Fallback>
+  </mc:AlternateContent>
+</p:sld>
+</file>
+
+<file path=ppt/slides/slide27.xml><?xml version="1.0" encoding="utf-8"?>
+<p:sld xmlns:a="http://schemas.openxmlformats.org/drawingml/2006/main" xmlns:r="http://schemas.openxmlformats.org/officeDocument/2006/relationships" xmlns:p="http://schemas.openxmlformats.org/presentationml/2006/main" show="0">
+  <p:cSld>
+    <p:spTree>
+      <p:nvGrpSpPr>
+        <p:cNvPr id="1" name=""/>
+        <p:cNvGrpSpPr/>
+        <p:nvPr/>
+      </p:nvGrpSpPr>
+      <p:grpSpPr>
+        <a:xfrm>
+          <a:off x="0" y="0"/>
+          <a:ext cx="0" cy="0"/>
+          <a:chOff x="0" y="0"/>
+          <a:chExt cx="0" cy="0"/>
+        </a:xfrm>
+      </p:grpSpPr>
+      <p:sp>
+        <p:nvSpPr>
+          <p:cNvPr id="2" name="Title 1"/>
+          <p:cNvSpPr>
+            <a:spLocks noGrp="1"/>
+          </p:cNvSpPr>
+          <p:nvPr>
+            <p:ph type="title"/>
+          </p:nvPr>
+        </p:nvSpPr>
+        <p:spPr/>
+        <p:txBody>
+          <a:bodyPr/>
+          <a:lstStyle/>
+          <a:p>
+            <a:r>
+              <a:rPr lang="en-US" dirty="0" smtClean="0"/>
+              <a:t>P* </a:t>
+            </a:r>
+            <a:endParaRPr lang="en-US" dirty="0"/>
+          </a:p>
+        </p:txBody>
+      </p:sp>
+      <p:sp>
+        <p:nvSpPr>
+          <p:cNvPr id="4" name="Content Placeholder 3"/>
+          <p:cNvSpPr>
+            <a:spLocks noGrp="1"/>
+          </p:cNvSpPr>
+          <p:nvPr>
+            <p:ph idx="1"/>
+          </p:nvPr>
+        </p:nvSpPr>
+        <p:spPr/>
+        <p:txBody>
+          <a:bodyPr/>
+          <a:lstStyle/>
+          <a:p>
+            <a:r>
+              <a:rPr lang="en-US" dirty="0" smtClean="0"/>
+              <a:t>Pilot-Jobs provide an abstraction for dynamic resource management. Currently abstraction is job based, but can be extended to include network and storage as other resource elements</a:t>
+            </a:r>
+          </a:p>
+          <a:p>
+            <a:r>
+              <a:rPr lang="en-US" dirty="0" smtClean="0"/>
+              <a:t>P</a:t>
+            </a:r>
+            <a:r>
+              <a:rPr lang="en-US" dirty="0"/>
+              <a:t>* is a conceptual model for </a:t>
+            </a:r>
+            <a:r>
+              <a:rPr lang="en-US" dirty="0" smtClean="0"/>
+              <a:t>Pilot-based resource</a:t>
+            </a:r>
+            <a:endParaRPr lang="en-US" dirty="0"/>
+          </a:p>
+        </p:txBody>
+      </p:sp>
+    </p:spTree>
+    <p:extLst>
+      <p:ext uri="{BB962C8B-B14F-4D97-AF65-F5344CB8AC3E}">
+        <p14:creationId xmlns:p14="http://schemas.microsoft.com/office/powerpoint/2010/main" val="1240035077"/>
+      </p:ext>
+    </p:extLst>
+  </p:cSld>
+  <p:clrMapOvr>
+    <a:masterClrMapping/>
+  </p:clrMapOvr>
+  <mc:AlternateContent xmlns:mc="http://schemas.openxmlformats.org/markup-compatibility/2006">
+    <mc:Choice xmlns:p14="http://schemas.microsoft.com/office/powerpoint/2010/main" Requires="p14">
+      <p:transition spd="slow" p14:dur="2000"/>
+    </mc:Choice>
+    <mc:Fallback>
+      <p:transition xmlns:p14="http://schemas.microsoft.com/office/powerpoint/2010/main" spd="slow"/>
+    </mc:Fallback>
+  </mc:AlternateContent>
+</p:sld>
+</file>
+
+<file path=ppt/slides/slide28.xml><?xml version="1.0" encoding="utf-8"?>
+<p:sld xmlns:a="http://schemas.openxmlformats.org/drawingml/2006/main" xmlns:r="http://schemas.openxmlformats.org/officeDocument/2006/relationships" xmlns:p="http://schemas.openxmlformats.org/presentationml/2006/main">
+  <p:cSld>
+    <p:spTree>
+      <p:nvGrpSpPr>
+        <p:cNvPr id="1" name=""/>
+        <p:cNvGrpSpPr/>
+        <p:nvPr/>
+      </p:nvGrpSpPr>
+      <p:grpSpPr>
+        <a:xfrm>
+          <a:off x="0" y="0"/>
+          <a:ext cx="0" cy="0"/>
+          <a:chOff x="0" y="0"/>
+          <a:chExt cx="0" cy="0"/>
+        </a:xfrm>
+      </p:grpSpPr>
+      <p:sp>
+        <p:nvSpPr>
+          <p:cNvPr id="2" name="Title 1"/>
+          <p:cNvSpPr>
+            <a:spLocks noGrp="1"/>
+          </p:cNvSpPr>
+          <p:nvPr>
+            <p:ph type="title"/>
+          </p:nvPr>
+        </p:nvSpPr>
+        <p:spPr/>
+        <p:txBody>
+          <a:bodyPr/>
+          <a:lstStyle/>
+          <a:p>
+            <a:r>
+              <a:rPr lang="en-US" dirty="0" smtClean="0"/>
+              <a:t>*.* : Putting it together</a:t>
+            </a:r>
+            <a:endParaRPr lang="en-US" dirty="0"/>
+          </a:p>
+        </p:txBody>
+      </p:sp>
+      <p:pic>
+        <p:nvPicPr>
+          <p:cNvPr id="4" name="Content Placeholder 3" descr="ngmw-schematic-3.png"/>
+          <p:cNvPicPr>
+            <a:picLocks noGrp="1" noChangeAspect="1"/>
+          </p:cNvPicPr>
+          <p:nvPr>
+            <p:ph sz="half" idx="1"/>
+          </p:nvPr>
+        </p:nvPicPr>
+        <p:blipFill>
+          <a:blip r:embed="rId3">
+            <a:extLst>
+              <a:ext uri="{28A0092B-C50C-407E-A947-70E740481C1C}">
+                <a14:useLocalDpi xmlns:a14="http://schemas.microsoft.com/office/drawing/2010/main" val="0"/>
+              </a:ext>
+            </a:extLst>
+          </a:blip>
+          <a:srcRect t="4" b="4"/>
+          <a:stretch>
+            <a:fillRect/>
+          </a:stretch>
+        </p:blipFill>
+        <p:spPr>
+          <a:xfrm>
+            <a:off x="4840808" y="1203158"/>
+            <a:ext cx="4038600" cy="4533900"/>
+          </a:xfrm>
+        </p:spPr>
+      </p:pic>
+      <p:sp>
+        <p:nvSpPr>
+          <p:cNvPr id="3" name="Content Placeholder 2"/>
+          <p:cNvSpPr>
+            <a:spLocks noGrp="1"/>
+          </p:cNvSpPr>
+          <p:nvPr>
+            <p:ph sz="half" idx="2"/>
+          </p:nvPr>
+        </p:nvSpPr>
+        <p:spPr>
+          <a:xfrm>
+            <a:off x="282231" y="1176421"/>
+            <a:ext cx="4279074" cy="4533900"/>
+          </a:xfrm>
+        </p:spPr>
+        <p:txBody>
+          <a:bodyPr/>
+          <a:lstStyle/>
+          <a:p>
+            <a:r>
+              <a:rPr lang="en-US" sz="2000" dirty="0" smtClean="0"/>
+              <a:t>P*: Decouples dynamic resource management from job and task management</a:t>
+            </a:r>
+          </a:p>
+          <a:p>
+            <a:r>
+              <a:rPr lang="en-US" sz="2000" dirty="0" smtClean="0"/>
+              <a:t>F*: Resource aggregation and provisioning decoupled from job and resource management</a:t>
+            </a:r>
+          </a:p>
+          <a:p>
+            <a:pPr lvl="1"/>
+            <a:r>
+              <a:rPr lang="en-US" sz="1800" dirty="0" smtClean="0"/>
+              <a:t>Furthers the separation of concerns</a:t>
+            </a:r>
+          </a:p>
+          <a:p>
+            <a:r>
+              <a:rPr lang="en-US" sz="2000" dirty="0" smtClean="0"/>
+              <a:t>C* provides, F</a:t>
+            </a:r>
+            <a:r>
+              <a:rPr lang="en-US" sz="2000" dirty="0"/>
+              <a:t>* </a:t>
+            </a:r>
+            <a:r>
+              <a:rPr lang="en-US" sz="2000" dirty="0" smtClean="0"/>
+              <a:t>decides</a:t>
+            </a:r>
+            <a:r>
+              <a:rPr lang="en-US" sz="2000" dirty="0"/>
+              <a:t>, P* </a:t>
+            </a:r>
+            <a:r>
+              <a:rPr lang="en-US" sz="2000" dirty="0" smtClean="0"/>
+              <a:t>executes</a:t>
+            </a:r>
+          </a:p>
+          <a:p>
+            <a:r>
+              <a:rPr lang="en-US" sz="2000" dirty="0" smtClean="0"/>
+              <a:t>Federate at the capability level</a:t>
+            </a:r>
+          </a:p>
+          <a:p>
+            <a:r>
+              <a:rPr lang="en-US" sz="2000" dirty="0" smtClean="0"/>
+              <a:t>P* creates the overlay at the resource level</a:t>
+            </a:r>
+            <a:endParaRPr lang="en-US" sz="2000" dirty="0"/>
+          </a:p>
+          <a:p>
+            <a:endParaRPr lang="en-US" sz="2000" dirty="0"/>
+          </a:p>
+        </p:txBody>
+      </p:sp>
+    </p:spTree>
+    <p:extLst>
+      <p:ext uri="{BB962C8B-B14F-4D97-AF65-F5344CB8AC3E}">
+        <p14:creationId xmlns:p14="http://schemas.microsoft.com/office/powerpoint/2010/main" val="1576754480"/>
       </p:ext>
     </p:extLst>
   </p:cSld>
@@ -7594,8 +9452,55 @@
           <a:p>
             <a:r>
               <a:rPr lang="en-US" dirty="0" smtClean="0"/>
-              <a:t>Support new science and new usage modes</a:t>
-            </a:r>
+              <a:t>Support new science and new usage </a:t>
+            </a:r>
+            <a:r>
+              <a:rPr lang="en-US" dirty="0" smtClean="0"/>
+              <a:t>modes</a:t>
+            </a:r>
+          </a:p>
+          <a:p>
+            <a:pPr lvl="1"/>
+            <a:r>
+              <a:rPr lang="en-US" sz="2000" dirty="0"/>
+              <a:t>Different modes of </a:t>
+            </a:r>
+            <a:r>
+              <a:rPr lang="en-US" sz="2000" dirty="0" err="1"/>
+              <a:t>exascale</a:t>
+            </a:r>
+            <a:r>
+              <a:rPr lang="en-US" sz="2000" dirty="0"/>
+              <a:t> computing</a:t>
+            </a:r>
+          </a:p>
+          <a:p>
+            <a:pPr lvl="2"/>
+            <a:r>
+              <a:rPr lang="en-US" sz="2000" dirty="0" smtClean="0"/>
+              <a:t>E.g. Coupling </a:t>
+            </a:r>
+            <a:r>
+              <a:rPr lang="en-US" sz="2000" dirty="0" err="1"/>
+              <a:t>exaflops</a:t>
+            </a:r>
+            <a:r>
+              <a:rPr lang="en-US" sz="2000" dirty="0"/>
+              <a:t> of computing with </a:t>
+            </a:r>
+            <a:r>
+              <a:rPr lang="en-US" sz="2000" dirty="0" err="1"/>
+              <a:t>exabytes</a:t>
+            </a:r>
+            <a:r>
+              <a:rPr lang="en-US" sz="2000" dirty="0"/>
+              <a:t> of </a:t>
+            </a:r>
+            <a:r>
+              <a:rPr lang="en-US" sz="2000" dirty="0" smtClean="0"/>
+              <a:t>data</a:t>
+            </a:r>
+            <a:endParaRPr lang="en-US" dirty="0" smtClean="0"/>
           </a:p>
           <a:p>
             <a:pPr lvl="1"/>
@@ -7615,48 +9520,6 @@
               <a:t>Complex, multi-component, distributed data and workflow based</a:t>
             </a:r>
             <a:endParaRPr lang="en-US" sz="2000" dirty="0"/>
-          </a:p>
-          <a:p>
-            <a:pPr lvl="1"/>
-            <a:r>
-              <a:rPr lang="en-US" sz="2000" dirty="0" smtClean="0"/>
-              <a:t>Different </a:t>
-            </a:r>
-            <a:r>
-              <a:rPr lang="en-US" sz="2000" dirty="0"/>
-              <a:t>modes of </a:t>
-            </a:r>
-            <a:r>
-              <a:rPr lang="en-US" sz="2000" dirty="0" err="1"/>
-              <a:t>exascale</a:t>
-            </a:r>
-            <a:r>
-              <a:rPr lang="en-US" sz="2000" dirty="0"/>
-              <a:t> computing</a:t>
-            </a:r>
-          </a:p>
-          <a:p>
-            <a:pPr lvl="2"/>
-            <a:r>
-              <a:rPr lang="en-US" sz="2000" dirty="0"/>
-              <a:t>Coupling </a:t>
-            </a:r>
-            <a:r>
-              <a:rPr lang="en-US" sz="2000" dirty="0" err="1"/>
-              <a:t>exaflops</a:t>
-            </a:r>
-            <a:r>
-              <a:rPr lang="en-US" sz="2000" dirty="0"/>
-              <a:t> of computing with </a:t>
-            </a:r>
-            <a:r>
-              <a:rPr lang="en-US" sz="2000" dirty="0" err="1"/>
-              <a:t>exabytes</a:t>
-            </a:r>
-            <a:r>
-              <a:rPr lang="en-US" sz="2000" dirty="0"/>
-              <a:t> of data</a:t>
-            </a:r>
           </a:p>
           <a:p>
             <a:pPr marL="457200" lvl="1" indent="0">
@@ -8298,7 +10161,15 @@
             </a:r>
             <a:r>
               <a:rPr lang="en-US" sz="2000" dirty="0" smtClean="0"/>
-              <a:t>analysis (ATLAS, HEP)</a:t>
+              <a:t>analysis </a:t>
+            </a:r>
+            <a:r>
+              <a:rPr lang="en-US" sz="2000" dirty="0" smtClean="0"/>
+              <a:t>(</a:t>
+            </a:r>
+            <a:r>
+              <a:rPr lang="en-US" sz="2000" dirty="0" smtClean="0"/>
+              <a:t>ATLAS, HEP)</a:t>
             </a:r>
           </a:p>
           <a:p>
@@ -8993,13 +10864,34 @@
               </a:buClr>
               <a:buSzPct val="100000"/>
             </a:pPr>
+            <a:endParaRPr lang="en-US" dirty="0" smtClean="0">
+              <a:solidFill>
+                <a:srgbClr val="000000"/>
+              </a:solidFill>
+            </a:endParaRPr>
+          </a:p>
+          <a:p>
+            <a:pPr marL="344488" indent="-342900">
+              <a:buClr>
+                <a:srgbClr val="000000"/>
+              </a:buClr>
+              <a:buSzPct val="100000"/>
+            </a:pPr>
             <a:r>
               <a:rPr lang="en-US" dirty="0" smtClean="0">
                 <a:solidFill>
                   <a:srgbClr val="000000"/>
                 </a:solidFill>
               </a:rPr>
-              <a:t>Functional Requirement</a:t>
+              <a:t>Functional </a:t>
+            </a:r>
+            <a:r>
+              <a:rPr lang="en-US" dirty="0" smtClean="0">
+                <a:solidFill>
+                  <a:srgbClr val="000000"/>
+                </a:solidFill>
+              </a:rPr>
+              <a:t>Requirement</a:t>
             </a:r>
             <a:endParaRPr lang="en-US" dirty="0">
               <a:solidFill>
@@ -9045,18 +10937,7 @@
                   </a:schemeClr>
                 </a:solidFill>
               </a:rPr>
-              <a:t>applications in conjunction with dynamic </a:t>
-            </a:r>
-            <a:r>
-              <a:rPr lang="en-US" sz="2000" dirty="0" smtClean="0">
-                <a:solidFill>
-                  <a:schemeClr val="tx1">
-                    <a:lumMod val="75000"/>
-                    <a:lumOff val="25000"/>
-                  </a:schemeClr>
-                </a:solidFill>
-              </a:rPr>
-              <a:t>resources</a:t>
+              <a:t>applications in conjunction with dynamic resources</a:t>
             </a:r>
             <a:endParaRPr lang="en" sz="2000" dirty="0">
               <a:solidFill>

</xml_diff>

<commit_message>
minor tweaks based upon A/M comments
</commit_message>
<xml_diff>
--- a/presentations/radical-modsim.pptx
+++ b/presentations/radical-modsim.pptx
@@ -6950,7 +6950,23 @@
           <a:p>
             <a:r>
               <a:rPr lang="en-US" sz="2000" dirty="0"/>
-              <a:t>Transformation of Application workload via system workload to Infrastructure capability</a:t>
+              <a:t>Transformation of </a:t>
+            </a:r>
+            <a:r>
+              <a:rPr lang="en-US" sz="2000" dirty="0" smtClean="0"/>
+              <a:t>application </a:t>
+            </a:r>
+            <a:r>
+              <a:rPr lang="en-US" sz="2000" dirty="0"/>
+              <a:t>workload via system workload to </a:t>
+            </a:r>
+            <a:r>
+              <a:rPr lang="en-US" sz="2000" dirty="0" smtClean="0"/>
+              <a:t>infrastructure </a:t>
+            </a:r>
+            <a:r>
+              <a:rPr lang="en-US" sz="2000" dirty="0"/>
+              <a:t>capability</a:t>
             </a:r>
           </a:p>
           <a:p>
@@ -6974,15 +6990,19 @@
           <a:p>
             <a:pPr lvl="1"/>
             <a:r>
+              <a:rPr lang="en-US" sz="1600" dirty="0" err="1" smtClean="0"/>
+              <a:t>Adaptivity</a:t>
+            </a:r>
+            <a:r>
               <a:rPr lang="en-US" sz="1600" dirty="0" smtClean="0"/>
-              <a:t>Response can be either at A, W level</a:t>
+              <a:t> can be either at A, W level</a:t>
             </a:r>
           </a:p>
           <a:p>
             <a:pPr lvl="1"/>
             <a:r>
               <a:rPr lang="en-US" sz="1600" dirty="0" smtClean="0"/>
-              <a:t>Application may self-throttle number of tasks generated</a:t>
+              <a:t>Application may self-throttle number of tasks, or type of task generated</a:t>
             </a:r>
           </a:p>
           <a:p>
@@ -7369,7 +7389,29 @@
                   </a:schemeClr>
                 </a:solidFill>
               </a:rPr>
-              <a:t>Proposed Architecture for a model-based, capability-driven NGMW</a:t>
+              <a:t>Proposed </a:t>
+            </a:r>
+            <a:r>
+              <a:rPr lang="en-US" sz="2000" dirty="0" smtClean="0">
+                <a:solidFill>
+                  <a:schemeClr val="tx1">
+                    <a:lumMod val="65000"/>
+                    <a:lumOff val="35000"/>
+                  </a:schemeClr>
+                </a:solidFill>
+              </a:rPr>
+              <a:t>architecture </a:t>
+            </a:r>
+            <a:r>
+              <a:rPr lang="en-US" sz="2000" dirty="0" smtClean="0">
+                <a:solidFill>
+                  <a:schemeClr val="tx1">
+                    <a:lumMod val="65000"/>
+                    <a:lumOff val="35000"/>
+                  </a:schemeClr>
+                </a:solidFill>
+              </a:rPr>
+              <a:t>for a model-based, capability-driven NGMW</a:t>
             </a:r>
           </a:p>
           <a:p>
@@ -7388,11 +7430,74 @@
                   </a:schemeClr>
                 </a:solidFill>
               </a:rPr>
-              <a:t>Models at multiple levels and their integration</a:t>
-            </a:r>
-          </a:p>
-          <a:p>
-            <a:pPr marL="1717675" lvl="3" indent="-342900">
+              <a:t>Models at multiple levels and their </a:t>
+            </a:r>
+            <a:r>
+              <a:rPr lang="en-US" sz="2000" dirty="0" smtClean="0">
+                <a:solidFill>
+                  <a:schemeClr val="tx1">
+                    <a:lumMod val="65000"/>
+                    <a:lumOff val="35000"/>
+                  </a:schemeClr>
+                </a:solidFill>
+              </a:rPr>
+              <a:t>integration: Applications </a:t>
+            </a:r>
+            <a:r>
+              <a:rPr lang="en-US" sz="2000" dirty="0" smtClean="0">
+                <a:solidFill>
+                  <a:schemeClr val="tx1">
+                    <a:lumMod val="65000"/>
+                    <a:lumOff val="35000"/>
+                  </a:schemeClr>
+                </a:solidFill>
+              </a:rPr>
+              <a:t>(A*, W*),  Dynamic Resources </a:t>
+            </a:r>
+            <a:r>
+              <a:rPr lang="en-US" sz="2000" dirty="0" smtClean="0">
+                <a:solidFill>
+                  <a:schemeClr val="tx1">
+                    <a:lumMod val="65000"/>
+                    <a:lumOff val="35000"/>
+                  </a:schemeClr>
+                </a:solidFill>
+              </a:rPr>
+              <a:t>(P*), Infrastructure (I</a:t>
+            </a:r>
+            <a:r>
+              <a:rPr lang="en-US" sz="2000" dirty="0" smtClean="0">
+                <a:solidFill>
+                  <a:schemeClr val="tx1">
+                    <a:lumMod val="65000"/>
+                    <a:lumOff val="35000"/>
+                  </a:schemeClr>
+                </a:solidFill>
+              </a:rPr>
+              <a:t>*), </a:t>
+            </a:r>
+            <a:r>
+              <a:rPr lang="en-US" sz="2000" dirty="0" smtClean="0">
+                <a:solidFill>
+                  <a:schemeClr val="tx1">
+                    <a:lumMod val="65000"/>
+                    <a:lumOff val="35000"/>
+                  </a:schemeClr>
+                </a:solidFill>
+              </a:rPr>
+              <a:t>Federation (F*)</a:t>
+            </a:r>
+            <a:endParaRPr lang="en-US" sz="2000" dirty="0">
+              <a:solidFill>
+                <a:schemeClr val="tx1">
+                  <a:lumMod val="65000"/>
+                  <a:lumOff val="35000"/>
+                </a:schemeClr>
+              </a:solidFill>
+            </a:endParaRPr>
+          </a:p>
+          <a:p>
+            <a:pPr lvl="2">
               <a:buClr>
                 <a:srgbClr val="000000"/>
               </a:buClr>
@@ -7407,16 +7512,8 @@
                   </a:schemeClr>
                 </a:solidFill>
               </a:rPr>
-              <a:t>Applications (A*, W*),  Dynamic Resources and Infrastructure (P*, I*), Federation of Infrastructure (F*)</a:t>
-            </a:r>
-          </a:p>
-          <a:p>
-            <a:pPr marL="800100" lvl="1" indent="-342900">
-              <a:buClr>
-                <a:srgbClr val="000000"/>
-              </a:buClr>
-              <a:buSzPct val="100000"/>
-            </a:pPr>
+              <a:t>Putting </a:t>
+            </a:r>
             <a:r>
               <a:rPr lang="en-US" sz="2000" dirty="0" smtClean="0">
                 <a:solidFill>
@@ -7426,7 +7523,40 @@
                   </a:schemeClr>
                 </a:solidFill>
               </a:rPr>
-              <a:t>Putting it altogether: Conceptual and Implementation</a:t>
+              <a:t>it </a:t>
+            </a:r>
+            <a:r>
+              <a:rPr lang="en-US" sz="2000" dirty="0" smtClean="0">
+                <a:solidFill>
+                  <a:schemeClr val="tx1">
+                    <a:lumMod val="65000"/>
+                    <a:lumOff val="35000"/>
+                  </a:schemeClr>
+                </a:solidFill>
+              </a:rPr>
+              <a:t>all </a:t>
+            </a:r>
+            <a:r>
+              <a:rPr lang="en-US" sz="2000" dirty="0" smtClean="0">
+                <a:solidFill>
+                  <a:schemeClr val="tx1">
+                    <a:lumMod val="65000"/>
+                    <a:lumOff val="35000"/>
+                  </a:schemeClr>
+                </a:solidFill>
+              </a:rPr>
+              <a:t>together</a:t>
+            </a:r>
+            <a:r>
+              <a:rPr lang="en-US" sz="2000" dirty="0" smtClean="0">
+                <a:solidFill>
+                  <a:schemeClr val="tx1">
+                    <a:lumMod val="65000"/>
+                    <a:lumOff val="35000"/>
+                  </a:schemeClr>
+                </a:solidFill>
+              </a:rPr>
+              <a:t>: Conceptual and Implementation</a:t>
             </a:r>
           </a:p>
           <a:p>
@@ -7609,8 +7739,8 @@
         </p:nvSpPr>
         <p:spPr>
           <a:xfrm>
-            <a:off x="160421" y="1176421"/>
-            <a:ext cx="4400884" cy="4533900"/>
+            <a:off x="160420" y="1176421"/>
+            <a:ext cx="4583697" cy="4533900"/>
           </a:xfrm>
         </p:spPr>
         <p:txBody>
@@ -7646,7 +7776,7 @@
           <a:p>
             <a:r>
               <a:rPr lang="en-US" sz="2000" dirty="0" smtClean="0"/>
-              <a:t>Bundles currently provide</a:t>
+              <a:t>Bundles currently support federation</a:t>
             </a:r>
           </a:p>
           <a:p>
@@ -10114,23 +10244,23 @@
               </a:spcAft>
             </a:pPr>
             <a:r>
-              <a:rPr lang="en" sz="2200" dirty="0" smtClean="0"/>
+              <a:rPr lang="en" dirty="0" smtClean="0"/>
               <a:t>Support </a:t>
             </a:r>
             <a:r>
-              <a:rPr lang="en-US" sz="2200" dirty="0" smtClean="0"/>
+              <a:rPr lang="en-US" dirty="0" smtClean="0"/>
               <a:t>novel and </a:t>
             </a:r>
             <a:r>
-              <a:rPr lang="en" sz="2200" dirty="0" smtClean="0"/>
+              <a:rPr lang="en" dirty="0" smtClean="0"/>
               <a:t>broad range of </a:t>
             </a:r>
             <a:r>
-              <a:rPr lang="en-US" sz="2200" dirty="0"/>
+              <a:rPr lang="en-US" dirty="0"/>
               <a:t>a</a:t>
             </a:r>
             <a:r>
-              <a:rPr lang="en-US" sz="2200" dirty="0" smtClean="0"/>
+              <a:rPr lang="en-US" dirty="0" smtClean="0"/>
               <a:t>pplication requirements</a:t>
             </a:r>
           </a:p>
@@ -10228,22 +10358,22 @@
               </a:lnSpc>
             </a:pPr>
             <a:r>
-              <a:rPr lang="en-US" sz="2200" dirty="0" smtClean="0"/>
+              <a:rPr lang="en-US" dirty="0" smtClean="0"/>
               <a:t>Federate</a:t>
             </a:r>
             <a:r>
-              <a:rPr lang="en" sz="2200" dirty="0" smtClean="0"/>
+              <a:rPr lang="en" dirty="0" smtClean="0"/>
               <a:t> </a:t>
             </a:r>
             <a:r>
-              <a:rPr lang="en" sz="2200" dirty="0"/>
+              <a:rPr lang="en" dirty="0"/>
               <a:t>diversified set of </a:t>
             </a:r>
             <a:r>
-              <a:rPr lang="en" sz="2200" dirty="0" smtClean="0"/>
+              <a:rPr lang="en" dirty="0" smtClean="0"/>
               <a:t>resources</a:t>
             </a:r>
-            <a:endParaRPr lang="en-US" sz="2200" dirty="0" smtClean="0"/>
+            <a:endParaRPr lang="en-US" dirty="0" smtClean="0"/>
           </a:p>
           <a:p>
             <a:pPr lvl="1">
@@ -10277,7 +10407,7 @@
               </a:lnSpc>
             </a:pPr>
             <a:r>
-              <a:rPr lang="en-US" sz="2200" dirty="0" smtClean="0"/>
+              <a:rPr lang="en-US" dirty="0" smtClean="0"/>
               <a:t>Co-Design and Execution: Multi-level and Integrated</a:t>
             </a:r>
           </a:p>
@@ -10494,7 +10624,67 @@
                 <a:ea typeface="ＭＳ Ｐゴシック" charset="0"/>
                 <a:cs typeface="ＭＳ Ｐゴシック" charset="0"/>
               </a:rPr>
-              <a:t>Metrics of performance is varied</a:t>
+              <a:t>Metrics of performance is </a:t>
+            </a:r>
+            <a:r>
+              <a:rPr lang="en-US" sz="2000" dirty="0" smtClean="0">
+                <a:latin typeface="Arial" charset="0"/>
+                <a:ea typeface="ＭＳ Ｐゴシック" charset="0"/>
+                <a:cs typeface="ＭＳ Ｐゴシック" charset="0"/>
+              </a:rPr>
+              <a:t>varied</a:t>
+            </a:r>
+          </a:p>
+          <a:p>
+            <a:pPr marL="457200" lvl="1" indent="0">
+              <a:lnSpc>
+                <a:spcPct val="90000"/>
+              </a:lnSpc>
+              <a:buNone/>
+            </a:pPr>
+            <a:endParaRPr lang="en-US" sz="2000" dirty="0" smtClean="0">
+              <a:latin typeface="Arial" charset="0"/>
+              <a:ea typeface="ＭＳ Ｐゴシック" charset="0"/>
+              <a:cs typeface="ＭＳ Ｐゴシック" charset="0"/>
+            </a:endParaRPr>
+          </a:p>
+          <a:p>
+            <a:pPr marL="344488" indent="-342900">
+              <a:lnSpc>
+                <a:spcPct val="90000"/>
+              </a:lnSpc>
+            </a:pPr>
+            <a:r>
+              <a:rPr lang="en-US" dirty="0" smtClean="0">
+                <a:latin typeface="Arial" charset="0"/>
+                <a:ea typeface="ＭＳ Ｐゴシック" charset="0"/>
+                <a:cs typeface="ＭＳ Ｐゴシック" charset="0"/>
+              </a:rPr>
+              <a:t>Application </a:t>
+            </a:r>
+            <a:r>
+              <a:rPr lang="en-US" dirty="0" smtClean="0">
+                <a:latin typeface="Arial" charset="0"/>
+                <a:ea typeface="ＭＳ Ｐゴシック" charset="0"/>
+                <a:cs typeface="ＭＳ Ｐゴシック" charset="0"/>
+              </a:rPr>
+              <a:t>structure </a:t>
+            </a:r>
+            <a:r>
+              <a:rPr lang="en-US" dirty="0" smtClean="0">
+                <a:latin typeface="Arial" charset="0"/>
+                <a:ea typeface="ＭＳ Ｐゴシック" charset="0"/>
+                <a:cs typeface="ＭＳ Ｐゴシック" charset="0"/>
+              </a:rPr>
+              <a:t>simple, but </a:t>
+            </a:r>
+            <a:r>
+              <a:rPr lang="en-US" dirty="0" smtClean="0">
+                <a:latin typeface="Arial" charset="0"/>
+                <a:ea typeface="ＭＳ Ｐゴシック" charset="0"/>
+                <a:cs typeface="ＭＳ Ｐゴシック" charset="0"/>
+              </a:rPr>
+              <a:t>infrastructural requirements difficult</a:t>
             </a:r>
           </a:p>
           <a:p>
@@ -10509,8 +10699,44 @@
                 <a:ea typeface="ＭＳ Ｐゴシック" charset="0"/>
                 <a:cs typeface="ＭＳ Ｐゴシック" charset="0"/>
               </a:rPr>
-              <a:t>Composed of heterogeneous services</a:t>
-            </a:r>
+              <a:t>Task-level composition and coordination is important and varied</a:t>
+            </a:r>
+          </a:p>
+          <a:p>
+            <a:pPr lvl="1">
+              <a:lnSpc>
+                <a:spcPct val="90000"/>
+              </a:lnSpc>
+            </a:pPr>
+            <a:r>
+              <a:rPr lang="en-US" sz="2000" dirty="0" smtClean="0">
+                <a:latin typeface="Arial" charset="0"/>
+                <a:ea typeface="ＭＳ Ｐゴシック" charset="0"/>
+                <a:cs typeface="ＭＳ Ｐゴシック" charset="0"/>
+              </a:rPr>
+              <a:t>External data infrastructure, </a:t>
+            </a:r>
+            <a:r>
+              <a:rPr lang="en-US" sz="2000" dirty="0" smtClean="0">
+                <a:latin typeface="Arial" charset="0"/>
+                <a:ea typeface="ＭＳ Ｐゴシック" charset="0"/>
+                <a:cs typeface="ＭＳ Ｐゴシック" charset="0"/>
+              </a:rPr>
+              <a:t>repositories</a:t>
+            </a:r>
+          </a:p>
+          <a:p>
+            <a:pPr marL="457200" lvl="1" indent="0">
+              <a:lnSpc>
+                <a:spcPct val="90000"/>
+              </a:lnSpc>
+              <a:buNone/>
+            </a:pPr>
+            <a:endParaRPr lang="en-US" sz="2000" dirty="0" smtClean="0">
+              <a:latin typeface="Arial" charset="0"/>
+              <a:ea typeface="ＭＳ Ｐゴシック" charset="0"/>
+              <a:cs typeface="ＭＳ Ｐゴシック" charset="0"/>
+            </a:endParaRPr>
           </a:p>
           <a:p>
             <a:pPr marL="344488" indent="-342900">
@@ -10524,7 +10750,23 @@
                 <a:ea typeface="ＭＳ Ｐゴシック" charset="0"/>
                 <a:cs typeface="ＭＳ Ｐゴシック" charset="0"/>
               </a:rPr>
-              <a:t>In general application structure simple but infrastructural requirements difficult</a:t>
+              <a:t>Design point is to support </a:t>
+            </a:r>
+            <a:r>
+              <a:rPr lang="en-US" dirty="0" err="1" smtClean="0">
+                <a:latin typeface="Arial" charset="0"/>
+                <a:ea typeface="ＭＳ Ｐゴシック" charset="0"/>
+                <a:cs typeface="ＭＳ Ｐゴシック" charset="0"/>
+              </a:rPr>
+              <a:t>exascale</a:t>
+            </a:r>
+            <a:r>
+              <a:rPr lang="en-US" dirty="0" smtClean="0">
+                <a:latin typeface="Arial" charset="0"/>
+                <a:ea typeface="ＭＳ Ｐゴシック" charset="0"/>
+                <a:cs typeface="ＭＳ Ｐゴシック" charset="0"/>
+              </a:rPr>
+              <a:t> collectively for many scalable applications on “production” infrastructure</a:t>
             </a:r>
           </a:p>
           <a:p>
@@ -10539,7 +10781,47 @@
                 <a:ea typeface="ＭＳ Ｐゴシック" charset="0"/>
                 <a:cs typeface="ＭＳ Ｐゴシック" charset="0"/>
               </a:rPr>
-              <a:t>Task-level composition and coordination is important and varied</a:t>
+              <a:t>Community (HEP) applications, essentially similar</a:t>
+            </a:r>
+          </a:p>
+          <a:p>
+            <a:pPr marL="227013" lvl="1" indent="-227013">
+              <a:lnSpc>
+                <a:spcPct val="90000"/>
+              </a:lnSpc>
+              <a:spcBef>
+                <a:spcPts val="1200"/>
+              </a:spcBef>
+              <a:buFontTx/>
+              <a:buChar char="•"/>
+            </a:pPr>
+            <a:r>
+              <a:rPr lang="en-US" sz="2000" dirty="0">
+                <a:latin typeface="Arial" charset="0"/>
+                <a:ea typeface="ＭＳ Ｐゴシック" charset="0"/>
+                <a:cs typeface="ＭＳ Ｐゴシック" charset="0"/>
+              </a:rPr>
+              <a:t>Explains why DC software environment is </a:t>
+            </a:r>
+            <a:r>
+              <a:rPr lang="en-US" sz="2000" dirty="0" smtClean="0">
+                <a:latin typeface="Arial" charset="0"/>
+                <a:ea typeface="ＭＳ Ｐゴシック" charset="0"/>
+                <a:cs typeface="ＭＳ Ｐゴシック" charset="0"/>
+              </a:rPr>
+              <a:t>complex, points to an </a:t>
+            </a:r>
+            <a:r>
+              <a:rPr lang="en-US" sz="2000" dirty="0" smtClean="0"/>
+              <a:t>important </a:t>
+            </a:r>
+            <a:r>
+              <a:rPr lang="en-US" sz="2000" dirty="0"/>
+              <a:t>role for </a:t>
+            </a:r>
+            <a:r>
+              <a:rPr lang="en-US" sz="2000" dirty="0" smtClean="0"/>
+              <a:t>middleware</a:t>
             </a:r>
           </a:p>
           <a:p>
@@ -10552,149 +10834,49 @@
               <a:rPr lang="en-US" sz="2000" dirty="0" smtClean="0">
                 <a:latin typeface="Arial" charset="0"/>
                 <a:ea typeface="ＭＳ Ｐゴシック" charset="0"/>
-                <a:cs typeface="ＭＳ Ｐゴシック" charset="0"/>
-              </a:rPr>
-              <a:t>External data infrastructure, repositories</a:t>
-            </a:r>
-          </a:p>
-          <a:p>
-            <a:pPr marL="344488" indent="-342900">
-              <a:lnSpc>
-                <a:spcPct val="90000"/>
-              </a:lnSpc>
-            </a:pPr>
-            <a:r>
-              <a:rPr lang="en-US" dirty="0" smtClean="0">
+              </a:rPr>
+              <a:t>Integrate </a:t>
+            </a:r>
+            <a:r>
+              <a:rPr lang="en-US" sz="2000" dirty="0">
                 <a:latin typeface="Arial" charset="0"/>
                 <a:ea typeface="ＭＳ Ｐゴシック" charset="0"/>
-                <a:cs typeface="ＭＳ Ｐゴシック" charset="0"/>
-              </a:rPr>
-              <a:t>Design point is to support </a:t>
-            </a:r>
-            <a:r>
-              <a:rPr lang="en-US" dirty="0" err="1" smtClean="0">
-                <a:latin typeface="Arial" charset="0"/>
-                <a:ea typeface="ＭＳ Ｐゴシック" charset="0"/>
-                <a:cs typeface="ＭＳ Ｐゴシック" charset="0"/>
-              </a:rPr>
-              <a:t>exascale</a:t>
-            </a:r>
-            <a:r>
-              <a:rPr lang="en-US" dirty="0" smtClean="0">
-                <a:latin typeface="Arial" charset="0"/>
-                <a:ea typeface="ＭＳ Ｐゴシック" charset="0"/>
-                <a:cs typeface="ＭＳ Ｐゴシック" charset="0"/>
-              </a:rPr>
-              <a:t> collectively for many scalable applications on “production” infrastructure</a:t>
-            </a:r>
-          </a:p>
-          <a:p>
-            <a:pPr lvl="1">
-              <a:lnSpc>
-                <a:spcPct val="90000"/>
-              </a:lnSpc>
-            </a:pPr>
+              </a:rPr>
+              <a:t>services and extend </a:t>
+            </a:r>
             <a:r>
               <a:rPr lang="en-US" sz="2000" dirty="0" smtClean="0">
                 <a:latin typeface="Arial" charset="0"/>
                 <a:ea typeface="ＭＳ Ｐゴシック" charset="0"/>
-                <a:cs typeface="ＭＳ Ｐゴシック" charset="0"/>
-              </a:rPr>
-              <a:t>Community (HEP) applications, essentially similar</a:t>
-            </a:r>
-          </a:p>
-          <a:p>
-            <a:pPr>
-              <a:lnSpc>
-                <a:spcPct val="90000"/>
-              </a:lnSpc>
-            </a:pPr>
-            <a:r>
-              <a:rPr lang="en-US" dirty="0" smtClean="0"/>
-              <a:t>Important </a:t>
-            </a:r>
-            <a:r>
-              <a:rPr lang="en-US" dirty="0"/>
-              <a:t>role for </a:t>
-            </a:r>
-            <a:r>
-              <a:rPr lang="en-US" dirty="0" smtClean="0"/>
-              <a:t>middleware</a:t>
-            </a:r>
-          </a:p>
-          <a:p>
-            <a:pPr lvl="1">
-              <a:lnSpc>
-                <a:spcPct val="90000"/>
-              </a:lnSpc>
-            </a:pPr>
+              </a:rPr>
+              <a:t>tools</a:t>
+            </a:r>
+            <a:r>
+              <a:rPr lang="en-US" sz="2000" dirty="0" smtClean="0"/>
+              <a:t> amidst </a:t>
+            </a:r>
             <a:r>
               <a:rPr lang="en-US" sz="2000" dirty="0" smtClean="0">
                 <a:latin typeface="Arial" charset="0"/>
                 <a:ea typeface="ＭＳ Ｐゴシック" charset="0"/>
               </a:rPr>
-              <a:t>Integrate </a:t>
+              <a:t>heterogeneous </a:t>
             </a:r>
             <a:r>
               <a:rPr lang="en-US" sz="2000" dirty="0">
                 <a:latin typeface="Arial" charset="0"/>
                 <a:ea typeface="ＭＳ Ｐゴシック" charset="0"/>
               </a:rPr>
-              <a:t>services and extend </a:t>
+              <a:t>software and system access </a:t>
             </a:r>
             <a:r>
               <a:rPr lang="en-US" sz="2000" dirty="0" smtClean="0">
                 <a:latin typeface="Arial" charset="0"/>
                 <a:ea typeface="ＭＳ Ｐゴシック" charset="0"/>
               </a:rPr>
-              <a:t>tools</a:t>
-            </a:r>
-            <a:r>
-              <a:rPr lang="en-US" sz="2000" dirty="0" smtClean="0"/>
-              <a:t> amidst </a:t>
-            </a:r>
-            <a:r>
-              <a:rPr lang="en-US" sz="2000" dirty="0" smtClean="0">
-                <a:latin typeface="Arial" charset="0"/>
-                <a:ea typeface="ＭＳ Ｐゴシック" charset="0"/>
-              </a:rPr>
-              <a:t>heterogeneous </a:t>
-            </a:r>
-            <a:r>
-              <a:rPr lang="en-US" sz="2000" dirty="0">
-                <a:latin typeface="Arial" charset="0"/>
-                <a:ea typeface="ＭＳ Ｐゴシック" charset="0"/>
-              </a:rPr>
-              <a:t>software and system access </a:t>
-            </a:r>
-            <a:r>
-              <a:rPr lang="en-US" sz="2000" dirty="0" smtClean="0">
-                <a:latin typeface="Arial" charset="0"/>
-                <a:ea typeface="ＭＳ Ｐゴシック" charset="0"/>
-              </a:rPr>
               <a:t>layers</a:t>
             </a:r>
             <a:endParaRPr lang="en-US" sz="2000" dirty="0"/>
-          </a:p>
-          <a:p>
-            <a:pPr lvl="1">
-              <a:lnSpc>
-                <a:spcPct val="90000"/>
-              </a:lnSpc>
-            </a:pPr>
-            <a:r>
-              <a:rPr lang="en-US" sz="2000" dirty="0" smtClean="0">
-                <a:latin typeface="Arial" charset="0"/>
-                <a:ea typeface="ＭＳ Ｐゴシック" charset="0"/>
-                <a:cs typeface="ＭＳ Ｐゴシック" charset="0"/>
-              </a:rPr>
-              <a:t>Explains why DC software environment is complex</a:t>
-            </a:r>
-            <a:endParaRPr lang="en-US" sz="2000" dirty="0">
-              <a:latin typeface="Arial" charset="0"/>
-              <a:ea typeface="ＭＳ Ｐゴシック" charset="0"/>
-              <a:cs typeface="ＭＳ Ｐゴシック" charset="0"/>
-            </a:endParaRPr>
           </a:p>
         </p:txBody>
       </p:sp>

</xml_diff>

<commit_message>
last commit before meeting starts. luckily talk post-lunch
</commit_message>
<xml_diff>
--- a/presentations/radical-modsim.pptx
+++ b/presentations/radical-modsim.pptx
@@ -5,7 +5,7 @@
     <p:sldMasterId id="2147483656" r:id="rId1"/>
   </p:sldMasterIdLst>
   <p:notesMasterIdLst>
-    <p:notesMasterId r:id="rId31"/>
+    <p:notesMasterId r:id="rId26"/>
   </p:notesMasterIdLst>
   <p:sldIdLst>
     <p:sldId id="256" r:id="rId2"/>
@@ -32,11 +32,6 @@
     <p:sldId id="295" r:id="rId23"/>
     <p:sldId id="348" r:id="rId24"/>
     <p:sldId id="336" r:id="rId25"/>
-    <p:sldId id="341" r:id="rId26"/>
-    <p:sldId id="342" r:id="rId27"/>
-    <p:sldId id="347" r:id="rId28"/>
-    <p:sldId id="349" r:id="rId29"/>
-    <p:sldId id="350" r:id="rId30"/>
   </p:sldIdLst>
   <p:sldSz cx="9144000" cy="6858000" type="screen4x3"/>
   <p:notesSz cx="6858000" cy="9144000"/>
@@ -1426,100 +1421,6 @@
 </p:notes>
 </file>
 
-<file path=ppt/notesSlides/notesSlide19.xml><?xml version="1.0" encoding="utf-8"?>
-<p:notes xmlns:a="http://schemas.openxmlformats.org/drawingml/2006/main" xmlns:r="http://schemas.openxmlformats.org/officeDocument/2006/relationships" xmlns:p="http://schemas.openxmlformats.org/presentationml/2006/main">
-  <p:cSld>
-    <p:spTree>
-      <p:nvGrpSpPr>
-        <p:cNvPr id="1" name=""/>
-        <p:cNvGrpSpPr/>
-        <p:nvPr/>
-      </p:nvGrpSpPr>
-      <p:grpSpPr>
-        <a:xfrm>
-          <a:off x="0" y="0"/>
-          <a:ext cx="0" cy="0"/>
-          <a:chOff x="0" y="0"/>
-          <a:chExt cx="0" cy="0"/>
-        </a:xfrm>
-      </p:grpSpPr>
-      <p:sp>
-        <p:nvSpPr>
-          <p:cNvPr id="2" name="Slide Image Placeholder 1"/>
-          <p:cNvSpPr>
-            <a:spLocks noGrp="1" noRot="1" noChangeAspect="1"/>
-          </p:cNvSpPr>
-          <p:nvPr>
-            <p:ph type="sldImg"/>
-          </p:nvPr>
-        </p:nvSpPr>
-        <p:spPr/>
-      </p:sp>
-      <p:sp>
-        <p:nvSpPr>
-          <p:cNvPr id="3" name="Notes Placeholder 2"/>
-          <p:cNvSpPr>
-            <a:spLocks noGrp="1"/>
-          </p:cNvSpPr>
-          <p:nvPr>
-            <p:ph type="body" idx="1"/>
-          </p:nvPr>
-        </p:nvSpPr>
-        <p:spPr/>
-        <p:txBody>
-          <a:bodyPr/>
-          <a:lstStyle/>
-          <a:p>
-            <a:r>
-              <a:rPr lang="en-US" dirty="0" smtClean="0"/>
-              <a:t>Middleware</a:t>
-            </a:r>
-            <a:r>
-              <a:rPr lang="en-US" baseline="0" dirty="0" smtClean="0"/>
-              <a:t> </a:t>
-            </a:r>
-            <a:r>
-              <a:rPr lang="en-US" dirty="0" smtClean="0"/>
-              <a:t>capabilities as</a:t>
-            </a:r>
-            <a:r>
-              <a:rPr lang="en-US" baseline="0" dirty="0" smtClean="0"/>
-              <a:t> an abstraction to resources</a:t>
-            </a:r>
-          </a:p>
-          <a:p>
-            <a:endParaRPr lang="en-US" baseline="0" dirty="0" smtClean="0"/>
-          </a:p>
-          <a:p>
-            <a:r>
-              <a:rPr lang="en-US" baseline="0" dirty="0" smtClean="0"/>
-              <a:t>Middleware’s responsibility to support the set of capabilities that an application asks for and determine the collection of resources that can/must be used to provide capability</a:t>
-            </a:r>
-          </a:p>
-          <a:p>
-            <a:endParaRPr lang="en-US" baseline="0" dirty="0" smtClean="0"/>
-          </a:p>
-          <a:p>
-            <a:endParaRPr lang="en-US" baseline="0" dirty="0" smtClean="0"/>
-          </a:p>
-          <a:p>
-            <a:endParaRPr lang="en-US" dirty="0"/>
-          </a:p>
-        </p:txBody>
-      </p:sp>
-    </p:spTree>
-    <p:extLst>
-      <p:ext uri="{BB962C8B-B14F-4D97-AF65-F5344CB8AC3E}">
-        <p14:creationId xmlns:p14="http://schemas.microsoft.com/office/powerpoint/2010/main" val="357425583"/>
-      </p:ext>
-    </p:extLst>
-  </p:cSld>
-  <p:clrMapOvr>
-    <a:masterClrMapping/>
-  </p:clrMapOvr>
-</p:notes>
-</file>
-
 <file path=ppt/notesSlides/notesSlide2.xml><?xml version="1.0" encoding="utf-8"?>
 <p:notes xmlns:a="http://schemas.openxmlformats.org/drawingml/2006/main" xmlns:r="http://schemas.openxmlformats.org/officeDocument/2006/relationships" xmlns:p="http://schemas.openxmlformats.org/presentationml/2006/main" showMasterSp="0" showMasterPhAnim="0">
   <p:cSld>
@@ -1610,230 +1511,6 @@
             <a:r>
               <a:rPr lang="en-US" baseline="0" dirty="0" smtClean="0"/>
               <a:t> a non-traditional way, by using the Organizers Qs as a way to summarize the talk</a:t>
-            </a:r>
-            <a:endParaRPr dirty="0"/>
-          </a:p>
-        </p:txBody>
-      </p:sp>
-    </p:spTree>
-  </p:cSld>
-  <p:clrMapOvr>
-    <a:masterClrMapping/>
-  </p:clrMapOvr>
-</p:notes>
-</file>
-
-<file path=ppt/notesSlides/notesSlide20.xml><?xml version="1.0" encoding="utf-8"?>
-<p:notes xmlns:a="http://schemas.openxmlformats.org/drawingml/2006/main" xmlns:r="http://schemas.openxmlformats.org/officeDocument/2006/relationships" xmlns:p="http://schemas.openxmlformats.org/presentationml/2006/main">
-  <p:cSld>
-    <p:spTree>
-      <p:nvGrpSpPr>
-        <p:cNvPr id="1" name=""/>
-        <p:cNvGrpSpPr/>
-        <p:nvPr/>
-      </p:nvGrpSpPr>
-      <p:grpSpPr>
-        <a:xfrm>
-          <a:off x="0" y="0"/>
-          <a:ext cx="0" cy="0"/>
-          <a:chOff x="0" y="0"/>
-          <a:chExt cx="0" cy="0"/>
-        </a:xfrm>
-      </p:grpSpPr>
-      <p:sp>
-        <p:nvSpPr>
-          <p:cNvPr id="2" name="Slide Image Placeholder 1"/>
-          <p:cNvSpPr>
-            <a:spLocks noGrp="1" noRot="1" noChangeAspect="1"/>
-          </p:cNvSpPr>
-          <p:nvPr>
-            <p:ph type="sldImg"/>
-          </p:nvPr>
-        </p:nvSpPr>
-        <p:spPr>
-          <a:xfrm>
-            <a:off x="1143000" y="685800"/>
-            <a:ext cx="4572000" cy="3429000"/>
-          </a:xfrm>
-        </p:spPr>
-      </p:sp>
-      <p:sp>
-        <p:nvSpPr>
-          <p:cNvPr id="3" name="Notes Placeholder 2"/>
-          <p:cNvSpPr>
-            <a:spLocks noGrp="1"/>
-          </p:cNvSpPr>
-          <p:nvPr>
-            <p:ph type="body" idx="1"/>
-          </p:nvPr>
-        </p:nvSpPr>
-        <p:spPr/>
-        <p:txBody>
-          <a:bodyPr/>
-          <a:lstStyle/>
-          <a:p>
-            <a:pPr marL="0" marR="0" indent="0" algn="l" defTabSz="457200" rtl="0" eaLnBrk="1" fontAlgn="auto" latinLnBrk="0" hangingPunct="1">
-              <a:lnSpc>
-                <a:spcPct val="100000"/>
-              </a:lnSpc>
-              <a:spcBef>
-                <a:spcPts val="0"/>
-              </a:spcBef>
-              <a:spcAft>
-                <a:spcPts val="0"/>
-              </a:spcAft>
-              <a:buClrTx/>
-              <a:buSzTx/>
-              <a:buFontTx/>
-              <a:buNone/>
-              <a:tabLst/>
-              <a:defRPr/>
-            </a:pPr>
-            <a:r>
-              <a:rPr lang="en-US" dirty="0" smtClean="0"/>
-              <a:t>We take the schematic of NGMW and show how the different levels at which the Models work, (ii) how different models interact, especially (a) Andre and Christian’s work/interface, (ii) I* and F*.</a:t>
-            </a:r>
-          </a:p>
-          <a:p>
-            <a:endParaRPr lang="en-US" dirty="0"/>
-          </a:p>
-        </p:txBody>
-      </p:sp>
-    </p:spTree>
-    <p:extLst>
-      <p:ext uri="{BB962C8B-B14F-4D97-AF65-F5344CB8AC3E}">
-        <p14:creationId xmlns:p14="http://schemas.microsoft.com/office/powerpoint/2010/main" val="1073575463"/>
-      </p:ext>
-    </p:extLst>
-  </p:cSld>
-  <p:clrMapOvr>
-    <a:masterClrMapping/>
-  </p:clrMapOvr>
-</p:notes>
-</file>
-
-<file path=ppt/notesSlides/notesSlide21.xml><?xml version="1.0" encoding="utf-8"?>
-<p:notes xmlns:a="http://schemas.openxmlformats.org/drawingml/2006/main" xmlns:r="http://schemas.openxmlformats.org/officeDocument/2006/relationships" xmlns:p="http://schemas.openxmlformats.org/presentationml/2006/main" showMasterSp="0" showMasterPhAnim="0">
-  <p:cSld>
-    <p:spTree>
-      <p:nvGrpSpPr>
-        <p:cNvPr id="1" name="Shape 49"/>
-        <p:cNvGrpSpPr/>
-        <p:nvPr/>
-      </p:nvGrpSpPr>
-      <p:grpSpPr>
-        <a:xfrm>
-          <a:off x="0" y="0"/>
-          <a:ext cx="0" cy="0"/>
-          <a:chOff x="0" y="0"/>
-          <a:chExt cx="0" cy="0"/>
-        </a:xfrm>
-      </p:grpSpPr>
-      <p:sp>
-        <p:nvSpPr>
-          <p:cNvPr id="50" name="Shape 50"/>
-          <p:cNvSpPr>
-            <a:spLocks noGrp="1" noRot="1" noChangeAspect="1"/>
-          </p:cNvSpPr>
-          <p:nvPr>
-            <p:ph type="sldImg" idx="2"/>
-          </p:nvPr>
-        </p:nvSpPr>
-        <p:spPr>
-          <a:xfrm>
-            <a:off x="1143000" y="685800"/>
-            <a:ext cx="4572000" cy="3429000"/>
-          </a:xfrm>
-          <a:custGeom>
-            <a:avLst/>
-            <a:gdLst/>
-            <a:ahLst/>
-            <a:cxnLst/>
-            <a:rect l="0" t="0" r="0" b="0"/>
-            <a:pathLst>
-              <a:path w="120000" h="120000" extrusionOk="0">
-                <a:moveTo>
-                  <a:pt x="0" y="0"/>
-                </a:moveTo>
-                <a:lnTo>
-                  <a:pt x="120000" y="0"/>
-                </a:lnTo>
-                <a:lnTo>
-                  <a:pt x="120000" y="120000"/>
-                </a:lnTo>
-                <a:lnTo>
-                  <a:pt x="0" y="120000"/>
-                </a:lnTo>
-                <a:close/>
-              </a:path>
-            </a:pathLst>
-          </a:custGeom>
-        </p:spPr>
-      </p:sp>
-      <p:sp>
-        <p:nvSpPr>
-          <p:cNvPr id="51" name="Shape 51"/>
-          <p:cNvSpPr txBox="1">
-            <a:spLocks noGrp="1"/>
-          </p:cNvSpPr>
-          <p:nvPr>
-            <p:ph type="body" idx="1"/>
-          </p:nvPr>
-        </p:nvSpPr>
-        <p:spPr>
-          <a:xfrm>
-            <a:off x="685800" y="4343400"/>
-            <a:ext cx="5486399" cy="4114800"/>
-          </a:xfrm>
-          <a:prstGeom prst="rect">
-            <a:avLst/>
-          </a:prstGeom>
-        </p:spPr>
-        <p:txBody>
-          <a:bodyPr lIns="91425" tIns="91425" rIns="91425" bIns="91425" anchor="t" anchorCtr="0">
-            <a:noAutofit/>
-          </a:bodyPr>
-          <a:lstStyle/>
-          <a:p>
-            <a:r>
-              <a:rPr lang="en-US" dirty="0" smtClean="0">
-                <a:solidFill>
-                  <a:srgbClr val="606060"/>
-                </a:solidFill>
-              </a:rPr>
-              <a:t>D</a:t>
-            </a:r>
-            <a:r>
-              <a:rPr lang="en" dirty="0" smtClean="0">
-                <a:solidFill>
-                  <a:srgbClr val="606060"/>
-                </a:solidFill>
-              </a:rPr>
-              <a:t>ata generation </a:t>
-            </a:r>
-            <a:r>
-              <a:rPr lang="en-US" dirty="0" smtClean="0">
-                <a:solidFill>
-                  <a:srgbClr val="606060"/>
-                </a:solidFill>
-              </a:rPr>
-              <a:t>doubles every </a:t>
-            </a:r>
-            <a:r>
-              <a:rPr lang="en" dirty="0" smtClean="0">
-                <a:solidFill>
-                  <a:srgbClr val="606060"/>
-                </a:solidFill>
-              </a:rPr>
-              <a:t>&lt;&lt; 12 months</a:t>
-            </a:r>
-            <a:r>
-              <a:rPr lang="en-US" dirty="0" smtClean="0">
-                <a:solidFill>
-                  <a:srgbClr val="606060"/>
-                </a:solidFill>
-              </a:rPr>
-              <a:t>, i.e. faster than the doubling  rate of data storage (roughly 18 months)</a:t>
             </a:r>
             <a:endParaRPr dirty="0"/>
           </a:p>
@@ -2105,8 +1782,24 @@
             </a:pPr>
             <a:r>
               <a:rPr lang="en-US" dirty="0" smtClean="0"/>
-              <a:t>Sub problem X is better running on a non-leadership class machine? </a:t>
-            </a:r>
+              <a:t>Integration of Information</a:t>
+            </a:r>
+            <a:r>
+              <a:rPr lang="en-US" baseline="0" dirty="0" smtClean="0"/>
+              <a:t>: </a:t>
+            </a:r>
+            <a:r>
+              <a:rPr lang="en-US" dirty="0" smtClean="0"/>
+              <a:t>Applications/Services/Tools</a:t>
+            </a:r>
+            <a:r>
+              <a:rPr lang="en-US" baseline="0" dirty="0" smtClean="0"/>
+              <a:t> about resources – Critical role for middleware</a:t>
+            </a:r>
+            <a:endParaRPr lang="en-US" dirty="0" smtClean="0"/>
+          </a:p>
+          <a:p>
+            <a:endParaRPr lang="en-US" dirty="0" smtClean="0"/>
           </a:p>
           <a:p>
             <a:endParaRPr lang="en-US" dirty="0"/>
@@ -7006,15 +6699,11 @@
           <a:p>
             <a:r>
               <a:rPr lang="en-US" dirty="0" smtClean="0"/>
-              <a:t>Design </a:t>
-            </a:r>
-            <a:r>
-              <a:rPr lang="en-US" dirty="0" err="1" smtClean="0"/>
-              <a:t>Obj</a:t>
-            </a:r>
-            <a:r>
-              <a:rPr lang="en-US" dirty="0" smtClean="0"/>
-              <a:t>: Multi-level and Integrated Reasoning</a:t>
+              <a:t>Design Objective</a:t>
+            </a:r>
+            <a:r>
+              <a:rPr lang="en-US" dirty="0" smtClean="0"/>
+              <a:t>: Multi-level and Integrated</a:t>
             </a:r>
             <a:endParaRPr lang="en-US" dirty="0"/>
           </a:p>
@@ -7503,7 +7192,18 @@
                   </a:schemeClr>
                 </a:solidFill>
               </a:rPr>
-              <a:t>for a model-based, capability-driven NGMW</a:t>
+              <a:t>for a </a:t>
+            </a:r>
+            <a:r>
+              <a:rPr lang="en-US" sz="2000" dirty="0" smtClean="0">
+                <a:solidFill>
+                  <a:schemeClr val="tx1">
+                    <a:lumMod val="65000"/>
+                    <a:lumOff val="35000"/>
+                  </a:schemeClr>
+                </a:solidFill>
+              </a:rPr>
+              <a:t>capability-based NGMW</a:t>
             </a:r>
           </a:p>
           <a:p>
@@ -7522,7 +7222,18 @@
                   </a:schemeClr>
                 </a:solidFill>
               </a:rPr>
-              <a:t>Models at multiple levels and their </a:t>
+              <a:t>Models </a:t>
+            </a:r>
+            <a:r>
+              <a:rPr lang="en-US" sz="2000" dirty="0" smtClean="0">
+                <a:solidFill>
+                  <a:schemeClr val="tx1">
+                    <a:lumMod val="65000"/>
+                    <a:lumOff val="35000"/>
+                  </a:schemeClr>
+                </a:solidFill>
+              </a:rPr>
+              <a:t>at multiple levels and their </a:t>
             </a:r>
             <a:r>
               <a:rPr lang="en-US" sz="2000" dirty="0" smtClean="0">
@@ -8512,7 +8223,7 @@
             <a:pPr lvl="1"/>
             <a:r>
               <a:rPr lang="en-US" dirty="0" smtClean="0"/>
-              <a:t>Model-based, Capability-driven Middleware for DEC</a:t>
+              <a:t>Capability-based Middleware for DEC</a:t>
             </a:r>
           </a:p>
           <a:p>
@@ -8968,870 +8679,6 @@
   <p:clrMapOvr>
     <a:masterClrMapping/>
   </p:clrMapOvr>
-</p:sld>
-</file>
-
-<file path=ppt/slides/slide25.xml><?xml version="1.0" encoding="utf-8"?>
-<p:sld xmlns:a="http://schemas.openxmlformats.org/drawingml/2006/main" xmlns:r="http://schemas.openxmlformats.org/officeDocument/2006/relationships" xmlns:p="http://schemas.openxmlformats.org/presentationml/2006/main" show="0">
-  <p:cSld>
-    <p:spTree>
-      <p:nvGrpSpPr>
-        <p:cNvPr id="1" name=""/>
-        <p:cNvGrpSpPr/>
-        <p:nvPr/>
-      </p:nvGrpSpPr>
-      <p:grpSpPr>
-        <a:xfrm>
-          <a:off x="0" y="0"/>
-          <a:ext cx="0" cy="0"/>
-          <a:chOff x="0" y="0"/>
-          <a:chExt cx="0" cy="0"/>
-        </a:xfrm>
-      </p:grpSpPr>
-      <p:sp>
-        <p:nvSpPr>
-          <p:cNvPr id="6" name="Title 5"/>
-          <p:cNvSpPr>
-            <a:spLocks noGrp="1"/>
-          </p:cNvSpPr>
-          <p:nvPr>
-            <p:ph type="title"/>
-          </p:nvPr>
-        </p:nvSpPr>
-        <p:spPr/>
-        <p:txBody>
-          <a:bodyPr/>
-          <a:lstStyle/>
-          <a:p>
-            <a:r>
-              <a:rPr lang="en-US" dirty="0" smtClean="0"/>
-              <a:t>NGMW Schematic</a:t>
-            </a:r>
-            <a:endParaRPr lang="en-US" dirty="0"/>
-          </a:p>
-        </p:txBody>
-      </p:sp>
-      <p:pic>
-        <p:nvPicPr>
-          <p:cNvPr id="3" name="Content Placeholder 2" descr="ngmw-schematic-1.png"/>
-          <p:cNvPicPr>
-            <a:picLocks noGrp="1" noChangeAspect="1"/>
-          </p:cNvPicPr>
-          <p:nvPr>
-            <p:ph idx="1"/>
-          </p:nvPr>
-        </p:nvPicPr>
-        <p:blipFill>
-          <a:blip r:embed="rId3">
-            <a:extLst>
-              <a:ext uri="{28A0092B-C50C-407E-A947-70E740481C1C}">
-                <a14:useLocalDpi xmlns:a14="http://schemas.microsoft.com/office/drawing/2010/main" val="0"/>
-              </a:ext>
-            </a:extLst>
-          </a:blip>
-          <a:srcRect l="-2275" r="-2275"/>
-          <a:stretch>
-            <a:fillRect/>
-          </a:stretch>
-        </p:blipFill>
-        <p:spPr/>
-      </p:pic>
-    </p:spTree>
-    <p:extLst>
-      <p:ext uri="{BB962C8B-B14F-4D97-AF65-F5344CB8AC3E}">
-        <p14:creationId xmlns:p14="http://schemas.microsoft.com/office/powerpoint/2010/main" val="957286402"/>
-      </p:ext>
-    </p:extLst>
-  </p:cSld>
-  <p:clrMapOvr>
-    <a:masterClrMapping/>
-  </p:clrMapOvr>
-  <mc:AlternateContent xmlns:mc="http://schemas.openxmlformats.org/markup-compatibility/2006">
-    <mc:Choice xmlns:p14="http://schemas.microsoft.com/office/powerpoint/2010/main" Requires="p14">
-      <p:transition spd="slow" p14:dur="2000"/>
-    </mc:Choice>
-    <mc:Fallback>
-      <p:transition xmlns:p14="http://schemas.microsoft.com/office/powerpoint/2010/main" spd="slow"/>
-    </mc:Fallback>
-  </mc:AlternateContent>
-</p:sld>
-</file>
-
-<file path=ppt/slides/slide26.xml><?xml version="1.0" encoding="utf-8"?>
-<p:sld xmlns:a="http://schemas.openxmlformats.org/drawingml/2006/main" xmlns:r="http://schemas.openxmlformats.org/officeDocument/2006/relationships" xmlns:p="http://schemas.openxmlformats.org/presentationml/2006/main" show="0">
-  <p:cSld>
-    <p:spTree>
-      <p:nvGrpSpPr>
-        <p:cNvPr id="1" name=""/>
-        <p:cNvGrpSpPr/>
-        <p:nvPr/>
-      </p:nvGrpSpPr>
-      <p:grpSpPr>
-        <a:xfrm>
-          <a:off x="0" y="0"/>
-          <a:ext cx="0" cy="0"/>
-          <a:chOff x="0" y="0"/>
-          <a:chExt cx="0" cy="0"/>
-        </a:xfrm>
-      </p:grpSpPr>
-      <p:sp>
-        <p:nvSpPr>
-          <p:cNvPr id="2" name="Title 1"/>
-          <p:cNvSpPr>
-            <a:spLocks noGrp="1"/>
-          </p:cNvSpPr>
-          <p:nvPr>
-            <p:ph type="title"/>
-          </p:nvPr>
-        </p:nvSpPr>
-        <p:spPr/>
-        <p:txBody>
-          <a:bodyPr/>
-          <a:lstStyle/>
-          <a:p>
-            <a:r>
-              <a:rPr lang="en-US" dirty="0" smtClean="0"/>
-              <a:t>P* </a:t>
-            </a:r>
-            <a:endParaRPr lang="en-US" dirty="0"/>
-          </a:p>
-        </p:txBody>
-      </p:sp>
-      <p:sp>
-        <p:nvSpPr>
-          <p:cNvPr id="4" name="Content Placeholder 3"/>
-          <p:cNvSpPr>
-            <a:spLocks noGrp="1"/>
-          </p:cNvSpPr>
-          <p:nvPr>
-            <p:ph idx="1"/>
-          </p:nvPr>
-        </p:nvSpPr>
-        <p:spPr/>
-        <p:txBody>
-          <a:bodyPr/>
-          <a:lstStyle/>
-          <a:p>
-            <a:r>
-              <a:rPr lang="en-US" dirty="0" smtClean="0"/>
-              <a:t>Pilot-Jobs provide an abstraction for dynamic resource management. Currently abstraction is job based, but can be extended to include network and storage as other resource elements</a:t>
-            </a:r>
-          </a:p>
-          <a:p>
-            <a:r>
-              <a:rPr lang="en-US" dirty="0" smtClean="0"/>
-              <a:t>P</a:t>
-            </a:r>
-            <a:r>
-              <a:rPr lang="en-US" dirty="0"/>
-              <a:t>* is a conceptual model for </a:t>
-            </a:r>
-            <a:r>
-              <a:rPr lang="en-US" dirty="0" smtClean="0"/>
-              <a:t>Pilot-based resource</a:t>
-            </a:r>
-            <a:endParaRPr lang="en-US" dirty="0"/>
-          </a:p>
-        </p:txBody>
-      </p:sp>
-    </p:spTree>
-    <p:extLst>
-      <p:ext uri="{BB962C8B-B14F-4D97-AF65-F5344CB8AC3E}">
-        <p14:creationId xmlns:p14="http://schemas.microsoft.com/office/powerpoint/2010/main" val="1240035077"/>
-      </p:ext>
-    </p:extLst>
-  </p:cSld>
-  <p:clrMapOvr>
-    <a:masterClrMapping/>
-  </p:clrMapOvr>
-  <mc:AlternateContent xmlns:mc="http://schemas.openxmlformats.org/markup-compatibility/2006">
-    <mc:Choice xmlns:p14="http://schemas.microsoft.com/office/powerpoint/2010/main" Requires="p14">
-      <p:transition spd="slow" p14:dur="2000"/>
-    </mc:Choice>
-    <mc:Fallback>
-      <p:transition xmlns:p14="http://schemas.microsoft.com/office/powerpoint/2010/main" spd="slow"/>
-    </mc:Fallback>
-  </mc:AlternateContent>
-</p:sld>
-</file>
-
-<file path=ppt/slides/slide27.xml><?xml version="1.0" encoding="utf-8"?>
-<p:sld xmlns:a="http://schemas.openxmlformats.org/drawingml/2006/main" xmlns:r="http://schemas.openxmlformats.org/officeDocument/2006/relationships" xmlns:p="http://schemas.openxmlformats.org/presentationml/2006/main">
-  <p:cSld>
-    <p:spTree>
-      <p:nvGrpSpPr>
-        <p:cNvPr id="1" name=""/>
-        <p:cNvGrpSpPr/>
-        <p:nvPr/>
-      </p:nvGrpSpPr>
-      <p:grpSpPr>
-        <a:xfrm>
-          <a:off x="0" y="0"/>
-          <a:ext cx="0" cy="0"/>
-          <a:chOff x="0" y="0"/>
-          <a:chExt cx="0" cy="0"/>
-        </a:xfrm>
-      </p:grpSpPr>
-      <p:sp>
-        <p:nvSpPr>
-          <p:cNvPr id="2" name="Title 1"/>
-          <p:cNvSpPr>
-            <a:spLocks noGrp="1"/>
-          </p:cNvSpPr>
-          <p:nvPr>
-            <p:ph type="title"/>
-          </p:nvPr>
-        </p:nvSpPr>
-        <p:spPr/>
-        <p:txBody>
-          <a:bodyPr/>
-          <a:lstStyle/>
-          <a:p>
-            <a:r>
-              <a:rPr lang="en-US" dirty="0" smtClean="0"/>
-              <a:t>*.* : Putting it together</a:t>
-            </a:r>
-            <a:endParaRPr lang="en-US" dirty="0"/>
-          </a:p>
-        </p:txBody>
-      </p:sp>
-      <p:pic>
-        <p:nvPicPr>
-          <p:cNvPr id="4" name="Content Placeholder 3" descr="ngmw-schematic-3.png"/>
-          <p:cNvPicPr>
-            <a:picLocks noGrp="1" noChangeAspect="1"/>
-          </p:cNvPicPr>
-          <p:nvPr>
-            <p:ph sz="half" idx="1"/>
-          </p:nvPr>
-        </p:nvPicPr>
-        <p:blipFill>
-          <a:blip r:embed="rId3">
-            <a:extLst>
-              <a:ext uri="{28A0092B-C50C-407E-A947-70E740481C1C}">
-                <a14:useLocalDpi xmlns:a14="http://schemas.microsoft.com/office/drawing/2010/main" val="0"/>
-              </a:ext>
-            </a:extLst>
-          </a:blip>
-          <a:srcRect t="4" b="4"/>
-          <a:stretch>
-            <a:fillRect/>
-          </a:stretch>
-        </p:blipFill>
-        <p:spPr>
-          <a:xfrm>
-            <a:off x="4840808" y="1203158"/>
-            <a:ext cx="4038600" cy="4533900"/>
-          </a:xfrm>
-        </p:spPr>
-      </p:pic>
-      <p:sp>
-        <p:nvSpPr>
-          <p:cNvPr id="3" name="Content Placeholder 2"/>
-          <p:cNvSpPr>
-            <a:spLocks noGrp="1"/>
-          </p:cNvSpPr>
-          <p:nvPr>
-            <p:ph sz="half" idx="2"/>
-          </p:nvPr>
-        </p:nvSpPr>
-        <p:spPr>
-          <a:xfrm>
-            <a:off x="282231" y="1176421"/>
-            <a:ext cx="4279074" cy="4533900"/>
-          </a:xfrm>
-        </p:spPr>
-        <p:txBody>
-          <a:bodyPr/>
-          <a:lstStyle/>
-          <a:p>
-            <a:r>
-              <a:rPr lang="en-US" sz="2000" dirty="0" smtClean="0"/>
-              <a:t>P*: Decouples dynamic resource management from job and task management</a:t>
-            </a:r>
-          </a:p>
-          <a:p>
-            <a:r>
-              <a:rPr lang="en-US" sz="2000" dirty="0" smtClean="0"/>
-              <a:t>F*: Resource aggregation and provisioning decoupled from job and resource management</a:t>
-            </a:r>
-          </a:p>
-          <a:p>
-            <a:pPr lvl="1"/>
-            <a:r>
-              <a:rPr lang="en-US" sz="1800" dirty="0" smtClean="0"/>
-              <a:t>Furthers the separation of concerns</a:t>
-            </a:r>
-          </a:p>
-          <a:p>
-            <a:r>
-              <a:rPr lang="en-US" sz="2000" dirty="0" smtClean="0"/>
-              <a:t>C* provides, F</a:t>
-            </a:r>
-            <a:r>
-              <a:rPr lang="en-US" sz="2000" dirty="0"/>
-              <a:t>* </a:t>
-            </a:r>
-            <a:r>
-              <a:rPr lang="en-US" sz="2000" dirty="0" smtClean="0"/>
-              <a:t>decides</a:t>
-            </a:r>
-            <a:r>
-              <a:rPr lang="en-US" sz="2000" dirty="0"/>
-              <a:t>, P* </a:t>
-            </a:r>
-            <a:r>
-              <a:rPr lang="en-US" sz="2000" dirty="0" smtClean="0"/>
-              <a:t>executes</a:t>
-            </a:r>
-          </a:p>
-          <a:p>
-            <a:r>
-              <a:rPr lang="en-US" sz="2000" dirty="0" smtClean="0"/>
-              <a:t>Federate at the capability level</a:t>
-            </a:r>
-          </a:p>
-          <a:p>
-            <a:r>
-              <a:rPr lang="en-US" sz="2000" dirty="0" smtClean="0"/>
-              <a:t>P* creates the overlay at the resource level</a:t>
-            </a:r>
-            <a:endParaRPr lang="en-US" sz="2000" dirty="0"/>
-          </a:p>
-          <a:p>
-            <a:endParaRPr lang="en-US" sz="2000" dirty="0"/>
-          </a:p>
-        </p:txBody>
-      </p:sp>
-    </p:spTree>
-    <p:extLst>
-      <p:ext uri="{BB962C8B-B14F-4D97-AF65-F5344CB8AC3E}">
-        <p14:creationId xmlns:p14="http://schemas.microsoft.com/office/powerpoint/2010/main" val="1576754480"/>
-      </p:ext>
-    </p:extLst>
-  </p:cSld>
-  <p:clrMapOvr>
-    <a:masterClrMapping/>
-  </p:clrMapOvr>
-</p:sld>
-</file>
-
-<file path=ppt/slides/slide28.xml><?xml version="1.0" encoding="utf-8"?>
-<p:sld xmlns:a="http://schemas.openxmlformats.org/drawingml/2006/main" xmlns:r="http://schemas.openxmlformats.org/officeDocument/2006/relationships" xmlns:p="http://schemas.openxmlformats.org/presentationml/2006/main">
-  <p:cSld>
-    <p:spTree>
-      <p:nvGrpSpPr>
-        <p:cNvPr id="1" name=""/>
-        <p:cNvGrpSpPr/>
-        <p:nvPr/>
-      </p:nvGrpSpPr>
-      <p:grpSpPr>
-        <a:xfrm>
-          <a:off x="0" y="0"/>
-          <a:ext cx="0" cy="0"/>
-          <a:chOff x="0" y="0"/>
-          <a:chExt cx="0" cy="0"/>
-        </a:xfrm>
-      </p:grpSpPr>
-      <p:sp>
-        <p:nvSpPr>
-          <p:cNvPr id="58369" name="Title 1"/>
-          <p:cNvSpPr>
-            <a:spLocks noGrp="1"/>
-          </p:cNvSpPr>
-          <p:nvPr>
-            <p:ph type="title"/>
-          </p:nvPr>
-        </p:nvSpPr>
-        <p:spPr/>
-        <p:txBody>
-          <a:bodyPr/>
-          <a:lstStyle/>
-          <a:p>
-            <a:r>
-              <a:rPr lang="en-US" dirty="0" smtClean="0">
-                <a:latin typeface="Arial" charset="0"/>
-                <a:ea typeface="ＭＳ Ｐゴシック" charset="0"/>
-                <a:cs typeface="ＭＳ Ｐゴシック" charset="0"/>
-              </a:rPr>
-              <a:t>Mapping Tasks to Resources</a:t>
-            </a:r>
-            <a:endParaRPr lang="en-US" dirty="0">
-              <a:latin typeface="Arial" charset="0"/>
-              <a:ea typeface="ＭＳ Ｐゴシック" charset="0"/>
-              <a:cs typeface="ＭＳ Ｐゴシック" charset="0"/>
-            </a:endParaRPr>
-          </a:p>
-        </p:txBody>
-      </p:sp>
-      <p:sp>
-        <p:nvSpPr>
-          <p:cNvPr id="58370" name="Content Placeholder 2"/>
-          <p:cNvSpPr>
-            <a:spLocks noGrp="1"/>
-          </p:cNvSpPr>
-          <p:nvPr>
-            <p:ph idx="1"/>
-          </p:nvPr>
-        </p:nvSpPr>
-        <p:spPr/>
-        <p:txBody>
-          <a:bodyPr/>
-          <a:lstStyle/>
-          <a:p>
-            <a:r>
-              <a:rPr lang="en-US" dirty="0">
-                <a:latin typeface="Arial" charset="0"/>
-                <a:ea typeface="ＭＳ Ｐゴシック" charset="0"/>
-                <a:cs typeface="ＭＳ Ｐゴシック" charset="0"/>
-              </a:rPr>
-              <a:t>Different aspects of mapping tasks to resources</a:t>
-            </a:r>
-          </a:p>
-          <a:p>
-            <a:pPr lvl="1"/>
-            <a:r>
-              <a:rPr lang="en-US" dirty="0" smtClean="0">
-                <a:latin typeface="Arial" charset="0"/>
-                <a:ea typeface="ＭＳ Ｐゴシック" charset="0"/>
-              </a:rPr>
-              <a:t>Optimal </a:t>
-            </a:r>
-            <a:r>
-              <a:rPr lang="en-US" dirty="0">
-                <a:latin typeface="Arial" charset="0"/>
-                <a:ea typeface="ＭＳ Ｐゴシック" charset="0"/>
-              </a:rPr>
-              <a:t>Characterization: Finding the optimal workload </a:t>
-            </a:r>
-            <a:r>
-              <a:rPr lang="en-US" dirty="0" smtClean="0">
-                <a:latin typeface="Arial" charset="0"/>
-                <a:ea typeface="ＭＳ Ｐゴシック" charset="0"/>
-              </a:rPr>
-              <a:t>characterization </a:t>
-            </a:r>
-            <a:r>
-              <a:rPr lang="en-US" dirty="0">
-                <a:latin typeface="Arial" charset="0"/>
-                <a:ea typeface="ＭＳ Ｐゴシック" charset="0"/>
-              </a:rPr>
-              <a:t>(of an application)</a:t>
-            </a:r>
-          </a:p>
-          <a:p>
-            <a:pPr lvl="2"/>
-            <a:r>
-              <a:rPr lang="en-US" dirty="0">
-                <a:latin typeface="Arial" charset="0"/>
-                <a:ea typeface="ＭＳ Ｐゴシック" charset="0"/>
-              </a:rPr>
-              <a:t>Generality versus specificity. Class of Applications versus Many application classes/types</a:t>
-            </a:r>
-          </a:p>
-          <a:p>
-            <a:pPr lvl="2"/>
-            <a:r>
-              <a:rPr lang="en-US" dirty="0">
-                <a:latin typeface="Arial" charset="0"/>
-                <a:ea typeface="ＭＳ Ｐゴシック" charset="0"/>
-              </a:rPr>
-              <a:t>Different applications have different </a:t>
-            </a:r>
-            <a:r>
-              <a:rPr lang="en-US" dirty="0" smtClean="0">
-                <a:latin typeface="Arial" charset="0"/>
-                <a:ea typeface="ＭＳ Ｐゴシック" charset="0"/>
-              </a:rPr>
-              <a:t>metrics</a:t>
-            </a:r>
-          </a:p>
-          <a:p>
-            <a:pPr lvl="2"/>
-            <a:endParaRPr lang="en-US" dirty="0">
-              <a:latin typeface="Arial" charset="0"/>
-              <a:ea typeface="ＭＳ Ｐゴシック" charset="0"/>
-            </a:endParaRPr>
-          </a:p>
-          <a:p>
-            <a:pPr lvl="1"/>
-            <a:r>
-              <a:rPr lang="en-US" dirty="0" smtClean="0">
-                <a:latin typeface="Arial" charset="0"/>
-                <a:ea typeface="ＭＳ Ｐゴシック" charset="0"/>
-              </a:rPr>
-              <a:t>Optimal </a:t>
-            </a:r>
-            <a:r>
-              <a:rPr lang="en-US" dirty="0">
-                <a:latin typeface="Arial" charset="0"/>
-                <a:ea typeface="ＭＳ Ｐゴシック" charset="0"/>
-              </a:rPr>
-              <a:t>Federation: Finding the optimal </a:t>
-            </a:r>
-            <a:r>
-              <a:rPr lang="en-US" dirty="0" smtClean="0">
-                <a:latin typeface="Arial" charset="0"/>
-                <a:ea typeface="ＭＳ Ｐゴシック" charset="0"/>
-              </a:rPr>
-              <a:t>infrastructure </a:t>
-            </a:r>
-            <a:r>
-              <a:rPr lang="en-US" dirty="0">
-                <a:latin typeface="Arial" charset="0"/>
-                <a:ea typeface="ＭＳ Ｐゴシック" charset="0"/>
-              </a:rPr>
-              <a:t>configurations for a given workload </a:t>
-            </a:r>
-          </a:p>
-          <a:p>
-            <a:pPr lvl="2"/>
-            <a:r>
-              <a:rPr lang="en-US" dirty="0">
-                <a:latin typeface="Arial" charset="0"/>
-                <a:ea typeface="ＭＳ Ｐゴシック" charset="0"/>
-              </a:rPr>
-              <a:t>Irrespective of whether it is best representation of an application</a:t>
-            </a:r>
-          </a:p>
-          <a:p>
-            <a:pPr lvl="2"/>
-            <a:r>
-              <a:rPr lang="en-US" dirty="0">
-                <a:latin typeface="Arial" charset="0"/>
-                <a:ea typeface="ＭＳ Ｐゴシック" charset="0"/>
-              </a:rPr>
-              <a:t>Resources availability at extreme scale is </a:t>
-            </a:r>
-            <a:r>
-              <a:rPr lang="en-US" dirty="0" smtClean="0">
-                <a:latin typeface="Arial" charset="0"/>
-                <a:ea typeface="ＭＳ Ｐゴシック" charset="0"/>
-              </a:rPr>
-              <a:t>variable</a:t>
-            </a:r>
-          </a:p>
-          <a:p>
-            <a:pPr lvl="2"/>
-            <a:endParaRPr lang="en-US" dirty="0">
-              <a:latin typeface="Arial" charset="0"/>
-              <a:ea typeface="ＭＳ Ｐゴシック" charset="0"/>
-            </a:endParaRPr>
-          </a:p>
-          <a:p>
-            <a:pPr lvl="1"/>
-            <a:r>
-              <a:rPr lang="en-US" dirty="0" smtClean="0">
-                <a:latin typeface="Arial" charset="0"/>
-                <a:ea typeface="ＭＳ Ｐゴシック" charset="0"/>
-              </a:rPr>
-              <a:t>Optimal </a:t>
-            </a:r>
-            <a:r>
-              <a:rPr lang="en-US" dirty="0">
-                <a:latin typeface="Arial" charset="0"/>
-                <a:ea typeface="ＭＳ Ｐゴシック" charset="0"/>
-              </a:rPr>
-              <a:t>Mapping: Workload to Resource Mapping</a:t>
-            </a:r>
-          </a:p>
-          <a:p>
-            <a:pPr lvl="2"/>
-            <a:r>
-              <a:rPr lang="en-US" dirty="0">
-                <a:latin typeface="Arial" charset="0"/>
-                <a:ea typeface="ＭＳ Ｐゴシック" charset="0"/>
-              </a:rPr>
-              <a:t>Static versus Dynamic </a:t>
-            </a:r>
-            <a:r>
-              <a:rPr lang="en-US" dirty="0" smtClean="0">
-                <a:latin typeface="Arial" charset="0"/>
-                <a:ea typeface="ＭＳ Ｐゴシック" charset="0"/>
-              </a:rPr>
-              <a:t>Mapping</a:t>
-            </a:r>
-            <a:endParaRPr lang="en-US" dirty="0">
-              <a:latin typeface="Arial" charset="0"/>
-              <a:ea typeface="ＭＳ Ｐゴシック" charset="0"/>
-            </a:endParaRPr>
-          </a:p>
-        </p:txBody>
-      </p:sp>
-    </p:spTree>
-    <p:extLst>
-      <p:ext uri="{BB962C8B-B14F-4D97-AF65-F5344CB8AC3E}">
-        <p14:creationId xmlns:p14="http://schemas.microsoft.com/office/powerpoint/2010/main" val="797019325"/>
-      </p:ext>
-    </p:extLst>
-  </p:cSld>
-  <p:clrMapOvr>
-    <a:masterClrMapping/>
-  </p:clrMapOvr>
-</p:sld>
-</file>
-
-<file path=ppt/slides/slide29.xml><?xml version="1.0" encoding="utf-8"?>
-<p:sld xmlns:a="http://schemas.openxmlformats.org/drawingml/2006/main" xmlns:r="http://schemas.openxmlformats.org/officeDocument/2006/relationships" xmlns:p="http://schemas.openxmlformats.org/presentationml/2006/main">
-  <p:cSld>
-    <p:spTree>
-      <p:nvGrpSpPr>
-        <p:cNvPr id="1" name="Shape 46"/>
-        <p:cNvGrpSpPr/>
-        <p:nvPr/>
-      </p:nvGrpSpPr>
-      <p:grpSpPr>
-        <a:xfrm>
-          <a:off x="0" y="0"/>
-          <a:ext cx="0" cy="0"/>
-          <a:chOff x="0" y="0"/>
-          <a:chExt cx="0" cy="0"/>
-        </a:xfrm>
-      </p:grpSpPr>
-      <p:sp>
-        <p:nvSpPr>
-          <p:cNvPr id="47" name="Shape 47"/>
-          <p:cNvSpPr txBox="1">
-            <a:spLocks noGrp="1"/>
-          </p:cNvSpPr>
-          <p:nvPr>
-            <p:ph type="title"/>
-          </p:nvPr>
-        </p:nvSpPr>
-        <p:spPr>
-          <a:prstGeom prst="rect">
-            <a:avLst/>
-          </a:prstGeom>
-        </p:spPr>
-        <p:txBody>
-          <a:bodyPr lIns="91425" tIns="91425" rIns="91425" bIns="91425" anchor="b" anchorCtr="0">
-            <a:noAutofit/>
-          </a:bodyPr>
-          <a:lstStyle/>
-          <a:p>
-            <a:pPr lvl="0" rtl="0">
-              <a:buNone/>
-            </a:pPr>
-            <a:r>
-              <a:rPr lang="en-US" dirty="0" err="1" smtClean="0"/>
-              <a:t>ModSim</a:t>
-            </a:r>
-            <a:r>
-              <a:rPr lang="en-US" dirty="0" smtClean="0"/>
-              <a:t> Challenges</a:t>
-            </a:r>
-            <a:r>
-              <a:rPr lang="en" dirty="0"/>
-              <a:t>	</a:t>
-            </a:r>
-          </a:p>
-        </p:txBody>
-      </p:sp>
-      <p:sp>
-        <p:nvSpPr>
-          <p:cNvPr id="48" name="Shape 48"/>
-          <p:cNvSpPr txBox="1">
-            <a:spLocks noGrp="1"/>
-          </p:cNvSpPr>
-          <p:nvPr>
-            <p:ph idx="4294967295"/>
-          </p:nvPr>
-        </p:nvSpPr>
-        <p:spPr>
-          <a:xfrm>
-            <a:off x="282231" y="789713"/>
-            <a:ext cx="8715010" cy="5146675"/>
-          </a:xfrm>
-          <a:prstGeom prst="rect">
-            <a:avLst/>
-          </a:prstGeom>
-        </p:spPr>
-        <p:txBody>
-          <a:bodyPr lIns="91425" tIns="91425" rIns="91425" bIns="91425" anchor="t" anchorCtr="0">
-            <a:noAutofit/>
-          </a:bodyPr>
-          <a:lstStyle/>
-          <a:p>
-            <a:pPr>
-              <a:lnSpc>
-                <a:spcPct val="90000"/>
-              </a:lnSpc>
-            </a:pPr>
-            <a:r>
-              <a:rPr lang="en-US" dirty="0" smtClean="0"/>
-              <a:t>Overarching Consideration: How does modeling DEC couple to and synergize with HPC </a:t>
-            </a:r>
-            <a:r>
-              <a:rPr lang="en-US" dirty="0" err="1" smtClean="0"/>
-              <a:t>exascale</a:t>
-            </a:r>
-            <a:r>
-              <a:rPr lang="en-US" dirty="0" smtClean="0"/>
-              <a:t> modeling efforts?</a:t>
-            </a:r>
-          </a:p>
-          <a:p>
-            <a:pPr>
-              <a:lnSpc>
-                <a:spcPct val="90000"/>
-              </a:lnSpc>
-            </a:pPr>
-            <a:r>
-              <a:rPr lang="en-US" dirty="0" smtClean="0"/>
-              <a:t>Operational Challenges: </a:t>
-            </a:r>
-          </a:p>
-          <a:p>
-            <a:pPr lvl="1">
-              <a:lnSpc>
-                <a:spcPct val="90000"/>
-              </a:lnSpc>
-            </a:pPr>
-            <a:r>
-              <a:rPr lang="en-US" dirty="0" smtClean="0"/>
-              <a:t>Granularity</a:t>
-            </a:r>
-          </a:p>
-          <a:p>
-            <a:pPr lvl="2">
-              <a:lnSpc>
-                <a:spcPct val="90000"/>
-              </a:lnSpc>
-            </a:pPr>
-            <a:r>
-              <a:rPr lang="en-US" dirty="0" smtClean="0"/>
-              <a:t>Different models of varying specificity</a:t>
-            </a:r>
-          </a:p>
-          <a:p>
-            <a:pPr lvl="2">
-              <a:lnSpc>
-                <a:spcPct val="90000"/>
-              </a:lnSpc>
-            </a:pPr>
-            <a:r>
-              <a:rPr lang="en-US" dirty="0" smtClean="0"/>
-              <a:t>Some are analytical, some are conceptual </a:t>
-            </a:r>
-          </a:p>
-          <a:p>
-            <a:pPr lvl="1">
-              <a:lnSpc>
-                <a:spcPct val="90000"/>
-              </a:lnSpc>
-            </a:pPr>
-            <a:r>
-              <a:rPr lang="en-US" dirty="0" smtClean="0"/>
-              <a:t>Multi-scale</a:t>
-            </a:r>
-          </a:p>
-          <a:p>
-            <a:pPr lvl="2">
-              <a:lnSpc>
-                <a:spcPct val="90000"/>
-              </a:lnSpc>
-            </a:pPr>
-            <a:r>
-              <a:rPr lang="en-US" dirty="0" smtClean="0"/>
-              <a:t>Macroscopic versus microscopic consequences</a:t>
-            </a:r>
-          </a:p>
-          <a:p>
-            <a:pPr lvl="1">
-              <a:lnSpc>
-                <a:spcPct val="90000"/>
-              </a:lnSpc>
-            </a:pPr>
-            <a:r>
-              <a:rPr lang="en-US" dirty="0" smtClean="0"/>
-              <a:t>Many possible parameters, which should be used?</a:t>
-            </a:r>
-          </a:p>
-          <a:p>
-            <a:pPr lvl="2">
-              <a:lnSpc>
-                <a:spcPct val="90000"/>
-              </a:lnSpc>
-            </a:pPr>
-            <a:r>
-              <a:rPr lang="en-US" dirty="0" smtClean="0"/>
-              <a:t>Linking models that reason using different parameters, e.g., energy considerations may not play a role at large-scale distribution	</a:t>
-            </a:r>
-          </a:p>
-          <a:p>
-            <a:pPr lvl="1">
-              <a:lnSpc>
-                <a:spcPct val="90000"/>
-              </a:lnSpc>
-            </a:pPr>
-            <a:r>
-              <a:rPr lang="en-US" dirty="0" smtClean="0"/>
-              <a:t>Heterogeneity</a:t>
-            </a:r>
-          </a:p>
-          <a:p>
-            <a:pPr lvl="2">
-              <a:lnSpc>
-                <a:spcPct val="90000"/>
-              </a:lnSpc>
-            </a:pPr>
-            <a:r>
-              <a:rPr lang="en-US" dirty="0" smtClean="0"/>
-              <a:t>Federating heterogeneous distributed infrastructure</a:t>
-            </a:r>
-          </a:p>
-          <a:p>
-            <a:pPr lvl="1">
-              <a:lnSpc>
-                <a:spcPct val="90000"/>
-              </a:lnSpc>
-            </a:pPr>
-            <a:endParaRPr lang="en-US" dirty="0" smtClean="0"/>
-          </a:p>
-          <a:p>
-            <a:pPr marL="0" indent="0">
-              <a:lnSpc>
-                <a:spcPct val="90000"/>
-              </a:lnSpc>
-              <a:buNone/>
-            </a:pPr>
-            <a:endParaRPr lang="en-US" sz="2000" dirty="0"/>
-          </a:p>
-          <a:p>
-            <a:pPr marL="457200" lvl="1" indent="0">
-              <a:lnSpc>
-                <a:spcPct val="90000"/>
-              </a:lnSpc>
-              <a:buNone/>
-            </a:pPr>
-            <a:endParaRPr lang="en-US" sz="2000" dirty="0">
-              <a:solidFill>
-                <a:srgbClr val="606060"/>
-              </a:solidFill>
-            </a:endParaRPr>
-          </a:p>
-        </p:txBody>
-      </p:sp>
-    </p:spTree>
-    <p:extLst>
-      <p:ext uri="{BB962C8B-B14F-4D97-AF65-F5344CB8AC3E}">
-        <p14:creationId xmlns:p14="http://schemas.microsoft.com/office/powerpoint/2010/main" val="2469319972"/>
-      </p:ext>
-    </p:extLst>
-  </p:cSld>
-  <p:clrMapOvr>
-    <a:masterClrMapping/>
-  </p:clrMapOvr>
-  <p:transition xmlns:p14="http://schemas.microsoft.com/office/powerpoint/2010/main" spd="slow">
-    <p:cut/>
-  </p:transition>
-  <p:timing>
-    <p:tnLst>
-      <p:par>
-        <p:cTn xmlns:p14="http://schemas.microsoft.com/office/powerpoint/2010/main" id="1" dur="indefinite" restart="never" nodeType="tmRoot"/>
-      </p:par>
-    </p:tnLst>
-  </p:timing>
 </p:sld>
 </file>
 
@@ -11299,6 +10146,25 @@
               <a:buSzPct val="100000"/>
             </a:pPr>
             <a:r>
+              <a:rPr lang="en-US" sz="2000" dirty="0">
+                <a:solidFill>
+                  <a:schemeClr val="tx1">
+                    <a:lumMod val="65000"/>
+                    <a:lumOff val="35000"/>
+                  </a:schemeClr>
+                </a:solidFill>
+              </a:rPr>
+              <a:t>Support reasoning and predictable behavior</a:t>
+            </a:r>
+          </a:p>
+          <a:p>
+            <a:pPr marL="1208088" lvl="2" indent="-342900">
+              <a:buClr>
+                <a:srgbClr val="000000"/>
+              </a:buClr>
+              <a:buSzPct val="100000"/>
+            </a:pPr>
+            <a:r>
               <a:rPr lang="en-US" sz="2000" dirty="0" smtClean="0"/>
               <a:t>What </a:t>
             </a:r>
@@ -11320,8 +10186,29 @@
             </a:r>
             <a:r>
               <a:rPr lang="en-US" sz="2000" dirty="0"/>
-              <a:t>to distribute? </a:t>
-            </a:r>
+              <a:t>to distribute</a:t>
+            </a:r>
+            <a:r>
+              <a:rPr lang="en-US" sz="2000" dirty="0" smtClean="0"/>
+              <a:t>?</a:t>
+            </a:r>
+          </a:p>
+          <a:p>
+            <a:pPr marL="1208088" lvl="2" indent="-342900">
+              <a:buClr>
+                <a:srgbClr val="000000"/>
+              </a:buClr>
+              <a:buSzPct val="100000"/>
+            </a:pPr>
+            <a:r>
+              <a:rPr lang="en-US" sz="2000" dirty="0" smtClean="0"/>
+              <a:t>Estimate time to completion? </a:t>
+            </a:r>
+            <a:r>
+              <a:rPr lang="en-US" sz="2000" dirty="0" smtClean="0"/>
+              <a:t> </a:t>
+            </a:r>
+            <a:endParaRPr lang="en-US" sz="2000" dirty="0"/>
           </a:p>
           <a:p>
             <a:pPr marL="800100" lvl="1" indent="-342900">
@@ -11341,25 +10228,6 @@
             <a:r>
               <a:rPr lang="en-US" sz="2000" dirty="0" smtClean="0"/>
               <a:t>applications and resources (compute, data and networks) </a:t>
-            </a:r>
-          </a:p>
-          <a:p>
-            <a:pPr marL="800100" lvl="1" indent="-342900">
-              <a:buClr>
-                <a:srgbClr val="000000"/>
-              </a:buClr>
-              <a:buSzPct val="100000"/>
-            </a:pPr>
-            <a:r>
-              <a:rPr lang="en-US" sz="2000" dirty="0" smtClean="0">
-                <a:solidFill>
-                  <a:schemeClr val="tx1">
-                    <a:lumMod val="65000"/>
-                    <a:lumOff val="35000"/>
-                  </a:schemeClr>
-                </a:solidFill>
-              </a:rPr>
-              <a:t>Support reasoning and predictable behavior</a:t>
             </a:r>
           </a:p>
           <a:p>
@@ -11533,85 +10401,6 @@
                   <a:lumMod val="75000"/>
                   <a:lumOff val="25000"/>
                 </a:schemeClr>
-              </a:solidFill>
-            </a:endParaRPr>
-          </a:p>
-          <a:p>
-            <a:pPr marL="800100" lvl="1" indent="-342900">
-              <a:buClr>
-                <a:srgbClr val="000000"/>
-              </a:buClr>
-              <a:buSzPct val="100000"/>
-            </a:pPr>
-            <a:r>
-              <a:rPr lang="en-US" sz="2000" dirty="0">
-                <a:solidFill>
-                  <a:schemeClr val="tx1">
-                    <a:lumMod val="75000"/>
-                    <a:lumOff val="25000"/>
-                  </a:schemeClr>
-                </a:solidFill>
-              </a:rPr>
-              <a:t>Abstracted application communication and dataflow </a:t>
-            </a:r>
-            <a:r>
-              <a:rPr lang="en-US" sz="2000" dirty="0" smtClean="0">
-                <a:solidFill>
-                  <a:schemeClr val="tx1">
-                    <a:lumMod val="75000"/>
-                    <a:lumOff val="25000"/>
-                  </a:schemeClr>
-                </a:solidFill>
-              </a:rPr>
-              <a:t>representation that </a:t>
-            </a:r>
-            <a:r>
-              <a:rPr lang="en-US" sz="2000" dirty="0">
-                <a:solidFill>
-                  <a:schemeClr val="tx1">
-                    <a:lumMod val="75000"/>
-                    <a:lumOff val="25000"/>
-                  </a:schemeClr>
-                </a:solidFill>
-              </a:rPr>
-              <a:t>captures application logic yet is </a:t>
-            </a:r>
-            <a:r>
-              <a:rPr lang="en-US" sz="2000" dirty="0" smtClean="0">
-                <a:solidFill>
-                  <a:schemeClr val="tx1">
-                    <a:lumMod val="75000"/>
-                    <a:lumOff val="25000"/>
-                  </a:schemeClr>
-                </a:solidFill>
-              </a:rPr>
-              <a:t>not application-specific and allows for reasoning on distribution</a:t>
-            </a:r>
-            <a:r>
-              <a:rPr lang="en-US" sz="2000" dirty="0">
-                <a:solidFill>
-                  <a:schemeClr val="tx1">
-                    <a:lumMod val="75000"/>
-                    <a:lumOff val="25000"/>
-                  </a:schemeClr>
-                </a:solidFill>
-              </a:rPr>
-              <a:t>, scheduling, </a:t>
-            </a:r>
-            <a:r>
-              <a:rPr lang="en-US" sz="2000" dirty="0" smtClean="0">
-                <a:solidFill>
-                  <a:schemeClr val="tx1">
-                    <a:lumMod val="75000"/>
-                    <a:lumOff val="25000"/>
-                  </a:schemeClr>
-                </a:solidFill>
-              </a:rPr>
-              <a:t>placement</a:t>
-            </a:r>
-            <a:endParaRPr lang="en-US" sz="2000" dirty="0">
-              <a:solidFill>
-                <a:srgbClr val="800000"/>
               </a:solidFill>
             </a:endParaRPr>
           </a:p>
@@ -11758,10 +10547,10 @@
                   </a:schemeClr>
                 </a:solidFill>
               </a:rPr>
-              <a:t>Not </a:t>
-            </a:r>
-            <a:r>
-              <a:rPr lang="en-US" dirty="0">
+              <a:t>Does not just </a:t>
+            </a:r>
+            <a:r>
+              <a:rPr lang="en-US" dirty="0" smtClean="0">
                 <a:solidFill>
                   <a:schemeClr val="tx1">
                     <a:lumMod val="65000"/>
@@ -11769,7 +10558,7 @@
                   </a:schemeClr>
                 </a:solidFill>
               </a:rPr>
-              <a:t>just </a:t>
+              <a:t>“</a:t>
             </a:r>
             <a:r>
               <a:rPr lang="en-US" dirty="0" smtClean="0">
@@ -11780,7 +10569,18 @@
                   </a:schemeClr>
                 </a:solidFill>
               </a:rPr>
-              <a:t>“glues” different </a:t>
+              <a:t>glue” </a:t>
+            </a:r>
+            <a:r>
+              <a:rPr lang="en-US" dirty="0" smtClean="0">
+                <a:solidFill>
+                  <a:schemeClr val="tx1">
+                    <a:lumMod val="65000"/>
+                    <a:lumOff val="35000"/>
+                  </a:schemeClr>
+                </a:solidFill>
+              </a:rPr>
+              <a:t>different </a:t>
             </a:r>
             <a:r>
               <a:rPr lang="en-US" dirty="0">

</xml_diff>